<commit_message>
Deploying to gh-pages from @ sean4andrew/safuncs@dfbb32d6cc392ebeb66c696f8386581687c77c0a 🚀
</commit_message>
<xml_diff>
--- a/reference/ONDA_XX-Hazard-Curve.pptx
+++ b/reference/ONDA_XX-Hazard-Curve.pptx
@@ -2531,7 +2531,7 @@
           </p:nvSpPr>
           <p:spPr>
             <a:xfrm>
-              <a:off x="1475299" y="983989"/>
+              <a:off x="1510661" y="983989"/>
               <a:ext cx="0" cy="3185376"/>
             </a:xfrm>
             <a:custGeom>
@@ -2574,7 +2574,7 @@
           </p:nvSpPr>
           <p:spPr>
             <a:xfrm>
-              <a:off x="1828917" y="983989"/>
+              <a:off x="1793555" y="983989"/>
               <a:ext cx="0" cy="3185376"/>
             </a:xfrm>
             <a:custGeom>
@@ -2617,7 +2617,7 @@
           </p:nvSpPr>
           <p:spPr>
             <a:xfrm>
-              <a:off x="2182534" y="983989"/>
+              <a:off x="2076449" y="983989"/>
               <a:ext cx="0" cy="3185376"/>
             </a:xfrm>
             <a:custGeom>
@@ -2660,7 +2660,7 @@
           </p:nvSpPr>
           <p:spPr>
             <a:xfrm>
-              <a:off x="2536152" y="983989"/>
+              <a:off x="2359343" y="983989"/>
               <a:ext cx="0" cy="3185376"/>
             </a:xfrm>
             <a:custGeom>
@@ -2703,7 +2703,7 @@
           </p:nvSpPr>
           <p:spPr>
             <a:xfrm>
-              <a:off x="2889769" y="983989"/>
+              <a:off x="2642237" y="983989"/>
               <a:ext cx="0" cy="3185376"/>
             </a:xfrm>
             <a:custGeom>
@@ -2746,7 +2746,7 @@
           </p:nvSpPr>
           <p:spPr>
             <a:xfrm>
-              <a:off x="3243387" y="983989"/>
+              <a:off x="2925131" y="983989"/>
               <a:ext cx="0" cy="3185376"/>
             </a:xfrm>
             <a:custGeom>
@@ -2789,7 +2789,7 @@
           </p:nvSpPr>
           <p:spPr>
             <a:xfrm>
-              <a:off x="3597004" y="983989"/>
+              <a:off x="3208025" y="983989"/>
               <a:ext cx="0" cy="3185376"/>
             </a:xfrm>
             <a:custGeom>
@@ -2832,7 +2832,7 @@
           </p:nvSpPr>
           <p:spPr>
             <a:xfrm>
-              <a:off x="3950622" y="983989"/>
+              <a:off x="3490919" y="983989"/>
               <a:ext cx="0" cy="3185376"/>
             </a:xfrm>
             <a:custGeom>
@@ -2875,7 +2875,7 @@
           </p:nvSpPr>
           <p:spPr>
             <a:xfrm>
-              <a:off x="4304239" y="983989"/>
+              <a:off x="3773813" y="983989"/>
               <a:ext cx="0" cy="3185376"/>
             </a:xfrm>
             <a:custGeom>
@@ -2918,7 +2918,7 @@
           </p:nvSpPr>
           <p:spPr>
             <a:xfrm>
-              <a:off x="4657857" y="983989"/>
+              <a:off x="4056707" y="983989"/>
               <a:ext cx="0" cy="3185376"/>
             </a:xfrm>
             <a:custGeom>
@@ -2961,7 +2961,7 @@
           </p:nvSpPr>
           <p:spPr>
             <a:xfrm>
-              <a:off x="5011475" y="983989"/>
+              <a:off x="4339601" y="983989"/>
               <a:ext cx="0" cy="3185376"/>
             </a:xfrm>
             <a:custGeom>
@@ -3004,7 +3004,7 @@
           </p:nvSpPr>
           <p:spPr>
             <a:xfrm>
-              <a:off x="5365092" y="983989"/>
+              <a:off x="4622495" y="983989"/>
               <a:ext cx="0" cy="3185376"/>
             </a:xfrm>
             <a:custGeom>
@@ -3047,179 +3047,7 @@
           </p:nvSpPr>
           <p:spPr>
             <a:xfrm>
-              <a:off x="1461154" y="4024575"/>
-              <a:ext cx="4200976" cy="0"/>
-            </a:xfrm>
-            <a:custGeom>
-              <a:avLst/>
-              <a:pathLst>
-                <a:path w="4200976" h="0">
-                  <a:moveTo>
-                    <a:pt x="0" y="0"/>
-                  </a:moveTo>
-                  <a:lnTo>
-                    <a:pt x="4200976" y="0"/>
-                  </a:lnTo>
-                  <a:lnTo>
-                    <a:pt x="4200976" y="0"/>
-                  </a:lnTo>
-                </a:path>
-              </a:pathLst>
-            </a:custGeom>
-            <a:ln w="13550" cap="flat">
-              <a:solidFill>
-                <a:srgbClr val="FFFFFF">
-                  <a:alpha val="100000"/>
-                </a:srgbClr>
-              </a:solidFill>
-              <a:prstDash val="solid"/>
-              <a:round/>
-            </a:ln>
-          </p:spPr>
-          <p:txBody>
-            <a:bodyPr/>
-            <a:lstStyle/>
-            <a:p/>
-          </p:txBody>
-        </p:sp>
-        <p:sp>
-          <p:nvSpPr>
-            <p:cNvPr id="24" name="pl23"/>
-            <p:cNvSpPr/>
-            <p:nvPr/>
-          </p:nvSpPr>
-          <p:spPr>
-            <a:xfrm>
-              <a:off x="1461154" y="3178134"/>
-              <a:ext cx="4200976" cy="0"/>
-            </a:xfrm>
-            <a:custGeom>
-              <a:avLst/>
-              <a:pathLst>
-                <a:path w="4200976" h="0">
-                  <a:moveTo>
-                    <a:pt x="0" y="0"/>
-                  </a:moveTo>
-                  <a:lnTo>
-                    <a:pt x="4200976" y="0"/>
-                  </a:lnTo>
-                  <a:lnTo>
-                    <a:pt x="4200976" y="0"/>
-                  </a:lnTo>
-                </a:path>
-              </a:pathLst>
-            </a:custGeom>
-            <a:ln w="13550" cap="flat">
-              <a:solidFill>
-                <a:srgbClr val="FFFFFF">
-                  <a:alpha val="100000"/>
-                </a:srgbClr>
-              </a:solidFill>
-              <a:prstDash val="solid"/>
-              <a:round/>
-            </a:ln>
-          </p:spPr>
-          <p:txBody>
-            <a:bodyPr/>
-            <a:lstStyle/>
-            <a:p/>
-          </p:txBody>
-        </p:sp>
-        <p:sp>
-          <p:nvSpPr>
-            <p:cNvPr id="25" name="pl24"/>
-            <p:cNvSpPr/>
-            <p:nvPr/>
-          </p:nvSpPr>
-          <p:spPr>
-            <a:xfrm>
-              <a:off x="1461154" y="2331694"/>
-              <a:ext cx="4200976" cy="0"/>
-            </a:xfrm>
-            <a:custGeom>
-              <a:avLst/>
-              <a:pathLst>
-                <a:path w="4200976" h="0">
-                  <a:moveTo>
-                    <a:pt x="0" y="0"/>
-                  </a:moveTo>
-                  <a:lnTo>
-                    <a:pt x="4200976" y="0"/>
-                  </a:lnTo>
-                  <a:lnTo>
-                    <a:pt x="4200976" y="0"/>
-                  </a:lnTo>
-                </a:path>
-              </a:pathLst>
-            </a:custGeom>
-            <a:ln w="13550" cap="flat">
-              <a:solidFill>
-                <a:srgbClr val="FFFFFF">
-                  <a:alpha val="100000"/>
-                </a:srgbClr>
-              </a:solidFill>
-              <a:prstDash val="solid"/>
-              <a:round/>
-            </a:ln>
-          </p:spPr>
-          <p:txBody>
-            <a:bodyPr/>
-            <a:lstStyle/>
-            <a:p/>
-          </p:txBody>
-        </p:sp>
-        <p:sp>
-          <p:nvSpPr>
-            <p:cNvPr id="26" name="pl25"/>
-            <p:cNvSpPr/>
-            <p:nvPr/>
-          </p:nvSpPr>
-          <p:spPr>
-            <a:xfrm>
-              <a:off x="1461154" y="1485253"/>
-              <a:ext cx="4200976" cy="0"/>
-            </a:xfrm>
-            <a:custGeom>
-              <a:avLst/>
-              <a:pathLst>
-                <a:path w="4200976" h="0">
-                  <a:moveTo>
-                    <a:pt x="0" y="0"/>
-                  </a:moveTo>
-                  <a:lnTo>
-                    <a:pt x="4200976" y="0"/>
-                  </a:lnTo>
-                  <a:lnTo>
-                    <a:pt x="4200976" y="0"/>
-                  </a:lnTo>
-                </a:path>
-              </a:pathLst>
-            </a:custGeom>
-            <a:ln w="13550" cap="flat">
-              <a:solidFill>
-                <a:srgbClr val="FFFFFF">
-                  <a:alpha val="100000"/>
-                </a:srgbClr>
-              </a:solidFill>
-              <a:prstDash val="solid"/>
-              <a:round/>
-            </a:ln>
-          </p:spPr>
-          <p:txBody>
-            <a:bodyPr/>
-            <a:lstStyle/>
-            <a:p/>
-          </p:txBody>
-        </p:sp>
-        <p:sp>
-          <p:nvSpPr>
-            <p:cNvPr id="27" name="pl26"/>
-            <p:cNvSpPr/>
-            <p:nvPr/>
-          </p:nvSpPr>
-          <p:spPr>
-            <a:xfrm>
-              <a:off x="1652108" y="983989"/>
+              <a:off x="4905389" y="983989"/>
               <a:ext cx="0" cy="3185376"/>
             </a:xfrm>
             <a:custGeom>
@@ -3238,7 +3066,7 @@
                 </a:path>
               </a:pathLst>
             </a:custGeom>
-            <a:ln w="13550" cap="flat">
+            <a:ln w="6775" cap="flat">
               <a:solidFill>
                 <a:srgbClr val="FFFFFF">
                   <a:alpha val="100000"/>
@@ -3256,13 +3084,13 @@
         </p:sp>
         <p:sp>
           <p:nvSpPr>
-            <p:cNvPr id="28" name="pl27"/>
-            <p:cNvSpPr/>
-            <p:nvPr/>
-          </p:nvSpPr>
-          <p:spPr>
-            <a:xfrm>
-              <a:off x="2005725" y="983989"/>
+            <p:cNvPr id="24" name="pl23"/>
+            <p:cNvSpPr/>
+            <p:nvPr/>
+          </p:nvSpPr>
+          <p:spPr>
+            <a:xfrm>
+              <a:off x="5188283" y="983989"/>
               <a:ext cx="0" cy="3185376"/>
             </a:xfrm>
             <a:custGeom>
@@ -3281,7 +3109,7 @@
                 </a:path>
               </a:pathLst>
             </a:custGeom>
-            <a:ln w="13550" cap="flat">
+            <a:ln w="6775" cap="flat">
               <a:solidFill>
                 <a:srgbClr val="FFFFFF">
                   <a:alpha val="100000"/>
@@ -3299,13 +3127,13 @@
         </p:sp>
         <p:sp>
           <p:nvSpPr>
-            <p:cNvPr id="29" name="pl28"/>
-            <p:cNvSpPr/>
-            <p:nvPr/>
-          </p:nvSpPr>
-          <p:spPr>
-            <a:xfrm>
-              <a:off x="2359343" y="983989"/>
+            <p:cNvPr id="25" name="pl24"/>
+            <p:cNvSpPr/>
+            <p:nvPr/>
+          </p:nvSpPr>
+          <p:spPr>
+            <a:xfrm>
+              <a:off x="5471177" y="983989"/>
               <a:ext cx="0" cy="3185376"/>
             </a:xfrm>
             <a:custGeom>
@@ -3324,6 +3152,49 @@
                 </a:path>
               </a:pathLst>
             </a:custGeom>
+            <a:ln w="6775" cap="flat">
+              <a:solidFill>
+                <a:srgbClr val="FFFFFF">
+                  <a:alpha val="100000"/>
+                </a:srgbClr>
+              </a:solidFill>
+              <a:prstDash val="solid"/>
+              <a:round/>
+            </a:ln>
+          </p:spPr>
+          <p:txBody>
+            <a:bodyPr/>
+            <a:lstStyle/>
+            <a:p/>
+          </p:txBody>
+        </p:sp>
+        <p:sp>
+          <p:nvSpPr>
+            <p:cNvPr id="26" name="pl25"/>
+            <p:cNvSpPr/>
+            <p:nvPr/>
+          </p:nvSpPr>
+          <p:spPr>
+            <a:xfrm>
+              <a:off x="1461154" y="4024575"/>
+              <a:ext cx="4200976" cy="0"/>
+            </a:xfrm>
+            <a:custGeom>
+              <a:avLst/>
+              <a:pathLst>
+                <a:path w="4200976" h="0">
+                  <a:moveTo>
+                    <a:pt x="0" y="0"/>
+                  </a:moveTo>
+                  <a:lnTo>
+                    <a:pt x="4200976" y="0"/>
+                  </a:lnTo>
+                  <a:lnTo>
+                    <a:pt x="4200976" y="0"/>
+                  </a:lnTo>
+                </a:path>
+              </a:pathLst>
+            </a:custGeom>
             <a:ln w="13550" cap="flat">
               <a:solidFill>
                 <a:srgbClr val="FFFFFF">
@@ -3342,13 +3213,142 @@
         </p:sp>
         <p:sp>
           <p:nvSpPr>
+            <p:cNvPr id="27" name="pl26"/>
+            <p:cNvSpPr/>
+            <p:nvPr/>
+          </p:nvSpPr>
+          <p:spPr>
+            <a:xfrm>
+              <a:off x="1461154" y="3178134"/>
+              <a:ext cx="4200976" cy="0"/>
+            </a:xfrm>
+            <a:custGeom>
+              <a:avLst/>
+              <a:pathLst>
+                <a:path w="4200976" h="0">
+                  <a:moveTo>
+                    <a:pt x="0" y="0"/>
+                  </a:moveTo>
+                  <a:lnTo>
+                    <a:pt x="4200976" y="0"/>
+                  </a:lnTo>
+                  <a:lnTo>
+                    <a:pt x="4200976" y="0"/>
+                  </a:lnTo>
+                </a:path>
+              </a:pathLst>
+            </a:custGeom>
+            <a:ln w="13550" cap="flat">
+              <a:solidFill>
+                <a:srgbClr val="FFFFFF">
+                  <a:alpha val="100000"/>
+                </a:srgbClr>
+              </a:solidFill>
+              <a:prstDash val="solid"/>
+              <a:round/>
+            </a:ln>
+          </p:spPr>
+          <p:txBody>
+            <a:bodyPr/>
+            <a:lstStyle/>
+            <a:p/>
+          </p:txBody>
+        </p:sp>
+        <p:sp>
+          <p:nvSpPr>
+            <p:cNvPr id="28" name="pl27"/>
+            <p:cNvSpPr/>
+            <p:nvPr/>
+          </p:nvSpPr>
+          <p:spPr>
+            <a:xfrm>
+              <a:off x="1461154" y="2331694"/>
+              <a:ext cx="4200976" cy="0"/>
+            </a:xfrm>
+            <a:custGeom>
+              <a:avLst/>
+              <a:pathLst>
+                <a:path w="4200976" h="0">
+                  <a:moveTo>
+                    <a:pt x="0" y="0"/>
+                  </a:moveTo>
+                  <a:lnTo>
+                    <a:pt x="4200976" y="0"/>
+                  </a:lnTo>
+                  <a:lnTo>
+                    <a:pt x="4200976" y="0"/>
+                  </a:lnTo>
+                </a:path>
+              </a:pathLst>
+            </a:custGeom>
+            <a:ln w="13550" cap="flat">
+              <a:solidFill>
+                <a:srgbClr val="FFFFFF">
+                  <a:alpha val="100000"/>
+                </a:srgbClr>
+              </a:solidFill>
+              <a:prstDash val="solid"/>
+              <a:round/>
+            </a:ln>
+          </p:spPr>
+          <p:txBody>
+            <a:bodyPr/>
+            <a:lstStyle/>
+            <a:p/>
+          </p:txBody>
+        </p:sp>
+        <p:sp>
+          <p:nvSpPr>
+            <p:cNvPr id="29" name="pl28"/>
+            <p:cNvSpPr/>
+            <p:nvPr/>
+          </p:nvSpPr>
+          <p:spPr>
+            <a:xfrm>
+              <a:off x="1461154" y="1485253"/>
+              <a:ext cx="4200976" cy="0"/>
+            </a:xfrm>
+            <a:custGeom>
+              <a:avLst/>
+              <a:pathLst>
+                <a:path w="4200976" h="0">
+                  <a:moveTo>
+                    <a:pt x="0" y="0"/>
+                  </a:moveTo>
+                  <a:lnTo>
+                    <a:pt x="4200976" y="0"/>
+                  </a:lnTo>
+                  <a:lnTo>
+                    <a:pt x="4200976" y="0"/>
+                  </a:lnTo>
+                </a:path>
+              </a:pathLst>
+            </a:custGeom>
+            <a:ln w="13550" cap="flat">
+              <a:solidFill>
+                <a:srgbClr val="FFFFFF">
+                  <a:alpha val="100000"/>
+                </a:srgbClr>
+              </a:solidFill>
+              <a:prstDash val="solid"/>
+              <a:round/>
+            </a:ln>
+          </p:spPr>
+          <p:txBody>
+            <a:bodyPr/>
+            <a:lstStyle/>
+            <a:p/>
+          </p:txBody>
+        </p:sp>
+        <p:sp>
+          <p:nvSpPr>
             <p:cNvPr id="30" name="pl29"/>
             <p:cNvSpPr/>
             <p:nvPr/>
           </p:nvSpPr>
           <p:spPr>
             <a:xfrm>
-              <a:off x="2712960" y="983989"/>
+              <a:off x="1652108" y="983989"/>
               <a:ext cx="0" cy="3185376"/>
             </a:xfrm>
             <a:custGeom>
@@ -3391,7 +3391,7 @@
           </p:nvSpPr>
           <p:spPr>
             <a:xfrm>
-              <a:off x="3066578" y="983989"/>
+              <a:off x="1935002" y="983989"/>
               <a:ext cx="0" cy="3185376"/>
             </a:xfrm>
             <a:custGeom>
@@ -3434,7 +3434,7 @@
           </p:nvSpPr>
           <p:spPr>
             <a:xfrm>
-              <a:off x="3420196" y="983989"/>
+              <a:off x="2217896" y="983989"/>
               <a:ext cx="0" cy="3185376"/>
             </a:xfrm>
             <a:custGeom>
@@ -3477,7 +3477,7 @@
           </p:nvSpPr>
           <p:spPr>
             <a:xfrm>
-              <a:off x="3773813" y="983989"/>
+              <a:off x="2500790" y="983989"/>
               <a:ext cx="0" cy="3185376"/>
             </a:xfrm>
             <a:custGeom>
@@ -3520,7 +3520,7 @@
           </p:nvSpPr>
           <p:spPr>
             <a:xfrm>
-              <a:off x="4127431" y="983989"/>
+              <a:off x="2783684" y="983989"/>
               <a:ext cx="0" cy="3185376"/>
             </a:xfrm>
             <a:custGeom>
@@ -3563,7 +3563,7 @@
           </p:nvSpPr>
           <p:spPr>
             <a:xfrm>
-              <a:off x="4481048" y="983989"/>
+              <a:off x="3066578" y="983989"/>
               <a:ext cx="0" cy="3185376"/>
             </a:xfrm>
             <a:custGeom>
@@ -3606,7 +3606,7 @@
           </p:nvSpPr>
           <p:spPr>
             <a:xfrm>
-              <a:off x="4834666" y="983989"/>
+              <a:off x="3349472" y="983989"/>
               <a:ext cx="0" cy="3185376"/>
             </a:xfrm>
             <a:custGeom>
@@ -3649,7 +3649,7 @@
           </p:nvSpPr>
           <p:spPr>
             <a:xfrm>
-              <a:off x="5188283" y="983989"/>
+              <a:off x="3632366" y="983989"/>
               <a:ext cx="0" cy="3185376"/>
             </a:xfrm>
             <a:custGeom>
@@ -3692,7 +3692,7 @@
           </p:nvSpPr>
           <p:spPr>
             <a:xfrm>
-              <a:off x="5541901" y="983989"/>
+              <a:off x="3915260" y="983989"/>
               <a:ext cx="0" cy="3185376"/>
             </a:xfrm>
             <a:custGeom>
@@ -3735,6 +3735,264 @@
           </p:nvSpPr>
           <p:spPr>
             <a:xfrm>
+              <a:off x="4198154" y="983989"/>
+              <a:ext cx="0" cy="3185376"/>
+            </a:xfrm>
+            <a:custGeom>
+              <a:avLst/>
+              <a:pathLst>
+                <a:path w="0" h="3185376">
+                  <a:moveTo>
+                    <a:pt x="0" y="3185376"/>
+                  </a:moveTo>
+                  <a:lnTo>
+                    <a:pt x="0" y="0"/>
+                  </a:lnTo>
+                  <a:lnTo>
+                    <a:pt x="0" y="0"/>
+                  </a:lnTo>
+                </a:path>
+              </a:pathLst>
+            </a:custGeom>
+            <a:ln w="13550" cap="flat">
+              <a:solidFill>
+                <a:srgbClr val="FFFFFF">
+                  <a:alpha val="100000"/>
+                </a:srgbClr>
+              </a:solidFill>
+              <a:prstDash val="solid"/>
+              <a:round/>
+            </a:ln>
+          </p:spPr>
+          <p:txBody>
+            <a:bodyPr/>
+            <a:lstStyle/>
+            <a:p/>
+          </p:txBody>
+        </p:sp>
+        <p:sp>
+          <p:nvSpPr>
+            <p:cNvPr id="40" name="pl39"/>
+            <p:cNvSpPr/>
+            <p:nvPr/>
+          </p:nvSpPr>
+          <p:spPr>
+            <a:xfrm>
+              <a:off x="4481048" y="983989"/>
+              <a:ext cx="0" cy="3185376"/>
+            </a:xfrm>
+            <a:custGeom>
+              <a:avLst/>
+              <a:pathLst>
+                <a:path w="0" h="3185376">
+                  <a:moveTo>
+                    <a:pt x="0" y="3185376"/>
+                  </a:moveTo>
+                  <a:lnTo>
+                    <a:pt x="0" y="0"/>
+                  </a:lnTo>
+                  <a:lnTo>
+                    <a:pt x="0" y="0"/>
+                  </a:lnTo>
+                </a:path>
+              </a:pathLst>
+            </a:custGeom>
+            <a:ln w="13550" cap="flat">
+              <a:solidFill>
+                <a:srgbClr val="FFFFFF">
+                  <a:alpha val="100000"/>
+                </a:srgbClr>
+              </a:solidFill>
+              <a:prstDash val="solid"/>
+              <a:round/>
+            </a:ln>
+          </p:spPr>
+          <p:txBody>
+            <a:bodyPr/>
+            <a:lstStyle/>
+            <a:p/>
+          </p:txBody>
+        </p:sp>
+        <p:sp>
+          <p:nvSpPr>
+            <p:cNvPr id="41" name="pl40"/>
+            <p:cNvSpPr/>
+            <p:nvPr/>
+          </p:nvSpPr>
+          <p:spPr>
+            <a:xfrm>
+              <a:off x="4763942" y="983989"/>
+              <a:ext cx="0" cy="3185376"/>
+            </a:xfrm>
+            <a:custGeom>
+              <a:avLst/>
+              <a:pathLst>
+                <a:path w="0" h="3185376">
+                  <a:moveTo>
+                    <a:pt x="0" y="3185376"/>
+                  </a:moveTo>
+                  <a:lnTo>
+                    <a:pt x="0" y="0"/>
+                  </a:lnTo>
+                  <a:lnTo>
+                    <a:pt x="0" y="0"/>
+                  </a:lnTo>
+                </a:path>
+              </a:pathLst>
+            </a:custGeom>
+            <a:ln w="13550" cap="flat">
+              <a:solidFill>
+                <a:srgbClr val="FFFFFF">
+                  <a:alpha val="100000"/>
+                </a:srgbClr>
+              </a:solidFill>
+              <a:prstDash val="solid"/>
+              <a:round/>
+            </a:ln>
+          </p:spPr>
+          <p:txBody>
+            <a:bodyPr/>
+            <a:lstStyle/>
+            <a:p/>
+          </p:txBody>
+        </p:sp>
+        <p:sp>
+          <p:nvSpPr>
+            <p:cNvPr id="42" name="pl41"/>
+            <p:cNvSpPr/>
+            <p:nvPr/>
+          </p:nvSpPr>
+          <p:spPr>
+            <a:xfrm>
+              <a:off x="5046836" y="983989"/>
+              <a:ext cx="0" cy="3185376"/>
+            </a:xfrm>
+            <a:custGeom>
+              <a:avLst/>
+              <a:pathLst>
+                <a:path w="0" h="3185376">
+                  <a:moveTo>
+                    <a:pt x="0" y="3185376"/>
+                  </a:moveTo>
+                  <a:lnTo>
+                    <a:pt x="0" y="0"/>
+                  </a:lnTo>
+                  <a:lnTo>
+                    <a:pt x="0" y="0"/>
+                  </a:lnTo>
+                </a:path>
+              </a:pathLst>
+            </a:custGeom>
+            <a:ln w="13550" cap="flat">
+              <a:solidFill>
+                <a:srgbClr val="FFFFFF">
+                  <a:alpha val="100000"/>
+                </a:srgbClr>
+              </a:solidFill>
+              <a:prstDash val="solid"/>
+              <a:round/>
+            </a:ln>
+          </p:spPr>
+          <p:txBody>
+            <a:bodyPr/>
+            <a:lstStyle/>
+            <a:p/>
+          </p:txBody>
+        </p:sp>
+        <p:sp>
+          <p:nvSpPr>
+            <p:cNvPr id="43" name="pl42"/>
+            <p:cNvSpPr/>
+            <p:nvPr/>
+          </p:nvSpPr>
+          <p:spPr>
+            <a:xfrm>
+              <a:off x="5329730" y="983989"/>
+              <a:ext cx="0" cy="3185376"/>
+            </a:xfrm>
+            <a:custGeom>
+              <a:avLst/>
+              <a:pathLst>
+                <a:path w="0" h="3185376">
+                  <a:moveTo>
+                    <a:pt x="0" y="3185376"/>
+                  </a:moveTo>
+                  <a:lnTo>
+                    <a:pt x="0" y="0"/>
+                  </a:lnTo>
+                  <a:lnTo>
+                    <a:pt x="0" y="0"/>
+                  </a:lnTo>
+                </a:path>
+              </a:pathLst>
+            </a:custGeom>
+            <a:ln w="13550" cap="flat">
+              <a:solidFill>
+                <a:srgbClr val="FFFFFF">
+                  <a:alpha val="100000"/>
+                </a:srgbClr>
+              </a:solidFill>
+              <a:prstDash val="solid"/>
+              <a:round/>
+            </a:ln>
+          </p:spPr>
+          <p:txBody>
+            <a:bodyPr/>
+            <a:lstStyle/>
+            <a:p/>
+          </p:txBody>
+        </p:sp>
+        <p:sp>
+          <p:nvSpPr>
+            <p:cNvPr id="44" name="pl43"/>
+            <p:cNvSpPr/>
+            <p:nvPr/>
+          </p:nvSpPr>
+          <p:spPr>
+            <a:xfrm>
+              <a:off x="5612624" y="983989"/>
+              <a:ext cx="0" cy="3185376"/>
+            </a:xfrm>
+            <a:custGeom>
+              <a:avLst/>
+              <a:pathLst>
+                <a:path w="0" h="3185376">
+                  <a:moveTo>
+                    <a:pt x="0" y="3185376"/>
+                  </a:moveTo>
+                  <a:lnTo>
+                    <a:pt x="0" y="0"/>
+                  </a:lnTo>
+                  <a:lnTo>
+                    <a:pt x="0" y="0"/>
+                  </a:lnTo>
+                </a:path>
+              </a:pathLst>
+            </a:custGeom>
+            <a:ln w="13550" cap="flat">
+              <a:solidFill>
+                <a:srgbClr val="FFFFFF">
+                  <a:alpha val="100000"/>
+                </a:srgbClr>
+              </a:solidFill>
+              <a:prstDash val="solid"/>
+              <a:round/>
+            </a:ln>
+          </p:spPr>
+          <p:txBody>
+            <a:bodyPr/>
+            <a:lstStyle/>
+            <a:p/>
+          </p:txBody>
+        </p:sp>
+        <p:sp>
+          <p:nvSpPr>
+            <p:cNvPr id="45" name="pl44"/>
+            <p:cNvSpPr/>
+            <p:nvPr/>
+          </p:nvSpPr>
+          <p:spPr>
+            <a:xfrm>
               <a:off x="1687470" y="1128778"/>
               <a:ext cx="3748346" cy="2895796"/>
             </a:xfrm>
@@ -3925,7 +4183,7 @@
         </p:sp>
         <p:sp>
           <p:nvSpPr>
-            <p:cNvPr id="40" name="pt39"/>
+            <p:cNvPr id="46" name="pt45"/>
             <p:cNvSpPr/>
             <p:nvPr/>
           </p:nvSpPr>
@@ -3960,7 +4218,7 @@
         </p:sp>
         <p:sp>
           <p:nvSpPr>
-            <p:cNvPr id="41" name="pt40"/>
+            <p:cNvPr id="47" name="pt46"/>
             <p:cNvSpPr/>
             <p:nvPr/>
           </p:nvSpPr>
@@ -3995,7 +4253,7 @@
         </p:sp>
         <p:sp>
           <p:nvSpPr>
-            <p:cNvPr id="42" name="pt41"/>
+            <p:cNvPr id="48" name="pt47"/>
             <p:cNvSpPr/>
             <p:nvPr/>
           </p:nvSpPr>
@@ -4030,7 +4288,7 @@
         </p:sp>
         <p:sp>
           <p:nvSpPr>
-            <p:cNvPr id="43" name="pt42"/>
+            <p:cNvPr id="49" name="pt48"/>
             <p:cNvSpPr/>
             <p:nvPr/>
           </p:nvSpPr>
@@ -4065,7 +4323,7 @@
         </p:sp>
         <p:sp>
           <p:nvSpPr>
-            <p:cNvPr id="44" name="pt43"/>
+            <p:cNvPr id="50" name="pt49"/>
             <p:cNvSpPr/>
             <p:nvPr/>
           </p:nvSpPr>
@@ -4100,7 +4358,7 @@
         </p:sp>
         <p:sp>
           <p:nvSpPr>
-            <p:cNvPr id="45" name="pt44"/>
+            <p:cNvPr id="51" name="pt50"/>
             <p:cNvSpPr/>
             <p:nvPr/>
           </p:nvSpPr>
@@ -4135,7 +4393,7 @@
         </p:sp>
         <p:sp>
           <p:nvSpPr>
-            <p:cNvPr id="46" name="pt45"/>
+            <p:cNvPr id="52" name="pt51"/>
             <p:cNvSpPr/>
             <p:nvPr/>
           </p:nvSpPr>
@@ -4170,7 +4428,7 @@
         </p:sp>
         <p:sp>
           <p:nvSpPr>
-            <p:cNvPr id="47" name="pt46"/>
+            <p:cNvPr id="53" name="pt52"/>
             <p:cNvSpPr/>
             <p:nvPr/>
           </p:nvSpPr>
@@ -4205,7 +4463,7 @@
         </p:sp>
         <p:sp>
           <p:nvSpPr>
-            <p:cNvPr id="48" name="pt47"/>
+            <p:cNvPr id="54" name="pt53"/>
             <p:cNvSpPr/>
             <p:nvPr/>
           </p:nvSpPr>
@@ -4240,7 +4498,7 @@
         </p:sp>
         <p:sp>
           <p:nvSpPr>
-            <p:cNvPr id="49" name="pt48"/>
+            <p:cNvPr id="55" name="pt54"/>
             <p:cNvSpPr/>
             <p:nvPr/>
           </p:nvSpPr>
@@ -4275,7 +4533,7 @@
         </p:sp>
         <p:sp>
           <p:nvSpPr>
-            <p:cNvPr id="50" name="pt49"/>
+            <p:cNvPr id="56" name="pt55"/>
             <p:cNvSpPr/>
             <p:nvPr/>
           </p:nvSpPr>
@@ -4310,7 +4568,7 @@
         </p:sp>
         <p:sp>
           <p:nvSpPr>
-            <p:cNvPr id="51" name="pt50"/>
+            <p:cNvPr id="57" name="pt56"/>
             <p:cNvSpPr/>
             <p:nvPr/>
           </p:nvSpPr>
@@ -4345,7 +4603,7 @@
         </p:sp>
         <p:sp>
           <p:nvSpPr>
-            <p:cNvPr id="52" name="pt51"/>
+            <p:cNvPr id="58" name="pt57"/>
             <p:cNvSpPr/>
             <p:nvPr/>
           </p:nvSpPr>
@@ -4380,7 +4638,7 @@
         </p:sp>
         <p:sp>
           <p:nvSpPr>
-            <p:cNvPr id="53" name="pt52"/>
+            <p:cNvPr id="59" name="pt58"/>
             <p:cNvSpPr/>
             <p:nvPr/>
           </p:nvSpPr>
@@ -4415,7 +4673,7 @@
         </p:sp>
         <p:sp>
           <p:nvSpPr>
-            <p:cNvPr id="54" name="pt53"/>
+            <p:cNvPr id="60" name="pt59"/>
             <p:cNvSpPr/>
             <p:nvPr/>
           </p:nvSpPr>
@@ -4450,7 +4708,7 @@
         </p:sp>
         <p:sp>
           <p:nvSpPr>
-            <p:cNvPr id="55" name="pt54"/>
+            <p:cNvPr id="61" name="pt60"/>
             <p:cNvSpPr/>
             <p:nvPr/>
           </p:nvSpPr>
@@ -4485,7 +4743,7 @@
         </p:sp>
         <p:sp>
           <p:nvSpPr>
-            <p:cNvPr id="56" name="pt55"/>
+            <p:cNvPr id="62" name="pt61"/>
             <p:cNvSpPr/>
             <p:nvPr/>
           </p:nvSpPr>
@@ -4520,7 +4778,7 @@
         </p:sp>
         <p:sp>
           <p:nvSpPr>
-            <p:cNvPr id="57" name="pt56"/>
+            <p:cNvPr id="63" name="pt62"/>
             <p:cNvSpPr/>
             <p:nvPr/>
           </p:nvSpPr>
@@ -4555,7 +4813,7 @@
         </p:sp>
         <p:sp>
           <p:nvSpPr>
-            <p:cNvPr id="58" name="pt57"/>
+            <p:cNvPr id="64" name="pt63"/>
             <p:cNvSpPr/>
             <p:nvPr/>
           </p:nvSpPr>
@@ -4590,7 +4848,7 @@
         </p:sp>
         <p:sp>
           <p:nvSpPr>
-            <p:cNvPr id="59" name="pt58"/>
+            <p:cNvPr id="65" name="pt64"/>
             <p:cNvSpPr/>
             <p:nvPr/>
           </p:nvSpPr>
@@ -4625,7 +4883,7 @@
         </p:sp>
         <p:sp>
           <p:nvSpPr>
-            <p:cNvPr id="60" name="pt59"/>
+            <p:cNvPr id="66" name="pt65"/>
             <p:cNvSpPr/>
             <p:nvPr/>
           </p:nvSpPr>
@@ -4660,7 +4918,7 @@
         </p:sp>
         <p:sp>
           <p:nvSpPr>
-            <p:cNvPr id="61" name="pt60"/>
+            <p:cNvPr id="67" name="pt66"/>
             <p:cNvSpPr/>
             <p:nvPr/>
           </p:nvSpPr>
@@ -4695,7 +4953,7 @@
         </p:sp>
         <p:sp>
           <p:nvSpPr>
-            <p:cNvPr id="62" name="pt61"/>
+            <p:cNvPr id="68" name="pt67"/>
             <p:cNvSpPr/>
             <p:nvPr/>
           </p:nvSpPr>
@@ -4730,7 +4988,7 @@
         </p:sp>
         <p:sp>
           <p:nvSpPr>
-            <p:cNvPr id="63" name="pt62"/>
+            <p:cNvPr id="69" name="pt68"/>
             <p:cNvSpPr/>
             <p:nvPr/>
           </p:nvSpPr>
@@ -4765,7 +5023,7 @@
         </p:sp>
         <p:sp>
           <p:nvSpPr>
-            <p:cNvPr id="64" name="pt63"/>
+            <p:cNvPr id="70" name="pt69"/>
             <p:cNvSpPr/>
             <p:nvPr/>
           </p:nvSpPr>
@@ -4800,7 +5058,7 @@
         </p:sp>
         <p:sp>
           <p:nvSpPr>
-            <p:cNvPr id="65" name="pt64"/>
+            <p:cNvPr id="71" name="pt70"/>
             <p:cNvSpPr/>
             <p:nvPr/>
           </p:nvSpPr>
@@ -4835,7 +5093,7 @@
         </p:sp>
         <p:sp>
           <p:nvSpPr>
-            <p:cNvPr id="66" name="pt65"/>
+            <p:cNvPr id="72" name="pt71"/>
             <p:cNvSpPr/>
             <p:nvPr/>
           </p:nvSpPr>
@@ -4870,7 +5128,7 @@
         </p:sp>
         <p:sp>
           <p:nvSpPr>
-            <p:cNvPr id="67" name="pt66"/>
+            <p:cNvPr id="73" name="pt72"/>
             <p:cNvSpPr/>
             <p:nvPr/>
           </p:nvSpPr>
@@ -4905,7 +5163,7 @@
         </p:sp>
         <p:sp>
           <p:nvSpPr>
-            <p:cNvPr id="68" name="pt67"/>
+            <p:cNvPr id="74" name="pt73"/>
             <p:cNvSpPr/>
             <p:nvPr/>
           </p:nvSpPr>
@@ -4940,7 +5198,7 @@
         </p:sp>
         <p:sp>
           <p:nvSpPr>
-            <p:cNvPr id="69" name="pt68"/>
+            <p:cNvPr id="75" name="pt74"/>
             <p:cNvSpPr/>
             <p:nvPr/>
           </p:nvSpPr>
@@ -4975,7 +5233,7 @@
         </p:sp>
         <p:sp>
           <p:nvSpPr>
-            <p:cNvPr id="70" name="pt69"/>
+            <p:cNvPr id="76" name="pt75"/>
             <p:cNvSpPr/>
             <p:nvPr/>
           </p:nvSpPr>
@@ -5010,7 +5268,7 @@
         </p:sp>
         <p:sp>
           <p:nvSpPr>
-            <p:cNvPr id="71" name="pt70"/>
+            <p:cNvPr id="77" name="pt76"/>
             <p:cNvSpPr/>
             <p:nvPr/>
           </p:nvSpPr>
@@ -5045,7 +5303,7 @@
         </p:sp>
         <p:sp>
           <p:nvSpPr>
-            <p:cNvPr id="72" name="pt71"/>
+            <p:cNvPr id="78" name="pt77"/>
             <p:cNvSpPr/>
             <p:nvPr/>
           </p:nvSpPr>
@@ -5080,7 +5338,7 @@
         </p:sp>
         <p:sp>
           <p:nvSpPr>
-            <p:cNvPr id="73" name="pt72"/>
+            <p:cNvPr id="79" name="pt78"/>
             <p:cNvSpPr/>
             <p:nvPr/>
           </p:nvSpPr>
@@ -5115,7 +5373,7 @@
         </p:sp>
         <p:sp>
           <p:nvSpPr>
-            <p:cNvPr id="74" name="pt73"/>
+            <p:cNvPr id="80" name="pt79"/>
             <p:cNvSpPr/>
             <p:nvPr/>
           </p:nvSpPr>
@@ -5150,7 +5408,7 @@
         </p:sp>
         <p:sp>
           <p:nvSpPr>
-            <p:cNvPr id="75" name="pt74"/>
+            <p:cNvPr id="81" name="pt80"/>
             <p:cNvSpPr/>
             <p:nvPr/>
           </p:nvSpPr>
@@ -5185,7 +5443,7 @@
         </p:sp>
         <p:sp>
           <p:nvSpPr>
-            <p:cNvPr id="76" name="pt75"/>
+            <p:cNvPr id="82" name="pt81"/>
             <p:cNvSpPr/>
             <p:nvPr/>
           </p:nvSpPr>
@@ -5220,7 +5478,7 @@
         </p:sp>
         <p:sp>
           <p:nvSpPr>
-            <p:cNvPr id="77" name="pt76"/>
+            <p:cNvPr id="83" name="pt82"/>
             <p:cNvSpPr/>
             <p:nvPr/>
           </p:nvSpPr>
@@ -5255,7 +5513,7 @@
         </p:sp>
         <p:sp>
           <p:nvSpPr>
-            <p:cNvPr id="78" name="pt77"/>
+            <p:cNvPr id="84" name="pt83"/>
             <p:cNvSpPr/>
             <p:nvPr/>
           </p:nvSpPr>
@@ -5290,7 +5548,7 @@
         </p:sp>
         <p:sp>
           <p:nvSpPr>
-            <p:cNvPr id="79" name="pt78"/>
+            <p:cNvPr id="85" name="pt84"/>
             <p:cNvSpPr/>
             <p:nvPr/>
           </p:nvSpPr>
@@ -5325,7 +5583,7 @@
         </p:sp>
         <p:sp>
           <p:nvSpPr>
-            <p:cNvPr id="80" name="pt79"/>
+            <p:cNvPr id="86" name="pt85"/>
             <p:cNvSpPr/>
             <p:nvPr/>
           </p:nvSpPr>
@@ -5360,7 +5618,7 @@
         </p:sp>
         <p:sp>
           <p:nvSpPr>
-            <p:cNvPr id="81" name="pt80"/>
+            <p:cNvPr id="87" name="pt86"/>
             <p:cNvSpPr/>
             <p:nvPr/>
           </p:nvSpPr>
@@ -5395,7 +5653,7 @@
         </p:sp>
         <p:sp>
           <p:nvSpPr>
-            <p:cNvPr id="82" name="pt81"/>
+            <p:cNvPr id="88" name="pt87"/>
             <p:cNvSpPr/>
             <p:nvPr/>
           </p:nvSpPr>
@@ -5430,7 +5688,7 @@
         </p:sp>
         <p:sp>
           <p:nvSpPr>
-            <p:cNvPr id="83" name="pt82"/>
+            <p:cNvPr id="89" name="pt88"/>
             <p:cNvSpPr/>
             <p:nvPr/>
           </p:nvSpPr>
@@ -5465,7 +5723,7 @@
         </p:sp>
         <p:sp>
           <p:nvSpPr>
-            <p:cNvPr id="84" name="pt83"/>
+            <p:cNvPr id="90" name="pt89"/>
             <p:cNvSpPr/>
             <p:nvPr/>
           </p:nvSpPr>
@@ -5500,7 +5758,7 @@
         </p:sp>
         <p:sp>
           <p:nvSpPr>
-            <p:cNvPr id="85" name="pt84"/>
+            <p:cNvPr id="91" name="pt90"/>
             <p:cNvSpPr/>
             <p:nvPr/>
           </p:nvSpPr>
@@ -5535,7 +5793,7 @@
         </p:sp>
         <p:sp>
           <p:nvSpPr>
-            <p:cNvPr id="86" name="pt85"/>
+            <p:cNvPr id="92" name="pt91"/>
             <p:cNvSpPr/>
             <p:nvPr/>
           </p:nvSpPr>
@@ -5570,7 +5828,7 @@
         </p:sp>
         <p:sp>
           <p:nvSpPr>
-            <p:cNvPr id="87" name="pt86"/>
+            <p:cNvPr id="93" name="pt92"/>
             <p:cNvSpPr/>
             <p:nvPr/>
           </p:nvSpPr>
@@ -5605,7 +5863,7 @@
         </p:sp>
         <p:sp>
           <p:nvSpPr>
-            <p:cNvPr id="88" name="pt87"/>
+            <p:cNvPr id="94" name="pt93"/>
             <p:cNvSpPr/>
             <p:nvPr/>
           </p:nvSpPr>
@@ -5640,7 +5898,7 @@
         </p:sp>
         <p:sp>
           <p:nvSpPr>
-            <p:cNvPr id="89" name="pt88"/>
+            <p:cNvPr id="95" name="pt94"/>
             <p:cNvSpPr/>
             <p:nvPr/>
           </p:nvSpPr>
@@ -5675,7 +5933,7 @@
         </p:sp>
         <p:sp>
           <p:nvSpPr>
-            <p:cNvPr id="90" name="pt89"/>
+            <p:cNvPr id="96" name="pt95"/>
             <p:cNvSpPr/>
             <p:nvPr/>
           </p:nvSpPr>
@@ -5710,7 +5968,7 @@
         </p:sp>
         <p:sp>
           <p:nvSpPr>
-            <p:cNvPr id="91" name="pt90"/>
+            <p:cNvPr id="97" name="pt96"/>
             <p:cNvSpPr/>
             <p:nvPr/>
           </p:nvSpPr>
@@ -5745,7 +6003,7 @@
         </p:sp>
         <p:sp>
           <p:nvSpPr>
-            <p:cNvPr id="92" name="pt91"/>
+            <p:cNvPr id="98" name="pt97"/>
             <p:cNvSpPr/>
             <p:nvPr/>
           </p:nvSpPr>
@@ -5780,7 +6038,7 @@
         </p:sp>
         <p:sp>
           <p:nvSpPr>
-            <p:cNvPr id="93" name="pt92"/>
+            <p:cNvPr id="99" name="pt98"/>
             <p:cNvSpPr/>
             <p:nvPr/>
           </p:nvSpPr>
@@ -5815,7 +6073,7 @@
         </p:sp>
         <p:sp>
           <p:nvSpPr>
-            <p:cNvPr id="94" name="tx93"/>
+            <p:cNvPr id="100" name="tx99"/>
             <p:cNvSpPr/>
             <p:nvPr/>
           </p:nvSpPr>
@@ -5861,7 +6119,7 @@
         </p:sp>
         <p:sp>
           <p:nvSpPr>
-            <p:cNvPr id="95" name="tx94"/>
+            <p:cNvPr id="101" name="tx100"/>
             <p:cNvSpPr/>
             <p:nvPr/>
           </p:nvSpPr>
@@ -5907,7 +6165,7 @@
         </p:sp>
         <p:sp>
           <p:nvSpPr>
-            <p:cNvPr id="96" name="tx95"/>
+            <p:cNvPr id="102" name="tx101"/>
             <p:cNvSpPr/>
             <p:nvPr/>
           </p:nvSpPr>
@@ -5953,7 +6211,7 @@
         </p:sp>
         <p:sp>
           <p:nvSpPr>
-            <p:cNvPr id="97" name="tx96"/>
+            <p:cNvPr id="103" name="tx102"/>
             <p:cNvSpPr/>
             <p:nvPr/>
           </p:nvSpPr>
@@ -5999,7 +6257,7 @@
         </p:sp>
         <p:sp>
           <p:nvSpPr>
-            <p:cNvPr id="98" name="pl97"/>
+            <p:cNvPr id="104" name="pl103"/>
             <p:cNvSpPr/>
             <p:nvPr/>
           </p:nvSpPr>
@@ -6039,7 +6297,7 @@
         </p:sp>
         <p:sp>
           <p:nvSpPr>
-            <p:cNvPr id="99" name="pl98"/>
+            <p:cNvPr id="105" name="pl104"/>
             <p:cNvSpPr/>
             <p:nvPr/>
           </p:nvSpPr>
@@ -6079,7 +6337,7 @@
         </p:sp>
         <p:sp>
           <p:nvSpPr>
-            <p:cNvPr id="100" name="pl99"/>
+            <p:cNvPr id="106" name="pl105"/>
             <p:cNvSpPr/>
             <p:nvPr/>
           </p:nvSpPr>
@@ -6119,7 +6377,7 @@
         </p:sp>
         <p:sp>
           <p:nvSpPr>
-            <p:cNvPr id="101" name="pl100"/>
+            <p:cNvPr id="107" name="pl106"/>
             <p:cNvSpPr/>
             <p:nvPr/>
           </p:nvSpPr>
@@ -6159,7 +6417,7 @@
         </p:sp>
         <p:sp>
           <p:nvSpPr>
-            <p:cNvPr id="102" name="pl101"/>
+            <p:cNvPr id="108" name="pl107"/>
             <p:cNvSpPr/>
             <p:nvPr/>
           </p:nvSpPr>
@@ -6199,13 +6457,13 @@
         </p:sp>
         <p:sp>
           <p:nvSpPr>
-            <p:cNvPr id="103" name="pl102"/>
-            <p:cNvSpPr/>
-            <p:nvPr/>
-          </p:nvSpPr>
-          <p:spPr>
-            <a:xfrm>
-              <a:off x="2005725" y="4169365"/>
+            <p:cNvPr id="109" name="pl108"/>
+            <p:cNvSpPr/>
+            <p:nvPr/>
+          </p:nvSpPr>
+          <p:spPr>
+            <a:xfrm>
+              <a:off x="1935002" y="4169365"/>
               <a:ext cx="0" cy="34794"/>
             </a:xfrm>
             <a:custGeom>
@@ -6239,13 +6497,13 @@
         </p:sp>
         <p:sp>
           <p:nvSpPr>
-            <p:cNvPr id="104" name="pl103"/>
-            <p:cNvSpPr/>
-            <p:nvPr/>
-          </p:nvSpPr>
-          <p:spPr>
-            <a:xfrm>
-              <a:off x="2359343" y="4169365"/>
+            <p:cNvPr id="110" name="pl109"/>
+            <p:cNvSpPr/>
+            <p:nvPr/>
+          </p:nvSpPr>
+          <p:spPr>
+            <a:xfrm>
+              <a:off x="2217896" y="4169365"/>
               <a:ext cx="0" cy="34794"/>
             </a:xfrm>
             <a:custGeom>
@@ -6279,13 +6537,13 @@
         </p:sp>
         <p:sp>
           <p:nvSpPr>
-            <p:cNvPr id="105" name="pl104"/>
-            <p:cNvSpPr/>
-            <p:nvPr/>
-          </p:nvSpPr>
-          <p:spPr>
-            <a:xfrm>
-              <a:off x="2712960" y="4169365"/>
+            <p:cNvPr id="111" name="pl110"/>
+            <p:cNvSpPr/>
+            <p:nvPr/>
+          </p:nvSpPr>
+          <p:spPr>
+            <a:xfrm>
+              <a:off x="2500790" y="4169365"/>
               <a:ext cx="0" cy="34794"/>
             </a:xfrm>
             <a:custGeom>
@@ -6319,13 +6577,13 @@
         </p:sp>
         <p:sp>
           <p:nvSpPr>
-            <p:cNvPr id="106" name="pl105"/>
-            <p:cNvSpPr/>
-            <p:nvPr/>
-          </p:nvSpPr>
-          <p:spPr>
-            <a:xfrm>
-              <a:off x="3066578" y="4169365"/>
+            <p:cNvPr id="112" name="pl111"/>
+            <p:cNvSpPr/>
+            <p:nvPr/>
+          </p:nvSpPr>
+          <p:spPr>
+            <a:xfrm>
+              <a:off x="2783684" y="4169365"/>
               <a:ext cx="0" cy="34794"/>
             </a:xfrm>
             <a:custGeom>
@@ -6359,13 +6617,13 @@
         </p:sp>
         <p:sp>
           <p:nvSpPr>
-            <p:cNvPr id="107" name="pl106"/>
-            <p:cNvSpPr/>
-            <p:nvPr/>
-          </p:nvSpPr>
-          <p:spPr>
-            <a:xfrm>
-              <a:off x="3420196" y="4169365"/>
+            <p:cNvPr id="113" name="pl112"/>
+            <p:cNvSpPr/>
+            <p:nvPr/>
+          </p:nvSpPr>
+          <p:spPr>
+            <a:xfrm>
+              <a:off x="3066578" y="4169365"/>
               <a:ext cx="0" cy="34794"/>
             </a:xfrm>
             <a:custGeom>
@@ -6399,13 +6657,13 @@
         </p:sp>
         <p:sp>
           <p:nvSpPr>
-            <p:cNvPr id="108" name="pl107"/>
-            <p:cNvSpPr/>
-            <p:nvPr/>
-          </p:nvSpPr>
-          <p:spPr>
-            <a:xfrm>
-              <a:off x="3773813" y="4169365"/>
+            <p:cNvPr id="114" name="pl113"/>
+            <p:cNvSpPr/>
+            <p:nvPr/>
+          </p:nvSpPr>
+          <p:spPr>
+            <a:xfrm>
+              <a:off x="3349472" y="4169365"/>
               <a:ext cx="0" cy="34794"/>
             </a:xfrm>
             <a:custGeom>
@@ -6439,13 +6697,13 @@
         </p:sp>
         <p:sp>
           <p:nvSpPr>
-            <p:cNvPr id="109" name="pl108"/>
-            <p:cNvSpPr/>
-            <p:nvPr/>
-          </p:nvSpPr>
-          <p:spPr>
-            <a:xfrm>
-              <a:off x="4127431" y="4169365"/>
+            <p:cNvPr id="115" name="pl114"/>
+            <p:cNvSpPr/>
+            <p:nvPr/>
+          </p:nvSpPr>
+          <p:spPr>
+            <a:xfrm>
+              <a:off x="3632366" y="4169365"/>
               <a:ext cx="0" cy="34794"/>
             </a:xfrm>
             <a:custGeom>
@@ -6479,13 +6737,13 @@
         </p:sp>
         <p:sp>
           <p:nvSpPr>
-            <p:cNvPr id="110" name="pl109"/>
-            <p:cNvSpPr/>
-            <p:nvPr/>
-          </p:nvSpPr>
-          <p:spPr>
-            <a:xfrm>
-              <a:off x="4481048" y="4169365"/>
+            <p:cNvPr id="116" name="pl115"/>
+            <p:cNvSpPr/>
+            <p:nvPr/>
+          </p:nvSpPr>
+          <p:spPr>
+            <a:xfrm>
+              <a:off x="3915260" y="4169365"/>
               <a:ext cx="0" cy="34794"/>
             </a:xfrm>
             <a:custGeom>
@@ -6519,13 +6777,13 @@
         </p:sp>
         <p:sp>
           <p:nvSpPr>
-            <p:cNvPr id="111" name="pl110"/>
-            <p:cNvSpPr/>
-            <p:nvPr/>
-          </p:nvSpPr>
-          <p:spPr>
-            <a:xfrm>
-              <a:off x="4834666" y="4169365"/>
+            <p:cNvPr id="117" name="pl116"/>
+            <p:cNvSpPr/>
+            <p:nvPr/>
+          </p:nvSpPr>
+          <p:spPr>
+            <a:xfrm>
+              <a:off x="4198154" y="4169365"/>
               <a:ext cx="0" cy="34794"/>
             </a:xfrm>
             <a:custGeom>
@@ -6559,13 +6817,13 @@
         </p:sp>
         <p:sp>
           <p:nvSpPr>
-            <p:cNvPr id="112" name="pl111"/>
-            <p:cNvSpPr/>
-            <p:nvPr/>
-          </p:nvSpPr>
-          <p:spPr>
-            <a:xfrm>
-              <a:off x="5188283" y="4169365"/>
+            <p:cNvPr id="118" name="pl117"/>
+            <p:cNvSpPr/>
+            <p:nvPr/>
+          </p:nvSpPr>
+          <p:spPr>
+            <a:xfrm>
+              <a:off x="4481048" y="4169365"/>
               <a:ext cx="0" cy="34794"/>
             </a:xfrm>
             <a:custGeom>
@@ -6599,13 +6857,13 @@
         </p:sp>
         <p:sp>
           <p:nvSpPr>
-            <p:cNvPr id="113" name="pl112"/>
-            <p:cNvSpPr/>
-            <p:nvPr/>
-          </p:nvSpPr>
-          <p:spPr>
-            <a:xfrm>
-              <a:off x="5541901" y="4169365"/>
+            <p:cNvPr id="119" name="pl118"/>
+            <p:cNvSpPr/>
+            <p:nvPr/>
+          </p:nvSpPr>
+          <p:spPr>
+            <a:xfrm>
+              <a:off x="4763942" y="4169365"/>
               <a:ext cx="0" cy="34794"/>
             </a:xfrm>
             <a:custGeom>
@@ -6639,7 +6897,127 @@
         </p:sp>
         <p:sp>
           <p:nvSpPr>
-            <p:cNvPr id="114" name="tx113"/>
+            <p:cNvPr id="120" name="pl119"/>
+            <p:cNvSpPr/>
+            <p:nvPr/>
+          </p:nvSpPr>
+          <p:spPr>
+            <a:xfrm>
+              <a:off x="5046836" y="4169365"/>
+              <a:ext cx="0" cy="34794"/>
+            </a:xfrm>
+            <a:custGeom>
+              <a:avLst/>
+              <a:pathLst>
+                <a:path w="0" h="34794">
+                  <a:moveTo>
+                    <a:pt x="0" y="34794"/>
+                  </a:moveTo>
+                  <a:lnTo>
+                    <a:pt x="0" y="0"/>
+                  </a:lnTo>
+                </a:path>
+              </a:pathLst>
+            </a:custGeom>
+            <a:ln w="13550" cap="flat">
+              <a:solidFill>
+                <a:srgbClr val="333333">
+                  <a:alpha val="100000"/>
+                </a:srgbClr>
+              </a:solidFill>
+              <a:prstDash val="solid"/>
+              <a:round/>
+            </a:ln>
+          </p:spPr>
+          <p:txBody>
+            <a:bodyPr/>
+            <a:lstStyle/>
+            <a:p/>
+          </p:txBody>
+        </p:sp>
+        <p:sp>
+          <p:nvSpPr>
+            <p:cNvPr id="121" name="pl120"/>
+            <p:cNvSpPr/>
+            <p:nvPr/>
+          </p:nvSpPr>
+          <p:spPr>
+            <a:xfrm>
+              <a:off x="5329730" y="4169365"/>
+              <a:ext cx="0" cy="34794"/>
+            </a:xfrm>
+            <a:custGeom>
+              <a:avLst/>
+              <a:pathLst>
+                <a:path w="0" h="34794">
+                  <a:moveTo>
+                    <a:pt x="0" y="34794"/>
+                  </a:moveTo>
+                  <a:lnTo>
+                    <a:pt x="0" y="0"/>
+                  </a:lnTo>
+                </a:path>
+              </a:pathLst>
+            </a:custGeom>
+            <a:ln w="13550" cap="flat">
+              <a:solidFill>
+                <a:srgbClr val="333333">
+                  <a:alpha val="100000"/>
+                </a:srgbClr>
+              </a:solidFill>
+              <a:prstDash val="solid"/>
+              <a:round/>
+            </a:ln>
+          </p:spPr>
+          <p:txBody>
+            <a:bodyPr/>
+            <a:lstStyle/>
+            <a:p/>
+          </p:txBody>
+        </p:sp>
+        <p:sp>
+          <p:nvSpPr>
+            <p:cNvPr id="122" name="pl121"/>
+            <p:cNvSpPr/>
+            <p:nvPr/>
+          </p:nvSpPr>
+          <p:spPr>
+            <a:xfrm>
+              <a:off x="5612624" y="4169365"/>
+              <a:ext cx="0" cy="34794"/>
+            </a:xfrm>
+            <a:custGeom>
+              <a:avLst/>
+              <a:pathLst>
+                <a:path w="0" h="34794">
+                  <a:moveTo>
+                    <a:pt x="0" y="34794"/>
+                  </a:moveTo>
+                  <a:lnTo>
+                    <a:pt x="0" y="0"/>
+                  </a:lnTo>
+                </a:path>
+              </a:pathLst>
+            </a:custGeom>
+            <a:ln w="13550" cap="flat">
+              <a:solidFill>
+                <a:srgbClr val="333333">
+                  <a:alpha val="100000"/>
+                </a:srgbClr>
+              </a:solidFill>
+              <a:prstDash val="solid"/>
+              <a:round/>
+            </a:ln>
+          </p:spPr>
+          <p:txBody>
+            <a:bodyPr/>
+            <a:lstStyle/>
+            <a:p/>
+          </p:txBody>
+        </p:sp>
+        <p:sp>
+          <p:nvSpPr>
+            <p:cNvPr id="123" name="tx122"/>
             <p:cNvSpPr/>
             <p:nvPr/>
           </p:nvSpPr>
@@ -6685,14 +7063,14 @@
         </p:sp>
         <p:sp>
           <p:nvSpPr>
-            <p:cNvPr id="115" name="tx114"/>
-            <p:cNvSpPr/>
-            <p:nvPr/>
-          </p:nvSpPr>
-          <p:spPr>
-            <a:xfrm>
-              <a:off x="1970173" y="4230412"/>
-              <a:ext cx="71105" cy="83056"/>
+            <p:cNvPr id="124" name="tx123"/>
+            <p:cNvSpPr/>
+            <p:nvPr/>
+          </p:nvSpPr>
+          <p:spPr>
+            <a:xfrm>
+              <a:off x="1899449" y="4231995"/>
+              <a:ext cx="71105" cy="81473"/>
             </a:xfrm>
             <a:prstGeom prst="rect">
               <a:avLst/>
@@ -6724,21 +7102,21 @@
                   <a:latin typeface="DejaVu Sans"/>
                   <a:cs typeface="DejaVu Sans"/>
                 </a:rPr>
-                <a:t>5</a:t>
+                <a:t>4</a:t>
               </a:r>
             </a:p>
           </p:txBody>
         </p:sp>
         <p:sp>
           <p:nvSpPr>
-            <p:cNvPr id="116" name="tx115"/>
-            <p:cNvSpPr/>
-            <p:nvPr/>
-          </p:nvSpPr>
-          <p:spPr>
-            <a:xfrm>
-              <a:off x="2288238" y="4228939"/>
-              <a:ext cx="142210" cy="84529"/>
+            <p:cNvPr id="125" name="tx124"/>
+            <p:cNvSpPr/>
+            <p:nvPr/>
+          </p:nvSpPr>
+          <p:spPr>
+            <a:xfrm>
+              <a:off x="2182343" y="4228939"/>
+              <a:ext cx="71105" cy="84529"/>
             </a:xfrm>
             <a:prstGeom prst="rect">
               <a:avLst/>
@@ -6770,21 +7148,21 @@
                   <a:latin typeface="DejaVu Sans"/>
                   <a:cs typeface="DejaVu Sans"/>
                 </a:rPr>
-                <a:t>10</a:t>
+                <a:t>8</a:t>
               </a:r>
             </a:p>
           </p:txBody>
         </p:sp>
         <p:sp>
           <p:nvSpPr>
-            <p:cNvPr id="117" name="tx116"/>
-            <p:cNvSpPr/>
-            <p:nvPr/>
-          </p:nvSpPr>
-          <p:spPr>
-            <a:xfrm>
-              <a:off x="2641855" y="4230412"/>
-              <a:ext cx="142210" cy="83056"/>
+            <p:cNvPr id="126" name="tx125"/>
+            <p:cNvSpPr/>
+            <p:nvPr/>
+          </p:nvSpPr>
+          <p:spPr>
+            <a:xfrm>
+              <a:off x="2429685" y="4230522"/>
+              <a:ext cx="142210" cy="82946"/>
             </a:xfrm>
             <a:prstGeom prst="rect">
               <a:avLst/>
@@ -6816,14 +7194,60 @@
                   <a:latin typeface="DejaVu Sans"/>
                   <a:cs typeface="DejaVu Sans"/>
                 </a:rPr>
-                <a:t>15</a:t>
+                <a:t>12</a:t>
               </a:r>
             </a:p>
           </p:txBody>
         </p:sp>
         <p:sp>
           <p:nvSpPr>
-            <p:cNvPr id="118" name="tx117"/>
+            <p:cNvPr id="127" name="tx126"/>
+            <p:cNvSpPr/>
+            <p:nvPr/>
+          </p:nvSpPr>
+          <p:spPr>
+            <a:xfrm>
+              <a:off x="2712579" y="4228939"/>
+              <a:ext cx="142210" cy="84529"/>
+            </a:xfrm>
+            <a:prstGeom prst="rect">
+              <a:avLst/>
+            </a:prstGeom>
+            <a:noFill/>
+          </p:spPr>
+          <p:txBody>
+            <a:bodyPr lIns="0" rIns="0" tIns="0" bIns="0" anchorCtr="1" anchor="ctr" wrap="none"/>
+            <a:lstStyle/>
+            <a:p>
+              <a:pPr algn="l" marL="0" marR="0" indent="0">
+                <a:lnSpc>
+                  <a:spcPts val="880"/>
+                </a:lnSpc>
+                <a:spcBef>
+                  <a:spcPts val="0"/>
+                </a:spcBef>
+                <a:spcAft>
+                  <a:spcPts val="0"/>
+                </a:spcAft>
+              </a:pPr>
+              <a:r>
+                <a:rPr sz="880">
+                  <a:solidFill>
+                    <a:srgbClr val="4D4D4D">
+                      <a:alpha val="100000"/>
+                    </a:srgbClr>
+                  </a:solidFill>
+                  <a:latin typeface="DejaVu Sans"/>
+                  <a:cs typeface="DejaVu Sans"/>
+                </a:rPr>
+                <a:t>16</a:t>
+              </a:r>
+            </a:p>
+          </p:txBody>
+        </p:sp>
+        <p:sp>
+          <p:nvSpPr>
+            <p:cNvPr id="128" name="tx127"/>
             <p:cNvSpPr/>
             <p:nvPr/>
           </p:nvSpPr>
@@ -6869,14 +7293,14 @@
         </p:sp>
         <p:sp>
           <p:nvSpPr>
-            <p:cNvPr id="119" name="tx118"/>
-            <p:cNvSpPr/>
-            <p:nvPr/>
-          </p:nvSpPr>
-          <p:spPr>
-            <a:xfrm>
-              <a:off x="3349090" y="4228939"/>
-              <a:ext cx="142210" cy="84529"/>
+            <p:cNvPr id="129" name="tx128"/>
+            <p:cNvSpPr/>
+            <p:nvPr/>
+          </p:nvSpPr>
+          <p:spPr>
+            <a:xfrm>
+              <a:off x="3278367" y="4230522"/>
+              <a:ext cx="142210" cy="82946"/>
             </a:xfrm>
             <a:prstGeom prst="rect">
               <a:avLst/>
@@ -6908,20 +7332,20 @@
                   <a:latin typeface="DejaVu Sans"/>
                   <a:cs typeface="DejaVu Sans"/>
                 </a:rPr>
-                <a:t>25</a:t>
+                <a:t>24</a:t>
               </a:r>
             </a:p>
           </p:txBody>
         </p:sp>
         <p:sp>
           <p:nvSpPr>
-            <p:cNvPr id="120" name="tx119"/>
-            <p:cNvSpPr/>
-            <p:nvPr/>
-          </p:nvSpPr>
-          <p:spPr>
-            <a:xfrm>
-              <a:off x="3702708" y="4228939"/>
+            <p:cNvPr id="130" name="tx129"/>
+            <p:cNvSpPr/>
+            <p:nvPr/>
+          </p:nvSpPr>
+          <p:spPr>
+            <a:xfrm>
+              <a:off x="3561261" y="4228939"/>
               <a:ext cx="142210" cy="84529"/>
             </a:xfrm>
             <a:prstGeom prst="rect">
@@ -6954,20 +7378,20 @@
                   <a:latin typeface="DejaVu Sans"/>
                   <a:cs typeface="DejaVu Sans"/>
                 </a:rPr>
-                <a:t>30</a:t>
+                <a:t>28</a:t>
               </a:r>
             </a:p>
           </p:txBody>
         </p:sp>
         <p:sp>
           <p:nvSpPr>
-            <p:cNvPr id="121" name="tx120"/>
-            <p:cNvSpPr/>
-            <p:nvPr/>
-          </p:nvSpPr>
-          <p:spPr>
-            <a:xfrm>
-              <a:off x="4056326" y="4228939"/>
+            <p:cNvPr id="131" name="tx130"/>
+            <p:cNvSpPr/>
+            <p:nvPr/>
+          </p:nvSpPr>
+          <p:spPr>
+            <a:xfrm>
+              <a:off x="3844155" y="4228939"/>
               <a:ext cx="142210" cy="84529"/>
             </a:xfrm>
             <a:prstGeom prst="rect">
@@ -7000,14 +7424,60 @@
                   <a:latin typeface="DejaVu Sans"/>
                   <a:cs typeface="DejaVu Sans"/>
                 </a:rPr>
-                <a:t>35</a:t>
+                <a:t>32</a:t>
               </a:r>
             </a:p>
           </p:txBody>
         </p:sp>
         <p:sp>
           <p:nvSpPr>
-            <p:cNvPr id="122" name="tx121"/>
+            <p:cNvPr id="132" name="tx131"/>
+            <p:cNvSpPr/>
+            <p:nvPr/>
+          </p:nvSpPr>
+          <p:spPr>
+            <a:xfrm>
+              <a:off x="4127049" y="4228939"/>
+              <a:ext cx="142210" cy="84529"/>
+            </a:xfrm>
+            <a:prstGeom prst="rect">
+              <a:avLst/>
+            </a:prstGeom>
+            <a:noFill/>
+          </p:spPr>
+          <p:txBody>
+            <a:bodyPr lIns="0" rIns="0" tIns="0" bIns="0" anchorCtr="1" anchor="ctr" wrap="none"/>
+            <a:lstStyle/>
+            <a:p>
+              <a:pPr algn="l" marL="0" marR="0" indent="0">
+                <a:lnSpc>
+                  <a:spcPts val="880"/>
+                </a:lnSpc>
+                <a:spcBef>
+                  <a:spcPts val="0"/>
+                </a:spcBef>
+                <a:spcAft>
+                  <a:spcPts val="0"/>
+                </a:spcAft>
+              </a:pPr>
+              <a:r>
+                <a:rPr sz="880">
+                  <a:solidFill>
+                    <a:srgbClr val="4D4D4D">
+                      <a:alpha val="100000"/>
+                    </a:srgbClr>
+                  </a:solidFill>
+                  <a:latin typeface="DejaVu Sans"/>
+                  <a:cs typeface="DejaVu Sans"/>
+                </a:rPr>
+                <a:t>36</a:t>
+              </a:r>
+            </a:p>
+          </p:txBody>
+        </p:sp>
+        <p:sp>
+          <p:nvSpPr>
+            <p:cNvPr id="133" name="tx132"/>
             <p:cNvSpPr/>
             <p:nvPr/>
           </p:nvSpPr>
@@ -7053,14 +7523,14 @@
         </p:sp>
         <p:sp>
           <p:nvSpPr>
-            <p:cNvPr id="123" name="tx122"/>
-            <p:cNvSpPr/>
-            <p:nvPr/>
-          </p:nvSpPr>
-          <p:spPr>
-            <a:xfrm>
-              <a:off x="4763561" y="4230412"/>
-              <a:ext cx="142210" cy="83056"/>
+            <p:cNvPr id="134" name="tx133"/>
+            <p:cNvSpPr/>
+            <p:nvPr/>
+          </p:nvSpPr>
+          <p:spPr>
+            <a:xfrm>
+              <a:off x="4692837" y="4231995"/>
+              <a:ext cx="142210" cy="81473"/>
             </a:xfrm>
             <a:prstGeom prst="rect">
               <a:avLst/>
@@ -7092,20 +7562,20 @@
                   <a:latin typeface="DejaVu Sans"/>
                   <a:cs typeface="DejaVu Sans"/>
                 </a:rPr>
-                <a:t>45</a:t>
+                <a:t>44</a:t>
               </a:r>
             </a:p>
           </p:txBody>
         </p:sp>
         <p:sp>
           <p:nvSpPr>
-            <p:cNvPr id="124" name="tx123"/>
-            <p:cNvSpPr/>
-            <p:nvPr/>
-          </p:nvSpPr>
-          <p:spPr>
-            <a:xfrm>
-              <a:off x="5117178" y="4228939"/>
+            <p:cNvPr id="135" name="tx134"/>
+            <p:cNvSpPr/>
+            <p:nvPr/>
+          </p:nvSpPr>
+          <p:spPr>
+            <a:xfrm>
+              <a:off x="4975731" y="4228939"/>
               <a:ext cx="142210" cy="84529"/>
             </a:xfrm>
             <a:prstGeom prst="rect">
@@ -7138,21 +7608,21 @@
                   <a:latin typeface="DejaVu Sans"/>
                   <a:cs typeface="DejaVu Sans"/>
                 </a:rPr>
-                <a:t>50</a:t>
+                <a:t>48</a:t>
               </a:r>
             </a:p>
           </p:txBody>
         </p:sp>
         <p:sp>
           <p:nvSpPr>
-            <p:cNvPr id="125" name="tx124"/>
-            <p:cNvSpPr/>
-            <p:nvPr/>
-          </p:nvSpPr>
-          <p:spPr>
-            <a:xfrm>
-              <a:off x="5470796" y="4230412"/>
-              <a:ext cx="142210" cy="83056"/>
+            <p:cNvPr id="136" name="tx135"/>
+            <p:cNvSpPr/>
+            <p:nvPr/>
+          </p:nvSpPr>
+          <p:spPr>
+            <a:xfrm>
+              <a:off x="5258625" y="4228939"/>
+              <a:ext cx="142210" cy="84529"/>
             </a:xfrm>
             <a:prstGeom prst="rect">
               <a:avLst/>
@@ -7184,14 +7654,60 @@
                   <a:latin typeface="DejaVu Sans"/>
                   <a:cs typeface="DejaVu Sans"/>
                 </a:rPr>
-                <a:t>55</a:t>
+                <a:t>52</a:t>
               </a:r>
             </a:p>
           </p:txBody>
         </p:sp>
         <p:sp>
           <p:nvSpPr>
-            <p:cNvPr id="126" name="tx125"/>
+            <p:cNvPr id="137" name="tx136"/>
+            <p:cNvSpPr/>
+            <p:nvPr/>
+          </p:nvSpPr>
+          <p:spPr>
+            <a:xfrm>
+              <a:off x="5541519" y="4228939"/>
+              <a:ext cx="142210" cy="84529"/>
+            </a:xfrm>
+            <a:prstGeom prst="rect">
+              <a:avLst/>
+            </a:prstGeom>
+            <a:noFill/>
+          </p:spPr>
+          <p:txBody>
+            <a:bodyPr lIns="0" rIns="0" tIns="0" bIns="0" anchorCtr="1" anchor="ctr" wrap="none"/>
+            <a:lstStyle/>
+            <a:p>
+              <a:pPr algn="l" marL="0" marR="0" indent="0">
+                <a:lnSpc>
+                  <a:spcPts val="880"/>
+                </a:lnSpc>
+                <a:spcBef>
+                  <a:spcPts val="0"/>
+                </a:spcBef>
+                <a:spcAft>
+                  <a:spcPts val="0"/>
+                </a:spcAft>
+              </a:pPr>
+              <a:r>
+                <a:rPr sz="880">
+                  <a:solidFill>
+                    <a:srgbClr val="4D4D4D">
+                      <a:alpha val="100000"/>
+                    </a:srgbClr>
+                  </a:solidFill>
+                  <a:latin typeface="DejaVu Sans"/>
+                  <a:cs typeface="DejaVu Sans"/>
+                </a:rPr>
+                <a:t>56</a:t>
+              </a:r>
+            </a:p>
+          </p:txBody>
+        </p:sp>
+        <p:sp>
+          <p:nvSpPr>
+            <p:cNvPr id="138" name="tx137"/>
             <p:cNvSpPr/>
             <p:nvPr/>
           </p:nvSpPr>
@@ -7237,7 +7753,7 @@
         </p:sp>
         <p:sp>
           <p:nvSpPr>
-            <p:cNvPr id="127" name="tx126"/>
+            <p:cNvPr id="139" name="tx138"/>
             <p:cNvSpPr/>
             <p:nvPr/>
           </p:nvSpPr>
@@ -7283,7 +7799,7 @@
         </p:sp>
         <p:sp>
           <p:nvSpPr>
-            <p:cNvPr id="128" name="rc127"/>
+            <p:cNvPr id="140" name="rc139"/>
             <p:cNvSpPr/>
             <p:nvPr/>
           </p:nvSpPr>
@@ -7309,7 +7825,7 @@
         </p:sp>
         <p:sp>
           <p:nvSpPr>
-            <p:cNvPr id="129" name="tx128"/>
+            <p:cNvPr id="141" name="tx140"/>
             <p:cNvSpPr/>
             <p:nvPr/>
           </p:nvSpPr>
@@ -7355,7 +7871,7 @@
         </p:sp>
         <p:sp>
           <p:nvSpPr>
-            <p:cNvPr id="130" name="rc129"/>
+            <p:cNvPr id="142" name="rc141"/>
             <p:cNvSpPr/>
             <p:nvPr/>
           </p:nvSpPr>
@@ -7381,7 +7897,7 @@
         </p:sp>
         <p:sp>
           <p:nvSpPr>
-            <p:cNvPr id="131" name="pl130"/>
+            <p:cNvPr id="143" name="pl142"/>
             <p:cNvSpPr/>
             <p:nvPr/>
           </p:nvSpPr>
@@ -7421,7 +7937,7 @@
         </p:sp>
         <p:sp>
           <p:nvSpPr>
-            <p:cNvPr id="132" name="pt131"/>
+            <p:cNvPr id="144" name="pt143"/>
             <p:cNvSpPr/>
             <p:nvPr/>
           </p:nvSpPr>
@@ -7456,7 +7972,7 @@
         </p:sp>
         <p:sp>
           <p:nvSpPr>
-            <p:cNvPr id="133" name="tx132"/>
+            <p:cNvPr id="145" name="tx144"/>
             <p:cNvSpPr/>
             <p:nvPr/>
           </p:nvSpPr>

</xml_diff>

<commit_message>
Deploying to gh-pages from @ sean4andrew/safuncs@4bf9528c2210357fce78e509f1fbb83a29e6d334 🚀
</commit_message>
<xml_diff>
--- a/reference/ONDA_XX-Hazard-Curve.pptx
+++ b/reference/ONDA_XX-Hazard-Curve.pptx
@@ -2531,7 +2531,7 @@
           </p:nvSpPr>
           <p:spPr>
             <a:xfrm>
-              <a:off x="1510661" y="983989"/>
+              <a:off x="1935002" y="983989"/>
               <a:ext cx="0" cy="3185376"/>
             </a:xfrm>
             <a:custGeom>
@@ -2574,7 +2574,7 @@
           </p:nvSpPr>
           <p:spPr>
             <a:xfrm>
-              <a:off x="1793555" y="983989"/>
+              <a:off x="2500790" y="983989"/>
               <a:ext cx="0" cy="3185376"/>
             </a:xfrm>
             <a:custGeom>
@@ -2617,7 +2617,7 @@
           </p:nvSpPr>
           <p:spPr>
             <a:xfrm>
-              <a:off x="2076449" y="983989"/>
+              <a:off x="3066578" y="983989"/>
               <a:ext cx="0" cy="3185376"/>
             </a:xfrm>
             <a:custGeom>
@@ -2660,7 +2660,7 @@
           </p:nvSpPr>
           <p:spPr>
             <a:xfrm>
-              <a:off x="2359343" y="983989"/>
+              <a:off x="3632366" y="983989"/>
               <a:ext cx="0" cy="3185376"/>
             </a:xfrm>
             <a:custGeom>
@@ -2703,7 +2703,7 @@
           </p:nvSpPr>
           <p:spPr>
             <a:xfrm>
-              <a:off x="2642237" y="983989"/>
+              <a:off x="4198154" y="983989"/>
               <a:ext cx="0" cy="3185376"/>
             </a:xfrm>
             <a:custGeom>
@@ -2746,7 +2746,7 @@
           </p:nvSpPr>
           <p:spPr>
             <a:xfrm>
-              <a:off x="2925131" y="983989"/>
+              <a:off x="4763942" y="983989"/>
               <a:ext cx="0" cy="3185376"/>
             </a:xfrm>
             <a:custGeom>
@@ -2789,7 +2789,7 @@
           </p:nvSpPr>
           <p:spPr>
             <a:xfrm>
-              <a:off x="3208025" y="983989"/>
+              <a:off x="5329730" y="983989"/>
               <a:ext cx="0" cy="3185376"/>
             </a:xfrm>
             <a:custGeom>
@@ -2832,7 +2832,179 @@
           </p:nvSpPr>
           <p:spPr>
             <a:xfrm>
-              <a:off x="3490919" y="983989"/>
+              <a:off x="1461154" y="4024575"/>
+              <a:ext cx="4200976" cy="0"/>
+            </a:xfrm>
+            <a:custGeom>
+              <a:avLst/>
+              <a:pathLst>
+                <a:path w="4200976" h="0">
+                  <a:moveTo>
+                    <a:pt x="0" y="0"/>
+                  </a:moveTo>
+                  <a:lnTo>
+                    <a:pt x="4200976" y="0"/>
+                  </a:lnTo>
+                  <a:lnTo>
+                    <a:pt x="4200976" y="0"/>
+                  </a:lnTo>
+                </a:path>
+              </a:pathLst>
+            </a:custGeom>
+            <a:ln w="13550" cap="flat">
+              <a:solidFill>
+                <a:srgbClr val="FFFFFF">
+                  <a:alpha val="100000"/>
+                </a:srgbClr>
+              </a:solidFill>
+              <a:prstDash val="solid"/>
+              <a:round/>
+            </a:ln>
+          </p:spPr>
+          <p:txBody>
+            <a:bodyPr/>
+            <a:lstStyle/>
+            <a:p/>
+          </p:txBody>
+        </p:sp>
+        <p:sp>
+          <p:nvSpPr>
+            <p:cNvPr id="19" name="pl18"/>
+            <p:cNvSpPr/>
+            <p:nvPr/>
+          </p:nvSpPr>
+          <p:spPr>
+            <a:xfrm>
+              <a:off x="1461154" y="3178134"/>
+              <a:ext cx="4200976" cy="0"/>
+            </a:xfrm>
+            <a:custGeom>
+              <a:avLst/>
+              <a:pathLst>
+                <a:path w="4200976" h="0">
+                  <a:moveTo>
+                    <a:pt x="0" y="0"/>
+                  </a:moveTo>
+                  <a:lnTo>
+                    <a:pt x="4200976" y="0"/>
+                  </a:lnTo>
+                  <a:lnTo>
+                    <a:pt x="4200976" y="0"/>
+                  </a:lnTo>
+                </a:path>
+              </a:pathLst>
+            </a:custGeom>
+            <a:ln w="13550" cap="flat">
+              <a:solidFill>
+                <a:srgbClr val="FFFFFF">
+                  <a:alpha val="100000"/>
+                </a:srgbClr>
+              </a:solidFill>
+              <a:prstDash val="solid"/>
+              <a:round/>
+            </a:ln>
+          </p:spPr>
+          <p:txBody>
+            <a:bodyPr/>
+            <a:lstStyle/>
+            <a:p/>
+          </p:txBody>
+        </p:sp>
+        <p:sp>
+          <p:nvSpPr>
+            <p:cNvPr id="20" name="pl19"/>
+            <p:cNvSpPr/>
+            <p:nvPr/>
+          </p:nvSpPr>
+          <p:spPr>
+            <a:xfrm>
+              <a:off x="1461154" y="2331694"/>
+              <a:ext cx="4200976" cy="0"/>
+            </a:xfrm>
+            <a:custGeom>
+              <a:avLst/>
+              <a:pathLst>
+                <a:path w="4200976" h="0">
+                  <a:moveTo>
+                    <a:pt x="0" y="0"/>
+                  </a:moveTo>
+                  <a:lnTo>
+                    <a:pt x="4200976" y="0"/>
+                  </a:lnTo>
+                  <a:lnTo>
+                    <a:pt x="4200976" y="0"/>
+                  </a:lnTo>
+                </a:path>
+              </a:pathLst>
+            </a:custGeom>
+            <a:ln w="13550" cap="flat">
+              <a:solidFill>
+                <a:srgbClr val="FFFFFF">
+                  <a:alpha val="100000"/>
+                </a:srgbClr>
+              </a:solidFill>
+              <a:prstDash val="solid"/>
+              <a:round/>
+            </a:ln>
+          </p:spPr>
+          <p:txBody>
+            <a:bodyPr/>
+            <a:lstStyle/>
+            <a:p/>
+          </p:txBody>
+        </p:sp>
+        <p:sp>
+          <p:nvSpPr>
+            <p:cNvPr id="21" name="pl20"/>
+            <p:cNvSpPr/>
+            <p:nvPr/>
+          </p:nvSpPr>
+          <p:spPr>
+            <a:xfrm>
+              <a:off x="1461154" y="1485253"/>
+              <a:ext cx="4200976" cy="0"/>
+            </a:xfrm>
+            <a:custGeom>
+              <a:avLst/>
+              <a:pathLst>
+                <a:path w="4200976" h="0">
+                  <a:moveTo>
+                    <a:pt x="0" y="0"/>
+                  </a:moveTo>
+                  <a:lnTo>
+                    <a:pt x="4200976" y="0"/>
+                  </a:lnTo>
+                  <a:lnTo>
+                    <a:pt x="4200976" y="0"/>
+                  </a:lnTo>
+                </a:path>
+              </a:pathLst>
+            </a:custGeom>
+            <a:ln w="13550" cap="flat">
+              <a:solidFill>
+                <a:srgbClr val="FFFFFF">
+                  <a:alpha val="100000"/>
+                </a:srgbClr>
+              </a:solidFill>
+              <a:prstDash val="solid"/>
+              <a:round/>
+            </a:ln>
+          </p:spPr>
+          <p:txBody>
+            <a:bodyPr/>
+            <a:lstStyle/>
+            <a:p/>
+          </p:txBody>
+        </p:sp>
+        <p:sp>
+          <p:nvSpPr>
+            <p:cNvPr id="22" name="pl21"/>
+            <p:cNvSpPr/>
+            <p:nvPr/>
+          </p:nvSpPr>
+          <p:spPr>
+            <a:xfrm>
+              <a:off x="1652108" y="983989"/>
               <a:ext cx="0" cy="3185376"/>
             </a:xfrm>
             <a:custGeom>
@@ -2851,7 +3023,7 @@
                 </a:path>
               </a:pathLst>
             </a:custGeom>
-            <a:ln w="6775" cap="flat">
+            <a:ln w="13550" cap="flat">
               <a:solidFill>
                 <a:srgbClr val="FFFFFF">
                   <a:alpha val="100000"/>
@@ -2869,13 +3041,13 @@
         </p:sp>
         <p:sp>
           <p:nvSpPr>
-            <p:cNvPr id="19" name="pl18"/>
-            <p:cNvSpPr/>
-            <p:nvPr/>
-          </p:nvSpPr>
-          <p:spPr>
-            <a:xfrm>
-              <a:off x="3773813" y="983989"/>
+            <p:cNvPr id="23" name="pl22"/>
+            <p:cNvSpPr/>
+            <p:nvPr/>
+          </p:nvSpPr>
+          <p:spPr>
+            <a:xfrm>
+              <a:off x="2217896" y="983989"/>
               <a:ext cx="0" cy="3185376"/>
             </a:xfrm>
             <a:custGeom>
@@ -2894,7 +3066,7 @@
                 </a:path>
               </a:pathLst>
             </a:custGeom>
-            <a:ln w="6775" cap="flat">
+            <a:ln w="13550" cap="flat">
               <a:solidFill>
                 <a:srgbClr val="FFFFFF">
                   <a:alpha val="100000"/>
@@ -2912,13 +3084,13 @@
         </p:sp>
         <p:sp>
           <p:nvSpPr>
-            <p:cNvPr id="20" name="pl19"/>
-            <p:cNvSpPr/>
-            <p:nvPr/>
-          </p:nvSpPr>
-          <p:spPr>
-            <a:xfrm>
-              <a:off x="4056707" y="983989"/>
+            <p:cNvPr id="24" name="pl23"/>
+            <p:cNvSpPr/>
+            <p:nvPr/>
+          </p:nvSpPr>
+          <p:spPr>
+            <a:xfrm>
+              <a:off x="2783684" y="983989"/>
               <a:ext cx="0" cy="3185376"/>
             </a:xfrm>
             <a:custGeom>
@@ -2937,7 +3109,7 @@
                 </a:path>
               </a:pathLst>
             </a:custGeom>
-            <a:ln w="6775" cap="flat">
+            <a:ln w="13550" cap="flat">
               <a:solidFill>
                 <a:srgbClr val="FFFFFF">
                   <a:alpha val="100000"/>
@@ -2955,13 +3127,13 @@
         </p:sp>
         <p:sp>
           <p:nvSpPr>
-            <p:cNvPr id="21" name="pl20"/>
-            <p:cNvSpPr/>
-            <p:nvPr/>
-          </p:nvSpPr>
-          <p:spPr>
-            <a:xfrm>
-              <a:off x="4339601" y="983989"/>
+            <p:cNvPr id="25" name="pl24"/>
+            <p:cNvSpPr/>
+            <p:nvPr/>
+          </p:nvSpPr>
+          <p:spPr>
+            <a:xfrm>
+              <a:off x="3349472" y="983989"/>
               <a:ext cx="0" cy="3185376"/>
             </a:xfrm>
             <a:custGeom>
@@ -2980,7 +3152,7 @@
                 </a:path>
               </a:pathLst>
             </a:custGeom>
-            <a:ln w="6775" cap="flat">
+            <a:ln w="13550" cap="flat">
               <a:solidFill>
                 <a:srgbClr val="FFFFFF">
                   <a:alpha val="100000"/>
@@ -2998,13 +3170,13 @@
         </p:sp>
         <p:sp>
           <p:nvSpPr>
-            <p:cNvPr id="22" name="pl21"/>
-            <p:cNvSpPr/>
-            <p:nvPr/>
-          </p:nvSpPr>
-          <p:spPr>
-            <a:xfrm>
-              <a:off x="4622495" y="983989"/>
+            <p:cNvPr id="26" name="pl25"/>
+            <p:cNvSpPr/>
+            <p:nvPr/>
+          </p:nvSpPr>
+          <p:spPr>
+            <a:xfrm>
+              <a:off x="3915260" y="983989"/>
               <a:ext cx="0" cy="3185376"/>
             </a:xfrm>
             <a:custGeom>
@@ -3023,7 +3195,7 @@
                 </a:path>
               </a:pathLst>
             </a:custGeom>
-            <a:ln w="6775" cap="flat">
+            <a:ln w="13550" cap="flat">
               <a:solidFill>
                 <a:srgbClr val="FFFFFF">
                   <a:alpha val="100000"/>
@@ -3041,13 +3213,13 @@
         </p:sp>
         <p:sp>
           <p:nvSpPr>
-            <p:cNvPr id="23" name="pl22"/>
-            <p:cNvSpPr/>
-            <p:nvPr/>
-          </p:nvSpPr>
-          <p:spPr>
-            <a:xfrm>
-              <a:off x="4905389" y="983989"/>
+            <p:cNvPr id="27" name="pl26"/>
+            <p:cNvSpPr/>
+            <p:nvPr/>
+          </p:nvSpPr>
+          <p:spPr>
+            <a:xfrm>
+              <a:off x="4481048" y="983989"/>
               <a:ext cx="0" cy="3185376"/>
             </a:xfrm>
             <a:custGeom>
@@ -3066,7 +3238,7 @@
                 </a:path>
               </a:pathLst>
             </a:custGeom>
-            <a:ln w="6775" cap="flat">
+            <a:ln w="13550" cap="flat">
               <a:solidFill>
                 <a:srgbClr val="FFFFFF">
                   <a:alpha val="100000"/>
@@ -3084,13 +3256,13 @@
         </p:sp>
         <p:sp>
           <p:nvSpPr>
-            <p:cNvPr id="24" name="pl23"/>
-            <p:cNvSpPr/>
-            <p:nvPr/>
-          </p:nvSpPr>
-          <p:spPr>
-            <a:xfrm>
-              <a:off x="5188283" y="983989"/>
+            <p:cNvPr id="28" name="pl27"/>
+            <p:cNvSpPr/>
+            <p:nvPr/>
+          </p:nvSpPr>
+          <p:spPr>
+            <a:xfrm>
+              <a:off x="5046836" y="983989"/>
               <a:ext cx="0" cy="3185376"/>
             </a:xfrm>
             <a:custGeom>
@@ -3109,7 +3281,7 @@
                 </a:path>
               </a:pathLst>
             </a:custGeom>
-            <a:ln w="6775" cap="flat">
+            <a:ln w="13550" cap="flat">
               <a:solidFill>
                 <a:srgbClr val="FFFFFF">
                   <a:alpha val="100000"/>
@@ -3127,13 +3299,13 @@
         </p:sp>
         <p:sp>
           <p:nvSpPr>
-            <p:cNvPr id="25" name="pl24"/>
-            <p:cNvSpPr/>
-            <p:nvPr/>
-          </p:nvSpPr>
-          <p:spPr>
-            <a:xfrm>
-              <a:off x="5471177" y="983989"/>
+            <p:cNvPr id="29" name="pl28"/>
+            <p:cNvSpPr/>
+            <p:nvPr/>
+          </p:nvSpPr>
+          <p:spPr>
+            <a:xfrm>
+              <a:off x="5612624" y="983989"/>
               <a:ext cx="0" cy="3185376"/>
             </a:xfrm>
             <a:custGeom>
@@ -3152,7 +3324,7 @@
                 </a:path>
               </a:pathLst>
             </a:custGeom>
-            <a:ln w="6775" cap="flat">
+            <a:ln w="13550" cap="flat">
               <a:solidFill>
                 <a:srgbClr val="FFFFFF">
                   <a:alpha val="100000"/>
@@ -3170,824 +3342,7 @@
         </p:sp>
         <p:sp>
           <p:nvSpPr>
-            <p:cNvPr id="26" name="pl25"/>
-            <p:cNvSpPr/>
-            <p:nvPr/>
-          </p:nvSpPr>
-          <p:spPr>
-            <a:xfrm>
-              <a:off x="1461154" y="4024575"/>
-              <a:ext cx="4200976" cy="0"/>
-            </a:xfrm>
-            <a:custGeom>
-              <a:avLst/>
-              <a:pathLst>
-                <a:path w="4200976" h="0">
-                  <a:moveTo>
-                    <a:pt x="0" y="0"/>
-                  </a:moveTo>
-                  <a:lnTo>
-                    <a:pt x="4200976" y="0"/>
-                  </a:lnTo>
-                  <a:lnTo>
-                    <a:pt x="4200976" y="0"/>
-                  </a:lnTo>
-                </a:path>
-              </a:pathLst>
-            </a:custGeom>
-            <a:ln w="13550" cap="flat">
-              <a:solidFill>
-                <a:srgbClr val="FFFFFF">
-                  <a:alpha val="100000"/>
-                </a:srgbClr>
-              </a:solidFill>
-              <a:prstDash val="solid"/>
-              <a:round/>
-            </a:ln>
-          </p:spPr>
-          <p:txBody>
-            <a:bodyPr/>
-            <a:lstStyle/>
-            <a:p/>
-          </p:txBody>
-        </p:sp>
-        <p:sp>
-          <p:nvSpPr>
-            <p:cNvPr id="27" name="pl26"/>
-            <p:cNvSpPr/>
-            <p:nvPr/>
-          </p:nvSpPr>
-          <p:spPr>
-            <a:xfrm>
-              <a:off x="1461154" y="3178134"/>
-              <a:ext cx="4200976" cy="0"/>
-            </a:xfrm>
-            <a:custGeom>
-              <a:avLst/>
-              <a:pathLst>
-                <a:path w="4200976" h="0">
-                  <a:moveTo>
-                    <a:pt x="0" y="0"/>
-                  </a:moveTo>
-                  <a:lnTo>
-                    <a:pt x="4200976" y="0"/>
-                  </a:lnTo>
-                  <a:lnTo>
-                    <a:pt x="4200976" y="0"/>
-                  </a:lnTo>
-                </a:path>
-              </a:pathLst>
-            </a:custGeom>
-            <a:ln w="13550" cap="flat">
-              <a:solidFill>
-                <a:srgbClr val="FFFFFF">
-                  <a:alpha val="100000"/>
-                </a:srgbClr>
-              </a:solidFill>
-              <a:prstDash val="solid"/>
-              <a:round/>
-            </a:ln>
-          </p:spPr>
-          <p:txBody>
-            <a:bodyPr/>
-            <a:lstStyle/>
-            <a:p/>
-          </p:txBody>
-        </p:sp>
-        <p:sp>
-          <p:nvSpPr>
-            <p:cNvPr id="28" name="pl27"/>
-            <p:cNvSpPr/>
-            <p:nvPr/>
-          </p:nvSpPr>
-          <p:spPr>
-            <a:xfrm>
-              <a:off x="1461154" y="2331694"/>
-              <a:ext cx="4200976" cy="0"/>
-            </a:xfrm>
-            <a:custGeom>
-              <a:avLst/>
-              <a:pathLst>
-                <a:path w="4200976" h="0">
-                  <a:moveTo>
-                    <a:pt x="0" y="0"/>
-                  </a:moveTo>
-                  <a:lnTo>
-                    <a:pt x="4200976" y="0"/>
-                  </a:lnTo>
-                  <a:lnTo>
-                    <a:pt x="4200976" y="0"/>
-                  </a:lnTo>
-                </a:path>
-              </a:pathLst>
-            </a:custGeom>
-            <a:ln w="13550" cap="flat">
-              <a:solidFill>
-                <a:srgbClr val="FFFFFF">
-                  <a:alpha val="100000"/>
-                </a:srgbClr>
-              </a:solidFill>
-              <a:prstDash val="solid"/>
-              <a:round/>
-            </a:ln>
-          </p:spPr>
-          <p:txBody>
-            <a:bodyPr/>
-            <a:lstStyle/>
-            <a:p/>
-          </p:txBody>
-        </p:sp>
-        <p:sp>
-          <p:nvSpPr>
-            <p:cNvPr id="29" name="pl28"/>
-            <p:cNvSpPr/>
-            <p:nvPr/>
-          </p:nvSpPr>
-          <p:spPr>
-            <a:xfrm>
-              <a:off x="1461154" y="1485253"/>
-              <a:ext cx="4200976" cy="0"/>
-            </a:xfrm>
-            <a:custGeom>
-              <a:avLst/>
-              <a:pathLst>
-                <a:path w="4200976" h="0">
-                  <a:moveTo>
-                    <a:pt x="0" y="0"/>
-                  </a:moveTo>
-                  <a:lnTo>
-                    <a:pt x="4200976" y="0"/>
-                  </a:lnTo>
-                  <a:lnTo>
-                    <a:pt x="4200976" y="0"/>
-                  </a:lnTo>
-                </a:path>
-              </a:pathLst>
-            </a:custGeom>
-            <a:ln w="13550" cap="flat">
-              <a:solidFill>
-                <a:srgbClr val="FFFFFF">
-                  <a:alpha val="100000"/>
-                </a:srgbClr>
-              </a:solidFill>
-              <a:prstDash val="solid"/>
-              <a:round/>
-            </a:ln>
-          </p:spPr>
-          <p:txBody>
-            <a:bodyPr/>
-            <a:lstStyle/>
-            <a:p/>
-          </p:txBody>
-        </p:sp>
-        <p:sp>
-          <p:nvSpPr>
             <p:cNvPr id="30" name="pl29"/>
-            <p:cNvSpPr/>
-            <p:nvPr/>
-          </p:nvSpPr>
-          <p:spPr>
-            <a:xfrm>
-              <a:off x="1652108" y="983989"/>
-              <a:ext cx="0" cy="3185376"/>
-            </a:xfrm>
-            <a:custGeom>
-              <a:avLst/>
-              <a:pathLst>
-                <a:path w="0" h="3185376">
-                  <a:moveTo>
-                    <a:pt x="0" y="3185376"/>
-                  </a:moveTo>
-                  <a:lnTo>
-                    <a:pt x="0" y="0"/>
-                  </a:lnTo>
-                  <a:lnTo>
-                    <a:pt x="0" y="0"/>
-                  </a:lnTo>
-                </a:path>
-              </a:pathLst>
-            </a:custGeom>
-            <a:ln w="13550" cap="flat">
-              <a:solidFill>
-                <a:srgbClr val="FFFFFF">
-                  <a:alpha val="100000"/>
-                </a:srgbClr>
-              </a:solidFill>
-              <a:prstDash val="solid"/>
-              <a:round/>
-            </a:ln>
-          </p:spPr>
-          <p:txBody>
-            <a:bodyPr/>
-            <a:lstStyle/>
-            <a:p/>
-          </p:txBody>
-        </p:sp>
-        <p:sp>
-          <p:nvSpPr>
-            <p:cNvPr id="31" name="pl30"/>
-            <p:cNvSpPr/>
-            <p:nvPr/>
-          </p:nvSpPr>
-          <p:spPr>
-            <a:xfrm>
-              <a:off x="1935002" y="983989"/>
-              <a:ext cx="0" cy="3185376"/>
-            </a:xfrm>
-            <a:custGeom>
-              <a:avLst/>
-              <a:pathLst>
-                <a:path w="0" h="3185376">
-                  <a:moveTo>
-                    <a:pt x="0" y="3185376"/>
-                  </a:moveTo>
-                  <a:lnTo>
-                    <a:pt x="0" y="0"/>
-                  </a:lnTo>
-                  <a:lnTo>
-                    <a:pt x="0" y="0"/>
-                  </a:lnTo>
-                </a:path>
-              </a:pathLst>
-            </a:custGeom>
-            <a:ln w="13550" cap="flat">
-              <a:solidFill>
-                <a:srgbClr val="FFFFFF">
-                  <a:alpha val="100000"/>
-                </a:srgbClr>
-              </a:solidFill>
-              <a:prstDash val="solid"/>
-              <a:round/>
-            </a:ln>
-          </p:spPr>
-          <p:txBody>
-            <a:bodyPr/>
-            <a:lstStyle/>
-            <a:p/>
-          </p:txBody>
-        </p:sp>
-        <p:sp>
-          <p:nvSpPr>
-            <p:cNvPr id="32" name="pl31"/>
-            <p:cNvSpPr/>
-            <p:nvPr/>
-          </p:nvSpPr>
-          <p:spPr>
-            <a:xfrm>
-              <a:off x="2217896" y="983989"/>
-              <a:ext cx="0" cy="3185376"/>
-            </a:xfrm>
-            <a:custGeom>
-              <a:avLst/>
-              <a:pathLst>
-                <a:path w="0" h="3185376">
-                  <a:moveTo>
-                    <a:pt x="0" y="3185376"/>
-                  </a:moveTo>
-                  <a:lnTo>
-                    <a:pt x="0" y="0"/>
-                  </a:lnTo>
-                  <a:lnTo>
-                    <a:pt x="0" y="0"/>
-                  </a:lnTo>
-                </a:path>
-              </a:pathLst>
-            </a:custGeom>
-            <a:ln w="13550" cap="flat">
-              <a:solidFill>
-                <a:srgbClr val="FFFFFF">
-                  <a:alpha val="100000"/>
-                </a:srgbClr>
-              </a:solidFill>
-              <a:prstDash val="solid"/>
-              <a:round/>
-            </a:ln>
-          </p:spPr>
-          <p:txBody>
-            <a:bodyPr/>
-            <a:lstStyle/>
-            <a:p/>
-          </p:txBody>
-        </p:sp>
-        <p:sp>
-          <p:nvSpPr>
-            <p:cNvPr id="33" name="pl32"/>
-            <p:cNvSpPr/>
-            <p:nvPr/>
-          </p:nvSpPr>
-          <p:spPr>
-            <a:xfrm>
-              <a:off x="2500790" y="983989"/>
-              <a:ext cx="0" cy="3185376"/>
-            </a:xfrm>
-            <a:custGeom>
-              <a:avLst/>
-              <a:pathLst>
-                <a:path w="0" h="3185376">
-                  <a:moveTo>
-                    <a:pt x="0" y="3185376"/>
-                  </a:moveTo>
-                  <a:lnTo>
-                    <a:pt x="0" y="0"/>
-                  </a:lnTo>
-                  <a:lnTo>
-                    <a:pt x="0" y="0"/>
-                  </a:lnTo>
-                </a:path>
-              </a:pathLst>
-            </a:custGeom>
-            <a:ln w="13550" cap="flat">
-              <a:solidFill>
-                <a:srgbClr val="FFFFFF">
-                  <a:alpha val="100000"/>
-                </a:srgbClr>
-              </a:solidFill>
-              <a:prstDash val="solid"/>
-              <a:round/>
-            </a:ln>
-          </p:spPr>
-          <p:txBody>
-            <a:bodyPr/>
-            <a:lstStyle/>
-            <a:p/>
-          </p:txBody>
-        </p:sp>
-        <p:sp>
-          <p:nvSpPr>
-            <p:cNvPr id="34" name="pl33"/>
-            <p:cNvSpPr/>
-            <p:nvPr/>
-          </p:nvSpPr>
-          <p:spPr>
-            <a:xfrm>
-              <a:off x="2783684" y="983989"/>
-              <a:ext cx="0" cy="3185376"/>
-            </a:xfrm>
-            <a:custGeom>
-              <a:avLst/>
-              <a:pathLst>
-                <a:path w="0" h="3185376">
-                  <a:moveTo>
-                    <a:pt x="0" y="3185376"/>
-                  </a:moveTo>
-                  <a:lnTo>
-                    <a:pt x="0" y="0"/>
-                  </a:lnTo>
-                  <a:lnTo>
-                    <a:pt x="0" y="0"/>
-                  </a:lnTo>
-                </a:path>
-              </a:pathLst>
-            </a:custGeom>
-            <a:ln w="13550" cap="flat">
-              <a:solidFill>
-                <a:srgbClr val="FFFFFF">
-                  <a:alpha val="100000"/>
-                </a:srgbClr>
-              </a:solidFill>
-              <a:prstDash val="solid"/>
-              <a:round/>
-            </a:ln>
-          </p:spPr>
-          <p:txBody>
-            <a:bodyPr/>
-            <a:lstStyle/>
-            <a:p/>
-          </p:txBody>
-        </p:sp>
-        <p:sp>
-          <p:nvSpPr>
-            <p:cNvPr id="35" name="pl34"/>
-            <p:cNvSpPr/>
-            <p:nvPr/>
-          </p:nvSpPr>
-          <p:spPr>
-            <a:xfrm>
-              <a:off x="3066578" y="983989"/>
-              <a:ext cx="0" cy="3185376"/>
-            </a:xfrm>
-            <a:custGeom>
-              <a:avLst/>
-              <a:pathLst>
-                <a:path w="0" h="3185376">
-                  <a:moveTo>
-                    <a:pt x="0" y="3185376"/>
-                  </a:moveTo>
-                  <a:lnTo>
-                    <a:pt x="0" y="0"/>
-                  </a:lnTo>
-                  <a:lnTo>
-                    <a:pt x="0" y="0"/>
-                  </a:lnTo>
-                </a:path>
-              </a:pathLst>
-            </a:custGeom>
-            <a:ln w="13550" cap="flat">
-              <a:solidFill>
-                <a:srgbClr val="FFFFFF">
-                  <a:alpha val="100000"/>
-                </a:srgbClr>
-              </a:solidFill>
-              <a:prstDash val="solid"/>
-              <a:round/>
-            </a:ln>
-          </p:spPr>
-          <p:txBody>
-            <a:bodyPr/>
-            <a:lstStyle/>
-            <a:p/>
-          </p:txBody>
-        </p:sp>
-        <p:sp>
-          <p:nvSpPr>
-            <p:cNvPr id="36" name="pl35"/>
-            <p:cNvSpPr/>
-            <p:nvPr/>
-          </p:nvSpPr>
-          <p:spPr>
-            <a:xfrm>
-              <a:off x="3349472" y="983989"/>
-              <a:ext cx="0" cy="3185376"/>
-            </a:xfrm>
-            <a:custGeom>
-              <a:avLst/>
-              <a:pathLst>
-                <a:path w="0" h="3185376">
-                  <a:moveTo>
-                    <a:pt x="0" y="3185376"/>
-                  </a:moveTo>
-                  <a:lnTo>
-                    <a:pt x="0" y="0"/>
-                  </a:lnTo>
-                  <a:lnTo>
-                    <a:pt x="0" y="0"/>
-                  </a:lnTo>
-                </a:path>
-              </a:pathLst>
-            </a:custGeom>
-            <a:ln w="13550" cap="flat">
-              <a:solidFill>
-                <a:srgbClr val="FFFFFF">
-                  <a:alpha val="100000"/>
-                </a:srgbClr>
-              </a:solidFill>
-              <a:prstDash val="solid"/>
-              <a:round/>
-            </a:ln>
-          </p:spPr>
-          <p:txBody>
-            <a:bodyPr/>
-            <a:lstStyle/>
-            <a:p/>
-          </p:txBody>
-        </p:sp>
-        <p:sp>
-          <p:nvSpPr>
-            <p:cNvPr id="37" name="pl36"/>
-            <p:cNvSpPr/>
-            <p:nvPr/>
-          </p:nvSpPr>
-          <p:spPr>
-            <a:xfrm>
-              <a:off x="3632366" y="983989"/>
-              <a:ext cx="0" cy="3185376"/>
-            </a:xfrm>
-            <a:custGeom>
-              <a:avLst/>
-              <a:pathLst>
-                <a:path w="0" h="3185376">
-                  <a:moveTo>
-                    <a:pt x="0" y="3185376"/>
-                  </a:moveTo>
-                  <a:lnTo>
-                    <a:pt x="0" y="0"/>
-                  </a:lnTo>
-                  <a:lnTo>
-                    <a:pt x="0" y="0"/>
-                  </a:lnTo>
-                </a:path>
-              </a:pathLst>
-            </a:custGeom>
-            <a:ln w="13550" cap="flat">
-              <a:solidFill>
-                <a:srgbClr val="FFFFFF">
-                  <a:alpha val="100000"/>
-                </a:srgbClr>
-              </a:solidFill>
-              <a:prstDash val="solid"/>
-              <a:round/>
-            </a:ln>
-          </p:spPr>
-          <p:txBody>
-            <a:bodyPr/>
-            <a:lstStyle/>
-            <a:p/>
-          </p:txBody>
-        </p:sp>
-        <p:sp>
-          <p:nvSpPr>
-            <p:cNvPr id="38" name="pl37"/>
-            <p:cNvSpPr/>
-            <p:nvPr/>
-          </p:nvSpPr>
-          <p:spPr>
-            <a:xfrm>
-              <a:off x="3915260" y="983989"/>
-              <a:ext cx="0" cy="3185376"/>
-            </a:xfrm>
-            <a:custGeom>
-              <a:avLst/>
-              <a:pathLst>
-                <a:path w="0" h="3185376">
-                  <a:moveTo>
-                    <a:pt x="0" y="3185376"/>
-                  </a:moveTo>
-                  <a:lnTo>
-                    <a:pt x="0" y="0"/>
-                  </a:lnTo>
-                  <a:lnTo>
-                    <a:pt x="0" y="0"/>
-                  </a:lnTo>
-                </a:path>
-              </a:pathLst>
-            </a:custGeom>
-            <a:ln w="13550" cap="flat">
-              <a:solidFill>
-                <a:srgbClr val="FFFFFF">
-                  <a:alpha val="100000"/>
-                </a:srgbClr>
-              </a:solidFill>
-              <a:prstDash val="solid"/>
-              <a:round/>
-            </a:ln>
-          </p:spPr>
-          <p:txBody>
-            <a:bodyPr/>
-            <a:lstStyle/>
-            <a:p/>
-          </p:txBody>
-        </p:sp>
-        <p:sp>
-          <p:nvSpPr>
-            <p:cNvPr id="39" name="pl38"/>
-            <p:cNvSpPr/>
-            <p:nvPr/>
-          </p:nvSpPr>
-          <p:spPr>
-            <a:xfrm>
-              <a:off x="4198154" y="983989"/>
-              <a:ext cx="0" cy="3185376"/>
-            </a:xfrm>
-            <a:custGeom>
-              <a:avLst/>
-              <a:pathLst>
-                <a:path w="0" h="3185376">
-                  <a:moveTo>
-                    <a:pt x="0" y="3185376"/>
-                  </a:moveTo>
-                  <a:lnTo>
-                    <a:pt x="0" y="0"/>
-                  </a:lnTo>
-                  <a:lnTo>
-                    <a:pt x="0" y="0"/>
-                  </a:lnTo>
-                </a:path>
-              </a:pathLst>
-            </a:custGeom>
-            <a:ln w="13550" cap="flat">
-              <a:solidFill>
-                <a:srgbClr val="FFFFFF">
-                  <a:alpha val="100000"/>
-                </a:srgbClr>
-              </a:solidFill>
-              <a:prstDash val="solid"/>
-              <a:round/>
-            </a:ln>
-          </p:spPr>
-          <p:txBody>
-            <a:bodyPr/>
-            <a:lstStyle/>
-            <a:p/>
-          </p:txBody>
-        </p:sp>
-        <p:sp>
-          <p:nvSpPr>
-            <p:cNvPr id="40" name="pl39"/>
-            <p:cNvSpPr/>
-            <p:nvPr/>
-          </p:nvSpPr>
-          <p:spPr>
-            <a:xfrm>
-              <a:off x="4481048" y="983989"/>
-              <a:ext cx="0" cy="3185376"/>
-            </a:xfrm>
-            <a:custGeom>
-              <a:avLst/>
-              <a:pathLst>
-                <a:path w="0" h="3185376">
-                  <a:moveTo>
-                    <a:pt x="0" y="3185376"/>
-                  </a:moveTo>
-                  <a:lnTo>
-                    <a:pt x="0" y="0"/>
-                  </a:lnTo>
-                  <a:lnTo>
-                    <a:pt x="0" y="0"/>
-                  </a:lnTo>
-                </a:path>
-              </a:pathLst>
-            </a:custGeom>
-            <a:ln w="13550" cap="flat">
-              <a:solidFill>
-                <a:srgbClr val="FFFFFF">
-                  <a:alpha val="100000"/>
-                </a:srgbClr>
-              </a:solidFill>
-              <a:prstDash val="solid"/>
-              <a:round/>
-            </a:ln>
-          </p:spPr>
-          <p:txBody>
-            <a:bodyPr/>
-            <a:lstStyle/>
-            <a:p/>
-          </p:txBody>
-        </p:sp>
-        <p:sp>
-          <p:nvSpPr>
-            <p:cNvPr id="41" name="pl40"/>
-            <p:cNvSpPr/>
-            <p:nvPr/>
-          </p:nvSpPr>
-          <p:spPr>
-            <a:xfrm>
-              <a:off x="4763942" y="983989"/>
-              <a:ext cx="0" cy="3185376"/>
-            </a:xfrm>
-            <a:custGeom>
-              <a:avLst/>
-              <a:pathLst>
-                <a:path w="0" h="3185376">
-                  <a:moveTo>
-                    <a:pt x="0" y="3185376"/>
-                  </a:moveTo>
-                  <a:lnTo>
-                    <a:pt x="0" y="0"/>
-                  </a:lnTo>
-                  <a:lnTo>
-                    <a:pt x="0" y="0"/>
-                  </a:lnTo>
-                </a:path>
-              </a:pathLst>
-            </a:custGeom>
-            <a:ln w="13550" cap="flat">
-              <a:solidFill>
-                <a:srgbClr val="FFFFFF">
-                  <a:alpha val="100000"/>
-                </a:srgbClr>
-              </a:solidFill>
-              <a:prstDash val="solid"/>
-              <a:round/>
-            </a:ln>
-          </p:spPr>
-          <p:txBody>
-            <a:bodyPr/>
-            <a:lstStyle/>
-            <a:p/>
-          </p:txBody>
-        </p:sp>
-        <p:sp>
-          <p:nvSpPr>
-            <p:cNvPr id="42" name="pl41"/>
-            <p:cNvSpPr/>
-            <p:nvPr/>
-          </p:nvSpPr>
-          <p:spPr>
-            <a:xfrm>
-              <a:off x="5046836" y="983989"/>
-              <a:ext cx="0" cy="3185376"/>
-            </a:xfrm>
-            <a:custGeom>
-              <a:avLst/>
-              <a:pathLst>
-                <a:path w="0" h="3185376">
-                  <a:moveTo>
-                    <a:pt x="0" y="3185376"/>
-                  </a:moveTo>
-                  <a:lnTo>
-                    <a:pt x="0" y="0"/>
-                  </a:lnTo>
-                  <a:lnTo>
-                    <a:pt x="0" y="0"/>
-                  </a:lnTo>
-                </a:path>
-              </a:pathLst>
-            </a:custGeom>
-            <a:ln w="13550" cap="flat">
-              <a:solidFill>
-                <a:srgbClr val="FFFFFF">
-                  <a:alpha val="100000"/>
-                </a:srgbClr>
-              </a:solidFill>
-              <a:prstDash val="solid"/>
-              <a:round/>
-            </a:ln>
-          </p:spPr>
-          <p:txBody>
-            <a:bodyPr/>
-            <a:lstStyle/>
-            <a:p/>
-          </p:txBody>
-        </p:sp>
-        <p:sp>
-          <p:nvSpPr>
-            <p:cNvPr id="43" name="pl42"/>
-            <p:cNvSpPr/>
-            <p:nvPr/>
-          </p:nvSpPr>
-          <p:spPr>
-            <a:xfrm>
-              <a:off x="5329730" y="983989"/>
-              <a:ext cx="0" cy="3185376"/>
-            </a:xfrm>
-            <a:custGeom>
-              <a:avLst/>
-              <a:pathLst>
-                <a:path w="0" h="3185376">
-                  <a:moveTo>
-                    <a:pt x="0" y="3185376"/>
-                  </a:moveTo>
-                  <a:lnTo>
-                    <a:pt x="0" y="0"/>
-                  </a:lnTo>
-                  <a:lnTo>
-                    <a:pt x="0" y="0"/>
-                  </a:lnTo>
-                </a:path>
-              </a:pathLst>
-            </a:custGeom>
-            <a:ln w="13550" cap="flat">
-              <a:solidFill>
-                <a:srgbClr val="FFFFFF">
-                  <a:alpha val="100000"/>
-                </a:srgbClr>
-              </a:solidFill>
-              <a:prstDash val="solid"/>
-              <a:round/>
-            </a:ln>
-          </p:spPr>
-          <p:txBody>
-            <a:bodyPr/>
-            <a:lstStyle/>
-            <a:p/>
-          </p:txBody>
-        </p:sp>
-        <p:sp>
-          <p:nvSpPr>
-            <p:cNvPr id="44" name="pl43"/>
-            <p:cNvSpPr/>
-            <p:nvPr/>
-          </p:nvSpPr>
-          <p:spPr>
-            <a:xfrm>
-              <a:off x="5612624" y="983989"/>
-              <a:ext cx="0" cy="3185376"/>
-            </a:xfrm>
-            <a:custGeom>
-              <a:avLst/>
-              <a:pathLst>
-                <a:path w="0" h="3185376">
-                  <a:moveTo>
-                    <a:pt x="0" y="3185376"/>
-                  </a:moveTo>
-                  <a:lnTo>
-                    <a:pt x="0" y="0"/>
-                  </a:lnTo>
-                  <a:lnTo>
-                    <a:pt x="0" y="0"/>
-                  </a:lnTo>
-                </a:path>
-              </a:pathLst>
-            </a:custGeom>
-            <a:ln w="13550" cap="flat">
-              <a:solidFill>
-                <a:srgbClr val="FFFFFF">
-                  <a:alpha val="100000"/>
-                </a:srgbClr>
-              </a:solidFill>
-              <a:prstDash val="solid"/>
-              <a:round/>
-            </a:ln>
-          </p:spPr>
-          <p:txBody>
-            <a:bodyPr/>
-            <a:lstStyle/>
-            <a:p/>
-          </p:txBody>
-        </p:sp>
-        <p:sp>
-          <p:nvSpPr>
-            <p:cNvPr id="45" name="pl44"/>
             <p:cNvSpPr/>
             <p:nvPr/>
           </p:nvSpPr>
@@ -4183,7 +3538,7 @@
         </p:sp>
         <p:sp>
           <p:nvSpPr>
-            <p:cNvPr id="46" name="pt45"/>
+            <p:cNvPr id="31" name="pt30"/>
             <p:cNvSpPr/>
             <p:nvPr/>
           </p:nvSpPr>
@@ -4218,7 +3573,7 @@
         </p:sp>
         <p:sp>
           <p:nvSpPr>
-            <p:cNvPr id="47" name="pt46"/>
+            <p:cNvPr id="32" name="pt31"/>
             <p:cNvSpPr/>
             <p:nvPr/>
           </p:nvSpPr>
@@ -4253,7 +3608,7 @@
         </p:sp>
         <p:sp>
           <p:nvSpPr>
-            <p:cNvPr id="48" name="pt47"/>
+            <p:cNvPr id="33" name="pt32"/>
             <p:cNvSpPr/>
             <p:nvPr/>
           </p:nvSpPr>
@@ -4288,7 +3643,7 @@
         </p:sp>
         <p:sp>
           <p:nvSpPr>
-            <p:cNvPr id="49" name="pt48"/>
+            <p:cNvPr id="34" name="pt33"/>
             <p:cNvSpPr/>
             <p:nvPr/>
           </p:nvSpPr>
@@ -4323,7 +3678,7 @@
         </p:sp>
         <p:sp>
           <p:nvSpPr>
-            <p:cNvPr id="50" name="pt49"/>
+            <p:cNvPr id="35" name="pt34"/>
             <p:cNvSpPr/>
             <p:nvPr/>
           </p:nvSpPr>
@@ -4358,7 +3713,7 @@
         </p:sp>
         <p:sp>
           <p:nvSpPr>
-            <p:cNvPr id="51" name="pt50"/>
+            <p:cNvPr id="36" name="pt35"/>
             <p:cNvSpPr/>
             <p:nvPr/>
           </p:nvSpPr>
@@ -4393,7 +3748,7 @@
         </p:sp>
         <p:sp>
           <p:nvSpPr>
-            <p:cNvPr id="52" name="pt51"/>
+            <p:cNvPr id="37" name="pt36"/>
             <p:cNvSpPr/>
             <p:nvPr/>
           </p:nvSpPr>
@@ -4428,7 +3783,7 @@
         </p:sp>
         <p:sp>
           <p:nvSpPr>
-            <p:cNvPr id="53" name="pt52"/>
+            <p:cNvPr id="38" name="pt37"/>
             <p:cNvSpPr/>
             <p:nvPr/>
           </p:nvSpPr>
@@ -4463,7 +3818,7 @@
         </p:sp>
         <p:sp>
           <p:nvSpPr>
-            <p:cNvPr id="54" name="pt53"/>
+            <p:cNvPr id="39" name="pt38"/>
             <p:cNvSpPr/>
             <p:nvPr/>
           </p:nvSpPr>
@@ -4498,7 +3853,7 @@
         </p:sp>
         <p:sp>
           <p:nvSpPr>
-            <p:cNvPr id="55" name="pt54"/>
+            <p:cNvPr id="40" name="pt39"/>
             <p:cNvSpPr/>
             <p:nvPr/>
           </p:nvSpPr>
@@ -4533,7 +3888,7 @@
         </p:sp>
         <p:sp>
           <p:nvSpPr>
-            <p:cNvPr id="56" name="pt55"/>
+            <p:cNvPr id="41" name="pt40"/>
             <p:cNvSpPr/>
             <p:nvPr/>
           </p:nvSpPr>
@@ -4568,7 +3923,7 @@
         </p:sp>
         <p:sp>
           <p:nvSpPr>
-            <p:cNvPr id="57" name="pt56"/>
+            <p:cNvPr id="42" name="pt41"/>
             <p:cNvSpPr/>
             <p:nvPr/>
           </p:nvSpPr>
@@ -4603,7 +3958,7 @@
         </p:sp>
         <p:sp>
           <p:nvSpPr>
-            <p:cNvPr id="58" name="pt57"/>
+            <p:cNvPr id="43" name="pt42"/>
             <p:cNvSpPr/>
             <p:nvPr/>
           </p:nvSpPr>
@@ -4638,7 +3993,7 @@
         </p:sp>
         <p:sp>
           <p:nvSpPr>
-            <p:cNvPr id="59" name="pt58"/>
+            <p:cNvPr id="44" name="pt43"/>
             <p:cNvSpPr/>
             <p:nvPr/>
           </p:nvSpPr>
@@ -4673,7 +4028,7 @@
         </p:sp>
         <p:sp>
           <p:nvSpPr>
-            <p:cNvPr id="60" name="pt59"/>
+            <p:cNvPr id="45" name="pt44"/>
             <p:cNvSpPr/>
             <p:nvPr/>
           </p:nvSpPr>
@@ -4708,7 +4063,7 @@
         </p:sp>
         <p:sp>
           <p:nvSpPr>
-            <p:cNvPr id="61" name="pt60"/>
+            <p:cNvPr id="46" name="pt45"/>
             <p:cNvSpPr/>
             <p:nvPr/>
           </p:nvSpPr>
@@ -4743,7 +4098,7 @@
         </p:sp>
         <p:sp>
           <p:nvSpPr>
-            <p:cNvPr id="62" name="pt61"/>
+            <p:cNvPr id="47" name="pt46"/>
             <p:cNvSpPr/>
             <p:nvPr/>
           </p:nvSpPr>
@@ -4778,7 +4133,7 @@
         </p:sp>
         <p:sp>
           <p:nvSpPr>
-            <p:cNvPr id="63" name="pt62"/>
+            <p:cNvPr id="48" name="pt47"/>
             <p:cNvSpPr/>
             <p:nvPr/>
           </p:nvSpPr>
@@ -4813,7 +4168,7 @@
         </p:sp>
         <p:sp>
           <p:nvSpPr>
-            <p:cNvPr id="64" name="pt63"/>
+            <p:cNvPr id="49" name="pt48"/>
             <p:cNvSpPr/>
             <p:nvPr/>
           </p:nvSpPr>
@@ -4848,7 +4203,7 @@
         </p:sp>
         <p:sp>
           <p:nvSpPr>
-            <p:cNvPr id="65" name="pt64"/>
+            <p:cNvPr id="50" name="pt49"/>
             <p:cNvSpPr/>
             <p:nvPr/>
           </p:nvSpPr>
@@ -4883,7 +4238,7 @@
         </p:sp>
         <p:sp>
           <p:nvSpPr>
-            <p:cNvPr id="66" name="pt65"/>
+            <p:cNvPr id="51" name="pt50"/>
             <p:cNvSpPr/>
             <p:nvPr/>
           </p:nvSpPr>
@@ -4918,7 +4273,7 @@
         </p:sp>
         <p:sp>
           <p:nvSpPr>
-            <p:cNvPr id="67" name="pt66"/>
+            <p:cNvPr id="52" name="pt51"/>
             <p:cNvSpPr/>
             <p:nvPr/>
           </p:nvSpPr>
@@ -4953,7 +4308,7 @@
         </p:sp>
         <p:sp>
           <p:nvSpPr>
-            <p:cNvPr id="68" name="pt67"/>
+            <p:cNvPr id="53" name="pt52"/>
             <p:cNvSpPr/>
             <p:nvPr/>
           </p:nvSpPr>
@@ -4988,7 +4343,7 @@
         </p:sp>
         <p:sp>
           <p:nvSpPr>
-            <p:cNvPr id="69" name="pt68"/>
+            <p:cNvPr id="54" name="pt53"/>
             <p:cNvSpPr/>
             <p:nvPr/>
           </p:nvSpPr>
@@ -5023,7 +4378,7 @@
         </p:sp>
         <p:sp>
           <p:nvSpPr>
-            <p:cNvPr id="70" name="pt69"/>
+            <p:cNvPr id="55" name="pt54"/>
             <p:cNvSpPr/>
             <p:nvPr/>
           </p:nvSpPr>
@@ -5058,7 +4413,7 @@
         </p:sp>
         <p:sp>
           <p:nvSpPr>
-            <p:cNvPr id="71" name="pt70"/>
+            <p:cNvPr id="56" name="pt55"/>
             <p:cNvSpPr/>
             <p:nvPr/>
           </p:nvSpPr>
@@ -5093,7 +4448,7 @@
         </p:sp>
         <p:sp>
           <p:nvSpPr>
-            <p:cNvPr id="72" name="pt71"/>
+            <p:cNvPr id="57" name="pt56"/>
             <p:cNvSpPr/>
             <p:nvPr/>
           </p:nvSpPr>
@@ -5128,7 +4483,7 @@
         </p:sp>
         <p:sp>
           <p:nvSpPr>
-            <p:cNvPr id="73" name="pt72"/>
+            <p:cNvPr id="58" name="pt57"/>
             <p:cNvSpPr/>
             <p:nvPr/>
           </p:nvSpPr>
@@ -5163,7 +4518,7 @@
         </p:sp>
         <p:sp>
           <p:nvSpPr>
-            <p:cNvPr id="74" name="pt73"/>
+            <p:cNvPr id="59" name="pt58"/>
             <p:cNvSpPr/>
             <p:nvPr/>
           </p:nvSpPr>
@@ -5198,7 +4553,7 @@
         </p:sp>
         <p:sp>
           <p:nvSpPr>
-            <p:cNvPr id="75" name="pt74"/>
+            <p:cNvPr id="60" name="pt59"/>
             <p:cNvSpPr/>
             <p:nvPr/>
           </p:nvSpPr>
@@ -5233,7 +4588,7 @@
         </p:sp>
         <p:sp>
           <p:nvSpPr>
-            <p:cNvPr id="76" name="pt75"/>
+            <p:cNvPr id="61" name="pt60"/>
             <p:cNvSpPr/>
             <p:nvPr/>
           </p:nvSpPr>
@@ -5268,7 +4623,7 @@
         </p:sp>
         <p:sp>
           <p:nvSpPr>
-            <p:cNvPr id="77" name="pt76"/>
+            <p:cNvPr id="62" name="pt61"/>
             <p:cNvSpPr/>
             <p:nvPr/>
           </p:nvSpPr>
@@ -5303,7 +4658,7 @@
         </p:sp>
         <p:sp>
           <p:nvSpPr>
-            <p:cNvPr id="78" name="pt77"/>
+            <p:cNvPr id="63" name="pt62"/>
             <p:cNvSpPr/>
             <p:nvPr/>
           </p:nvSpPr>
@@ -5338,7 +4693,7 @@
         </p:sp>
         <p:sp>
           <p:nvSpPr>
-            <p:cNvPr id="79" name="pt78"/>
+            <p:cNvPr id="64" name="pt63"/>
             <p:cNvSpPr/>
             <p:nvPr/>
           </p:nvSpPr>
@@ -5373,7 +4728,7 @@
         </p:sp>
         <p:sp>
           <p:nvSpPr>
-            <p:cNvPr id="80" name="pt79"/>
+            <p:cNvPr id="65" name="pt64"/>
             <p:cNvSpPr/>
             <p:nvPr/>
           </p:nvSpPr>
@@ -5408,7 +4763,7 @@
         </p:sp>
         <p:sp>
           <p:nvSpPr>
-            <p:cNvPr id="81" name="pt80"/>
+            <p:cNvPr id="66" name="pt65"/>
             <p:cNvSpPr/>
             <p:nvPr/>
           </p:nvSpPr>
@@ -5443,7 +4798,7 @@
         </p:sp>
         <p:sp>
           <p:nvSpPr>
-            <p:cNvPr id="82" name="pt81"/>
+            <p:cNvPr id="67" name="pt66"/>
             <p:cNvSpPr/>
             <p:nvPr/>
           </p:nvSpPr>
@@ -5478,7 +4833,7 @@
         </p:sp>
         <p:sp>
           <p:nvSpPr>
-            <p:cNvPr id="83" name="pt82"/>
+            <p:cNvPr id="68" name="pt67"/>
             <p:cNvSpPr/>
             <p:nvPr/>
           </p:nvSpPr>
@@ -5513,7 +4868,7 @@
         </p:sp>
         <p:sp>
           <p:nvSpPr>
-            <p:cNvPr id="84" name="pt83"/>
+            <p:cNvPr id="69" name="pt68"/>
             <p:cNvSpPr/>
             <p:nvPr/>
           </p:nvSpPr>
@@ -5548,7 +4903,7 @@
         </p:sp>
         <p:sp>
           <p:nvSpPr>
-            <p:cNvPr id="85" name="pt84"/>
+            <p:cNvPr id="70" name="pt69"/>
             <p:cNvSpPr/>
             <p:nvPr/>
           </p:nvSpPr>
@@ -5583,7 +4938,7 @@
         </p:sp>
         <p:sp>
           <p:nvSpPr>
-            <p:cNvPr id="86" name="pt85"/>
+            <p:cNvPr id="71" name="pt70"/>
             <p:cNvSpPr/>
             <p:nvPr/>
           </p:nvSpPr>
@@ -5618,7 +4973,7 @@
         </p:sp>
         <p:sp>
           <p:nvSpPr>
-            <p:cNvPr id="87" name="pt86"/>
+            <p:cNvPr id="72" name="pt71"/>
             <p:cNvSpPr/>
             <p:nvPr/>
           </p:nvSpPr>
@@ -5653,7 +5008,7 @@
         </p:sp>
         <p:sp>
           <p:nvSpPr>
-            <p:cNvPr id="88" name="pt87"/>
+            <p:cNvPr id="73" name="pt72"/>
             <p:cNvSpPr/>
             <p:nvPr/>
           </p:nvSpPr>
@@ -5688,7 +5043,7 @@
         </p:sp>
         <p:sp>
           <p:nvSpPr>
-            <p:cNvPr id="89" name="pt88"/>
+            <p:cNvPr id="74" name="pt73"/>
             <p:cNvSpPr/>
             <p:nvPr/>
           </p:nvSpPr>
@@ -5723,7 +5078,7 @@
         </p:sp>
         <p:sp>
           <p:nvSpPr>
-            <p:cNvPr id="90" name="pt89"/>
+            <p:cNvPr id="75" name="pt74"/>
             <p:cNvSpPr/>
             <p:nvPr/>
           </p:nvSpPr>
@@ -5758,7 +5113,7 @@
         </p:sp>
         <p:sp>
           <p:nvSpPr>
-            <p:cNvPr id="91" name="pt90"/>
+            <p:cNvPr id="76" name="pt75"/>
             <p:cNvSpPr/>
             <p:nvPr/>
           </p:nvSpPr>
@@ -5793,7 +5148,7 @@
         </p:sp>
         <p:sp>
           <p:nvSpPr>
-            <p:cNvPr id="92" name="pt91"/>
+            <p:cNvPr id="77" name="pt76"/>
             <p:cNvSpPr/>
             <p:nvPr/>
           </p:nvSpPr>
@@ -5828,7 +5183,7 @@
         </p:sp>
         <p:sp>
           <p:nvSpPr>
-            <p:cNvPr id="93" name="pt92"/>
+            <p:cNvPr id="78" name="pt77"/>
             <p:cNvSpPr/>
             <p:nvPr/>
           </p:nvSpPr>
@@ -5863,7 +5218,7 @@
         </p:sp>
         <p:sp>
           <p:nvSpPr>
-            <p:cNvPr id="94" name="pt93"/>
+            <p:cNvPr id="79" name="pt78"/>
             <p:cNvSpPr/>
             <p:nvPr/>
           </p:nvSpPr>
@@ -5898,7 +5253,7 @@
         </p:sp>
         <p:sp>
           <p:nvSpPr>
-            <p:cNvPr id="95" name="pt94"/>
+            <p:cNvPr id="80" name="pt79"/>
             <p:cNvSpPr/>
             <p:nvPr/>
           </p:nvSpPr>
@@ -5933,7 +5288,7 @@
         </p:sp>
         <p:sp>
           <p:nvSpPr>
-            <p:cNvPr id="96" name="pt95"/>
+            <p:cNvPr id="81" name="pt80"/>
             <p:cNvSpPr/>
             <p:nvPr/>
           </p:nvSpPr>
@@ -5968,7 +5323,7 @@
         </p:sp>
         <p:sp>
           <p:nvSpPr>
-            <p:cNvPr id="97" name="pt96"/>
+            <p:cNvPr id="82" name="pt81"/>
             <p:cNvSpPr/>
             <p:nvPr/>
           </p:nvSpPr>
@@ -6003,7 +5358,7 @@
         </p:sp>
         <p:sp>
           <p:nvSpPr>
-            <p:cNvPr id="98" name="pt97"/>
+            <p:cNvPr id="83" name="pt82"/>
             <p:cNvSpPr/>
             <p:nvPr/>
           </p:nvSpPr>
@@ -6038,7 +5393,7 @@
         </p:sp>
         <p:sp>
           <p:nvSpPr>
-            <p:cNvPr id="99" name="pt98"/>
+            <p:cNvPr id="84" name="pt83"/>
             <p:cNvSpPr/>
             <p:nvPr/>
           </p:nvSpPr>
@@ -6073,7 +5428,7 @@
         </p:sp>
         <p:sp>
           <p:nvSpPr>
-            <p:cNvPr id="100" name="tx99"/>
+            <p:cNvPr id="85" name="tx84"/>
             <p:cNvSpPr/>
             <p:nvPr/>
           </p:nvSpPr>
@@ -6119,7 +5474,7 @@
         </p:sp>
         <p:sp>
           <p:nvSpPr>
-            <p:cNvPr id="101" name="tx100"/>
+            <p:cNvPr id="86" name="tx85"/>
             <p:cNvSpPr/>
             <p:nvPr/>
           </p:nvSpPr>
@@ -6165,7 +5520,7 @@
         </p:sp>
         <p:sp>
           <p:nvSpPr>
-            <p:cNvPr id="102" name="tx101"/>
+            <p:cNvPr id="87" name="tx86"/>
             <p:cNvSpPr/>
             <p:nvPr/>
           </p:nvSpPr>
@@ -6211,7 +5566,7 @@
         </p:sp>
         <p:sp>
           <p:nvSpPr>
-            <p:cNvPr id="103" name="tx102"/>
+            <p:cNvPr id="88" name="tx87"/>
             <p:cNvSpPr/>
             <p:nvPr/>
           </p:nvSpPr>
@@ -6257,7 +5612,7 @@
         </p:sp>
         <p:sp>
           <p:nvSpPr>
-            <p:cNvPr id="104" name="pl103"/>
+            <p:cNvPr id="89" name="pl88"/>
             <p:cNvSpPr/>
             <p:nvPr/>
           </p:nvSpPr>
@@ -6297,7 +5652,7 @@
         </p:sp>
         <p:sp>
           <p:nvSpPr>
-            <p:cNvPr id="105" name="pl104"/>
+            <p:cNvPr id="90" name="pl89"/>
             <p:cNvSpPr/>
             <p:nvPr/>
           </p:nvSpPr>
@@ -6337,7 +5692,7 @@
         </p:sp>
         <p:sp>
           <p:nvSpPr>
-            <p:cNvPr id="106" name="pl105"/>
+            <p:cNvPr id="91" name="pl90"/>
             <p:cNvSpPr/>
             <p:nvPr/>
           </p:nvSpPr>
@@ -6377,7 +5732,7 @@
         </p:sp>
         <p:sp>
           <p:nvSpPr>
-            <p:cNvPr id="107" name="pl106"/>
+            <p:cNvPr id="92" name="pl91"/>
             <p:cNvSpPr/>
             <p:nvPr/>
           </p:nvSpPr>
@@ -6417,7 +5772,7 @@
         </p:sp>
         <p:sp>
           <p:nvSpPr>
-            <p:cNvPr id="108" name="pl107"/>
+            <p:cNvPr id="93" name="pl92"/>
             <p:cNvSpPr/>
             <p:nvPr/>
           </p:nvSpPr>
@@ -6457,13 +5812,13 @@
         </p:sp>
         <p:sp>
           <p:nvSpPr>
-            <p:cNvPr id="109" name="pl108"/>
-            <p:cNvSpPr/>
-            <p:nvPr/>
-          </p:nvSpPr>
-          <p:spPr>
-            <a:xfrm>
-              <a:off x="1935002" y="4169365"/>
+            <p:cNvPr id="94" name="pl93"/>
+            <p:cNvSpPr/>
+            <p:nvPr/>
+          </p:nvSpPr>
+          <p:spPr>
+            <a:xfrm>
+              <a:off x="2217896" y="4169365"/>
               <a:ext cx="0" cy="34794"/>
             </a:xfrm>
             <a:custGeom>
@@ -6497,13 +5852,13 @@
         </p:sp>
         <p:sp>
           <p:nvSpPr>
-            <p:cNvPr id="110" name="pl109"/>
-            <p:cNvSpPr/>
-            <p:nvPr/>
-          </p:nvSpPr>
-          <p:spPr>
-            <a:xfrm>
-              <a:off x="2217896" y="4169365"/>
+            <p:cNvPr id="95" name="pl94"/>
+            <p:cNvSpPr/>
+            <p:nvPr/>
+          </p:nvSpPr>
+          <p:spPr>
+            <a:xfrm>
+              <a:off x="2783684" y="4169365"/>
               <a:ext cx="0" cy="34794"/>
             </a:xfrm>
             <a:custGeom>
@@ -6537,13 +5892,13 @@
         </p:sp>
         <p:sp>
           <p:nvSpPr>
-            <p:cNvPr id="111" name="pl110"/>
-            <p:cNvSpPr/>
-            <p:nvPr/>
-          </p:nvSpPr>
-          <p:spPr>
-            <a:xfrm>
-              <a:off x="2500790" y="4169365"/>
+            <p:cNvPr id="96" name="pl95"/>
+            <p:cNvSpPr/>
+            <p:nvPr/>
+          </p:nvSpPr>
+          <p:spPr>
+            <a:xfrm>
+              <a:off x="3349472" y="4169365"/>
               <a:ext cx="0" cy="34794"/>
             </a:xfrm>
             <a:custGeom>
@@ -6577,13 +5932,13 @@
         </p:sp>
         <p:sp>
           <p:nvSpPr>
-            <p:cNvPr id="112" name="pl111"/>
-            <p:cNvSpPr/>
-            <p:nvPr/>
-          </p:nvSpPr>
-          <p:spPr>
-            <a:xfrm>
-              <a:off x="2783684" y="4169365"/>
+            <p:cNvPr id="97" name="pl96"/>
+            <p:cNvSpPr/>
+            <p:nvPr/>
+          </p:nvSpPr>
+          <p:spPr>
+            <a:xfrm>
+              <a:off x="3915260" y="4169365"/>
               <a:ext cx="0" cy="34794"/>
             </a:xfrm>
             <a:custGeom>
@@ -6617,13 +5972,13 @@
         </p:sp>
         <p:sp>
           <p:nvSpPr>
-            <p:cNvPr id="113" name="pl112"/>
-            <p:cNvSpPr/>
-            <p:nvPr/>
-          </p:nvSpPr>
-          <p:spPr>
-            <a:xfrm>
-              <a:off x="3066578" y="4169365"/>
+            <p:cNvPr id="98" name="pl97"/>
+            <p:cNvSpPr/>
+            <p:nvPr/>
+          </p:nvSpPr>
+          <p:spPr>
+            <a:xfrm>
+              <a:off x="4481048" y="4169365"/>
               <a:ext cx="0" cy="34794"/>
             </a:xfrm>
             <a:custGeom>
@@ -6657,13 +6012,13 @@
         </p:sp>
         <p:sp>
           <p:nvSpPr>
-            <p:cNvPr id="114" name="pl113"/>
-            <p:cNvSpPr/>
-            <p:nvPr/>
-          </p:nvSpPr>
-          <p:spPr>
-            <a:xfrm>
-              <a:off x="3349472" y="4169365"/>
+            <p:cNvPr id="99" name="pl98"/>
+            <p:cNvSpPr/>
+            <p:nvPr/>
+          </p:nvSpPr>
+          <p:spPr>
+            <a:xfrm>
+              <a:off x="5046836" y="4169365"/>
               <a:ext cx="0" cy="34794"/>
             </a:xfrm>
             <a:custGeom>
@@ -6697,13 +6052,13 @@
         </p:sp>
         <p:sp>
           <p:nvSpPr>
-            <p:cNvPr id="115" name="pl114"/>
-            <p:cNvSpPr/>
-            <p:nvPr/>
-          </p:nvSpPr>
-          <p:spPr>
-            <a:xfrm>
-              <a:off x="3632366" y="4169365"/>
+            <p:cNvPr id="100" name="pl99"/>
+            <p:cNvSpPr/>
+            <p:nvPr/>
+          </p:nvSpPr>
+          <p:spPr>
+            <a:xfrm>
+              <a:off x="5612624" y="4169365"/>
               <a:ext cx="0" cy="34794"/>
             </a:xfrm>
             <a:custGeom>
@@ -6737,287 +6092,7 @@
         </p:sp>
         <p:sp>
           <p:nvSpPr>
-            <p:cNvPr id="116" name="pl115"/>
-            <p:cNvSpPr/>
-            <p:nvPr/>
-          </p:nvSpPr>
-          <p:spPr>
-            <a:xfrm>
-              <a:off x="3915260" y="4169365"/>
-              <a:ext cx="0" cy="34794"/>
-            </a:xfrm>
-            <a:custGeom>
-              <a:avLst/>
-              <a:pathLst>
-                <a:path w="0" h="34794">
-                  <a:moveTo>
-                    <a:pt x="0" y="34794"/>
-                  </a:moveTo>
-                  <a:lnTo>
-                    <a:pt x="0" y="0"/>
-                  </a:lnTo>
-                </a:path>
-              </a:pathLst>
-            </a:custGeom>
-            <a:ln w="13550" cap="flat">
-              <a:solidFill>
-                <a:srgbClr val="333333">
-                  <a:alpha val="100000"/>
-                </a:srgbClr>
-              </a:solidFill>
-              <a:prstDash val="solid"/>
-              <a:round/>
-            </a:ln>
-          </p:spPr>
-          <p:txBody>
-            <a:bodyPr/>
-            <a:lstStyle/>
-            <a:p/>
-          </p:txBody>
-        </p:sp>
-        <p:sp>
-          <p:nvSpPr>
-            <p:cNvPr id="117" name="pl116"/>
-            <p:cNvSpPr/>
-            <p:nvPr/>
-          </p:nvSpPr>
-          <p:spPr>
-            <a:xfrm>
-              <a:off x="4198154" y="4169365"/>
-              <a:ext cx="0" cy="34794"/>
-            </a:xfrm>
-            <a:custGeom>
-              <a:avLst/>
-              <a:pathLst>
-                <a:path w="0" h="34794">
-                  <a:moveTo>
-                    <a:pt x="0" y="34794"/>
-                  </a:moveTo>
-                  <a:lnTo>
-                    <a:pt x="0" y="0"/>
-                  </a:lnTo>
-                </a:path>
-              </a:pathLst>
-            </a:custGeom>
-            <a:ln w="13550" cap="flat">
-              <a:solidFill>
-                <a:srgbClr val="333333">
-                  <a:alpha val="100000"/>
-                </a:srgbClr>
-              </a:solidFill>
-              <a:prstDash val="solid"/>
-              <a:round/>
-            </a:ln>
-          </p:spPr>
-          <p:txBody>
-            <a:bodyPr/>
-            <a:lstStyle/>
-            <a:p/>
-          </p:txBody>
-        </p:sp>
-        <p:sp>
-          <p:nvSpPr>
-            <p:cNvPr id="118" name="pl117"/>
-            <p:cNvSpPr/>
-            <p:nvPr/>
-          </p:nvSpPr>
-          <p:spPr>
-            <a:xfrm>
-              <a:off x="4481048" y="4169365"/>
-              <a:ext cx="0" cy="34794"/>
-            </a:xfrm>
-            <a:custGeom>
-              <a:avLst/>
-              <a:pathLst>
-                <a:path w="0" h="34794">
-                  <a:moveTo>
-                    <a:pt x="0" y="34794"/>
-                  </a:moveTo>
-                  <a:lnTo>
-                    <a:pt x="0" y="0"/>
-                  </a:lnTo>
-                </a:path>
-              </a:pathLst>
-            </a:custGeom>
-            <a:ln w="13550" cap="flat">
-              <a:solidFill>
-                <a:srgbClr val="333333">
-                  <a:alpha val="100000"/>
-                </a:srgbClr>
-              </a:solidFill>
-              <a:prstDash val="solid"/>
-              <a:round/>
-            </a:ln>
-          </p:spPr>
-          <p:txBody>
-            <a:bodyPr/>
-            <a:lstStyle/>
-            <a:p/>
-          </p:txBody>
-        </p:sp>
-        <p:sp>
-          <p:nvSpPr>
-            <p:cNvPr id="119" name="pl118"/>
-            <p:cNvSpPr/>
-            <p:nvPr/>
-          </p:nvSpPr>
-          <p:spPr>
-            <a:xfrm>
-              <a:off x="4763942" y="4169365"/>
-              <a:ext cx="0" cy="34794"/>
-            </a:xfrm>
-            <a:custGeom>
-              <a:avLst/>
-              <a:pathLst>
-                <a:path w="0" h="34794">
-                  <a:moveTo>
-                    <a:pt x="0" y="34794"/>
-                  </a:moveTo>
-                  <a:lnTo>
-                    <a:pt x="0" y="0"/>
-                  </a:lnTo>
-                </a:path>
-              </a:pathLst>
-            </a:custGeom>
-            <a:ln w="13550" cap="flat">
-              <a:solidFill>
-                <a:srgbClr val="333333">
-                  <a:alpha val="100000"/>
-                </a:srgbClr>
-              </a:solidFill>
-              <a:prstDash val="solid"/>
-              <a:round/>
-            </a:ln>
-          </p:spPr>
-          <p:txBody>
-            <a:bodyPr/>
-            <a:lstStyle/>
-            <a:p/>
-          </p:txBody>
-        </p:sp>
-        <p:sp>
-          <p:nvSpPr>
-            <p:cNvPr id="120" name="pl119"/>
-            <p:cNvSpPr/>
-            <p:nvPr/>
-          </p:nvSpPr>
-          <p:spPr>
-            <a:xfrm>
-              <a:off x="5046836" y="4169365"/>
-              <a:ext cx="0" cy="34794"/>
-            </a:xfrm>
-            <a:custGeom>
-              <a:avLst/>
-              <a:pathLst>
-                <a:path w="0" h="34794">
-                  <a:moveTo>
-                    <a:pt x="0" y="34794"/>
-                  </a:moveTo>
-                  <a:lnTo>
-                    <a:pt x="0" y="0"/>
-                  </a:lnTo>
-                </a:path>
-              </a:pathLst>
-            </a:custGeom>
-            <a:ln w="13550" cap="flat">
-              <a:solidFill>
-                <a:srgbClr val="333333">
-                  <a:alpha val="100000"/>
-                </a:srgbClr>
-              </a:solidFill>
-              <a:prstDash val="solid"/>
-              <a:round/>
-            </a:ln>
-          </p:spPr>
-          <p:txBody>
-            <a:bodyPr/>
-            <a:lstStyle/>
-            <a:p/>
-          </p:txBody>
-        </p:sp>
-        <p:sp>
-          <p:nvSpPr>
-            <p:cNvPr id="121" name="pl120"/>
-            <p:cNvSpPr/>
-            <p:nvPr/>
-          </p:nvSpPr>
-          <p:spPr>
-            <a:xfrm>
-              <a:off x="5329730" y="4169365"/>
-              <a:ext cx="0" cy="34794"/>
-            </a:xfrm>
-            <a:custGeom>
-              <a:avLst/>
-              <a:pathLst>
-                <a:path w="0" h="34794">
-                  <a:moveTo>
-                    <a:pt x="0" y="34794"/>
-                  </a:moveTo>
-                  <a:lnTo>
-                    <a:pt x="0" y="0"/>
-                  </a:lnTo>
-                </a:path>
-              </a:pathLst>
-            </a:custGeom>
-            <a:ln w="13550" cap="flat">
-              <a:solidFill>
-                <a:srgbClr val="333333">
-                  <a:alpha val="100000"/>
-                </a:srgbClr>
-              </a:solidFill>
-              <a:prstDash val="solid"/>
-              <a:round/>
-            </a:ln>
-          </p:spPr>
-          <p:txBody>
-            <a:bodyPr/>
-            <a:lstStyle/>
-            <a:p/>
-          </p:txBody>
-        </p:sp>
-        <p:sp>
-          <p:nvSpPr>
-            <p:cNvPr id="122" name="pl121"/>
-            <p:cNvSpPr/>
-            <p:nvPr/>
-          </p:nvSpPr>
-          <p:spPr>
-            <a:xfrm>
-              <a:off x="5612624" y="4169365"/>
-              <a:ext cx="0" cy="34794"/>
-            </a:xfrm>
-            <a:custGeom>
-              <a:avLst/>
-              <a:pathLst>
-                <a:path w="0" h="34794">
-                  <a:moveTo>
-                    <a:pt x="0" y="34794"/>
-                  </a:moveTo>
-                  <a:lnTo>
-                    <a:pt x="0" y="0"/>
-                  </a:lnTo>
-                </a:path>
-              </a:pathLst>
-            </a:custGeom>
-            <a:ln w="13550" cap="flat">
-              <a:solidFill>
-                <a:srgbClr val="333333">
-                  <a:alpha val="100000"/>
-                </a:srgbClr>
-              </a:solidFill>
-              <a:prstDash val="solid"/>
-              <a:round/>
-            </a:ln>
-          </p:spPr>
-          <p:txBody>
-            <a:bodyPr/>
-            <a:lstStyle/>
-            <a:p/>
-          </p:txBody>
-        </p:sp>
-        <p:sp>
-          <p:nvSpPr>
-            <p:cNvPr id="123" name="tx122"/>
+            <p:cNvPr id="101" name="tx100"/>
             <p:cNvSpPr/>
             <p:nvPr/>
           </p:nvSpPr>
@@ -7063,53 +6138,7 @@
         </p:sp>
         <p:sp>
           <p:nvSpPr>
-            <p:cNvPr id="124" name="tx123"/>
-            <p:cNvSpPr/>
-            <p:nvPr/>
-          </p:nvSpPr>
-          <p:spPr>
-            <a:xfrm>
-              <a:off x="1899449" y="4231995"/>
-              <a:ext cx="71105" cy="81473"/>
-            </a:xfrm>
-            <a:prstGeom prst="rect">
-              <a:avLst/>
-            </a:prstGeom>
-            <a:noFill/>
-          </p:spPr>
-          <p:txBody>
-            <a:bodyPr lIns="0" rIns="0" tIns="0" bIns="0" anchorCtr="1" anchor="ctr" wrap="none"/>
-            <a:lstStyle/>
-            <a:p>
-              <a:pPr algn="l" marL="0" marR="0" indent="0">
-                <a:lnSpc>
-                  <a:spcPts val="880"/>
-                </a:lnSpc>
-                <a:spcBef>
-                  <a:spcPts val="0"/>
-                </a:spcBef>
-                <a:spcAft>
-                  <a:spcPts val="0"/>
-                </a:spcAft>
-              </a:pPr>
-              <a:r>
-                <a:rPr sz="880">
-                  <a:solidFill>
-                    <a:srgbClr val="4D4D4D">
-                      <a:alpha val="100000"/>
-                    </a:srgbClr>
-                  </a:solidFill>
-                  <a:latin typeface="DejaVu Sans"/>
-                  <a:cs typeface="DejaVu Sans"/>
-                </a:rPr>
-                <a:t>4</a:t>
-              </a:r>
-            </a:p>
-          </p:txBody>
-        </p:sp>
-        <p:sp>
-          <p:nvSpPr>
-            <p:cNvPr id="125" name="tx124"/>
+            <p:cNvPr id="102" name="tx101"/>
             <p:cNvSpPr/>
             <p:nvPr/>
           </p:nvSpPr>
@@ -7155,53 +6184,7 @@
         </p:sp>
         <p:sp>
           <p:nvSpPr>
-            <p:cNvPr id="126" name="tx125"/>
-            <p:cNvSpPr/>
-            <p:nvPr/>
-          </p:nvSpPr>
-          <p:spPr>
-            <a:xfrm>
-              <a:off x="2429685" y="4230522"/>
-              <a:ext cx="142210" cy="82946"/>
-            </a:xfrm>
-            <a:prstGeom prst="rect">
-              <a:avLst/>
-            </a:prstGeom>
-            <a:noFill/>
-          </p:spPr>
-          <p:txBody>
-            <a:bodyPr lIns="0" rIns="0" tIns="0" bIns="0" anchorCtr="1" anchor="ctr" wrap="none"/>
-            <a:lstStyle/>
-            <a:p>
-              <a:pPr algn="l" marL="0" marR="0" indent="0">
-                <a:lnSpc>
-                  <a:spcPts val="880"/>
-                </a:lnSpc>
-                <a:spcBef>
-                  <a:spcPts val="0"/>
-                </a:spcBef>
-                <a:spcAft>
-                  <a:spcPts val="0"/>
-                </a:spcAft>
-              </a:pPr>
-              <a:r>
-                <a:rPr sz="880">
-                  <a:solidFill>
-                    <a:srgbClr val="4D4D4D">
-                      <a:alpha val="100000"/>
-                    </a:srgbClr>
-                  </a:solidFill>
-                  <a:latin typeface="DejaVu Sans"/>
-                  <a:cs typeface="DejaVu Sans"/>
-                </a:rPr>
-                <a:t>12</a:t>
-              </a:r>
-            </a:p>
-          </p:txBody>
-        </p:sp>
-        <p:sp>
-          <p:nvSpPr>
-            <p:cNvPr id="127" name="tx126"/>
+            <p:cNvPr id="103" name="tx102"/>
             <p:cNvSpPr/>
             <p:nvPr/>
           </p:nvSpPr>
@@ -7247,53 +6230,7 @@
         </p:sp>
         <p:sp>
           <p:nvSpPr>
-            <p:cNvPr id="128" name="tx127"/>
-            <p:cNvSpPr/>
-            <p:nvPr/>
-          </p:nvSpPr>
-          <p:spPr>
-            <a:xfrm>
-              <a:off x="2995473" y="4228939"/>
-              <a:ext cx="142210" cy="84529"/>
-            </a:xfrm>
-            <a:prstGeom prst="rect">
-              <a:avLst/>
-            </a:prstGeom>
-            <a:noFill/>
-          </p:spPr>
-          <p:txBody>
-            <a:bodyPr lIns="0" rIns="0" tIns="0" bIns="0" anchorCtr="1" anchor="ctr" wrap="none"/>
-            <a:lstStyle/>
-            <a:p>
-              <a:pPr algn="l" marL="0" marR="0" indent="0">
-                <a:lnSpc>
-                  <a:spcPts val="880"/>
-                </a:lnSpc>
-                <a:spcBef>
-                  <a:spcPts val="0"/>
-                </a:spcBef>
-                <a:spcAft>
-                  <a:spcPts val="0"/>
-                </a:spcAft>
-              </a:pPr>
-              <a:r>
-                <a:rPr sz="880">
-                  <a:solidFill>
-                    <a:srgbClr val="4D4D4D">
-                      <a:alpha val="100000"/>
-                    </a:srgbClr>
-                  </a:solidFill>
-                  <a:latin typeface="DejaVu Sans"/>
-                  <a:cs typeface="DejaVu Sans"/>
-                </a:rPr>
-                <a:t>20</a:t>
-              </a:r>
-            </a:p>
-          </p:txBody>
-        </p:sp>
-        <p:sp>
-          <p:nvSpPr>
-            <p:cNvPr id="129" name="tx128"/>
+            <p:cNvPr id="104" name="tx103"/>
             <p:cNvSpPr/>
             <p:nvPr/>
           </p:nvSpPr>
@@ -7339,53 +6276,7 @@
         </p:sp>
         <p:sp>
           <p:nvSpPr>
-            <p:cNvPr id="130" name="tx129"/>
-            <p:cNvSpPr/>
-            <p:nvPr/>
-          </p:nvSpPr>
-          <p:spPr>
-            <a:xfrm>
-              <a:off x="3561261" y="4228939"/>
-              <a:ext cx="142210" cy="84529"/>
-            </a:xfrm>
-            <a:prstGeom prst="rect">
-              <a:avLst/>
-            </a:prstGeom>
-            <a:noFill/>
-          </p:spPr>
-          <p:txBody>
-            <a:bodyPr lIns="0" rIns="0" tIns="0" bIns="0" anchorCtr="1" anchor="ctr" wrap="none"/>
-            <a:lstStyle/>
-            <a:p>
-              <a:pPr algn="l" marL="0" marR="0" indent="0">
-                <a:lnSpc>
-                  <a:spcPts val="880"/>
-                </a:lnSpc>
-                <a:spcBef>
-                  <a:spcPts val="0"/>
-                </a:spcBef>
-                <a:spcAft>
-                  <a:spcPts val="0"/>
-                </a:spcAft>
-              </a:pPr>
-              <a:r>
-                <a:rPr sz="880">
-                  <a:solidFill>
-                    <a:srgbClr val="4D4D4D">
-                      <a:alpha val="100000"/>
-                    </a:srgbClr>
-                  </a:solidFill>
-                  <a:latin typeface="DejaVu Sans"/>
-                  <a:cs typeface="DejaVu Sans"/>
-                </a:rPr>
-                <a:t>28</a:t>
-              </a:r>
-            </a:p>
-          </p:txBody>
-        </p:sp>
-        <p:sp>
-          <p:nvSpPr>
-            <p:cNvPr id="131" name="tx130"/>
+            <p:cNvPr id="105" name="tx104"/>
             <p:cNvSpPr/>
             <p:nvPr/>
           </p:nvSpPr>
@@ -7431,53 +6322,7 @@
         </p:sp>
         <p:sp>
           <p:nvSpPr>
-            <p:cNvPr id="132" name="tx131"/>
-            <p:cNvSpPr/>
-            <p:nvPr/>
-          </p:nvSpPr>
-          <p:spPr>
-            <a:xfrm>
-              <a:off x="4127049" y="4228939"/>
-              <a:ext cx="142210" cy="84529"/>
-            </a:xfrm>
-            <a:prstGeom prst="rect">
-              <a:avLst/>
-            </a:prstGeom>
-            <a:noFill/>
-          </p:spPr>
-          <p:txBody>
-            <a:bodyPr lIns="0" rIns="0" tIns="0" bIns="0" anchorCtr="1" anchor="ctr" wrap="none"/>
-            <a:lstStyle/>
-            <a:p>
-              <a:pPr algn="l" marL="0" marR="0" indent="0">
-                <a:lnSpc>
-                  <a:spcPts val="880"/>
-                </a:lnSpc>
-                <a:spcBef>
-                  <a:spcPts val="0"/>
-                </a:spcBef>
-                <a:spcAft>
-                  <a:spcPts val="0"/>
-                </a:spcAft>
-              </a:pPr>
-              <a:r>
-                <a:rPr sz="880">
-                  <a:solidFill>
-                    <a:srgbClr val="4D4D4D">
-                      <a:alpha val="100000"/>
-                    </a:srgbClr>
-                  </a:solidFill>
-                  <a:latin typeface="DejaVu Sans"/>
-                  <a:cs typeface="DejaVu Sans"/>
-                </a:rPr>
-                <a:t>36</a:t>
-              </a:r>
-            </a:p>
-          </p:txBody>
-        </p:sp>
-        <p:sp>
-          <p:nvSpPr>
-            <p:cNvPr id="133" name="tx132"/>
+            <p:cNvPr id="106" name="tx105"/>
             <p:cNvSpPr/>
             <p:nvPr/>
           </p:nvSpPr>
@@ -7523,53 +6368,7 @@
         </p:sp>
         <p:sp>
           <p:nvSpPr>
-            <p:cNvPr id="134" name="tx133"/>
-            <p:cNvSpPr/>
-            <p:nvPr/>
-          </p:nvSpPr>
-          <p:spPr>
-            <a:xfrm>
-              <a:off x="4692837" y="4231995"/>
-              <a:ext cx="142210" cy="81473"/>
-            </a:xfrm>
-            <a:prstGeom prst="rect">
-              <a:avLst/>
-            </a:prstGeom>
-            <a:noFill/>
-          </p:spPr>
-          <p:txBody>
-            <a:bodyPr lIns="0" rIns="0" tIns="0" bIns="0" anchorCtr="1" anchor="ctr" wrap="none"/>
-            <a:lstStyle/>
-            <a:p>
-              <a:pPr algn="l" marL="0" marR="0" indent="0">
-                <a:lnSpc>
-                  <a:spcPts val="880"/>
-                </a:lnSpc>
-                <a:spcBef>
-                  <a:spcPts val="0"/>
-                </a:spcBef>
-                <a:spcAft>
-                  <a:spcPts val="0"/>
-                </a:spcAft>
-              </a:pPr>
-              <a:r>
-                <a:rPr sz="880">
-                  <a:solidFill>
-                    <a:srgbClr val="4D4D4D">
-                      <a:alpha val="100000"/>
-                    </a:srgbClr>
-                  </a:solidFill>
-                  <a:latin typeface="DejaVu Sans"/>
-                  <a:cs typeface="DejaVu Sans"/>
-                </a:rPr>
-                <a:t>44</a:t>
-              </a:r>
-            </a:p>
-          </p:txBody>
-        </p:sp>
-        <p:sp>
-          <p:nvSpPr>
-            <p:cNvPr id="135" name="tx134"/>
+            <p:cNvPr id="107" name="tx106"/>
             <p:cNvSpPr/>
             <p:nvPr/>
           </p:nvSpPr>
@@ -7615,53 +6414,7 @@
         </p:sp>
         <p:sp>
           <p:nvSpPr>
-            <p:cNvPr id="136" name="tx135"/>
-            <p:cNvSpPr/>
-            <p:nvPr/>
-          </p:nvSpPr>
-          <p:spPr>
-            <a:xfrm>
-              <a:off x="5258625" y="4228939"/>
-              <a:ext cx="142210" cy="84529"/>
-            </a:xfrm>
-            <a:prstGeom prst="rect">
-              <a:avLst/>
-            </a:prstGeom>
-            <a:noFill/>
-          </p:spPr>
-          <p:txBody>
-            <a:bodyPr lIns="0" rIns="0" tIns="0" bIns="0" anchorCtr="1" anchor="ctr" wrap="none"/>
-            <a:lstStyle/>
-            <a:p>
-              <a:pPr algn="l" marL="0" marR="0" indent="0">
-                <a:lnSpc>
-                  <a:spcPts val="880"/>
-                </a:lnSpc>
-                <a:spcBef>
-                  <a:spcPts val="0"/>
-                </a:spcBef>
-                <a:spcAft>
-                  <a:spcPts val="0"/>
-                </a:spcAft>
-              </a:pPr>
-              <a:r>
-                <a:rPr sz="880">
-                  <a:solidFill>
-                    <a:srgbClr val="4D4D4D">
-                      <a:alpha val="100000"/>
-                    </a:srgbClr>
-                  </a:solidFill>
-                  <a:latin typeface="DejaVu Sans"/>
-                  <a:cs typeface="DejaVu Sans"/>
-                </a:rPr>
-                <a:t>52</a:t>
-              </a:r>
-            </a:p>
-          </p:txBody>
-        </p:sp>
-        <p:sp>
-          <p:nvSpPr>
-            <p:cNvPr id="137" name="tx136"/>
+            <p:cNvPr id="108" name="tx107"/>
             <p:cNvSpPr/>
             <p:nvPr/>
           </p:nvSpPr>
@@ -7707,7 +6460,7 @@
         </p:sp>
         <p:sp>
           <p:nvSpPr>
-            <p:cNvPr id="138" name="tx137"/>
+            <p:cNvPr id="109" name="tx108"/>
             <p:cNvSpPr/>
             <p:nvPr/>
           </p:nvSpPr>
@@ -7753,7 +6506,7 @@
         </p:sp>
         <p:sp>
           <p:nvSpPr>
-            <p:cNvPr id="139" name="tx138"/>
+            <p:cNvPr id="110" name="tx109"/>
             <p:cNvSpPr/>
             <p:nvPr/>
           </p:nvSpPr>
@@ -7799,7 +6552,7 @@
         </p:sp>
         <p:sp>
           <p:nvSpPr>
-            <p:cNvPr id="140" name="rc139"/>
+            <p:cNvPr id="111" name="rc110"/>
             <p:cNvSpPr/>
             <p:nvPr/>
           </p:nvSpPr>
@@ -7825,7 +6578,7 @@
         </p:sp>
         <p:sp>
           <p:nvSpPr>
-            <p:cNvPr id="141" name="tx140"/>
+            <p:cNvPr id="112" name="tx111"/>
             <p:cNvSpPr/>
             <p:nvPr/>
           </p:nvSpPr>
@@ -7871,7 +6624,7 @@
         </p:sp>
         <p:sp>
           <p:nvSpPr>
-            <p:cNvPr id="142" name="rc141"/>
+            <p:cNvPr id="113" name="rc112"/>
             <p:cNvSpPr/>
             <p:nvPr/>
           </p:nvSpPr>
@@ -7897,7 +6650,7 @@
         </p:sp>
         <p:sp>
           <p:nvSpPr>
-            <p:cNvPr id="143" name="pl142"/>
+            <p:cNvPr id="114" name="pl113"/>
             <p:cNvSpPr/>
             <p:nvPr/>
           </p:nvSpPr>
@@ -7937,7 +6690,7 @@
         </p:sp>
         <p:sp>
           <p:nvSpPr>
-            <p:cNvPr id="144" name="pt143"/>
+            <p:cNvPr id="115" name="pt114"/>
             <p:cNvSpPr/>
             <p:nvPr/>
           </p:nvSpPr>
@@ -7972,7 +6725,7 @@
         </p:sp>
         <p:sp>
           <p:nvSpPr>
-            <p:cNvPr id="145" name="tx144"/>
+            <p:cNvPr id="116" name="tx115"/>
             <p:cNvSpPr/>
             <p:nvPr/>
           </p:nvSpPr>

</xml_diff>

<commit_message>
Deploying to gh-pages from @ sean4andrew/safuncs@b290fdb0140c5ec756ae01a6077ffabd51396d31 🚀
</commit_message>
<xml_diff>
--- a/reference/ONDA_XX-Hazard-Curve.pptx
+++ b/reference/ONDA_XX-Hazard-Curve.pptx
@@ -2531,7 +2531,7 @@
           </p:nvSpPr>
           <p:spPr>
             <a:xfrm>
-              <a:off x="1935002" y="983989"/>
+              <a:off x="1510661" y="983989"/>
               <a:ext cx="0" cy="3185376"/>
             </a:xfrm>
             <a:custGeom>
@@ -2574,7 +2574,7 @@
           </p:nvSpPr>
           <p:spPr>
             <a:xfrm>
-              <a:off x="2500790" y="983989"/>
+              <a:off x="1793555" y="983989"/>
               <a:ext cx="0" cy="3185376"/>
             </a:xfrm>
             <a:custGeom>
@@ -2617,7 +2617,7 @@
           </p:nvSpPr>
           <p:spPr>
             <a:xfrm>
-              <a:off x="3066578" y="983989"/>
+              <a:off x="2076449" y="983989"/>
               <a:ext cx="0" cy="3185376"/>
             </a:xfrm>
             <a:custGeom>
@@ -2660,7 +2660,7 @@
           </p:nvSpPr>
           <p:spPr>
             <a:xfrm>
-              <a:off x="3632366" y="983989"/>
+              <a:off x="2359343" y="983989"/>
               <a:ext cx="0" cy="3185376"/>
             </a:xfrm>
             <a:custGeom>
@@ -2703,7 +2703,7 @@
           </p:nvSpPr>
           <p:spPr>
             <a:xfrm>
-              <a:off x="4198154" y="983989"/>
+              <a:off x="2642237" y="983989"/>
               <a:ext cx="0" cy="3185376"/>
             </a:xfrm>
             <a:custGeom>
@@ -2746,7 +2746,7 @@
           </p:nvSpPr>
           <p:spPr>
             <a:xfrm>
-              <a:off x="4763942" y="983989"/>
+              <a:off x="2925131" y="983989"/>
               <a:ext cx="0" cy="3185376"/>
             </a:xfrm>
             <a:custGeom>
@@ -2789,7 +2789,7 @@
           </p:nvSpPr>
           <p:spPr>
             <a:xfrm>
-              <a:off x="5329730" y="983989"/>
+              <a:off x="3208025" y="983989"/>
               <a:ext cx="0" cy="3185376"/>
             </a:xfrm>
             <a:custGeom>
@@ -2832,179 +2832,7 @@
           </p:nvSpPr>
           <p:spPr>
             <a:xfrm>
-              <a:off x="1461154" y="4024575"/>
-              <a:ext cx="4200976" cy="0"/>
-            </a:xfrm>
-            <a:custGeom>
-              <a:avLst/>
-              <a:pathLst>
-                <a:path w="4200976" h="0">
-                  <a:moveTo>
-                    <a:pt x="0" y="0"/>
-                  </a:moveTo>
-                  <a:lnTo>
-                    <a:pt x="4200976" y="0"/>
-                  </a:lnTo>
-                  <a:lnTo>
-                    <a:pt x="4200976" y="0"/>
-                  </a:lnTo>
-                </a:path>
-              </a:pathLst>
-            </a:custGeom>
-            <a:ln w="13550" cap="flat">
-              <a:solidFill>
-                <a:srgbClr val="FFFFFF">
-                  <a:alpha val="100000"/>
-                </a:srgbClr>
-              </a:solidFill>
-              <a:prstDash val="solid"/>
-              <a:round/>
-            </a:ln>
-          </p:spPr>
-          <p:txBody>
-            <a:bodyPr/>
-            <a:lstStyle/>
-            <a:p/>
-          </p:txBody>
-        </p:sp>
-        <p:sp>
-          <p:nvSpPr>
-            <p:cNvPr id="19" name="pl18"/>
-            <p:cNvSpPr/>
-            <p:nvPr/>
-          </p:nvSpPr>
-          <p:spPr>
-            <a:xfrm>
-              <a:off x="1461154" y="3178134"/>
-              <a:ext cx="4200976" cy="0"/>
-            </a:xfrm>
-            <a:custGeom>
-              <a:avLst/>
-              <a:pathLst>
-                <a:path w="4200976" h="0">
-                  <a:moveTo>
-                    <a:pt x="0" y="0"/>
-                  </a:moveTo>
-                  <a:lnTo>
-                    <a:pt x="4200976" y="0"/>
-                  </a:lnTo>
-                  <a:lnTo>
-                    <a:pt x="4200976" y="0"/>
-                  </a:lnTo>
-                </a:path>
-              </a:pathLst>
-            </a:custGeom>
-            <a:ln w="13550" cap="flat">
-              <a:solidFill>
-                <a:srgbClr val="FFFFFF">
-                  <a:alpha val="100000"/>
-                </a:srgbClr>
-              </a:solidFill>
-              <a:prstDash val="solid"/>
-              <a:round/>
-            </a:ln>
-          </p:spPr>
-          <p:txBody>
-            <a:bodyPr/>
-            <a:lstStyle/>
-            <a:p/>
-          </p:txBody>
-        </p:sp>
-        <p:sp>
-          <p:nvSpPr>
-            <p:cNvPr id="20" name="pl19"/>
-            <p:cNvSpPr/>
-            <p:nvPr/>
-          </p:nvSpPr>
-          <p:spPr>
-            <a:xfrm>
-              <a:off x="1461154" y="2331694"/>
-              <a:ext cx="4200976" cy="0"/>
-            </a:xfrm>
-            <a:custGeom>
-              <a:avLst/>
-              <a:pathLst>
-                <a:path w="4200976" h="0">
-                  <a:moveTo>
-                    <a:pt x="0" y="0"/>
-                  </a:moveTo>
-                  <a:lnTo>
-                    <a:pt x="4200976" y="0"/>
-                  </a:lnTo>
-                  <a:lnTo>
-                    <a:pt x="4200976" y="0"/>
-                  </a:lnTo>
-                </a:path>
-              </a:pathLst>
-            </a:custGeom>
-            <a:ln w="13550" cap="flat">
-              <a:solidFill>
-                <a:srgbClr val="FFFFFF">
-                  <a:alpha val="100000"/>
-                </a:srgbClr>
-              </a:solidFill>
-              <a:prstDash val="solid"/>
-              <a:round/>
-            </a:ln>
-          </p:spPr>
-          <p:txBody>
-            <a:bodyPr/>
-            <a:lstStyle/>
-            <a:p/>
-          </p:txBody>
-        </p:sp>
-        <p:sp>
-          <p:nvSpPr>
-            <p:cNvPr id="21" name="pl20"/>
-            <p:cNvSpPr/>
-            <p:nvPr/>
-          </p:nvSpPr>
-          <p:spPr>
-            <a:xfrm>
-              <a:off x="1461154" y="1485253"/>
-              <a:ext cx="4200976" cy="0"/>
-            </a:xfrm>
-            <a:custGeom>
-              <a:avLst/>
-              <a:pathLst>
-                <a:path w="4200976" h="0">
-                  <a:moveTo>
-                    <a:pt x="0" y="0"/>
-                  </a:moveTo>
-                  <a:lnTo>
-                    <a:pt x="4200976" y="0"/>
-                  </a:lnTo>
-                  <a:lnTo>
-                    <a:pt x="4200976" y="0"/>
-                  </a:lnTo>
-                </a:path>
-              </a:pathLst>
-            </a:custGeom>
-            <a:ln w="13550" cap="flat">
-              <a:solidFill>
-                <a:srgbClr val="FFFFFF">
-                  <a:alpha val="100000"/>
-                </a:srgbClr>
-              </a:solidFill>
-              <a:prstDash val="solid"/>
-              <a:round/>
-            </a:ln>
-          </p:spPr>
-          <p:txBody>
-            <a:bodyPr/>
-            <a:lstStyle/>
-            <a:p/>
-          </p:txBody>
-        </p:sp>
-        <p:sp>
-          <p:nvSpPr>
-            <p:cNvPr id="22" name="pl21"/>
-            <p:cNvSpPr/>
-            <p:nvPr/>
-          </p:nvSpPr>
-          <p:spPr>
-            <a:xfrm>
-              <a:off x="1652108" y="983989"/>
+              <a:off x="3490919" y="983989"/>
               <a:ext cx="0" cy="3185376"/>
             </a:xfrm>
             <a:custGeom>
@@ -3023,7 +2851,7 @@
                 </a:path>
               </a:pathLst>
             </a:custGeom>
-            <a:ln w="13550" cap="flat">
+            <a:ln w="6775" cap="flat">
               <a:solidFill>
                 <a:srgbClr val="FFFFFF">
                   <a:alpha val="100000"/>
@@ -3041,13 +2869,13 @@
         </p:sp>
         <p:sp>
           <p:nvSpPr>
-            <p:cNvPr id="23" name="pl22"/>
-            <p:cNvSpPr/>
-            <p:nvPr/>
-          </p:nvSpPr>
-          <p:spPr>
-            <a:xfrm>
-              <a:off x="2217896" y="983989"/>
+            <p:cNvPr id="19" name="pl18"/>
+            <p:cNvSpPr/>
+            <p:nvPr/>
+          </p:nvSpPr>
+          <p:spPr>
+            <a:xfrm>
+              <a:off x="3773813" y="983989"/>
               <a:ext cx="0" cy="3185376"/>
             </a:xfrm>
             <a:custGeom>
@@ -3066,7 +2894,7 @@
                 </a:path>
               </a:pathLst>
             </a:custGeom>
-            <a:ln w="13550" cap="flat">
+            <a:ln w="6775" cap="flat">
               <a:solidFill>
                 <a:srgbClr val="FFFFFF">
                   <a:alpha val="100000"/>
@@ -3084,13 +2912,13 @@
         </p:sp>
         <p:sp>
           <p:nvSpPr>
-            <p:cNvPr id="24" name="pl23"/>
-            <p:cNvSpPr/>
-            <p:nvPr/>
-          </p:nvSpPr>
-          <p:spPr>
-            <a:xfrm>
-              <a:off x="2783684" y="983989"/>
+            <p:cNvPr id="20" name="pl19"/>
+            <p:cNvSpPr/>
+            <p:nvPr/>
+          </p:nvSpPr>
+          <p:spPr>
+            <a:xfrm>
+              <a:off x="4056707" y="983989"/>
               <a:ext cx="0" cy="3185376"/>
             </a:xfrm>
             <a:custGeom>
@@ -3109,7 +2937,7 @@
                 </a:path>
               </a:pathLst>
             </a:custGeom>
-            <a:ln w="13550" cap="flat">
+            <a:ln w="6775" cap="flat">
               <a:solidFill>
                 <a:srgbClr val="FFFFFF">
                   <a:alpha val="100000"/>
@@ -3127,13 +2955,13 @@
         </p:sp>
         <p:sp>
           <p:nvSpPr>
-            <p:cNvPr id="25" name="pl24"/>
-            <p:cNvSpPr/>
-            <p:nvPr/>
-          </p:nvSpPr>
-          <p:spPr>
-            <a:xfrm>
-              <a:off x="3349472" y="983989"/>
+            <p:cNvPr id="21" name="pl20"/>
+            <p:cNvSpPr/>
+            <p:nvPr/>
+          </p:nvSpPr>
+          <p:spPr>
+            <a:xfrm>
+              <a:off x="4339601" y="983989"/>
               <a:ext cx="0" cy="3185376"/>
             </a:xfrm>
             <a:custGeom>
@@ -3152,7 +2980,7 @@
                 </a:path>
               </a:pathLst>
             </a:custGeom>
-            <a:ln w="13550" cap="flat">
+            <a:ln w="6775" cap="flat">
               <a:solidFill>
                 <a:srgbClr val="FFFFFF">
                   <a:alpha val="100000"/>
@@ -3170,13 +2998,13 @@
         </p:sp>
         <p:sp>
           <p:nvSpPr>
-            <p:cNvPr id="26" name="pl25"/>
-            <p:cNvSpPr/>
-            <p:nvPr/>
-          </p:nvSpPr>
-          <p:spPr>
-            <a:xfrm>
-              <a:off x="3915260" y="983989"/>
+            <p:cNvPr id="22" name="pl21"/>
+            <p:cNvSpPr/>
+            <p:nvPr/>
+          </p:nvSpPr>
+          <p:spPr>
+            <a:xfrm>
+              <a:off x="4622495" y="983989"/>
               <a:ext cx="0" cy="3185376"/>
             </a:xfrm>
             <a:custGeom>
@@ -3195,7 +3023,7 @@
                 </a:path>
               </a:pathLst>
             </a:custGeom>
-            <a:ln w="13550" cap="flat">
+            <a:ln w="6775" cap="flat">
               <a:solidFill>
                 <a:srgbClr val="FFFFFF">
                   <a:alpha val="100000"/>
@@ -3213,13 +3041,13 @@
         </p:sp>
         <p:sp>
           <p:nvSpPr>
-            <p:cNvPr id="27" name="pl26"/>
-            <p:cNvSpPr/>
-            <p:nvPr/>
-          </p:nvSpPr>
-          <p:spPr>
-            <a:xfrm>
-              <a:off x="4481048" y="983989"/>
+            <p:cNvPr id="23" name="pl22"/>
+            <p:cNvSpPr/>
+            <p:nvPr/>
+          </p:nvSpPr>
+          <p:spPr>
+            <a:xfrm>
+              <a:off x="4905389" y="983989"/>
               <a:ext cx="0" cy="3185376"/>
             </a:xfrm>
             <a:custGeom>
@@ -3238,7 +3066,7 @@
                 </a:path>
               </a:pathLst>
             </a:custGeom>
-            <a:ln w="13550" cap="flat">
+            <a:ln w="6775" cap="flat">
               <a:solidFill>
                 <a:srgbClr val="FFFFFF">
                   <a:alpha val="100000"/>
@@ -3256,13 +3084,13 @@
         </p:sp>
         <p:sp>
           <p:nvSpPr>
-            <p:cNvPr id="28" name="pl27"/>
-            <p:cNvSpPr/>
-            <p:nvPr/>
-          </p:nvSpPr>
-          <p:spPr>
-            <a:xfrm>
-              <a:off x="5046836" y="983989"/>
+            <p:cNvPr id="24" name="pl23"/>
+            <p:cNvSpPr/>
+            <p:nvPr/>
+          </p:nvSpPr>
+          <p:spPr>
+            <a:xfrm>
+              <a:off x="5188283" y="983989"/>
               <a:ext cx="0" cy="3185376"/>
             </a:xfrm>
             <a:custGeom>
@@ -3281,7 +3109,7 @@
                 </a:path>
               </a:pathLst>
             </a:custGeom>
-            <a:ln w="13550" cap="flat">
+            <a:ln w="6775" cap="flat">
               <a:solidFill>
                 <a:srgbClr val="FFFFFF">
                   <a:alpha val="100000"/>
@@ -3299,13 +3127,13 @@
         </p:sp>
         <p:sp>
           <p:nvSpPr>
-            <p:cNvPr id="29" name="pl28"/>
-            <p:cNvSpPr/>
-            <p:nvPr/>
-          </p:nvSpPr>
-          <p:spPr>
-            <a:xfrm>
-              <a:off x="5612624" y="983989"/>
+            <p:cNvPr id="25" name="pl24"/>
+            <p:cNvSpPr/>
+            <p:nvPr/>
+          </p:nvSpPr>
+          <p:spPr>
+            <a:xfrm>
+              <a:off x="5471177" y="983989"/>
               <a:ext cx="0" cy="3185376"/>
             </a:xfrm>
             <a:custGeom>
@@ -3324,6 +3152,49 @@
                 </a:path>
               </a:pathLst>
             </a:custGeom>
+            <a:ln w="6775" cap="flat">
+              <a:solidFill>
+                <a:srgbClr val="FFFFFF">
+                  <a:alpha val="100000"/>
+                </a:srgbClr>
+              </a:solidFill>
+              <a:prstDash val="solid"/>
+              <a:round/>
+            </a:ln>
+          </p:spPr>
+          <p:txBody>
+            <a:bodyPr/>
+            <a:lstStyle/>
+            <a:p/>
+          </p:txBody>
+        </p:sp>
+        <p:sp>
+          <p:nvSpPr>
+            <p:cNvPr id="26" name="pl25"/>
+            <p:cNvSpPr/>
+            <p:nvPr/>
+          </p:nvSpPr>
+          <p:spPr>
+            <a:xfrm>
+              <a:off x="1461154" y="4024575"/>
+              <a:ext cx="4200976" cy="0"/>
+            </a:xfrm>
+            <a:custGeom>
+              <a:avLst/>
+              <a:pathLst>
+                <a:path w="4200976" h="0">
+                  <a:moveTo>
+                    <a:pt x="0" y="0"/>
+                  </a:moveTo>
+                  <a:lnTo>
+                    <a:pt x="4200976" y="0"/>
+                  </a:lnTo>
+                  <a:lnTo>
+                    <a:pt x="4200976" y="0"/>
+                  </a:lnTo>
+                </a:path>
+              </a:pathLst>
+            </a:custGeom>
             <a:ln w="13550" cap="flat">
               <a:solidFill>
                 <a:srgbClr val="FFFFFF">
@@ -3342,7 +3213,781 @@
         </p:sp>
         <p:sp>
           <p:nvSpPr>
+            <p:cNvPr id="27" name="pl26"/>
+            <p:cNvSpPr/>
+            <p:nvPr/>
+          </p:nvSpPr>
+          <p:spPr>
+            <a:xfrm>
+              <a:off x="1461154" y="3178134"/>
+              <a:ext cx="4200976" cy="0"/>
+            </a:xfrm>
+            <a:custGeom>
+              <a:avLst/>
+              <a:pathLst>
+                <a:path w="4200976" h="0">
+                  <a:moveTo>
+                    <a:pt x="0" y="0"/>
+                  </a:moveTo>
+                  <a:lnTo>
+                    <a:pt x="4200976" y="0"/>
+                  </a:lnTo>
+                  <a:lnTo>
+                    <a:pt x="4200976" y="0"/>
+                  </a:lnTo>
+                </a:path>
+              </a:pathLst>
+            </a:custGeom>
+            <a:ln w="13550" cap="flat">
+              <a:solidFill>
+                <a:srgbClr val="FFFFFF">
+                  <a:alpha val="100000"/>
+                </a:srgbClr>
+              </a:solidFill>
+              <a:prstDash val="solid"/>
+              <a:round/>
+            </a:ln>
+          </p:spPr>
+          <p:txBody>
+            <a:bodyPr/>
+            <a:lstStyle/>
+            <a:p/>
+          </p:txBody>
+        </p:sp>
+        <p:sp>
+          <p:nvSpPr>
+            <p:cNvPr id="28" name="pl27"/>
+            <p:cNvSpPr/>
+            <p:nvPr/>
+          </p:nvSpPr>
+          <p:spPr>
+            <a:xfrm>
+              <a:off x="1461154" y="2331694"/>
+              <a:ext cx="4200976" cy="0"/>
+            </a:xfrm>
+            <a:custGeom>
+              <a:avLst/>
+              <a:pathLst>
+                <a:path w="4200976" h="0">
+                  <a:moveTo>
+                    <a:pt x="0" y="0"/>
+                  </a:moveTo>
+                  <a:lnTo>
+                    <a:pt x="4200976" y="0"/>
+                  </a:lnTo>
+                  <a:lnTo>
+                    <a:pt x="4200976" y="0"/>
+                  </a:lnTo>
+                </a:path>
+              </a:pathLst>
+            </a:custGeom>
+            <a:ln w="13550" cap="flat">
+              <a:solidFill>
+                <a:srgbClr val="FFFFFF">
+                  <a:alpha val="100000"/>
+                </a:srgbClr>
+              </a:solidFill>
+              <a:prstDash val="solid"/>
+              <a:round/>
+            </a:ln>
+          </p:spPr>
+          <p:txBody>
+            <a:bodyPr/>
+            <a:lstStyle/>
+            <a:p/>
+          </p:txBody>
+        </p:sp>
+        <p:sp>
+          <p:nvSpPr>
+            <p:cNvPr id="29" name="pl28"/>
+            <p:cNvSpPr/>
+            <p:nvPr/>
+          </p:nvSpPr>
+          <p:spPr>
+            <a:xfrm>
+              <a:off x="1461154" y="1485253"/>
+              <a:ext cx="4200976" cy="0"/>
+            </a:xfrm>
+            <a:custGeom>
+              <a:avLst/>
+              <a:pathLst>
+                <a:path w="4200976" h="0">
+                  <a:moveTo>
+                    <a:pt x="0" y="0"/>
+                  </a:moveTo>
+                  <a:lnTo>
+                    <a:pt x="4200976" y="0"/>
+                  </a:lnTo>
+                  <a:lnTo>
+                    <a:pt x="4200976" y="0"/>
+                  </a:lnTo>
+                </a:path>
+              </a:pathLst>
+            </a:custGeom>
+            <a:ln w="13550" cap="flat">
+              <a:solidFill>
+                <a:srgbClr val="FFFFFF">
+                  <a:alpha val="100000"/>
+                </a:srgbClr>
+              </a:solidFill>
+              <a:prstDash val="solid"/>
+              <a:round/>
+            </a:ln>
+          </p:spPr>
+          <p:txBody>
+            <a:bodyPr/>
+            <a:lstStyle/>
+            <a:p/>
+          </p:txBody>
+        </p:sp>
+        <p:sp>
+          <p:nvSpPr>
             <p:cNvPr id="30" name="pl29"/>
+            <p:cNvSpPr/>
+            <p:nvPr/>
+          </p:nvSpPr>
+          <p:spPr>
+            <a:xfrm>
+              <a:off x="1652108" y="983989"/>
+              <a:ext cx="0" cy="3185376"/>
+            </a:xfrm>
+            <a:custGeom>
+              <a:avLst/>
+              <a:pathLst>
+                <a:path w="0" h="3185376">
+                  <a:moveTo>
+                    <a:pt x="0" y="3185376"/>
+                  </a:moveTo>
+                  <a:lnTo>
+                    <a:pt x="0" y="0"/>
+                  </a:lnTo>
+                  <a:lnTo>
+                    <a:pt x="0" y="0"/>
+                  </a:lnTo>
+                </a:path>
+              </a:pathLst>
+            </a:custGeom>
+            <a:ln w="13550" cap="flat">
+              <a:solidFill>
+                <a:srgbClr val="FFFFFF">
+                  <a:alpha val="100000"/>
+                </a:srgbClr>
+              </a:solidFill>
+              <a:prstDash val="solid"/>
+              <a:round/>
+            </a:ln>
+          </p:spPr>
+          <p:txBody>
+            <a:bodyPr/>
+            <a:lstStyle/>
+            <a:p/>
+          </p:txBody>
+        </p:sp>
+        <p:sp>
+          <p:nvSpPr>
+            <p:cNvPr id="31" name="pl30"/>
+            <p:cNvSpPr/>
+            <p:nvPr/>
+          </p:nvSpPr>
+          <p:spPr>
+            <a:xfrm>
+              <a:off x="1935002" y="983989"/>
+              <a:ext cx="0" cy="3185376"/>
+            </a:xfrm>
+            <a:custGeom>
+              <a:avLst/>
+              <a:pathLst>
+                <a:path w="0" h="3185376">
+                  <a:moveTo>
+                    <a:pt x="0" y="3185376"/>
+                  </a:moveTo>
+                  <a:lnTo>
+                    <a:pt x="0" y="0"/>
+                  </a:lnTo>
+                  <a:lnTo>
+                    <a:pt x="0" y="0"/>
+                  </a:lnTo>
+                </a:path>
+              </a:pathLst>
+            </a:custGeom>
+            <a:ln w="13550" cap="flat">
+              <a:solidFill>
+                <a:srgbClr val="FFFFFF">
+                  <a:alpha val="100000"/>
+                </a:srgbClr>
+              </a:solidFill>
+              <a:prstDash val="solid"/>
+              <a:round/>
+            </a:ln>
+          </p:spPr>
+          <p:txBody>
+            <a:bodyPr/>
+            <a:lstStyle/>
+            <a:p/>
+          </p:txBody>
+        </p:sp>
+        <p:sp>
+          <p:nvSpPr>
+            <p:cNvPr id="32" name="pl31"/>
+            <p:cNvSpPr/>
+            <p:nvPr/>
+          </p:nvSpPr>
+          <p:spPr>
+            <a:xfrm>
+              <a:off x="2217896" y="983989"/>
+              <a:ext cx="0" cy="3185376"/>
+            </a:xfrm>
+            <a:custGeom>
+              <a:avLst/>
+              <a:pathLst>
+                <a:path w="0" h="3185376">
+                  <a:moveTo>
+                    <a:pt x="0" y="3185376"/>
+                  </a:moveTo>
+                  <a:lnTo>
+                    <a:pt x="0" y="0"/>
+                  </a:lnTo>
+                  <a:lnTo>
+                    <a:pt x="0" y="0"/>
+                  </a:lnTo>
+                </a:path>
+              </a:pathLst>
+            </a:custGeom>
+            <a:ln w="13550" cap="flat">
+              <a:solidFill>
+                <a:srgbClr val="FFFFFF">
+                  <a:alpha val="100000"/>
+                </a:srgbClr>
+              </a:solidFill>
+              <a:prstDash val="solid"/>
+              <a:round/>
+            </a:ln>
+          </p:spPr>
+          <p:txBody>
+            <a:bodyPr/>
+            <a:lstStyle/>
+            <a:p/>
+          </p:txBody>
+        </p:sp>
+        <p:sp>
+          <p:nvSpPr>
+            <p:cNvPr id="33" name="pl32"/>
+            <p:cNvSpPr/>
+            <p:nvPr/>
+          </p:nvSpPr>
+          <p:spPr>
+            <a:xfrm>
+              <a:off x="2500790" y="983989"/>
+              <a:ext cx="0" cy="3185376"/>
+            </a:xfrm>
+            <a:custGeom>
+              <a:avLst/>
+              <a:pathLst>
+                <a:path w="0" h="3185376">
+                  <a:moveTo>
+                    <a:pt x="0" y="3185376"/>
+                  </a:moveTo>
+                  <a:lnTo>
+                    <a:pt x="0" y="0"/>
+                  </a:lnTo>
+                  <a:lnTo>
+                    <a:pt x="0" y="0"/>
+                  </a:lnTo>
+                </a:path>
+              </a:pathLst>
+            </a:custGeom>
+            <a:ln w="13550" cap="flat">
+              <a:solidFill>
+                <a:srgbClr val="FFFFFF">
+                  <a:alpha val="100000"/>
+                </a:srgbClr>
+              </a:solidFill>
+              <a:prstDash val="solid"/>
+              <a:round/>
+            </a:ln>
+          </p:spPr>
+          <p:txBody>
+            <a:bodyPr/>
+            <a:lstStyle/>
+            <a:p/>
+          </p:txBody>
+        </p:sp>
+        <p:sp>
+          <p:nvSpPr>
+            <p:cNvPr id="34" name="pl33"/>
+            <p:cNvSpPr/>
+            <p:nvPr/>
+          </p:nvSpPr>
+          <p:spPr>
+            <a:xfrm>
+              <a:off x="2783684" y="983989"/>
+              <a:ext cx="0" cy="3185376"/>
+            </a:xfrm>
+            <a:custGeom>
+              <a:avLst/>
+              <a:pathLst>
+                <a:path w="0" h="3185376">
+                  <a:moveTo>
+                    <a:pt x="0" y="3185376"/>
+                  </a:moveTo>
+                  <a:lnTo>
+                    <a:pt x="0" y="0"/>
+                  </a:lnTo>
+                  <a:lnTo>
+                    <a:pt x="0" y="0"/>
+                  </a:lnTo>
+                </a:path>
+              </a:pathLst>
+            </a:custGeom>
+            <a:ln w="13550" cap="flat">
+              <a:solidFill>
+                <a:srgbClr val="FFFFFF">
+                  <a:alpha val="100000"/>
+                </a:srgbClr>
+              </a:solidFill>
+              <a:prstDash val="solid"/>
+              <a:round/>
+            </a:ln>
+          </p:spPr>
+          <p:txBody>
+            <a:bodyPr/>
+            <a:lstStyle/>
+            <a:p/>
+          </p:txBody>
+        </p:sp>
+        <p:sp>
+          <p:nvSpPr>
+            <p:cNvPr id="35" name="pl34"/>
+            <p:cNvSpPr/>
+            <p:nvPr/>
+          </p:nvSpPr>
+          <p:spPr>
+            <a:xfrm>
+              <a:off x="3066578" y="983989"/>
+              <a:ext cx="0" cy="3185376"/>
+            </a:xfrm>
+            <a:custGeom>
+              <a:avLst/>
+              <a:pathLst>
+                <a:path w="0" h="3185376">
+                  <a:moveTo>
+                    <a:pt x="0" y="3185376"/>
+                  </a:moveTo>
+                  <a:lnTo>
+                    <a:pt x="0" y="0"/>
+                  </a:lnTo>
+                  <a:lnTo>
+                    <a:pt x="0" y="0"/>
+                  </a:lnTo>
+                </a:path>
+              </a:pathLst>
+            </a:custGeom>
+            <a:ln w="13550" cap="flat">
+              <a:solidFill>
+                <a:srgbClr val="FFFFFF">
+                  <a:alpha val="100000"/>
+                </a:srgbClr>
+              </a:solidFill>
+              <a:prstDash val="solid"/>
+              <a:round/>
+            </a:ln>
+          </p:spPr>
+          <p:txBody>
+            <a:bodyPr/>
+            <a:lstStyle/>
+            <a:p/>
+          </p:txBody>
+        </p:sp>
+        <p:sp>
+          <p:nvSpPr>
+            <p:cNvPr id="36" name="pl35"/>
+            <p:cNvSpPr/>
+            <p:nvPr/>
+          </p:nvSpPr>
+          <p:spPr>
+            <a:xfrm>
+              <a:off x="3349472" y="983989"/>
+              <a:ext cx="0" cy="3185376"/>
+            </a:xfrm>
+            <a:custGeom>
+              <a:avLst/>
+              <a:pathLst>
+                <a:path w="0" h="3185376">
+                  <a:moveTo>
+                    <a:pt x="0" y="3185376"/>
+                  </a:moveTo>
+                  <a:lnTo>
+                    <a:pt x="0" y="0"/>
+                  </a:lnTo>
+                  <a:lnTo>
+                    <a:pt x="0" y="0"/>
+                  </a:lnTo>
+                </a:path>
+              </a:pathLst>
+            </a:custGeom>
+            <a:ln w="13550" cap="flat">
+              <a:solidFill>
+                <a:srgbClr val="FFFFFF">
+                  <a:alpha val="100000"/>
+                </a:srgbClr>
+              </a:solidFill>
+              <a:prstDash val="solid"/>
+              <a:round/>
+            </a:ln>
+          </p:spPr>
+          <p:txBody>
+            <a:bodyPr/>
+            <a:lstStyle/>
+            <a:p/>
+          </p:txBody>
+        </p:sp>
+        <p:sp>
+          <p:nvSpPr>
+            <p:cNvPr id="37" name="pl36"/>
+            <p:cNvSpPr/>
+            <p:nvPr/>
+          </p:nvSpPr>
+          <p:spPr>
+            <a:xfrm>
+              <a:off x="3632366" y="983989"/>
+              <a:ext cx="0" cy="3185376"/>
+            </a:xfrm>
+            <a:custGeom>
+              <a:avLst/>
+              <a:pathLst>
+                <a:path w="0" h="3185376">
+                  <a:moveTo>
+                    <a:pt x="0" y="3185376"/>
+                  </a:moveTo>
+                  <a:lnTo>
+                    <a:pt x="0" y="0"/>
+                  </a:lnTo>
+                  <a:lnTo>
+                    <a:pt x="0" y="0"/>
+                  </a:lnTo>
+                </a:path>
+              </a:pathLst>
+            </a:custGeom>
+            <a:ln w="13550" cap="flat">
+              <a:solidFill>
+                <a:srgbClr val="FFFFFF">
+                  <a:alpha val="100000"/>
+                </a:srgbClr>
+              </a:solidFill>
+              <a:prstDash val="solid"/>
+              <a:round/>
+            </a:ln>
+          </p:spPr>
+          <p:txBody>
+            <a:bodyPr/>
+            <a:lstStyle/>
+            <a:p/>
+          </p:txBody>
+        </p:sp>
+        <p:sp>
+          <p:nvSpPr>
+            <p:cNvPr id="38" name="pl37"/>
+            <p:cNvSpPr/>
+            <p:nvPr/>
+          </p:nvSpPr>
+          <p:spPr>
+            <a:xfrm>
+              <a:off x="3915260" y="983989"/>
+              <a:ext cx="0" cy="3185376"/>
+            </a:xfrm>
+            <a:custGeom>
+              <a:avLst/>
+              <a:pathLst>
+                <a:path w="0" h="3185376">
+                  <a:moveTo>
+                    <a:pt x="0" y="3185376"/>
+                  </a:moveTo>
+                  <a:lnTo>
+                    <a:pt x="0" y="0"/>
+                  </a:lnTo>
+                  <a:lnTo>
+                    <a:pt x="0" y="0"/>
+                  </a:lnTo>
+                </a:path>
+              </a:pathLst>
+            </a:custGeom>
+            <a:ln w="13550" cap="flat">
+              <a:solidFill>
+                <a:srgbClr val="FFFFFF">
+                  <a:alpha val="100000"/>
+                </a:srgbClr>
+              </a:solidFill>
+              <a:prstDash val="solid"/>
+              <a:round/>
+            </a:ln>
+          </p:spPr>
+          <p:txBody>
+            <a:bodyPr/>
+            <a:lstStyle/>
+            <a:p/>
+          </p:txBody>
+        </p:sp>
+        <p:sp>
+          <p:nvSpPr>
+            <p:cNvPr id="39" name="pl38"/>
+            <p:cNvSpPr/>
+            <p:nvPr/>
+          </p:nvSpPr>
+          <p:spPr>
+            <a:xfrm>
+              <a:off x="4198154" y="983989"/>
+              <a:ext cx="0" cy="3185376"/>
+            </a:xfrm>
+            <a:custGeom>
+              <a:avLst/>
+              <a:pathLst>
+                <a:path w="0" h="3185376">
+                  <a:moveTo>
+                    <a:pt x="0" y="3185376"/>
+                  </a:moveTo>
+                  <a:lnTo>
+                    <a:pt x="0" y="0"/>
+                  </a:lnTo>
+                  <a:lnTo>
+                    <a:pt x="0" y="0"/>
+                  </a:lnTo>
+                </a:path>
+              </a:pathLst>
+            </a:custGeom>
+            <a:ln w="13550" cap="flat">
+              <a:solidFill>
+                <a:srgbClr val="FFFFFF">
+                  <a:alpha val="100000"/>
+                </a:srgbClr>
+              </a:solidFill>
+              <a:prstDash val="solid"/>
+              <a:round/>
+            </a:ln>
+          </p:spPr>
+          <p:txBody>
+            <a:bodyPr/>
+            <a:lstStyle/>
+            <a:p/>
+          </p:txBody>
+        </p:sp>
+        <p:sp>
+          <p:nvSpPr>
+            <p:cNvPr id="40" name="pl39"/>
+            <p:cNvSpPr/>
+            <p:nvPr/>
+          </p:nvSpPr>
+          <p:spPr>
+            <a:xfrm>
+              <a:off x="4481048" y="983989"/>
+              <a:ext cx="0" cy="3185376"/>
+            </a:xfrm>
+            <a:custGeom>
+              <a:avLst/>
+              <a:pathLst>
+                <a:path w="0" h="3185376">
+                  <a:moveTo>
+                    <a:pt x="0" y="3185376"/>
+                  </a:moveTo>
+                  <a:lnTo>
+                    <a:pt x="0" y="0"/>
+                  </a:lnTo>
+                  <a:lnTo>
+                    <a:pt x="0" y="0"/>
+                  </a:lnTo>
+                </a:path>
+              </a:pathLst>
+            </a:custGeom>
+            <a:ln w="13550" cap="flat">
+              <a:solidFill>
+                <a:srgbClr val="FFFFFF">
+                  <a:alpha val="100000"/>
+                </a:srgbClr>
+              </a:solidFill>
+              <a:prstDash val="solid"/>
+              <a:round/>
+            </a:ln>
+          </p:spPr>
+          <p:txBody>
+            <a:bodyPr/>
+            <a:lstStyle/>
+            <a:p/>
+          </p:txBody>
+        </p:sp>
+        <p:sp>
+          <p:nvSpPr>
+            <p:cNvPr id="41" name="pl40"/>
+            <p:cNvSpPr/>
+            <p:nvPr/>
+          </p:nvSpPr>
+          <p:spPr>
+            <a:xfrm>
+              <a:off x="4763942" y="983989"/>
+              <a:ext cx="0" cy="3185376"/>
+            </a:xfrm>
+            <a:custGeom>
+              <a:avLst/>
+              <a:pathLst>
+                <a:path w="0" h="3185376">
+                  <a:moveTo>
+                    <a:pt x="0" y="3185376"/>
+                  </a:moveTo>
+                  <a:lnTo>
+                    <a:pt x="0" y="0"/>
+                  </a:lnTo>
+                  <a:lnTo>
+                    <a:pt x="0" y="0"/>
+                  </a:lnTo>
+                </a:path>
+              </a:pathLst>
+            </a:custGeom>
+            <a:ln w="13550" cap="flat">
+              <a:solidFill>
+                <a:srgbClr val="FFFFFF">
+                  <a:alpha val="100000"/>
+                </a:srgbClr>
+              </a:solidFill>
+              <a:prstDash val="solid"/>
+              <a:round/>
+            </a:ln>
+          </p:spPr>
+          <p:txBody>
+            <a:bodyPr/>
+            <a:lstStyle/>
+            <a:p/>
+          </p:txBody>
+        </p:sp>
+        <p:sp>
+          <p:nvSpPr>
+            <p:cNvPr id="42" name="pl41"/>
+            <p:cNvSpPr/>
+            <p:nvPr/>
+          </p:nvSpPr>
+          <p:spPr>
+            <a:xfrm>
+              <a:off x="5046836" y="983989"/>
+              <a:ext cx="0" cy="3185376"/>
+            </a:xfrm>
+            <a:custGeom>
+              <a:avLst/>
+              <a:pathLst>
+                <a:path w="0" h="3185376">
+                  <a:moveTo>
+                    <a:pt x="0" y="3185376"/>
+                  </a:moveTo>
+                  <a:lnTo>
+                    <a:pt x="0" y="0"/>
+                  </a:lnTo>
+                  <a:lnTo>
+                    <a:pt x="0" y="0"/>
+                  </a:lnTo>
+                </a:path>
+              </a:pathLst>
+            </a:custGeom>
+            <a:ln w="13550" cap="flat">
+              <a:solidFill>
+                <a:srgbClr val="FFFFFF">
+                  <a:alpha val="100000"/>
+                </a:srgbClr>
+              </a:solidFill>
+              <a:prstDash val="solid"/>
+              <a:round/>
+            </a:ln>
+          </p:spPr>
+          <p:txBody>
+            <a:bodyPr/>
+            <a:lstStyle/>
+            <a:p/>
+          </p:txBody>
+        </p:sp>
+        <p:sp>
+          <p:nvSpPr>
+            <p:cNvPr id="43" name="pl42"/>
+            <p:cNvSpPr/>
+            <p:nvPr/>
+          </p:nvSpPr>
+          <p:spPr>
+            <a:xfrm>
+              <a:off x="5329730" y="983989"/>
+              <a:ext cx="0" cy="3185376"/>
+            </a:xfrm>
+            <a:custGeom>
+              <a:avLst/>
+              <a:pathLst>
+                <a:path w="0" h="3185376">
+                  <a:moveTo>
+                    <a:pt x="0" y="3185376"/>
+                  </a:moveTo>
+                  <a:lnTo>
+                    <a:pt x="0" y="0"/>
+                  </a:lnTo>
+                  <a:lnTo>
+                    <a:pt x="0" y="0"/>
+                  </a:lnTo>
+                </a:path>
+              </a:pathLst>
+            </a:custGeom>
+            <a:ln w="13550" cap="flat">
+              <a:solidFill>
+                <a:srgbClr val="FFFFFF">
+                  <a:alpha val="100000"/>
+                </a:srgbClr>
+              </a:solidFill>
+              <a:prstDash val="solid"/>
+              <a:round/>
+            </a:ln>
+          </p:spPr>
+          <p:txBody>
+            <a:bodyPr/>
+            <a:lstStyle/>
+            <a:p/>
+          </p:txBody>
+        </p:sp>
+        <p:sp>
+          <p:nvSpPr>
+            <p:cNvPr id="44" name="pl43"/>
+            <p:cNvSpPr/>
+            <p:nvPr/>
+          </p:nvSpPr>
+          <p:spPr>
+            <a:xfrm>
+              <a:off x="5612624" y="983989"/>
+              <a:ext cx="0" cy="3185376"/>
+            </a:xfrm>
+            <a:custGeom>
+              <a:avLst/>
+              <a:pathLst>
+                <a:path w="0" h="3185376">
+                  <a:moveTo>
+                    <a:pt x="0" y="3185376"/>
+                  </a:moveTo>
+                  <a:lnTo>
+                    <a:pt x="0" y="0"/>
+                  </a:lnTo>
+                  <a:lnTo>
+                    <a:pt x="0" y="0"/>
+                  </a:lnTo>
+                </a:path>
+              </a:pathLst>
+            </a:custGeom>
+            <a:ln w="13550" cap="flat">
+              <a:solidFill>
+                <a:srgbClr val="FFFFFF">
+                  <a:alpha val="100000"/>
+                </a:srgbClr>
+              </a:solidFill>
+              <a:prstDash val="solid"/>
+              <a:round/>
+            </a:ln>
+          </p:spPr>
+          <p:txBody>
+            <a:bodyPr/>
+            <a:lstStyle/>
+            <a:p/>
+          </p:txBody>
+        </p:sp>
+        <p:sp>
+          <p:nvSpPr>
+            <p:cNvPr id="45" name="pl44"/>
             <p:cNvSpPr/>
             <p:nvPr/>
           </p:nvSpPr>
@@ -3538,7 +4183,7 @@
         </p:sp>
         <p:sp>
           <p:nvSpPr>
-            <p:cNvPr id="31" name="pt30"/>
+            <p:cNvPr id="46" name="pt45"/>
             <p:cNvSpPr/>
             <p:nvPr/>
           </p:nvSpPr>
@@ -3573,7 +4218,7 @@
         </p:sp>
         <p:sp>
           <p:nvSpPr>
-            <p:cNvPr id="32" name="pt31"/>
+            <p:cNvPr id="47" name="pt46"/>
             <p:cNvSpPr/>
             <p:nvPr/>
           </p:nvSpPr>
@@ -3608,7 +4253,7 @@
         </p:sp>
         <p:sp>
           <p:nvSpPr>
-            <p:cNvPr id="33" name="pt32"/>
+            <p:cNvPr id="48" name="pt47"/>
             <p:cNvSpPr/>
             <p:nvPr/>
           </p:nvSpPr>
@@ -3643,7 +4288,7 @@
         </p:sp>
         <p:sp>
           <p:nvSpPr>
-            <p:cNvPr id="34" name="pt33"/>
+            <p:cNvPr id="49" name="pt48"/>
             <p:cNvSpPr/>
             <p:nvPr/>
           </p:nvSpPr>
@@ -3678,7 +4323,7 @@
         </p:sp>
         <p:sp>
           <p:nvSpPr>
-            <p:cNvPr id="35" name="pt34"/>
+            <p:cNvPr id="50" name="pt49"/>
             <p:cNvSpPr/>
             <p:nvPr/>
           </p:nvSpPr>
@@ -3713,7 +4358,7 @@
         </p:sp>
         <p:sp>
           <p:nvSpPr>
-            <p:cNvPr id="36" name="pt35"/>
+            <p:cNvPr id="51" name="pt50"/>
             <p:cNvSpPr/>
             <p:nvPr/>
           </p:nvSpPr>
@@ -3748,7 +4393,7 @@
         </p:sp>
         <p:sp>
           <p:nvSpPr>
-            <p:cNvPr id="37" name="pt36"/>
+            <p:cNvPr id="52" name="pt51"/>
             <p:cNvSpPr/>
             <p:nvPr/>
           </p:nvSpPr>
@@ -3783,7 +4428,7 @@
         </p:sp>
         <p:sp>
           <p:nvSpPr>
-            <p:cNvPr id="38" name="pt37"/>
+            <p:cNvPr id="53" name="pt52"/>
             <p:cNvSpPr/>
             <p:nvPr/>
           </p:nvSpPr>
@@ -3818,7 +4463,7 @@
         </p:sp>
         <p:sp>
           <p:nvSpPr>
-            <p:cNvPr id="39" name="pt38"/>
+            <p:cNvPr id="54" name="pt53"/>
             <p:cNvSpPr/>
             <p:nvPr/>
           </p:nvSpPr>
@@ -3853,7 +4498,7 @@
         </p:sp>
         <p:sp>
           <p:nvSpPr>
-            <p:cNvPr id="40" name="pt39"/>
+            <p:cNvPr id="55" name="pt54"/>
             <p:cNvSpPr/>
             <p:nvPr/>
           </p:nvSpPr>
@@ -3888,7 +4533,7 @@
         </p:sp>
         <p:sp>
           <p:nvSpPr>
-            <p:cNvPr id="41" name="pt40"/>
+            <p:cNvPr id="56" name="pt55"/>
             <p:cNvSpPr/>
             <p:nvPr/>
           </p:nvSpPr>
@@ -3923,7 +4568,7 @@
         </p:sp>
         <p:sp>
           <p:nvSpPr>
-            <p:cNvPr id="42" name="pt41"/>
+            <p:cNvPr id="57" name="pt56"/>
             <p:cNvSpPr/>
             <p:nvPr/>
           </p:nvSpPr>
@@ -3958,7 +4603,7 @@
         </p:sp>
         <p:sp>
           <p:nvSpPr>
-            <p:cNvPr id="43" name="pt42"/>
+            <p:cNvPr id="58" name="pt57"/>
             <p:cNvSpPr/>
             <p:nvPr/>
           </p:nvSpPr>
@@ -3993,7 +4638,7 @@
         </p:sp>
         <p:sp>
           <p:nvSpPr>
-            <p:cNvPr id="44" name="pt43"/>
+            <p:cNvPr id="59" name="pt58"/>
             <p:cNvSpPr/>
             <p:nvPr/>
           </p:nvSpPr>
@@ -4028,7 +4673,7 @@
         </p:sp>
         <p:sp>
           <p:nvSpPr>
-            <p:cNvPr id="45" name="pt44"/>
+            <p:cNvPr id="60" name="pt59"/>
             <p:cNvSpPr/>
             <p:nvPr/>
           </p:nvSpPr>
@@ -4063,7 +4708,7 @@
         </p:sp>
         <p:sp>
           <p:nvSpPr>
-            <p:cNvPr id="46" name="pt45"/>
+            <p:cNvPr id="61" name="pt60"/>
             <p:cNvSpPr/>
             <p:nvPr/>
           </p:nvSpPr>
@@ -4098,7 +4743,7 @@
         </p:sp>
         <p:sp>
           <p:nvSpPr>
-            <p:cNvPr id="47" name="pt46"/>
+            <p:cNvPr id="62" name="pt61"/>
             <p:cNvSpPr/>
             <p:nvPr/>
           </p:nvSpPr>
@@ -4133,7 +4778,7 @@
         </p:sp>
         <p:sp>
           <p:nvSpPr>
-            <p:cNvPr id="48" name="pt47"/>
+            <p:cNvPr id="63" name="pt62"/>
             <p:cNvSpPr/>
             <p:nvPr/>
           </p:nvSpPr>
@@ -4168,7 +4813,7 @@
         </p:sp>
         <p:sp>
           <p:nvSpPr>
-            <p:cNvPr id="49" name="pt48"/>
+            <p:cNvPr id="64" name="pt63"/>
             <p:cNvSpPr/>
             <p:nvPr/>
           </p:nvSpPr>
@@ -4203,7 +4848,7 @@
         </p:sp>
         <p:sp>
           <p:nvSpPr>
-            <p:cNvPr id="50" name="pt49"/>
+            <p:cNvPr id="65" name="pt64"/>
             <p:cNvSpPr/>
             <p:nvPr/>
           </p:nvSpPr>
@@ -4238,7 +4883,7 @@
         </p:sp>
         <p:sp>
           <p:nvSpPr>
-            <p:cNvPr id="51" name="pt50"/>
+            <p:cNvPr id="66" name="pt65"/>
             <p:cNvSpPr/>
             <p:nvPr/>
           </p:nvSpPr>
@@ -4273,7 +4918,7 @@
         </p:sp>
         <p:sp>
           <p:nvSpPr>
-            <p:cNvPr id="52" name="pt51"/>
+            <p:cNvPr id="67" name="pt66"/>
             <p:cNvSpPr/>
             <p:nvPr/>
           </p:nvSpPr>
@@ -4308,7 +4953,7 @@
         </p:sp>
         <p:sp>
           <p:nvSpPr>
-            <p:cNvPr id="53" name="pt52"/>
+            <p:cNvPr id="68" name="pt67"/>
             <p:cNvSpPr/>
             <p:nvPr/>
           </p:nvSpPr>
@@ -4343,7 +4988,7 @@
         </p:sp>
         <p:sp>
           <p:nvSpPr>
-            <p:cNvPr id="54" name="pt53"/>
+            <p:cNvPr id="69" name="pt68"/>
             <p:cNvSpPr/>
             <p:nvPr/>
           </p:nvSpPr>
@@ -4378,7 +5023,7 @@
         </p:sp>
         <p:sp>
           <p:nvSpPr>
-            <p:cNvPr id="55" name="pt54"/>
+            <p:cNvPr id="70" name="pt69"/>
             <p:cNvSpPr/>
             <p:nvPr/>
           </p:nvSpPr>
@@ -4413,7 +5058,7 @@
         </p:sp>
         <p:sp>
           <p:nvSpPr>
-            <p:cNvPr id="56" name="pt55"/>
+            <p:cNvPr id="71" name="pt70"/>
             <p:cNvSpPr/>
             <p:nvPr/>
           </p:nvSpPr>
@@ -4448,7 +5093,7 @@
         </p:sp>
         <p:sp>
           <p:nvSpPr>
-            <p:cNvPr id="57" name="pt56"/>
+            <p:cNvPr id="72" name="pt71"/>
             <p:cNvSpPr/>
             <p:nvPr/>
           </p:nvSpPr>
@@ -4483,7 +5128,7 @@
         </p:sp>
         <p:sp>
           <p:nvSpPr>
-            <p:cNvPr id="58" name="pt57"/>
+            <p:cNvPr id="73" name="pt72"/>
             <p:cNvSpPr/>
             <p:nvPr/>
           </p:nvSpPr>
@@ -4518,7 +5163,7 @@
         </p:sp>
         <p:sp>
           <p:nvSpPr>
-            <p:cNvPr id="59" name="pt58"/>
+            <p:cNvPr id="74" name="pt73"/>
             <p:cNvSpPr/>
             <p:nvPr/>
           </p:nvSpPr>
@@ -4553,7 +5198,7 @@
         </p:sp>
         <p:sp>
           <p:nvSpPr>
-            <p:cNvPr id="60" name="pt59"/>
+            <p:cNvPr id="75" name="pt74"/>
             <p:cNvSpPr/>
             <p:nvPr/>
           </p:nvSpPr>
@@ -4588,7 +5233,7 @@
         </p:sp>
         <p:sp>
           <p:nvSpPr>
-            <p:cNvPr id="61" name="pt60"/>
+            <p:cNvPr id="76" name="pt75"/>
             <p:cNvSpPr/>
             <p:nvPr/>
           </p:nvSpPr>
@@ -4623,7 +5268,7 @@
         </p:sp>
         <p:sp>
           <p:nvSpPr>
-            <p:cNvPr id="62" name="pt61"/>
+            <p:cNvPr id="77" name="pt76"/>
             <p:cNvSpPr/>
             <p:nvPr/>
           </p:nvSpPr>
@@ -4658,7 +5303,7 @@
         </p:sp>
         <p:sp>
           <p:nvSpPr>
-            <p:cNvPr id="63" name="pt62"/>
+            <p:cNvPr id="78" name="pt77"/>
             <p:cNvSpPr/>
             <p:nvPr/>
           </p:nvSpPr>
@@ -4693,7 +5338,7 @@
         </p:sp>
         <p:sp>
           <p:nvSpPr>
-            <p:cNvPr id="64" name="pt63"/>
+            <p:cNvPr id="79" name="pt78"/>
             <p:cNvSpPr/>
             <p:nvPr/>
           </p:nvSpPr>
@@ -4728,7 +5373,7 @@
         </p:sp>
         <p:sp>
           <p:nvSpPr>
-            <p:cNvPr id="65" name="pt64"/>
+            <p:cNvPr id="80" name="pt79"/>
             <p:cNvSpPr/>
             <p:nvPr/>
           </p:nvSpPr>
@@ -4763,7 +5408,7 @@
         </p:sp>
         <p:sp>
           <p:nvSpPr>
-            <p:cNvPr id="66" name="pt65"/>
+            <p:cNvPr id="81" name="pt80"/>
             <p:cNvSpPr/>
             <p:nvPr/>
           </p:nvSpPr>
@@ -4798,7 +5443,7 @@
         </p:sp>
         <p:sp>
           <p:nvSpPr>
-            <p:cNvPr id="67" name="pt66"/>
+            <p:cNvPr id="82" name="pt81"/>
             <p:cNvSpPr/>
             <p:nvPr/>
           </p:nvSpPr>
@@ -4833,7 +5478,7 @@
         </p:sp>
         <p:sp>
           <p:nvSpPr>
-            <p:cNvPr id="68" name="pt67"/>
+            <p:cNvPr id="83" name="pt82"/>
             <p:cNvSpPr/>
             <p:nvPr/>
           </p:nvSpPr>
@@ -4868,7 +5513,7 @@
         </p:sp>
         <p:sp>
           <p:nvSpPr>
-            <p:cNvPr id="69" name="pt68"/>
+            <p:cNvPr id="84" name="pt83"/>
             <p:cNvSpPr/>
             <p:nvPr/>
           </p:nvSpPr>
@@ -4903,7 +5548,7 @@
         </p:sp>
         <p:sp>
           <p:nvSpPr>
-            <p:cNvPr id="70" name="pt69"/>
+            <p:cNvPr id="85" name="pt84"/>
             <p:cNvSpPr/>
             <p:nvPr/>
           </p:nvSpPr>
@@ -4938,7 +5583,7 @@
         </p:sp>
         <p:sp>
           <p:nvSpPr>
-            <p:cNvPr id="71" name="pt70"/>
+            <p:cNvPr id="86" name="pt85"/>
             <p:cNvSpPr/>
             <p:nvPr/>
           </p:nvSpPr>
@@ -4973,7 +5618,7 @@
         </p:sp>
         <p:sp>
           <p:nvSpPr>
-            <p:cNvPr id="72" name="pt71"/>
+            <p:cNvPr id="87" name="pt86"/>
             <p:cNvSpPr/>
             <p:nvPr/>
           </p:nvSpPr>
@@ -5008,7 +5653,7 @@
         </p:sp>
         <p:sp>
           <p:nvSpPr>
-            <p:cNvPr id="73" name="pt72"/>
+            <p:cNvPr id="88" name="pt87"/>
             <p:cNvSpPr/>
             <p:nvPr/>
           </p:nvSpPr>
@@ -5043,7 +5688,7 @@
         </p:sp>
         <p:sp>
           <p:nvSpPr>
-            <p:cNvPr id="74" name="pt73"/>
+            <p:cNvPr id="89" name="pt88"/>
             <p:cNvSpPr/>
             <p:nvPr/>
           </p:nvSpPr>
@@ -5078,7 +5723,7 @@
         </p:sp>
         <p:sp>
           <p:nvSpPr>
-            <p:cNvPr id="75" name="pt74"/>
+            <p:cNvPr id="90" name="pt89"/>
             <p:cNvSpPr/>
             <p:nvPr/>
           </p:nvSpPr>
@@ -5113,7 +5758,7 @@
         </p:sp>
         <p:sp>
           <p:nvSpPr>
-            <p:cNvPr id="76" name="pt75"/>
+            <p:cNvPr id="91" name="pt90"/>
             <p:cNvSpPr/>
             <p:nvPr/>
           </p:nvSpPr>
@@ -5148,7 +5793,7 @@
         </p:sp>
         <p:sp>
           <p:nvSpPr>
-            <p:cNvPr id="77" name="pt76"/>
+            <p:cNvPr id="92" name="pt91"/>
             <p:cNvSpPr/>
             <p:nvPr/>
           </p:nvSpPr>
@@ -5183,7 +5828,7 @@
         </p:sp>
         <p:sp>
           <p:nvSpPr>
-            <p:cNvPr id="78" name="pt77"/>
+            <p:cNvPr id="93" name="pt92"/>
             <p:cNvSpPr/>
             <p:nvPr/>
           </p:nvSpPr>
@@ -5218,7 +5863,7 @@
         </p:sp>
         <p:sp>
           <p:nvSpPr>
-            <p:cNvPr id="79" name="pt78"/>
+            <p:cNvPr id="94" name="pt93"/>
             <p:cNvSpPr/>
             <p:nvPr/>
           </p:nvSpPr>
@@ -5253,7 +5898,7 @@
         </p:sp>
         <p:sp>
           <p:nvSpPr>
-            <p:cNvPr id="80" name="pt79"/>
+            <p:cNvPr id="95" name="pt94"/>
             <p:cNvSpPr/>
             <p:nvPr/>
           </p:nvSpPr>
@@ -5288,7 +5933,7 @@
         </p:sp>
         <p:sp>
           <p:nvSpPr>
-            <p:cNvPr id="81" name="pt80"/>
+            <p:cNvPr id="96" name="pt95"/>
             <p:cNvSpPr/>
             <p:nvPr/>
           </p:nvSpPr>
@@ -5323,7 +5968,7 @@
         </p:sp>
         <p:sp>
           <p:nvSpPr>
-            <p:cNvPr id="82" name="pt81"/>
+            <p:cNvPr id="97" name="pt96"/>
             <p:cNvSpPr/>
             <p:nvPr/>
           </p:nvSpPr>
@@ -5358,7 +6003,7 @@
         </p:sp>
         <p:sp>
           <p:nvSpPr>
-            <p:cNvPr id="83" name="pt82"/>
+            <p:cNvPr id="98" name="pt97"/>
             <p:cNvSpPr/>
             <p:nvPr/>
           </p:nvSpPr>
@@ -5393,7 +6038,7 @@
         </p:sp>
         <p:sp>
           <p:nvSpPr>
-            <p:cNvPr id="84" name="pt83"/>
+            <p:cNvPr id="99" name="pt98"/>
             <p:cNvSpPr/>
             <p:nvPr/>
           </p:nvSpPr>
@@ -5428,7 +6073,7 @@
         </p:sp>
         <p:sp>
           <p:nvSpPr>
-            <p:cNvPr id="85" name="tx84"/>
+            <p:cNvPr id="100" name="tx99"/>
             <p:cNvSpPr/>
             <p:nvPr/>
           </p:nvSpPr>
@@ -5474,7 +6119,7 @@
         </p:sp>
         <p:sp>
           <p:nvSpPr>
-            <p:cNvPr id="86" name="tx85"/>
+            <p:cNvPr id="101" name="tx100"/>
             <p:cNvSpPr/>
             <p:nvPr/>
           </p:nvSpPr>
@@ -5520,7 +6165,7 @@
         </p:sp>
         <p:sp>
           <p:nvSpPr>
-            <p:cNvPr id="87" name="tx86"/>
+            <p:cNvPr id="102" name="tx101"/>
             <p:cNvSpPr/>
             <p:nvPr/>
           </p:nvSpPr>
@@ -5566,7 +6211,7 @@
         </p:sp>
         <p:sp>
           <p:nvSpPr>
-            <p:cNvPr id="88" name="tx87"/>
+            <p:cNvPr id="103" name="tx102"/>
             <p:cNvSpPr/>
             <p:nvPr/>
           </p:nvSpPr>
@@ -5612,7 +6257,7 @@
         </p:sp>
         <p:sp>
           <p:nvSpPr>
-            <p:cNvPr id="89" name="pl88"/>
+            <p:cNvPr id="104" name="pl103"/>
             <p:cNvSpPr/>
             <p:nvPr/>
           </p:nvSpPr>
@@ -5652,7 +6297,7 @@
         </p:sp>
         <p:sp>
           <p:nvSpPr>
-            <p:cNvPr id="90" name="pl89"/>
+            <p:cNvPr id="105" name="pl104"/>
             <p:cNvSpPr/>
             <p:nvPr/>
           </p:nvSpPr>
@@ -5692,7 +6337,7 @@
         </p:sp>
         <p:sp>
           <p:nvSpPr>
-            <p:cNvPr id="91" name="pl90"/>
+            <p:cNvPr id="106" name="pl105"/>
             <p:cNvSpPr/>
             <p:nvPr/>
           </p:nvSpPr>
@@ -5732,7 +6377,7 @@
         </p:sp>
         <p:sp>
           <p:nvSpPr>
-            <p:cNvPr id="92" name="pl91"/>
+            <p:cNvPr id="107" name="pl106"/>
             <p:cNvSpPr/>
             <p:nvPr/>
           </p:nvSpPr>
@@ -5772,7 +6417,7 @@
         </p:sp>
         <p:sp>
           <p:nvSpPr>
-            <p:cNvPr id="93" name="pl92"/>
+            <p:cNvPr id="108" name="pl107"/>
             <p:cNvSpPr/>
             <p:nvPr/>
           </p:nvSpPr>
@@ -5812,13 +6457,13 @@
         </p:sp>
         <p:sp>
           <p:nvSpPr>
-            <p:cNvPr id="94" name="pl93"/>
-            <p:cNvSpPr/>
-            <p:nvPr/>
-          </p:nvSpPr>
-          <p:spPr>
-            <a:xfrm>
-              <a:off x="2217896" y="4169365"/>
+            <p:cNvPr id="109" name="pl108"/>
+            <p:cNvSpPr/>
+            <p:nvPr/>
+          </p:nvSpPr>
+          <p:spPr>
+            <a:xfrm>
+              <a:off x="1935002" y="4169365"/>
               <a:ext cx="0" cy="34794"/>
             </a:xfrm>
             <a:custGeom>
@@ -5852,13 +6497,13 @@
         </p:sp>
         <p:sp>
           <p:nvSpPr>
-            <p:cNvPr id="95" name="pl94"/>
-            <p:cNvSpPr/>
-            <p:nvPr/>
-          </p:nvSpPr>
-          <p:spPr>
-            <a:xfrm>
-              <a:off x="2783684" y="4169365"/>
+            <p:cNvPr id="110" name="pl109"/>
+            <p:cNvSpPr/>
+            <p:nvPr/>
+          </p:nvSpPr>
+          <p:spPr>
+            <a:xfrm>
+              <a:off x="2217896" y="4169365"/>
               <a:ext cx="0" cy="34794"/>
             </a:xfrm>
             <a:custGeom>
@@ -5892,13 +6537,13 @@
         </p:sp>
         <p:sp>
           <p:nvSpPr>
-            <p:cNvPr id="96" name="pl95"/>
-            <p:cNvSpPr/>
-            <p:nvPr/>
-          </p:nvSpPr>
-          <p:spPr>
-            <a:xfrm>
-              <a:off x="3349472" y="4169365"/>
+            <p:cNvPr id="111" name="pl110"/>
+            <p:cNvSpPr/>
+            <p:nvPr/>
+          </p:nvSpPr>
+          <p:spPr>
+            <a:xfrm>
+              <a:off x="2500790" y="4169365"/>
               <a:ext cx="0" cy="34794"/>
             </a:xfrm>
             <a:custGeom>
@@ -5932,13 +6577,13 @@
         </p:sp>
         <p:sp>
           <p:nvSpPr>
-            <p:cNvPr id="97" name="pl96"/>
-            <p:cNvSpPr/>
-            <p:nvPr/>
-          </p:nvSpPr>
-          <p:spPr>
-            <a:xfrm>
-              <a:off x="3915260" y="4169365"/>
+            <p:cNvPr id="112" name="pl111"/>
+            <p:cNvSpPr/>
+            <p:nvPr/>
+          </p:nvSpPr>
+          <p:spPr>
+            <a:xfrm>
+              <a:off x="2783684" y="4169365"/>
               <a:ext cx="0" cy="34794"/>
             </a:xfrm>
             <a:custGeom>
@@ -5972,13 +6617,13 @@
         </p:sp>
         <p:sp>
           <p:nvSpPr>
-            <p:cNvPr id="98" name="pl97"/>
-            <p:cNvSpPr/>
-            <p:nvPr/>
-          </p:nvSpPr>
-          <p:spPr>
-            <a:xfrm>
-              <a:off x="4481048" y="4169365"/>
+            <p:cNvPr id="113" name="pl112"/>
+            <p:cNvSpPr/>
+            <p:nvPr/>
+          </p:nvSpPr>
+          <p:spPr>
+            <a:xfrm>
+              <a:off x="3066578" y="4169365"/>
               <a:ext cx="0" cy="34794"/>
             </a:xfrm>
             <a:custGeom>
@@ -6012,13 +6657,13 @@
         </p:sp>
         <p:sp>
           <p:nvSpPr>
-            <p:cNvPr id="99" name="pl98"/>
-            <p:cNvSpPr/>
-            <p:nvPr/>
-          </p:nvSpPr>
-          <p:spPr>
-            <a:xfrm>
-              <a:off x="5046836" y="4169365"/>
+            <p:cNvPr id="114" name="pl113"/>
+            <p:cNvSpPr/>
+            <p:nvPr/>
+          </p:nvSpPr>
+          <p:spPr>
+            <a:xfrm>
+              <a:off x="3349472" y="4169365"/>
               <a:ext cx="0" cy="34794"/>
             </a:xfrm>
             <a:custGeom>
@@ -6052,13 +6697,13 @@
         </p:sp>
         <p:sp>
           <p:nvSpPr>
-            <p:cNvPr id="100" name="pl99"/>
-            <p:cNvSpPr/>
-            <p:nvPr/>
-          </p:nvSpPr>
-          <p:spPr>
-            <a:xfrm>
-              <a:off x="5612624" y="4169365"/>
+            <p:cNvPr id="115" name="pl114"/>
+            <p:cNvSpPr/>
+            <p:nvPr/>
+          </p:nvSpPr>
+          <p:spPr>
+            <a:xfrm>
+              <a:off x="3632366" y="4169365"/>
               <a:ext cx="0" cy="34794"/>
             </a:xfrm>
             <a:custGeom>
@@ -6092,7 +6737,287 @@
         </p:sp>
         <p:sp>
           <p:nvSpPr>
-            <p:cNvPr id="101" name="tx100"/>
+            <p:cNvPr id="116" name="pl115"/>
+            <p:cNvSpPr/>
+            <p:nvPr/>
+          </p:nvSpPr>
+          <p:spPr>
+            <a:xfrm>
+              <a:off x="3915260" y="4169365"/>
+              <a:ext cx="0" cy="34794"/>
+            </a:xfrm>
+            <a:custGeom>
+              <a:avLst/>
+              <a:pathLst>
+                <a:path w="0" h="34794">
+                  <a:moveTo>
+                    <a:pt x="0" y="34794"/>
+                  </a:moveTo>
+                  <a:lnTo>
+                    <a:pt x="0" y="0"/>
+                  </a:lnTo>
+                </a:path>
+              </a:pathLst>
+            </a:custGeom>
+            <a:ln w="13550" cap="flat">
+              <a:solidFill>
+                <a:srgbClr val="333333">
+                  <a:alpha val="100000"/>
+                </a:srgbClr>
+              </a:solidFill>
+              <a:prstDash val="solid"/>
+              <a:round/>
+            </a:ln>
+          </p:spPr>
+          <p:txBody>
+            <a:bodyPr/>
+            <a:lstStyle/>
+            <a:p/>
+          </p:txBody>
+        </p:sp>
+        <p:sp>
+          <p:nvSpPr>
+            <p:cNvPr id="117" name="pl116"/>
+            <p:cNvSpPr/>
+            <p:nvPr/>
+          </p:nvSpPr>
+          <p:spPr>
+            <a:xfrm>
+              <a:off x="4198154" y="4169365"/>
+              <a:ext cx="0" cy="34794"/>
+            </a:xfrm>
+            <a:custGeom>
+              <a:avLst/>
+              <a:pathLst>
+                <a:path w="0" h="34794">
+                  <a:moveTo>
+                    <a:pt x="0" y="34794"/>
+                  </a:moveTo>
+                  <a:lnTo>
+                    <a:pt x="0" y="0"/>
+                  </a:lnTo>
+                </a:path>
+              </a:pathLst>
+            </a:custGeom>
+            <a:ln w="13550" cap="flat">
+              <a:solidFill>
+                <a:srgbClr val="333333">
+                  <a:alpha val="100000"/>
+                </a:srgbClr>
+              </a:solidFill>
+              <a:prstDash val="solid"/>
+              <a:round/>
+            </a:ln>
+          </p:spPr>
+          <p:txBody>
+            <a:bodyPr/>
+            <a:lstStyle/>
+            <a:p/>
+          </p:txBody>
+        </p:sp>
+        <p:sp>
+          <p:nvSpPr>
+            <p:cNvPr id="118" name="pl117"/>
+            <p:cNvSpPr/>
+            <p:nvPr/>
+          </p:nvSpPr>
+          <p:spPr>
+            <a:xfrm>
+              <a:off x="4481048" y="4169365"/>
+              <a:ext cx="0" cy="34794"/>
+            </a:xfrm>
+            <a:custGeom>
+              <a:avLst/>
+              <a:pathLst>
+                <a:path w="0" h="34794">
+                  <a:moveTo>
+                    <a:pt x="0" y="34794"/>
+                  </a:moveTo>
+                  <a:lnTo>
+                    <a:pt x="0" y="0"/>
+                  </a:lnTo>
+                </a:path>
+              </a:pathLst>
+            </a:custGeom>
+            <a:ln w="13550" cap="flat">
+              <a:solidFill>
+                <a:srgbClr val="333333">
+                  <a:alpha val="100000"/>
+                </a:srgbClr>
+              </a:solidFill>
+              <a:prstDash val="solid"/>
+              <a:round/>
+            </a:ln>
+          </p:spPr>
+          <p:txBody>
+            <a:bodyPr/>
+            <a:lstStyle/>
+            <a:p/>
+          </p:txBody>
+        </p:sp>
+        <p:sp>
+          <p:nvSpPr>
+            <p:cNvPr id="119" name="pl118"/>
+            <p:cNvSpPr/>
+            <p:nvPr/>
+          </p:nvSpPr>
+          <p:spPr>
+            <a:xfrm>
+              <a:off x="4763942" y="4169365"/>
+              <a:ext cx="0" cy="34794"/>
+            </a:xfrm>
+            <a:custGeom>
+              <a:avLst/>
+              <a:pathLst>
+                <a:path w="0" h="34794">
+                  <a:moveTo>
+                    <a:pt x="0" y="34794"/>
+                  </a:moveTo>
+                  <a:lnTo>
+                    <a:pt x="0" y="0"/>
+                  </a:lnTo>
+                </a:path>
+              </a:pathLst>
+            </a:custGeom>
+            <a:ln w="13550" cap="flat">
+              <a:solidFill>
+                <a:srgbClr val="333333">
+                  <a:alpha val="100000"/>
+                </a:srgbClr>
+              </a:solidFill>
+              <a:prstDash val="solid"/>
+              <a:round/>
+            </a:ln>
+          </p:spPr>
+          <p:txBody>
+            <a:bodyPr/>
+            <a:lstStyle/>
+            <a:p/>
+          </p:txBody>
+        </p:sp>
+        <p:sp>
+          <p:nvSpPr>
+            <p:cNvPr id="120" name="pl119"/>
+            <p:cNvSpPr/>
+            <p:nvPr/>
+          </p:nvSpPr>
+          <p:spPr>
+            <a:xfrm>
+              <a:off x="5046836" y="4169365"/>
+              <a:ext cx="0" cy="34794"/>
+            </a:xfrm>
+            <a:custGeom>
+              <a:avLst/>
+              <a:pathLst>
+                <a:path w="0" h="34794">
+                  <a:moveTo>
+                    <a:pt x="0" y="34794"/>
+                  </a:moveTo>
+                  <a:lnTo>
+                    <a:pt x="0" y="0"/>
+                  </a:lnTo>
+                </a:path>
+              </a:pathLst>
+            </a:custGeom>
+            <a:ln w="13550" cap="flat">
+              <a:solidFill>
+                <a:srgbClr val="333333">
+                  <a:alpha val="100000"/>
+                </a:srgbClr>
+              </a:solidFill>
+              <a:prstDash val="solid"/>
+              <a:round/>
+            </a:ln>
+          </p:spPr>
+          <p:txBody>
+            <a:bodyPr/>
+            <a:lstStyle/>
+            <a:p/>
+          </p:txBody>
+        </p:sp>
+        <p:sp>
+          <p:nvSpPr>
+            <p:cNvPr id="121" name="pl120"/>
+            <p:cNvSpPr/>
+            <p:nvPr/>
+          </p:nvSpPr>
+          <p:spPr>
+            <a:xfrm>
+              <a:off x="5329730" y="4169365"/>
+              <a:ext cx="0" cy="34794"/>
+            </a:xfrm>
+            <a:custGeom>
+              <a:avLst/>
+              <a:pathLst>
+                <a:path w="0" h="34794">
+                  <a:moveTo>
+                    <a:pt x="0" y="34794"/>
+                  </a:moveTo>
+                  <a:lnTo>
+                    <a:pt x="0" y="0"/>
+                  </a:lnTo>
+                </a:path>
+              </a:pathLst>
+            </a:custGeom>
+            <a:ln w="13550" cap="flat">
+              <a:solidFill>
+                <a:srgbClr val="333333">
+                  <a:alpha val="100000"/>
+                </a:srgbClr>
+              </a:solidFill>
+              <a:prstDash val="solid"/>
+              <a:round/>
+            </a:ln>
+          </p:spPr>
+          <p:txBody>
+            <a:bodyPr/>
+            <a:lstStyle/>
+            <a:p/>
+          </p:txBody>
+        </p:sp>
+        <p:sp>
+          <p:nvSpPr>
+            <p:cNvPr id="122" name="pl121"/>
+            <p:cNvSpPr/>
+            <p:nvPr/>
+          </p:nvSpPr>
+          <p:spPr>
+            <a:xfrm>
+              <a:off x="5612624" y="4169365"/>
+              <a:ext cx="0" cy="34794"/>
+            </a:xfrm>
+            <a:custGeom>
+              <a:avLst/>
+              <a:pathLst>
+                <a:path w="0" h="34794">
+                  <a:moveTo>
+                    <a:pt x="0" y="34794"/>
+                  </a:moveTo>
+                  <a:lnTo>
+                    <a:pt x="0" y="0"/>
+                  </a:lnTo>
+                </a:path>
+              </a:pathLst>
+            </a:custGeom>
+            <a:ln w="13550" cap="flat">
+              <a:solidFill>
+                <a:srgbClr val="333333">
+                  <a:alpha val="100000"/>
+                </a:srgbClr>
+              </a:solidFill>
+              <a:prstDash val="solid"/>
+              <a:round/>
+            </a:ln>
+          </p:spPr>
+          <p:txBody>
+            <a:bodyPr/>
+            <a:lstStyle/>
+            <a:p/>
+          </p:txBody>
+        </p:sp>
+        <p:sp>
+          <p:nvSpPr>
+            <p:cNvPr id="123" name="tx122"/>
             <p:cNvSpPr/>
             <p:nvPr/>
           </p:nvSpPr>
@@ -6138,7 +7063,53 @@
         </p:sp>
         <p:sp>
           <p:nvSpPr>
-            <p:cNvPr id="102" name="tx101"/>
+            <p:cNvPr id="124" name="tx123"/>
+            <p:cNvSpPr/>
+            <p:nvPr/>
+          </p:nvSpPr>
+          <p:spPr>
+            <a:xfrm>
+              <a:off x="1899449" y="4231995"/>
+              <a:ext cx="71105" cy="81473"/>
+            </a:xfrm>
+            <a:prstGeom prst="rect">
+              <a:avLst/>
+            </a:prstGeom>
+            <a:noFill/>
+          </p:spPr>
+          <p:txBody>
+            <a:bodyPr lIns="0" rIns="0" tIns="0" bIns="0" anchorCtr="1" anchor="ctr" wrap="none"/>
+            <a:lstStyle/>
+            <a:p>
+              <a:pPr algn="l" marL="0" marR="0" indent="0">
+                <a:lnSpc>
+                  <a:spcPts val="880"/>
+                </a:lnSpc>
+                <a:spcBef>
+                  <a:spcPts val="0"/>
+                </a:spcBef>
+                <a:spcAft>
+                  <a:spcPts val="0"/>
+                </a:spcAft>
+              </a:pPr>
+              <a:r>
+                <a:rPr sz="880">
+                  <a:solidFill>
+                    <a:srgbClr val="4D4D4D">
+                      <a:alpha val="100000"/>
+                    </a:srgbClr>
+                  </a:solidFill>
+                  <a:latin typeface="DejaVu Sans"/>
+                  <a:cs typeface="DejaVu Sans"/>
+                </a:rPr>
+                <a:t>4</a:t>
+              </a:r>
+            </a:p>
+          </p:txBody>
+        </p:sp>
+        <p:sp>
+          <p:nvSpPr>
+            <p:cNvPr id="125" name="tx124"/>
             <p:cNvSpPr/>
             <p:nvPr/>
           </p:nvSpPr>
@@ -6184,7 +7155,53 @@
         </p:sp>
         <p:sp>
           <p:nvSpPr>
-            <p:cNvPr id="103" name="tx102"/>
+            <p:cNvPr id="126" name="tx125"/>
+            <p:cNvSpPr/>
+            <p:nvPr/>
+          </p:nvSpPr>
+          <p:spPr>
+            <a:xfrm>
+              <a:off x="2429685" y="4230522"/>
+              <a:ext cx="142210" cy="82946"/>
+            </a:xfrm>
+            <a:prstGeom prst="rect">
+              <a:avLst/>
+            </a:prstGeom>
+            <a:noFill/>
+          </p:spPr>
+          <p:txBody>
+            <a:bodyPr lIns="0" rIns="0" tIns="0" bIns="0" anchorCtr="1" anchor="ctr" wrap="none"/>
+            <a:lstStyle/>
+            <a:p>
+              <a:pPr algn="l" marL="0" marR="0" indent="0">
+                <a:lnSpc>
+                  <a:spcPts val="880"/>
+                </a:lnSpc>
+                <a:spcBef>
+                  <a:spcPts val="0"/>
+                </a:spcBef>
+                <a:spcAft>
+                  <a:spcPts val="0"/>
+                </a:spcAft>
+              </a:pPr>
+              <a:r>
+                <a:rPr sz="880">
+                  <a:solidFill>
+                    <a:srgbClr val="4D4D4D">
+                      <a:alpha val="100000"/>
+                    </a:srgbClr>
+                  </a:solidFill>
+                  <a:latin typeface="DejaVu Sans"/>
+                  <a:cs typeface="DejaVu Sans"/>
+                </a:rPr>
+                <a:t>12</a:t>
+              </a:r>
+            </a:p>
+          </p:txBody>
+        </p:sp>
+        <p:sp>
+          <p:nvSpPr>
+            <p:cNvPr id="127" name="tx126"/>
             <p:cNvSpPr/>
             <p:nvPr/>
           </p:nvSpPr>
@@ -6230,7 +7247,53 @@
         </p:sp>
         <p:sp>
           <p:nvSpPr>
-            <p:cNvPr id="104" name="tx103"/>
+            <p:cNvPr id="128" name="tx127"/>
+            <p:cNvSpPr/>
+            <p:nvPr/>
+          </p:nvSpPr>
+          <p:spPr>
+            <a:xfrm>
+              <a:off x="2995473" y="4228939"/>
+              <a:ext cx="142210" cy="84529"/>
+            </a:xfrm>
+            <a:prstGeom prst="rect">
+              <a:avLst/>
+            </a:prstGeom>
+            <a:noFill/>
+          </p:spPr>
+          <p:txBody>
+            <a:bodyPr lIns="0" rIns="0" tIns="0" bIns="0" anchorCtr="1" anchor="ctr" wrap="none"/>
+            <a:lstStyle/>
+            <a:p>
+              <a:pPr algn="l" marL="0" marR="0" indent="0">
+                <a:lnSpc>
+                  <a:spcPts val="880"/>
+                </a:lnSpc>
+                <a:spcBef>
+                  <a:spcPts val="0"/>
+                </a:spcBef>
+                <a:spcAft>
+                  <a:spcPts val="0"/>
+                </a:spcAft>
+              </a:pPr>
+              <a:r>
+                <a:rPr sz="880">
+                  <a:solidFill>
+                    <a:srgbClr val="4D4D4D">
+                      <a:alpha val="100000"/>
+                    </a:srgbClr>
+                  </a:solidFill>
+                  <a:latin typeface="DejaVu Sans"/>
+                  <a:cs typeface="DejaVu Sans"/>
+                </a:rPr>
+                <a:t>20</a:t>
+              </a:r>
+            </a:p>
+          </p:txBody>
+        </p:sp>
+        <p:sp>
+          <p:nvSpPr>
+            <p:cNvPr id="129" name="tx128"/>
             <p:cNvSpPr/>
             <p:nvPr/>
           </p:nvSpPr>
@@ -6276,7 +7339,53 @@
         </p:sp>
         <p:sp>
           <p:nvSpPr>
-            <p:cNvPr id="105" name="tx104"/>
+            <p:cNvPr id="130" name="tx129"/>
+            <p:cNvSpPr/>
+            <p:nvPr/>
+          </p:nvSpPr>
+          <p:spPr>
+            <a:xfrm>
+              <a:off x="3561261" y="4228939"/>
+              <a:ext cx="142210" cy="84529"/>
+            </a:xfrm>
+            <a:prstGeom prst="rect">
+              <a:avLst/>
+            </a:prstGeom>
+            <a:noFill/>
+          </p:spPr>
+          <p:txBody>
+            <a:bodyPr lIns="0" rIns="0" tIns="0" bIns="0" anchorCtr="1" anchor="ctr" wrap="none"/>
+            <a:lstStyle/>
+            <a:p>
+              <a:pPr algn="l" marL="0" marR="0" indent="0">
+                <a:lnSpc>
+                  <a:spcPts val="880"/>
+                </a:lnSpc>
+                <a:spcBef>
+                  <a:spcPts val="0"/>
+                </a:spcBef>
+                <a:spcAft>
+                  <a:spcPts val="0"/>
+                </a:spcAft>
+              </a:pPr>
+              <a:r>
+                <a:rPr sz="880">
+                  <a:solidFill>
+                    <a:srgbClr val="4D4D4D">
+                      <a:alpha val="100000"/>
+                    </a:srgbClr>
+                  </a:solidFill>
+                  <a:latin typeface="DejaVu Sans"/>
+                  <a:cs typeface="DejaVu Sans"/>
+                </a:rPr>
+                <a:t>28</a:t>
+              </a:r>
+            </a:p>
+          </p:txBody>
+        </p:sp>
+        <p:sp>
+          <p:nvSpPr>
+            <p:cNvPr id="131" name="tx130"/>
             <p:cNvSpPr/>
             <p:nvPr/>
           </p:nvSpPr>
@@ -6322,7 +7431,53 @@
         </p:sp>
         <p:sp>
           <p:nvSpPr>
-            <p:cNvPr id="106" name="tx105"/>
+            <p:cNvPr id="132" name="tx131"/>
+            <p:cNvSpPr/>
+            <p:nvPr/>
+          </p:nvSpPr>
+          <p:spPr>
+            <a:xfrm>
+              <a:off x="4127049" y="4228939"/>
+              <a:ext cx="142210" cy="84529"/>
+            </a:xfrm>
+            <a:prstGeom prst="rect">
+              <a:avLst/>
+            </a:prstGeom>
+            <a:noFill/>
+          </p:spPr>
+          <p:txBody>
+            <a:bodyPr lIns="0" rIns="0" tIns="0" bIns="0" anchorCtr="1" anchor="ctr" wrap="none"/>
+            <a:lstStyle/>
+            <a:p>
+              <a:pPr algn="l" marL="0" marR="0" indent="0">
+                <a:lnSpc>
+                  <a:spcPts val="880"/>
+                </a:lnSpc>
+                <a:spcBef>
+                  <a:spcPts val="0"/>
+                </a:spcBef>
+                <a:spcAft>
+                  <a:spcPts val="0"/>
+                </a:spcAft>
+              </a:pPr>
+              <a:r>
+                <a:rPr sz="880">
+                  <a:solidFill>
+                    <a:srgbClr val="4D4D4D">
+                      <a:alpha val="100000"/>
+                    </a:srgbClr>
+                  </a:solidFill>
+                  <a:latin typeface="DejaVu Sans"/>
+                  <a:cs typeface="DejaVu Sans"/>
+                </a:rPr>
+                <a:t>36</a:t>
+              </a:r>
+            </a:p>
+          </p:txBody>
+        </p:sp>
+        <p:sp>
+          <p:nvSpPr>
+            <p:cNvPr id="133" name="tx132"/>
             <p:cNvSpPr/>
             <p:nvPr/>
           </p:nvSpPr>
@@ -6368,7 +7523,53 @@
         </p:sp>
         <p:sp>
           <p:nvSpPr>
-            <p:cNvPr id="107" name="tx106"/>
+            <p:cNvPr id="134" name="tx133"/>
+            <p:cNvSpPr/>
+            <p:nvPr/>
+          </p:nvSpPr>
+          <p:spPr>
+            <a:xfrm>
+              <a:off x="4692837" y="4231995"/>
+              <a:ext cx="142210" cy="81473"/>
+            </a:xfrm>
+            <a:prstGeom prst="rect">
+              <a:avLst/>
+            </a:prstGeom>
+            <a:noFill/>
+          </p:spPr>
+          <p:txBody>
+            <a:bodyPr lIns="0" rIns="0" tIns="0" bIns="0" anchorCtr="1" anchor="ctr" wrap="none"/>
+            <a:lstStyle/>
+            <a:p>
+              <a:pPr algn="l" marL="0" marR="0" indent="0">
+                <a:lnSpc>
+                  <a:spcPts val="880"/>
+                </a:lnSpc>
+                <a:spcBef>
+                  <a:spcPts val="0"/>
+                </a:spcBef>
+                <a:spcAft>
+                  <a:spcPts val="0"/>
+                </a:spcAft>
+              </a:pPr>
+              <a:r>
+                <a:rPr sz="880">
+                  <a:solidFill>
+                    <a:srgbClr val="4D4D4D">
+                      <a:alpha val="100000"/>
+                    </a:srgbClr>
+                  </a:solidFill>
+                  <a:latin typeface="DejaVu Sans"/>
+                  <a:cs typeface="DejaVu Sans"/>
+                </a:rPr>
+                <a:t>44</a:t>
+              </a:r>
+            </a:p>
+          </p:txBody>
+        </p:sp>
+        <p:sp>
+          <p:nvSpPr>
+            <p:cNvPr id="135" name="tx134"/>
             <p:cNvSpPr/>
             <p:nvPr/>
           </p:nvSpPr>
@@ -6414,7 +7615,53 @@
         </p:sp>
         <p:sp>
           <p:nvSpPr>
-            <p:cNvPr id="108" name="tx107"/>
+            <p:cNvPr id="136" name="tx135"/>
+            <p:cNvSpPr/>
+            <p:nvPr/>
+          </p:nvSpPr>
+          <p:spPr>
+            <a:xfrm>
+              <a:off x="5258625" y="4228939"/>
+              <a:ext cx="142210" cy="84529"/>
+            </a:xfrm>
+            <a:prstGeom prst="rect">
+              <a:avLst/>
+            </a:prstGeom>
+            <a:noFill/>
+          </p:spPr>
+          <p:txBody>
+            <a:bodyPr lIns="0" rIns="0" tIns="0" bIns="0" anchorCtr="1" anchor="ctr" wrap="none"/>
+            <a:lstStyle/>
+            <a:p>
+              <a:pPr algn="l" marL="0" marR="0" indent="0">
+                <a:lnSpc>
+                  <a:spcPts val="880"/>
+                </a:lnSpc>
+                <a:spcBef>
+                  <a:spcPts val="0"/>
+                </a:spcBef>
+                <a:spcAft>
+                  <a:spcPts val="0"/>
+                </a:spcAft>
+              </a:pPr>
+              <a:r>
+                <a:rPr sz="880">
+                  <a:solidFill>
+                    <a:srgbClr val="4D4D4D">
+                      <a:alpha val="100000"/>
+                    </a:srgbClr>
+                  </a:solidFill>
+                  <a:latin typeface="DejaVu Sans"/>
+                  <a:cs typeface="DejaVu Sans"/>
+                </a:rPr>
+                <a:t>52</a:t>
+              </a:r>
+            </a:p>
+          </p:txBody>
+        </p:sp>
+        <p:sp>
+          <p:nvSpPr>
+            <p:cNvPr id="137" name="tx136"/>
             <p:cNvSpPr/>
             <p:nvPr/>
           </p:nvSpPr>
@@ -6460,7 +7707,7 @@
         </p:sp>
         <p:sp>
           <p:nvSpPr>
-            <p:cNvPr id="109" name="tx108"/>
+            <p:cNvPr id="138" name="tx137"/>
             <p:cNvSpPr/>
             <p:nvPr/>
           </p:nvSpPr>
@@ -6506,7 +7753,7 @@
         </p:sp>
         <p:sp>
           <p:nvSpPr>
-            <p:cNvPr id="110" name="tx109"/>
+            <p:cNvPr id="139" name="tx138"/>
             <p:cNvSpPr/>
             <p:nvPr/>
           </p:nvSpPr>
@@ -6552,7 +7799,7 @@
         </p:sp>
         <p:sp>
           <p:nvSpPr>
-            <p:cNvPr id="111" name="rc110"/>
+            <p:cNvPr id="140" name="rc139"/>
             <p:cNvSpPr/>
             <p:nvPr/>
           </p:nvSpPr>
@@ -6578,7 +7825,7 @@
         </p:sp>
         <p:sp>
           <p:nvSpPr>
-            <p:cNvPr id="112" name="tx111"/>
+            <p:cNvPr id="141" name="tx140"/>
             <p:cNvSpPr/>
             <p:nvPr/>
           </p:nvSpPr>
@@ -6624,7 +7871,7 @@
         </p:sp>
         <p:sp>
           <p:nvSpPr>
-            <p:cNvPr id="113" name="rc112"/>
+            <p:cNvPr id="142" name="rc141"/>
             <p:cNvSpPr/>
             <p:nvPr/>
           </p:nvSpPr>
@@ -6650,7 +7897,7 @@
         </p:sp>
         <p:sp>
           <p:nvSpPr>
-            <p:cNvPr id="114" name="pl113"/>
+            <p:cNvPr id="143" name="pl142"/>
             <p:cNvSpPr/>
             <p:nvPr/>
           </p:nvSpPr>
@@ -6690,7 +7937,7 @@
         </p:sp>
         <p:sp>
           <p:nvSpPr>
-            <p:cNvPr id="115" name="pt114"/>
+            <p:cNvPr id="144" name="pt143"/>
             <p:cNvSpPr/>
             <p:nvPr/>
           </p:nvSpPr>
@@ -6725,7 +7972,7 @@
         </p:sp>
         <p:sp>
           <p:nvSpPr>
-            <p:cNvPr id="116" name="tx115"/>
+            <p:cNvPr id="145" name="tx144"/>
             <p:cNvSpPr/>
             <p:nvPr/>
           </p:nvSpPr>

</xml_diff>

<commit_message>
Deploying to gh-pages from @ sean4andrew/safuncs@03a6c3ad89b99b3a60e29dd52a50a1bfa0948738 🚀
</commit_message>
<xml_diff>
--- a/reference/ONDA_XX-Hazard-Curve.pptx
+++ b/reference/ONDA_XX-Hazard-Curve.pptx
@@ -2531,7 +2531,7 @@
           </p:nvSpPr>
           <p:spPr>
             <a:xfrm>
-              <a:off x="1510661" y="983989"/>
+              <a:off x="1475299" y="983989"/>
               <a:ext cx="0" cy="3185376"/>
             </a:xfrm>
             <a:custGeom>
@@ -2574,7 +2574,7 @@
           </p:nvSpPr>
           <p:spPr>
             <a:xfrm>
-              <a:off x="1793555" y="983989"/>
+              <a:off x="1828917" y="983989"/>
               <a:ext cx="0" cy="3185376"/>
             </a:xfrm>
             <a:custGeom>
@@ -2617,7 +2617,7 @@
           </p:nvSpPr>
           <p:spPr>
             <a:xfrm>
-              <a:off x="2076449" y="983989"/>
+              <a:off x="2182534" y="983989"/>
               <a:ext cx="0" cy="3185376"/>
             </a:xfrm>
             <a:custGeom>
@@ -2660,7 +2660,7 @@
           </p:nvSpPr>
           <p:spPr>
             <a:xfrm>
-              <a:off x="2359343" y="983989"/>
+              <a:off x="2536152" y="983989"/>
               <a:ext cx="0" cy="3185376"/>
             </a:xfrm>
             <a:custGeom>
@@ -2703,7 +2703,7 @@
           </p:nvSpPr>
           <p:spPr>
             <a:xfrm>
-              <a:off x="2642237" y="983989"/>
+              <a:off x="2889769" y="983989"/>
               <a:ext cx="0" cy="3185376"/>
             </a:xfrm>
             <a:custGeom>
@@ -2746,7 +2746,7 @@
           </p:nvSpPr>
           <p:spPr>
             <a:xfrm>
-              <a:off x="2925131" y="983989"/>
+              <a:off x="3243387" y="983989"/>
               <a:ext cx="0" cy="3185376"/>
             </a:xfrm>
             <a:custGeom>
@@ -2789,7 +2789,7 @@
           </p:nvSpPr>
           <p:spPr>
             <a:xfrm>
-              <a:off x="3208025" y="983989"/>
+              <a:off x="3597004" y="983989"/>
               <a:ext cx="0" cy="3185376"/>
             </a:xfrm>
             <a:custGeom>
@@ -2832,7 +2832,7 @@
           </p:nvSpPr>
           <p:spPr>
             <a:xfrm>
-              <a:off x="3490919" y="983989"/>
+              <a:off x="3950622" y="983989"/>
               <a:ext cx="0" cy="3185376"/>
             </a:xfrm>
             <a:custGeom>
@@ -2875,7 +2875,7 @@
           </p:nvSpPr>
           <p:spPr>
             <a:xfrm>
-              <a:off x="3773813" y="983989"/>
+              <a:off x="4304239" y="983989"/>
               <a:ext cx="0" cy="3185376"/>
             </a:xfrm>
             <a:custGeom>
@@ -2918,7 +2918,7 @@
           </p:nvSpPr>
           <p:spPr>
             <a:xfrm>
-              <a:off x="4056707" y="983989"/>
+              <a:off x="4657857" y="983989"/>
               <a:ext cx="0" cy="3185376"/>
             </a:xfrm>
             <a:custGeom>
@@ -2961,7 +2961,7 @@
           </p:nvSpPr>
           <p:spPr>
             <a:xfrm>
-              <a:off x="4339601" y="983989"/>
+              <a:off x="5011475" y="983989"/>
               <a:ext cx="0" cy="3185376"/>
             </a:xfrm>
             <a:custGeom>
@@ -3004,7 +3004,7 @@
           </p:nvSpPr>
           <p:spPr>
             <a:xfrm>
-              <a:off x="4622495" y="983989"/>
+              <a:off x="5365092" y="983989"/>
               <a:ext cx="0" cy="3185376"/>
             </a:xfrm>
             <a:custGeom>
@@ -3047,7 +3047,179 @@
           </p:nvSpPr>
           <p:spPr>
             <a:xfrm>
-              <a:off x="4905389" y="983989"/>
+              <a:off x="1461154" y="4024575"/>
+              <a:ext cx="4200976" cy="0"/>
+            </a:xfrm>
+            <a:custGeom>
+              <a:avLst/>
+              <a:pathLst>
+                <a:path w="4200976" h="0">
+                  <a:moveTo>
+                    <a:pt x="0" y="0"/>
+                  </a:moveTo>
+                  <a:lnTo>
+                    <a:pt x="4200976" y="0"/>
+                  </a:lnTo>
+                  <a:lnTo>
+                    <a:pt x="4200976" y="0"/>
+                  </a:lnTo>
+                </a:path>
+              </a:pathLst>
+            </a:custGeom>
+            <a:ln w="13550" cap="flat">
+              <a:solidFill>
+                <a:srgbClr val="FFFFFF">
+                  <a:alpha val="100000"/>
+                </a:srgbClr>
+              </a:solidFill>
+              <a:prstDash val="solid"/>
+              <a:round/>
+            </a:ln>
+          </p:spPr>
+          <p:txBody>
+            <a:bodyPr/>
+            <a:lstStyle/>
+            <a:p/>
+          </p:txBody>
+        </p:sp>
+        <p:sp>
+          <p:nvSpPr>
+            <p:cNvPr id="24" name="pl23"/>
+            <p:cNvSpPr/>
+            <p:nvPr/>
+          </p:nvSpPr>
+          <p:spPr>
+            <a:xfrm>
+              <a:off x="1461154" y="3178134"/>
+              <a:ext cx="4200976" cy="0"/>
+            </a:xfrm>
+            <a:custGeom>
+              <a:avLst/>
+              <a:pathLst>
+                <a:path w="4200976" h="0">
+                  <a:moveTo>
+                    <a:pt x="0" y="0"/>
+                  </a:moveTo>
+                  <a:lnTo>
+                    <a:pt x="4200976" y="0"/>
+                  </a:lnTo>
+                  <a:lnTo>
+                    <a:pt x="4200976" y="0"/>
+                  </a:lnTo>
+                </a:path>
+              </a:pathLst>
+            </a:custGeom>
+            <a:ln w="13550" cap="flat">
+              <a:solidFill>
+                <a:srgbClr val="FFFFFF">
+                  <a:alpha val="100000"/>
+                </a:srgbClr>
+              </a:solidFill>
+              <a:prstDash val="solid"/>
+              <a:round/>
+            </a:ln>
+          </p:spPr>
+          <p:txBody>
+            <a:bodyPr/>
+            <a:lstStyle/>
+            <a:p/>
+          </p:txBody>
+        </p:sp>
+        <p:sp>
+          <p:nvSpPr>
+            <p:cNvPr id="25" name="pl24"/>
+            <p:cNvSpPr/>
+            <p:nvPr/>
+          </p:nvSpPr>
+          <p:spPr>
+            <a:xfrm>
+              <a:off x="1461154" y="2331694"/>
+              <a:ext cx="4200976" cy="0"/>
+            </a:xfrm>
+            <a:custGeom>
+              <a:avLst/>
+              <a:pathLst>
+                <a:path w="4200976" h="0">
+                  <a:moveTo>
+                    <a:pt x="0" y="0"/>
+                  </a:moveTo>
+                  <a:lnTo>
+                    <a:pt x="4200976" y="0"/>
+                  </a:lnTo>
+                  <a:lnTo>
+                    <a:pt x="4200976" y="0"/>
+                  </a:lnTo>
+                </a:path>
+              </a:pathLst>
+            </a:custGeom>
+            <a:ln w="13550" cap="flat">
+              <a:solidFill>
+                <a:srgbClr val="FFFFFF">
+                  <a:alpha val="100000"/>
+                </a:srgbClr>
+              </a:solidFill>
+              <a:prstDash val="solid"/>
+              <a:round/>
+            </a:ln>
+          </p:spPr>
+          <p:txBody>
+            <a:bodyPr/>
+            <a:lstStyle/>
+            <a:p/>
+          </p:txBody>
+        </p:sp>
+        <p:sp>
+          <p:nvSpPr>
+            <p:cNvPr id="26" name="pl25"/>
+            <p:cNvSpPr/>
+            <p:nvPr/>
+          </p:nvSpPr>
+          <p:spPr>
+            <a:xfrm>
+              <a:off x="1461154" y="1485253"/>
+              <a:ext cx="4200976" cy="0"/>
+            </a:xfrm>
+            <a:custGeom>
+              <a:avLst/>
+              <a:pathLst>
+                <a:path w="4200976" h="0">
+                  <a:moveTo>
+                    <a:pt x="0" y="0"/>
+                  </a:moveTo>
+                  <a:lnTo>
+                    <a:pt x="4200976" y="0"/>
+                  </a:lnTo>
+                  <a:lnTo>
+                    <a:pt x="4200976" y="0"/>
+                  </a:lnTo>
+                </a:path>
+              </a:pathLst>
+            </a:custGeom>
+            <a:ln w="13550" cap="flat">
+              <a:solidFill>
+                <a:srgbClr val="FFFFFF">
+                  <a:alpha val="100000"/>
+                </a:srgbClr>
+              </a:solidFill>
+              <a:prstDash val="solid"/>
+              <a:round/>
+            </a:ln>
+          </p:spPr>
+          <p:txBody>
+            <a:bodyPr/>
+            <a:lstStyle/>
+            <a:p/>
+          </p:txBody>
+        </p:sp>
+        <p:sp>
+          <p:nvSpPr>
+            <p:cNvPr id="27" name="pl26"/>
+            <p:cNvSpPr/>
+            <p:nvPr/>
+          </p:nvSpPr>
+          <p:spPr>
+            <a:xfrm>
+              <a:off x="1652108" y="983989"/>
               <a:ext cx="0" cy="3185376"/>
             </a:xfrm>
             <a:custGeom>
@@ -3066,7 +3238,7 @@
                 </a:path>
               </a:pathLst>
             </a:custGeom>
-            <a:ln w="6775" cap="flat">
+            <a:ln w="13550" cap="flat">
               <a:solidFill>
                 <a:srgbClr val="FFFFFF">
                   <a:alpha val="100000"/>
@@ -3084,13 +3256,13 @@
         </p:sp>
         <p:sp>
           <p:nvSpPr>
-            <p:cNvPr id="24" name="pl23"/>
-            <p:cNvSpPr/>
-            <p:nvPr/>
-          </p:nvSpPr>
-          <p:spPr>
-            <a:xfrm>
-              <a:off x="5188283" y="983989"/>
+            <p:cNvPr id="28" name="pl27"/>
+            <p:cNvSpPr/>
+            <p:nvPr/>
+          </p:nvSpPr>
+          <p:spPr>
+            <a:xfrm>
+              <a:off x="2005725" y="983989"/>
               <a:ext cx="0" cy="3185376"/>
             </a:xfrm>
             <a:custGeom>
@@ -3109,7 +3281,7 @@
                 </a:path>
               </a:pathLst>
             </a:custGeom>
-            <a:ln w="6775" cap="flat">
+            <a:ln w="13550" cap="flat">
               <a:solidFill>
                 <a:srgbClr val="FFFFFF">
                   <a:alpha val="100000"/>
@@ -3127,13 +3299,13 @@
         </p:sp>
         <p:sp>
           <p:nvSpPr>
-            <p:cNvPr id="25" name="pl24"/>
-            <p:cNvSpPr/>
-            <p:nvPr/>
-          </p:nvSpPr>
-          <p:spPr>
-            <a:xfrm>
-              <a:off x="5471177" y="983989"/>
+            <p:cNvPr id="29" name="pl28"/>
+            <p:cNvSpPr/>
+            <p:nvPr/>
+          </p:nvSpPr>
+          <p:spPr>
+            <a:xfrm>
+              <a:off x="2359343" y="983989"/>
               <a:ext cx="0" cy="3185376"/>
             </a:xfrm>
             <a:custGeom>
@@ -3152,7 +3324,7 @@
                 </a:path>
               </a:pathLst>
             </a:custGeom>
-            <a:ln w="6775" cap="flat">
+            <a:ln w="13550" cap="flat">
               <a:solidFill>
                 <a:srgbClr val="FFFFFF">
                   <a:alpha val="100000"/>
@@ -3170,185 +3342,13 @@
         </p:sp>
         <p:sp>
           <p:nvSpPr>
-            <p:cNvPr id="26" name="pl25"/>
-            <p:cNvSpPr/>
-            <p:nvPr/>
-          </p:nvSpPr>
-          <p:spPr>
-            <a:xfrm>
-              <a:off x="1461154" y="4024575"/>
-              <a:ext cx="4200976" cy="0"/>
-            </a:xfrm>
-            <a:custGeom>
-              <a:avLst/>
-              <a:pathLst>
-                <a:path w="4200976" h="0">
-                  <a:moveTo>
-                    <a:pt x="0" y="0"/>
-                  </a:moveTo>
-                  <a:lnTo>
-                    <a:pt x="4200976" y="0"/>
-                  </a:lnTo>
-                  <a:lnTo>
-                    <a:pt x="4200976" y="0"/>
-                  </a:lnTo>
-                </a:path>
-              </a:pathLst>
-            </a:custGeom>
-            <a:ln w="13550" cap="flat">
-              <a:solidFill>
-                <a:srgbClr val="FFFFFF">
-                  <a:alpha val="100000"/>
-                </a:srgbClr>
-              </a:solidFill>
-              <a:prstDash val="solid"/>
-              <a:round/>
-            </a:ln>
-          </p:spPr>
-          <p:txBody>
-            <a:bodyPr/>
-            <a:lstStyle/>
-            <a:p/>
-          </p:txBody>
-        </p:sp>
-        <p:sp>
-          <p:nvSpPr>
-            <p:cNvPr id="27" name="pl26"/>
-            <p:cNvSpPr/>
-            <p:nvPr/>
-          </p:nvSpPr>
-          <p:spPr>
-            <a:xfrm>
-              <a:off x="1461154" y="3178134"/>
-              <a:ext cx="4200976" cy="0"/>
-            </a:xfrm>
-            <a:custGeom>
-              <a:avLst/>
-              <a:pathLst>
-                <a:path w="4200976" h="0">
-                  <a:moveTo>
-                    <a:pt x="0" y="0"/>
-                  </a:moveTo>
-                  <a:lnTo>
-                    <a:pt x="4200976" y="0"/>
-                  </a:lnTo>
-                  <a:lnTo>
-                    <a:pt x="4200976" y="0"/>
-                  </a:lnTo>
-                </a:path>
-              </a:pathLst>
-            </a:custGeom>
-            <a:ln w="13550" cap="flat">
-              <a:solidFill>
-                <a:srgbClr val="FFFFFF">
-                  <a:alpha val="100000"/>
-                </a:srgbClr>
-              </a:solidFill>
-              <a:prstDash val="solid"/>
-              <a:round/>
-            </a:ln>
-          </p:spPr>
-          <p:txBody>
-            <a:bodyPr/>
-            <a:lstStyle/>
-            <a:p/>
-          </p:txBody>
-        </p:sp>
-        <p:sp>
-          <p:nvSpPr>
-            <p:cNvPr id="28" name="pl27"/>
-            <p:cNvSpPr/>
-            <p:nvPr/>
-          </p:nvSpPr>
-          <p:spPr>
-            <a:xfrm>
-              <a:off x="1461154" y="2331694"/>
-              <a:ext cx="4200976" cy="0"/>
-            </a:xfrm>
-            <a:custGeom>
-              <a:avLst/>
-              <a:pathLst>
-                <a:path w="4200976" h="0">
-                  <a:moveTo>
-                    <a:pt x="0" y="0"/>
-                  </a:moveTo>
-                  <a:lnTo>
-                    <a:pt x="4200976" y="0"/>
-                  </a:lnTo>
-                  <a:lnTo>
-                    <a:pt x="4200976" y="0"/>
-                  </a:lnTo>
-                </a:path>
-              </a:pathLst>
-            </a:custGeom>
-            <a:ln w="13550" cap="flat">
-              <a:solidFill>
-                <a:srgbClr val="FFFFFF">
-                  <a:alpha val="100000"/>
-                </a:srgbClr>
-              </a:solidFill>
-              <a:prstDash val="solid"/>
-              <a:round/>
-            </a:ln>
-          </p:spPr>
-          <p:txBody>
-            <a:bodyPr/>
-            <a:lstStyle/>
-            <a:p/>
-          </p:txBody>
-        </p:sp>
-        <p:sp>
-          <p:nvSpPr>
-            <p:cNvPr id="29" name="pl28"/>
-            <p:cNvSpPr/>
-            <p:nvPr/>
-          </p:nvSpPr>
-          <p:spPr>
-            <a:xfrm>
-              <a:off x="1461154" y="1485253"/>
-              <a:ext cx="4200976" cy="0"/>
-            </a:xfrm>
-            <a:custGeom>
-              <a:avLst/>
-              <a:pathLst>
-                <a:path w="4200976" h="0">
-                  <a:moveTo>
-                    <a:pt x="0" y="0"/>
-                  </a:moveTo>
-                  <a:lnTo>
-                    <a:pt x="4200976" y="0"/>
-                  </a:lnTo>
-                  <a:lnTo>
-                    <a:pt x="4200976" y="0"/>
-                  </a:lnTo>
-                </a:path>
-              </a:pathLst>
-            </a:custGeom>
-            <a:ln w="13550" cap="flat">
-              <a:solidFill>
-                <a:srgbClr val="FFFFFF">
-                  <a:alpha val="100000"/>
-                </a:srgbClr>
-              </a:solidFill>
-              <a:prstDash val="solid"/>
-              <a:round/>
-            </a:ln>
-          </p:spPr>
-          <p:txBody>
-            <a:bodyPr/>
-            <a:lstStyle/>
-            <a:p/>
-          </p:txBody>
-        </p:sp>
-        <p:sp>
-          <p:nvSpPr>
             <p:cNvPr id="30" name="pl29"/>
             <p:cNvSpPr/>
             <p:nvPr/>
           </p:nvSpPr>
           <p:spPr>
             <a:xfrm>
-              <a:off x="1652108" y="983989"/>
+              <a:off x="2712960" y="983989"/>
               <a:ext cx="0" cy="3185376"/>
             </a:xfrm>
             <a:custGeom>
@@ -3391,7 +3391,7 @@
           </p:nvSpPr>
           <p:spPr>
             <a:xfrm>
-              <a:off x="1935002" y="983989"/>
+              <a:off x="3066578" y="983989"/>
               <a:ext cx="0" cy="3185376"/>
             </a:xfrm>
             <a:custGeom>
@@ -3434,7 +3434,7 @@
           </p:nvSpPr>
           <p:spPr>
             <a:xfrm>
-              <a:off x="2217896" y="983989"/>
+              <a:off x="3420196" y="983989"/>
               <a:ext cx="0" cy="3185376"/>
             </a:xfrm>
             <a:custGeom>
@@ -3477,7 +3477,7 @@
           </p:nvSpPr>
           <p:spPr>
             <a:xfrm>
-              <a:off x="2500790" y="983989"/>
+              <a:off x="3773813" y="983989"/>
               <a:ext cx="0" cy="3185376"/>
             </a:xfrm>
             <a:custGeom>
@@ -3520,7 +3520,7 @@
           </p:nvSpPr>
           <p:spPr>
             <a:xfrm>
-              <a:off x="2783684" y="983989"/>
+              <a:off x="4127431" y="983989"/>
               <a:ext cx="0" cy="3185376"/>
             </a:xfrm>
             <a:custGeom>
@@ -3563,7 +3563,7 @@
           </p:nvSpPr>
           <p:spPr>
             <a:xfrm>
-              <a:off x="3066578" y="983989"/>
+              <a:off x="4481048" y="983989"/>
               <a:ext cx="0" cy="3185376"/>
             </a:xfrm>
             <a:custGeom>
@@ -3606,7 +3606,7 @@
           </p:nvSpPr>
           <p:spPr>
             <a:xfrm>
-              <a:off x="3349472" y="983989"/>
+              <a:off x="4834666" y="983989"/>
               <a:ext cx="0" cy="3185376"/>
             </a:xfrm>
             <a:custGeom>
@@ -3649,7 +3649,7 @@
           </p:nvSpPr>
           <p:spPr>
             <a:xfrm>
-              <a:off x="3632366" y="983989"/>
+              <a:off x="5188283" y="983989"/>
               <a:ext cx="0" cy="3185376"/>
             </a:xfrm>
             <a:custGeom>
@@ -3692,7 +3692,7 @@
           </p:nvSpPr>
           <p:spPr>
             <a:xfrm>
-              <a:off x="3915260" y="983989"/>
+              <a:off x="5541901" y="983989"/>
               <a:ext cx="0" cy="3185376"/>
             </a:xfrm>
             <a:custGeom>
@@ -3735,264 +3735,6 @@
           </p:nvSpPr>
           <p:spPr>
             <a:xfrm>
-              <a:off x="4198154" y="983989"/>
-              <a:ext cx="0" cy="3185376"/>
-            </a:xfrm>
-            <a:custGeom>
-              <a:avLst/>
-              <a:pathLst>
-                <a:path w="0" h="3185376">
-                  <a:moveTo>
-                    <a:pt x="0" y="3185376"/>
-                  </a:moveTo>
-                  <a:lnTo>
-                    <a:pt x="0" y="0"/>
-                  </a:lnTo>
-                  <a:lnTo>
-                    <a:pt x="0" y="0"/>
-                  </a:lnTo>
-                </a:path>
-              </a:pathLst>
-            </a:custGeom>
-            <a:ln w="13550" cap="flat">
-              <a:solidFill>
-                <a:srgbClr val="FFFFFF">
-                  <a:alpha val="100000"/>
-                </a:srgbClr>
-              </a:solidFill>
-              <a:prstDash val="solid"/>
-              <a:round/>
-            </a:ln>
-          </p:spPr>
-          <p:txBody>
-            <a:bodyPr/>
-            <a:lstStyle/>
-            <a:p/>
-          </p:txBody>
-        </p:sp>
-        <p:sp>
-          <p:nvSpPr>
-            <p:cNvPr id="40" name="pl39"/>
-            <p:cNvSpPr/>
-            <p:nvPr/>
-          </p:nvSpPr>
-          <p:spPr>
-            <a:xfrm>
-              <a:off x="4481048" y="983989"/>
-              <a:ext cx="0" cy="3185376"/>
-            </a:xfrm>
-            <a:custGeom>
-              <a:avLst/>
-              <a:pathLst>
-                <a:path w="0" h="3185376">
-                  <a:moveTo>
-                    <a:pt x="0" y="3185376"/>
-                  </a:moveTo>
-                  <a:lnTo>
-                    <a:pt x="0" y="0"/>
-                  </a:lnTo>
-                  <a:lnTo>
-                    <a:pt x="0" y="0"/>
-                  </a:lnTo>
-                </a:path>
-              </a:pathLst>
-            </a:custGeom>
-            <a:ln w="13550" cap="flat">
-              <a:solidFill>
-                <a:srgbClr val="FFFFFF">
-                  <a:alpha val="100000"/>
-                </a:srgbClr>
-              </a:solidFill>
-              <a:prstDash val="solid"/>
-              <a:round/>
-            </a:ln>
-          </p:spPr>
-          <p:txBody>
-            <a:bodyPr/>
-            <a:lstStyle/>
-            <a:p/>
-          </p:txBody>
-        </p:sp>
-        <p:sp>
-          <p:nvSpPr>
-            <p:cNvPr id="41" name="pl40"/>
-            <p:cNvSpPr/>
-            <p:nvPr/>
-          </p:nvSpPr>
-          <p:spPr>
-            <a:xfrm>
-              <a:off x="4763942" y="983989"/>
-              <a:ext cx="0" cy="3185376"/>
-            </a:xfrm>
-            <a:custGeom>
-              <a:avLst/>
-              <a:pathLst>
-                <a:path w="0" h="3185376">
-                  <a:moveTo>
-                    <a:pt x="0" y="3185376"/>
-                  </a:moveTo>
-                  <a:lnTo>
-                    <a:pt x="0" y="0"/>
-                  </a:lnTo>
-                  <a:lnTo>
-                    <a:pt x="0" y="0"/>
-                  </a:lnTo>
-                </a:path>
-              </a:pathLst>
-            </a:custGeom>
-            <a:ln w="13550" cap="flat">
-              <a:solidFill>
-                <a:srgbClr val="FFFFFF">
-                  <a:alpha val="100000"/>
-                </a:srgbClr>
-              </a:solidFill>
-              <a:prstDash val="solid"/>
-              <a:round/>
-            </a:ln>
-          </p:spPr>
-          <p:txBody>
-            <a:bodyPr/>
-            <a:lstStyle/>
-            <a:p/>
-          </p:txBody>
-        </p:sp>
-        <p:sp>
-          <p:nvSpPr>
-            <p:cNvPr id="42" name="pl41"/>
-            <p:cNvSpPr/>
-            <p:nvPr/>
-          </p:nvSpPr>
-          <p:spPr>
-            <a:xfrm>
-              <a:off x="5046836" y="983989"/>
-              <a:ext cx="0" cy="3185376"/>
-            </a:xfrm>
-            <a:custGeom>
-              <a:avLst/>
-              <a:pathLst>
-                <a:path w="0" h="3185376">
-                  <a:moveTo>
-                    <a:pt x="0" y="3185376"/>
-                  </a:moveTo>
-                  <a:lnTo>
-                    <a:pt x="0" y="0"/>
-                  </a:lnTo>
-                  <a:lnTo>
-                    <a:pt x="0" y="0"/>
-                  </a:lnTo>
-                </a:path>
-              </a:pathLst>
-            </a:custGeom>
-            <a:ln w="13550" cap="flat">
-              <a:solidFill>
-                <a:srgbClr val="FFFFFF">
-                  <a:alpha val="100000"/>
-                </a:srgbClr>
-              </a:solidFill>
-              <a:prstDash val="solid"/>
-              <a:round/>
-            </a:ln>
-          </p:spPr>
-          <p:txBody>
-            <a:bodyPr/>
-            <a:lstStyle/>
-            <a:p/>
-          </p:txBody>
-        </p:sp>
-        <p:sp>
-          <p:nvSpPr>
-            <p:cNvPr id="43" name="pl42"/>
-            <p:cNvSpPr/>
-            <p:nvPr/>
-          </p:nvSpPr>
-          <p:spPr>
-            <a:xfrm>
-              <a:off x="5329730" y="983989"/>
-              <a:ext cx="0" cy="3185376"/>
-            </a:xfrm>
-            <a:custGeom>
-              <a:avLst/>
-              <a:pathLst>
-                <a:path w="0" h="3185376">
-                  <a:moveTo>
-                    <a:pt x="0" y="3185376"/>
-                  </a:moveTo>
-                  <a:lnTo>
-                    <a:pt x="0" y="0"/>
-                  </a:lnTo>
-                  <a:lnTo>
-                    <a:pt x="0" y="0"/>
-                  </a:lnTo>
-                </a:path>
-              </a:pathLst>
-            </a:custGeom>
-            <a:ln w="13550" cap="flat">
-              <a:solidFill>
-                <a:srgbClr val="FFFFFF">
-                  <a:alpha val="100000"/>
-                </a:srgbClr>
-              </a:solidFill>
-              <a:prstDash val="solid"/>
-              <a:round/>
-            </a:ln>
-          </p:spPr>
-          <p:txBody>
-            <a:bodyPr/>
-            <a:lstStyle/>
-            <a:p/>
-          </p:txBody>
-        </p:sp>
-        <p:sp>
-          <p:nvSpPr>
-            <p:cNvPr id="44" name="pl43"/>
-            <p:cNvSpPr/>
-            <p:nvPr/>
-          </p:nvSpPr>
-          <p:spPr>
-            <a:xfrm>
-              <a:off x="5612624" y="983989"/>
-              <a:ext cx="0" cy="3185376"/>
-            </a:xfrm>
-            <a:custGeom>
-              <a:avLst/>
-              <a:pathLst>
-                <a:path w="0" h="3185376">
-                  <a:moveTo>
-                    <a:pt x="0" y="3185376"/>
-                  </a:moveTo>
-                  <a:lnTo>
-                    <a:pt x="0" y="0"/>
-                  </a:lnTo>
-                  <a:lnTo>
-                    <a:pt x="0" y="0"/>
-                  </a:lnTo>
-                </a:path>
-              </a:pathLst>
-            </a:custGeom>
-            <a:ln w="13550" cap="flat">
-              <a:solidFill>
-                <a:srgbClr val="FFFFFF">
-                  <a:alpha val="100000"/>
-                </a:srgbClr>
-              </a:solidFill>
-              <a:prstDash val="solid"/>
-              <a:round/>
-            </a:ln>
-          </p:spPr>
-          <p:txBody>
-            <a:bodyPr/>
-            <a:lstStyle/>
-            <a:p/>
-          </p:txBody>
-        </p:sp>
-        <p:sp>
-          <p:nvSpPr>
-            <p:cNvPr id="45" name="pl44"/>
-            <p:cNvSpPr/>
-            <p:nvPr/>
-          </p:nvSpPr>
-          <p:spPr>
-            <a:xfrm>
               <a:off x="1687470" y="1128778"/>
               <a:ext cx="3748346" cy="2895796"/>
             </a:xfrm>
@@ -4183,7 +3925,7 @@
         </p:sp>
         <p:sp>
           <p:nvSpPr>
-            <p:cNvPr id="46" name="pt45"/>
+            <p:cNvPr id="40" name="pt39"/>
             <p:cNvSpPr/>
             <p:nvPr/>
           </p:nvSpPr>
@@ -4218,7 +3960,7 @@
         </p:sp>
         <p:sp>
           <p:nvSpPr>
-            <p:cNvPr id="47" name="pt46"/>
+            <p:cNvPr id="41" name="pt40"/>
             <p:cNvSpPr/>
             <p:nvPr/>
           </p:nvSpPr>
@@ -4253,7 +3995,7 @@
         </p:sp>
         <p:sp>
           <p:nvSpPr>
-            <p:cNvPr id="48" name="pt47"/>
+            <p:cNvPr id="42" name="pt41"/>
             <p:cNvSpPr/>
             <p:nvPr/>
           </p:nvSpPr>
@@ -4288,7 +4030,7 @@
         </p:sp>
         <p:sp>
           <p:nvSpPr>
-            <p:cNvPr id="49" name="pt48"/>
+            <p:cNvPr id="43" name="pt42"/>
             <p:cNvSpPr/>
             <p:nvPr/>
           </p:nvSpPr>
@@ -4323,7 +4065,7 @@
         </p:sp>
         <p:sp>
           <p:nvSpPr>
-            <p:cNvPr id="50" name="pt49"/>
+            <p:cNvPr id="44" name="pt43"/>
             <p:cNvSpPr/>
             <p:nvPr/>
           </p:nvSpPr>
@@ -4358,7 +4100,7 @@
         </p:sp>
         <p:sp>
           <p:nvSpPr>
-            <p:cNvPr id="51" name="pt50"/>
+            <p:cNvPr id="45" name="pt44"/>
             <p:cNvSpPr/>
             <p:nvPr/>
           </p:nvSpPr>
@@ -4393,7 +4135,7 @@
         </p:sp>
         <p:sp>
           <p:nvSpPr>
-            <p:cNvPr id="52" name="pt51"/>
+            <p:cNvPr id="46" name="pt45"/>
             <p:cNvSpPr/>
             <p:nvPr/>
           </p:nvSpPr>
@@ -4428,7 +4170,7 @@
         </p:sp>
         <p:sp>
           <p:nvSpPr>
-            <p:cNvPr id="53" name="pt52"/>
+            <p:cNvPr id="47" name="pt46"/>
             <p:cNvSpPr/>
             <p:nvPr/>
           </p:nvSpPr>
@@ -4463,7 +4205,7 @@
         </p:sp>
         <p:sp>
           <p:nvSpPr>
-            <p:cNvPr id="54" name="pt53"/>
+            <p:cNvPr id="48" name="pt47"/>
             <p:cNvSpPr/>
             <p:nvPr/>
           </p:nvSpPr>
@@ -4498,7 +4240,7 @@
         </p:sp>
         <p:sp>
           <p:nvSpPr>
-            <p:cNvPr id="55" name="pt54"/>
+            <p:cNvPr id="49" name="pt48"/>
             <p:cNvSpPr/>
             <p:nvPr/>
           </p:nvSpPr>
@@ -4533,7 +4275,7 @@
         </p:sp>
         <p:sp>
           <p:nvSpPr>
-            <p:cNvPr id="56" name="pt55"/>
+            <p:cNvPr id="50" name="pt49"/>
             <p:cNvSpPr/>
             <p:nvPr/>
           </p:nvSpPr>
@@ -4568,7 +4310,7 @@
         </p:sp>
         <p:sp>
           <p:nvSpPr>
-            <p:cNvPr id="57" name="pt56"/>
+            <p:cNvPr id="51" name="pt50"/>
             <p:cNvSpPr/>
             <p:nvPr/>
           </p:nvSpPr>
@@ -4603,7 +4345,7 @@
         </p:sp>
         <p:sp>
           <p:nvSpPr>
-            <p:cNvPr id="58" name="pt57"/>
+            <p:cNvPr id="52" name="pt51"/>
             <p:cNvSpPr/>
             <p:nvPr/>
           </p:nvSpPr>
@@ -4638,7 +4380,7 @@
         </p:sp>
         <p:sp>
           <p:nvSpPr>
-            <p:cNvPr id="59" name="pt58"/>
+            <p:cNvPr id="53" name="pt52"/>
             <p:cNvSpPr/>
             <p:nvPr/>
           </p:nvSpPr>
@@ -4673,7 +4415,7 @@
         </p:sp>
         <p:sp>
           <p:nvSpPr>
-            <p:cNvPr id="60" name="pt59"/>
+            <p:cNvPr id="54" name="pt53"/>
             <p:cNvSpPr/>
             <p:nvPr/>
           </p:nvSpPr>
@@ -4708,7 +4450,7 @@
         </p:sp>
         <p:sp>
           <p:nvSpPr>
-            <p:cNvPr id="61" name="pt60"/>
+            <p:cNvPr id="55" name="pt54"/>
             <p:cNvSpPr/>
             <p:nvPr/>
           </p:nvSpPr>
@@ -4743,7 +4485,7 @@
         </p:sp>
         <p:sp>
           <p:nvSpPr>
-            <p:cNvPr id="62" name="pt61"/>
+            <p:cNvPr id="56" name="pt55"/>
             <p:cNvSpPr/>
             <p:nvPr/>
           </p:nvSpPr>
@@ -4778,7 +4520,7 @@
         </p:sp>
         <p:sp>
           <p:nvSpPr>
-            <p:cNvPr id="63" name="pt62"/>
+            <p:cNvPr id="57" name="pt56"/>
             <p:cNvSpPr/>
             <p:nvPr/>
           </p:nvSpPr>
@@ -4813,7 +4555,7 @@
         </p:sp>
         <p:sp>
           <p:nvSpPr>
-            <p:cNvPr id="64" name="pt63"/>
+            <p:cNvPr id="58" name="pt57"/>
             <p:cNvSpPr/>
             <p:nvPr/>
           </p:nvSpPr>
@@ -4848,7 +4590,7 @@
         </p:sp>
         <p:sp>
           <p:nvSpPr>
-            <p:cNvPr id="65" name="pt64"/>
+            <p:cNvPr id="59" name="pt58"/>
             <p:cNvSpPr/>
             <p:nvPr/>
           </p:nvSpPr>
@@ -4883,7 +4625,7 @@
         </p:sp>
         <p:sp>
           <p:nvSpPr>
-            <p:cNvPr id="66" name="pt65"/>
+            <p:cNvPr id="60" name="pt59"/>
             <p:cNvSpPr/>
             <p:nvPr/>
           </p:nvSpPr>
@@ -4918,7 +4660,7 @@
         </p:sp>
         <p:sp>
           <p:nvSpPr>
-            <p:cNvPr id="67" name="pt66"/>
+            <p:cNvPr id="61" name="pt60"/>
             <p:cNvSpPr/>
             <p:nvPr/>
           </p:nvSpPr>
@@ -4953,7 +4695,7 @@
         </p:sp>
         <p:sp>
           <p:nvSpPr>
-            <p:cNvPr id="68" name="pt67"/>
+            <p:cNvPr id="62" name="pt61"/>
             <p:cNvSpPr/>
             <p:nvPr/>
           </p:nvSpPr>
@@ -4988,7 +4730,7 @@
         </p:sp>
         <p:sp>
           <p:nvSpPr>
-            <p:cNvPr id="69" name="pt68"/>
+            <p:cNvPr id="63" name="pt62"/>
             <p:cNvSpPr/>
             <p:nvPr/>
           </p:nvSpPr>
@@ -5023,7 +4765,7 @@
         </p:sp>
         <p:sp>
           <p:nvSpPr>
-            <p:cNvPr id="70" name="pt69"/>
+            <p:cNvPr id="64" name="pt63"/>
             <p:cNvSpPr/>
             <p:nvPr/>
           </p:nvSpPr>
@@ -5058,7 +4800,7 @@
         </p:sp>
         <p:sp>
           <p:nvSpPr>
-            <p:cNvPr id="71" name="pt70"/>
+            <p:cNvPr id="65" name="pt64"/>
             <p:cNvSpPr/>
             <p:nvPr/>
           </p:nvSpPr>
@@ -5093,7 +4835,7 @@
         </p:sp>
         <p:sp>
           <p:nvSpPr>
-            <p:cNvPr id="72" name="pt71"/>
+            <p:cNvPr id="66" name="pt65"/>
             <p:cNvSpPr/>
             <p:nvPr/>
           </p:nvSpPr>
@@ -5128,7 +4870,7 @@
         </p:sp>
         <p:sp>
           <p:nvSpPr>
-            <p:cNvPr id="73" name="pt72"/>
+            <p:cNvPr id="67" name="pt66"/>
             <p:cNvSpPr/>
             <p:nvPr/>
           </p:nvSpPr>
@@ -5163,7 +4905,7 @@
         </p:sp>
         <p:sp>
           <p:nvSpPr>
-            <p:cNvPr id="74" name="pt73"/>
+            <p:cNvPr id="68" name="pt67"/>
             <p:cNvSpPr/>
             <p:nvPr/>
           </p:nvSpPr>
@@ -5198,7 +4940,7 @@
         </p:sp>
         <p:sp>
           <p:nvSpPr>
-            <p:cNvPr id="75" name="pt74"/>
+            <p:cNvPr id="69" name="pt68"/>
             <p:cNvSpPr/>
             <p:nvPr/>
           </p:nvSpPr>
@@ -5233,7 +4975,7 @@
         </p:sp>
         <p:sp>
           <p:nvSpPr>
-            <p:cNvPr id="76" name="pt75"/>
+            <p:cNvPr id="70" name="pt69"/>
             <p:cNvSpPr/>
             <p:nvPr/>
           </p:nvSpPr>
@@ -5268,7 +5010,7 @@
         </p:sp>
         <p:sp>
           <p:nvSpPr>
-            <p:cNvPr id="77" name="pt76"/>
+            <p:cNvPr id="71" name="pt70"/>
             <p:cNvSpPr/>
             <p:nvPr/>
           </p:nvSpPr>
@@ -5303,7 +5045,7 @@
         </p:sp>
         <p:sp>
           <p:nvSpPr>
-            <p:cNvPr id="78" name="pt77"/>
+            <p:cNvPr id="72" name="pt71"/>
             <p:cNvSpPr/>
             <p:nvPr/>
           </p:nvSpPr>
@@ -5338,7 +5080,7 @@
         </p:sp>
         <p:sp>
           <p:nvSpPr>
-            <p:cNvPr id="79" name="pt78"/>
+            <p:cNvPr id="73" name="pt72"/>
             <p:cNvSpPr/>
             <p:nvPr/>
           </p:nvSpPr>
@@ -5373,7 +5115,7 @@
         </p:sp>
         <p:sp>
           <p:nvSpPr>
-            <p:cNvPr id="80" name="pt79"/>
+            <p:cNvPr id="74" name="pt73"/>
             <p:cNvSpPr/>
             <p:nvPr/>
           </p:nvSpPr>
@@ -5408,7 +5150,7 @@
         </p:sp>
         <p:sp>
           <p:nvSpPr>
-            <p:cNvPr id="81" name="pt80"/>
+            <p:cNvPr id="75" name="pt74"/>
             <p:cNvSpPr/>
             <p:nvPr/>
           </p:nvSpPr>
@@ -5443,7 +5185,7 @@
         </p:sp>
         <p:sp>
           <p:nvSpPr>
-            <p:cNvPr id="82" name="pt81"/>
+            <p:cNvPr id="76" name="pt75"/>
             <p:cNvSpPr/>
             <p:nvPr/>
           </p:nvSpPr>
@@ -5478,7 +5220,7 @@
         </p:sp>
         <p:sp>
           <p:nvSpPr>
-            <p:cNvPr id="83" name="pt82"/>
+            <p:cNvPr id="77" name="pt76"/>
             <p:cNvSpPr/>
             <p:nvPr/>
           </p:nvSpPr>
@@ -5513,7 +5255,7 @@
         </p:sp>
         <p:sp>
           <p:nvSpPr>
-            <p:cNvPr id="84" name="pt83"/>
+            <p:cNvPr id="78" name="pt77"/>
             <p:cNvSpPr/>
             <p:nvPr/>
           </p:nvSpPr>
@@ -5548,7 +5290,7 @@
         </p:sp>
         <p:sp>
           <p:nvSpPr>
-            <p:cNvPr id="85" name="pt84"/>
+            <p:cNvPr id="79" name="pt78"/>
             <p:cNvSpPr/>
             <p:nvPr/>
           </p:nvSpPr>
@@ -5583,7 +5325,7 @@
         </p:sp>
         <p:sp>
           <p:nvSpPr>
-            <p:cNvPr id="86" name="pt85"/>
+            <p:cNvPr id="80" name="pt79"/>
             <p:cNvSpPr/>
             <p:nvPr/>
           </p:nvSpPr>
@@ -5618,7 +5360,7 @@
         </p:sp>
         <p:sp>
           <p:nvSpPr>
-            <p:cNvPr id="87" name="pt86"/>
+            <p:cNvPr id="81" name="pt80"/>
             <p:cNvSpPr/>
             <p:nvPr/>
           </p:nvSpPr>
@@ -5653,7 +5395,7 @@
         </p:sp>
         <p:sp>
           <p:nvSpPr>
-            <p:cNvPr id="88" name="pt87"/>
+            <p:cNvPr id="82" name="pt81"/>
             <p:cNvSpPr/>
             <p:nvPr/>
           </p:nvSpPr>
@@ -5688,7 +5430,7 @@
         </p:sp>
         <p:sp>
           <p:nvSpPr>
-            <p:cNvPr id="89" name="pt88"/>
+            <p:cNvPr id="83" name="pt82"/>
             <p:cNvSpPr/>
             <p:nvPr/>
           </p:nvSpPr>
@@ -5723,7 +5465,7 @@
         </p:sp>
         <p:sp>
           <p:nvSpPr>
-            <p:cNvPr id="90" name="pt89"/>
+            <p:cNvPr id="84" name="pt83"/>
             <p:cNvSpPr/>
             <p:nvPr/>
           </p:nvSpPr>
@@ -5758,7 +5500,7 @@
         </p:sp>
         <p:sp>
           <p:nvSpPr>
-            <p:cNvPr id="91" name="pt90"/>
+            <p:cNvPr id="85" name="pt84"/>
             <p:cNvSpPr/>
             <p:nvPr/>
           </p:nvSpPr>
@@ -5793,7 +5535,7 @@
         </p:sp>
         <p:sp>
           <p:nvSpPr>
-            <p:cNvPr id="92" name="pt91"/>
+            <p:cNvPr id="86" name="pt85"/>
             <p:cNvSpPr/>
             <p:nvPr/>
           </p:nvSpPr>
@@ -5828,7 +5570,7 @@
         </p:sp>
         <p:sp>
           <p:nvSpPr>
-            <p:cNvPr id="93" name="pt92"/>
+            <p:cNvPr id="87" name="pt86"/>
             <p:cNvSpPr/>
             <p:nvPr/>
           </p:nvSpPr>
@@ -5863,7 +5605,7 @@
         </p:sp>
         <p:sp>
           <p:nvSpPr>
-            <p:cNvPr id="94" name="pt93"/>
+            <p:cNvPr id="88" name="pt87"/>
             <p:cNvSpPr/>
             <p:nvPr/>
           </p:nvSpPr>
@@ -5898,7 +5640,7 @@
         </p:sp>
         <p:sp>
           <p:nvSpPr>
-            <p:cNvPr id="95" name="pt94"/>
+            <p:cNvPr id="89" name="pt88"/>
             <p:cNvSpPr/>
             <p:nvPr/>
           </p:nvSpPr>
@@ -5933,7 +5675,7 @@
         </p:sp>
         <p:sp>
           <p:nvSpPr>
-            <p:cNvPr id="96" name="pt95"/>
+            <p:cNvPr id="90" name="pt89"/>
             <p:cNvSpPr/>
             <p:nvPr/>
           </p:nvSpPr>
@@ -5968,7 +5710,7 @@
         </p:sp>
         <p:sp>
           <p:nvSpPr>
-            <p:cNvPr id="97" name="pt96"/>
+            <p:cNvPr id="91" name="pt90"/>
             <p:cNvSpPr/>
             <p:nvPr/>
           </p:nvSpPr>
@@ -6003,7 +5745,7 @@
         </p:sp>
         <p:sp>
           <p:nvSpPr>
-            <p:cNvPr id="98" name="pt97"/>
+            <p:cNvPr id="92" name="pt91"/>
             <p:cNvSpPr/>
             <p:nvPr/>
           </p:nvSpPr>
@@ -6038,7 +5780,7 @@
         </p:sp>
         <p:sp>
           <p:nvSpPr>
-            <p:cNvPr id="99" name="pt98"/>
+            <p:cNvPr id="93" name="pt92"/>
             <p:cNvSpPr/>
             <p:nvPr/>
           </p:nvSpPr>
@@ -6073,7 +5815,7 @@
         </p:sp>
         <p:sp>
           <p:nvSpPr>
-            <p:cNvPr id="100" name="tx99"/>
+            <p:cNvPr id="94" name="tx93"/>
             <p:cNvSpPr/>
             <p:nvPr/>
           </p:nvSpPr>
@@ -6119,7 +5861,7 @@
         </p:sp>
         <p:sp>
           <p:nvSpPr>
-            <p:cNvPr id="101" name="tx100"/>
+            <p:cNvPr id="95" name="tx94"/>
             <p:cNvSpPr/>
             <p:nvPr/>
           </p:nvSpPr>
@@ -6165,7 +5907,7 @@
         </p:sp>
         <p:sp>
           <p:nvSpPr>
-            <p:cNvPr id="102" name="tx101"/>
+            <p:cNvPr id="96" name="tx95"/>
             <p:cNvSpPr/>
             <p:nvPr/>
           </p:nvSpPr>
@@ -6211,7 +5953,7 @@
         </p:sp>
         <p:sp>
           <p:nvSpPr>
-            <p:cNvPr id="103" name="tx102"/>
+            <p:cNvPr id="97" name="tx96"/>
             <p:cNvSpPr/>
             <p:nvPr/>
           </p:nvSpPr>
@@ -6257,7 +5999,7 @@
         </p:sp>
         <p:sp>
           <p:nvSpPr>
-            <p:cNvPr id="104" name="pl103"/>
+            <p:cNvPr id="98" name="pl97"/>
             <p:cNvSpPr/>
             <p:nvPr/>
           </p:nvSpPr>
@@ -6297,7 +6039,7 @@
         </p:sp>
         <p:sp>
           <p:nvSpPr>
-            <p:cNvPr id="105" name="pl104"/>
+            <p:cNvPr id="99" name="pl98"/>
             <p:cNvSpPr/>
             <p:nvPr/>
           </p:nvSpPr>
@@ -6337,7 +6079,7 @@
         </p:sp>
         <p:sp>
           <p:nvSpPr>
-            <p:cNvPr id="106" name="pl105"/>
+            <p:cNvPr id="100" name="pl99"/>
             <p:cNvSpPr/>
             <p:nvPr/>
           </p:nvSpPr>
@@ -6377,7 +6119,7 @@
         </p:sp>
         <p:sp>
           <p:nvSpPr>
-            <p:cNvPr id="107" name="pl106"/>
+            <p:cNvPr id="101" name="pl100"/>
             <p:cNvSpPr/>
             <p:nvPr/>
           </p:nvSpPr>
@@ -6417,7 +6159,7 @@
         </p:sp>
         <p:sp>
           <p:nvSpPr>
-            <p:cNvPr id="108" name="pl107"/>
+            <p:cNvPr id="102" name="pl101"/>
             <p:cNvSpPr/>
             <p:nvPr/>
           </p:nvSpPr>
@@ -6457,13 +6199,13 @@
         </p:sp>
         <p:sp>
           <p:nvSpPr>
-            <p:cNvPr id="109" name="pl108"/>
-            <p:cNvSpPr/>
-            <p:nvPr/>
-          </p:nvSpPr>
-          <p:spPr>
-            <a:xfrm>
-              <a:off x="1935002" y="4169365"/>
+            <p:cNvPr id="103" name="pl102"/>
+            <p:cNvSpPr/>
+            <p:nvPr/>
+          </p:nvSpPr>
+          <p:spPr>
+            <a:xfrm>
+              <a:off x="2005725" y="4169365"/>
               <a:ext cx="0" cy="34794"/>
             </a:xfrm>
             <a:custGeom>
@@ -6497,13 +6239,13 @@
         </p:sp>
         <p:sp>
           <p:nvSpPr>
-            <p:cNvPr id="110" name="pl109"/>
-            <p:cNvSpPr/>
-            <p:nvPr/>
-          </p:nvSpPr>
-          <p:spPr>
-            <a:xfrm>
-              <a:off x="2217896" y="4169365"/>
+            <p:cNvPr id="104" name="pl103"/>
+            <p:cNvSpPr/>
+            <p:nvPr/>
+          </p:nvSpPr>
+          <p:spPr>
+            <a:xfrm>
+              <a:off x="2359343" y="4169365"/>
               <a:ext cx="0" cy="34794"/>
             </a:xfrm>
             <a:custGeom>
@@ -6537,13 +6279,13 @@
         </p:sp>
         <p:sp>
           <p:nvSpPr>
-            <p:cNvPr id="111" name="pl110"/>
-            <p:cNvSpPr/>
-            <p:nvPr/>
-          </p:nvSpPr>
-          <p:spPr>
-            <a:xfrm>
-              <a:off x="2500790" y="4169365"/>
+            <p:cNvPr id="105" name="pl104"/>
+            <p:cNvSpPr/>
+            <p:nvPr/>
+          </p:nvSpPr>
+          <p:spPr>
+            <a:xfrm>
+              <a:off x="2712960" y="4169365"/>
               <a:ext cx="0" cy="34794"/>
             </a:xfrm>
             <a:custGeom>
@@ -6577,13 +6319,13 @@
         </p:sp>
         <p:sp>
           <p:nvSpPr>
-            <p:cNvPr id="112" name="pl111"/>
-            <p:cNvSpPr/>
-            <p:nvPr/>
-          </p:nvSpPr>
-          <p:spPr>
-            <a:xfrm>
-              <a:off x="2783684" y="4169365"/>
+            <p:cNvPr id="106" name="pl105"/>
+            <p:cNvSpPr/>
+            <p:nvPr/>
+          </p:nvSpPr>
+          <p:spPr>
+            <a:xfrm>
+              <a:off x="3066578" y="4169365"/>
               <a:ext cx="0" cy="34794"/>
             </a:xfrm>
             <a:custGeom>
@@ -6617,13 +6359,13 @@
         </p:sp>
         <p:sp>
           <p:nvSpPr>
-            <p:cNvPr id="113" name="pl112"/>
-            <p:cNvSpPr/>
-            <p:nvPr/>
-          </p:nvSpPr>
-          <p:spPr>
-            <a:xfrm>
-              <a:off x="3066578" y="4169365"/>
+            <p:cNvPr id="107" name="pl106"/>
+            <p:cNvSpPr/>
+            <p:nvPr/>
+          </p:nvSpPr>
+          <p:spPr>
+            <a:xfrm>
+              <a:off x="3420196" y="4169365"/>
               <a:ext cx="0" cy="34794"/>
             </a:xfrm>
             <a:custGeom>
@@ -6657,13 +6399,13 @@
         </p:sp>
         <p:sp>
           <p:nvSpPr>
-            <p:cNvPr id="114" name="pl113"/>
-            <p:cNvSpPr/>
-            <p:nvPr/>
-          </p:nvSpPr>
-          <p:spPr>
-            <a:xfrm>
-              <a:off x="3349472" y="4169365"/>
+            <p:cNvPr id="108" name="pl107"/>
+            <p:cNvSpPr/>
+            <p:nvPr/>
+          </p:nvSpPr>
+          <p:spPr>
+            <a:xfrm>
+              <a:off x="3773813" y="4169365"/>
               <a:ext cx="0" cy="34794"/>
             </a:xfrm>
             <a:custGeom>
@@ -6697,13 +6439,13 @@
         </p:sp>
         <p:sp>
           <p:nvSpPr>
-            <p:cNvPr id="115" name="pl114"/>
-            <p:cNvSpPr/>
-            <p:nvPr/>
-          </p:nvSpPr>
-          <p:spPr>
-            <a:xfrm>
-              <a:off x="3632366" y="4169365"/>
+            <p:cNvPr id="109" name="pl108"/>
+            <p:cNvSpPr/>
+            <p:nvPr/>
+          </p:nvSpPr>
+          <p:spPr>
+            <a:xfrm>
+              <a:off x="4127431" y="4169365"/>
               <a:ext cx="0" cy="34794"/>
             </a:xfrm>
             <a:custGeom>
@@ -6737,13 +6479,13 @@
         </p:sp>
         <p:sp>
           <p:nvSpPr>
-            <p:cNvPr id="116" name="pl115"/>
-            <p:cNvSpPr/>
-            <p:nvPr/>
-          </p:nvSpPr>
-          <p:spPr>
-            <a:xfrm>
-              <a:off x="3915260" y="4169365"/>
+            <p:cNvPr id="110" name="pl109"/>
+            <p:cNvSpPr/>
+            <p:nvPr/>
+          </p:nvSpPr>
+          <p:spPr>
+            <a:xfrm>
+              <a:off x="4481048" y="4169365"/>
               <a:ext cx="0" cy="34794"/>
             </a:xfrm>
             <a:custGeom>
@@ -6777,13 +6519,13 @@
         </p:sp>
         <p:sp>
           <p:nvSpPr>
-            <p:cNvPr id="117" name="pl116"/>
-            <p:cNvSpPr/>
-            <p:nvPr/>
-          </p:nvSpPr>
-          <p:spPr>
-            <a:xfrm>
-              <a:off x="4198154" y="4169365"/>
+            <p:cNvPr id="111" name="pl110"/>
+            <p:cNvSpPr/>
+            <p:nvPr/>
+          </p:nvSpPr>
+          <p:spPr>
+            <a:xfrm>
+              <a:off x="4834666" y="4169365"/>
               <a:ext cx="0" cy="34794"/>
             </a:xfrm>
             <a:custGeom>
@@ -6817,13 +6559,13 @@
         </p:sp>
         <p:sp>
           <p:nvSpPr>
-            <p:cNvPr id="118" name="pl117"/>
-            <p:cNvSpPr/>
-            <p:nvPr/>
-          </p:nvSpPr>
-          <p:spPr>
-            <a:xfrm>
-              <a:off x="4481048" y="4169365"/>
+            <p:cNvPr id="112" name="pl111"/>
+            <p:cNvSpPr/>
+            <p:nvPr/>
+          </p:nvSpPr>
+          <p:spPr>
+            <a:xfrm>
+              <a:off x="5188283" y="4169365"/>
               <a:ext cx="0" cy="34794"/>
             </a:xfrm>
             <a:custGeom>
@@ -6857,13 +6599,13 @@
         </p:sp>
         <p:sp>
           <p:nvSpPr>
-            <p:cNvPr id="119" name="pl118"/>
-            <p:cNvSpPr/>
-            <p:nvPr/>
-          </p:nvSpPr>
-          <p:spPr>
-            <a:xfrm>
-              <a:off x="4763942" y="4169365"/>
+            <p:cNvPr id="113" name="pl112"/>
+            <p:cNvSpPr/>
+            <p:nvPr/>
+          </p:nvSpPr>
+          <p:spPr>
+            <a:xfrm>
+              <a:off x="5541901" y="4169365"/>
               <a:ext cx="0" cy="34794"/>
             </a:xfrm>
             <a:custGeom>
@@ -6897,127 +6639,7 @@
         </p:sp>
         <p:sp>
           <p:nvSpPr>
-            <p:cNvPr id="120" name="pl119"/>
-            <p:cNvSpPr/>
-            <p:nvPr/>
-          </p:nvSpPr>
-          <p:spPr>
-            <a:xfrm>
-              <a:off x="5046836" y="4169365"/>
-              <a:ext cx="0" cy="34794"/>
-            </a:xfrm>
-            <a:custGeom>
-              <a:avLst/>
-              <a:pathLst>
-                <a:path w="0" h="34794">
-                  <a:moveTo>
-                    <a:pt x="0" y="34794"/>
-                  </a:moveTo>
-                  <a:lnTo>
-                    <a:pt x="0" y="0"/>
-                  </a:lnTo>
-                </a:path>
-              </a:pathLst>
-            </a:custGeom>
-            <a:ln w="13550" cap="flat">
-              <a:solidFill>
-                <a:srgbClr val="333333">
-                  <a:alpha val="100000"/>
-                </a:srgbClr>
-              </a:solidFill>
-              <a:prstDash val="solid"/>
-              <a:round/>
-            </a:ln>
-          </p:spPr>
-          <p:txBody>
-            <a:bodyPr/>
-            <a:lstStyle/>
-            <a:p/>
-          </p:txBody>
-        </p:sp>
-        <p:sp>
-          <p:nvSpPr>
-            <p:cNvPr id="121" name="pl120"/>
-            <p:cNvSpPr/>
-            <p:nvPr/>
-          </p:nvSpPr>
-          <p:spPr>
-            <a:xfrm>
-              <a:off x="5329730" y="4169365"/>
-              <a:ext cx="0" cy="34794"/>
-            </a:xfrm>
-            <a:custGeom>
-              <a:avLst/>
-              <a:pathLst>
-                <a:path w="0" h="34794">
-                  <a:moveTo>
-                    <a:pt x="0" y="34794"/>
-                  </a:moveTo>
-                  <a:lnTo>
-                    <a:pt x="0" y="0"/>
-                  </a:lnTo>
-                </a:path>
-              </a:pathLst>
-            </a:custGeom>
-            <a:ln w="13550" cap="flat">
-              <a:solidFill>
-                <a:srgbClr val="333333">
-                  <a:alpha val="100000"/>
-                </a:srgbClr>
-              </a:solidFill>
-              <a:prstDash val="solid"/>
-              <a:round/>
-            </a:ln>
-          </p:spPr>
-          <p:txBody>
-            <a:bodyPr/>
-            <a:lstStyle/>
-            <a:p/>
-          </p:txBody>
-        </p:sp>
-        <p:sp>
-          <p:nvSpPr>
-            <p:cNvPr id="122" name="pl121"/>
-            <p:cNvSpPr/>
-            <p:nvPr/>
-          </p:nvSpPr>
-          <p:spPr>
-            <a:xfrm>
-              <a:off x="5612624" y="4169365"/>
-              <a:ext cx="0" cy="34794"/>
-            </a:xfrm>
-            <a:custGeom>
-              <a:avLst/>
-              <a:pathLst>
-                <a:path w="0" h="34794">
-                  <a:moveTo>
-                    <a:pt x="0" y="34794"/>
-                  </a:moveTo>
-                  <a:lnTo>
-                    <a:pt x="0" y="0"/>
-                  </a:lnTo>
-                </a:path>
-              </a:pathLst>
-            </a:custGeom>
-            <a:ln w="13550" cap="flat">
-              <a:solidFill>
-                <a:srgbClr val="333333">
-                  <a:alpha val="100000"/>
-                </a:srgbClr>
-              </a:solidFill>
-              <a:prstDash val="solid"/>
-              <a:round/>
-            </a:ln>
-          </p:spPr>
-          <p:txBody>
-            <a:bodyPr/>
-            <a:lstStyle/>
-            <a:p/>
-          </p:txBody>
-        </p:sp>
-        <p:sp>
-          <p:nvSpPr>
-            <p:cNvPr id="123" name="tx122"/>
+            <p:cNvPr id="114" name="tx113"/>
             <p:cNvSpPr/>
             <p:nvPr/>
           </p:nvSpPr>
@@ -7063,14 +6685,14 @@
         </p:sp>
         <p:sp>
           <p:nvSpPr>
-            <p:cNvPr id="124" name="tx123"/>
-            <p:cNvSpPr/>
-            <p:nvPr/>
-          </p:nvSpPr>
-          <p:spPr>
-            <a:xfrm>
-              <a:off x="1899449" y="4231995"/>
-              <a:ext cx="71105" cy="81473"/>
+            <p:cNvPr id="115" name="tx114"/>
+            <p:cNvSpPr/>
+            <p:nvPr/>
+          </p:nvSpPr>
+          <p:spPr>
+            <a:xfrm>
+              <a:off x="1970173" y="4230412"/>
+              <a:ext cx="71105" cy="83056"/>
             </a:xfrm>
             <a:prstGeom prst="rect">
               <a:avLst/>
@@ -7102,21 +6724,21 @@
                   <a:latin typeface="DejaVu Sans"/>
                   <a:cs typeface="DejaVu Sans"/>
                 </a:rPr>
-                <a:t>4</a:t>
+                <a:t>5</a:t>
               </a:r>
             </a:p>
           </p:txBody>
         </p:sp>
         <p:sp>
           <p:nvSpPr>
-            <p:cNvPr id="125" name="tx124"/>
-            <p:cNvSpPr/>
-            <p:nvPr/>
-          </p:nvSpPr>
-          <p:spPr>
-            <a:xfrm>
-              <a:off x="2182343" y="4228939"/>
-              <a:ext cx="71105" cy="84529"/>
+            <p:cNvPr id="116" name="tx115"/>
+            <p:cNvSpPr/>
+            <p:nvPr/>
+          </p:nvSpPr>
+          <p:spPr>
+            <a:xfrm>
+              <a:off x="2288238" y="4228939"/>
+              <a:ext cx="142210" cy="84529"/>
             </a:xfrm>
             <a:prstGeom prst="rect">
               <a:avLst/>
@@ -7148,21 +6770,21 @@
                   <a:latin typeface="DejaVu Sans"/>
                   <a:cs typeface="DejaVu Sans"/>
                 </a:rPr>
-                <a:t>8</a:t>
+                <a:t>10</a:t>
               </a:r>
             </a:p>
           </p:txBody>
         </p:sp>
         <p:sp>
           <p:nvSpPr>
-            <p:cNvPr id="126" name="tx125"/>
-            <p:cNvSpPr/>
-            <p:nvPr/>
-          </p:nvSpPr>
-          <p:spPr>
-            <a:xfrm>
-              <a:off x="2429685" y="4230522"/>
-              <a:ext cx="142210" cy="82946"/>
+            <p:cNvPr id="117" name="tx116"/>
+            <p:cNvSpPr/>
+            <p:nvPr/>
+          </p:nvSpPr>
+          <p:spPr>
+            <a:xfrm>
+              <a:off x="2641855" y="4230412"/>
+              <a:ext cx="142210" cy="83056"/>
             </a:xfrm>
             <a:prstGeom prst="rect">
               <a:avLst/>
@@ -7194,60 +6816,14 @@
                   <a:latin typeface="DejaVu Sans"/>
                   <a:cs typeface="DejaVu Sans"/>
                 </a:rPr>
-                <a:t>12</a:t>
+                <a:t>15</a:t>
               </a:r>
             </a:p>
           </p:txBody>
         </p:sp>
         <p:sp>
           <p:nvSpPr>
-            <p:cNvPr id="127" name="tx126"/>
-            <p:cNvSpPr/>
-            <p:nvPr/>
-          </p:nvSpPr>
-          <p:spPr>
-            <a:xfrm>
-              <a:off x="2712579" y="4228939"/>
-              <a:ext cx="142210" cy="84529"/>
-            </a:xfrm>
-            <a:prstGeom prst="rect">
-              <a:avLst/>
-            </a:prstGeom>
-            <a:noFill/>
-          </p:spPr>
-          <p:txBody>
-            <a:bodyPr lIns="0" rIns="0" tIns="0" bIns="0" anchorCtr="1" anchor="ctr" wrap="none"/>
-            <a:lstStyle/>
-            <a:p>
-              <a:pPr algn="l" marL="0" marR="0" indent="0">
-                <a:lnSpc>
-                  <a:spcPts val="880"/>
-                </a:lnSpc>
-                <a:spcBef>
-                  <a:spcPts val="0"/>
-                </a:spcBef>
-                <a:spcAft>
-                  <a:spcPts val="0"/>
-                </a:spcAft>
-              </a:pPr>
-              <a:r>
-                <a:rPr sz="880">
-                  <a:solidFill>
-                    <a:srgbClr val="4D4D4D">
-                      <a:alpha val="100000"/>
-                    </a:srgbClr>
-                  </a:solidFill>
-                  <a:latin typeface="DejaVu Sans"/>
-                  <a:cs typeface="DejaVu Sans"/>
-                </a:rPr>
-                <a:t>16</a:t>
-              </a:r>
-            </a:p>
-          </p:txBody>
-        </p:sp>
-        <p:sp>
-          <p:nvSpPr>
-            <p:cNvPr id="128" name="tx127"/>
+            <p:cNvPr id="118" name="tx117"/>
             <p:cNvSpPr/>
             <p:nvPr/>
           </p:nvSpPr>
@@ -7293,14 +6869,14 @@
         </p:sp>
         <p:sp>
           <p:nvSpPr>
-            <p:cNvPr id="129" name="tx128"/>
-            <p:cNvSpPr/>
-            <p:nvPr/>
-          </p:nvSpPr>
-          <p:spPr>
-            <a:xfrm>
-              <a:off x="3278367" y="4230522"/>
-              <a:ext cx="142210" cy="82946"/>
+            <p:cNvPr id="119" name="tx118"/>
+            <p:cNvSpPr/>
+            <p:nvPr/>
+          </p:nvSpPr>
+          <p:spPr>
+            <a:xfrm>
+              <a:off x="3349090" y="4228939"/>
+              <a:ext cx="142210" cy="84529"/>
             </a:xfrm>
             <a:prstGeom prst="rect">
               <a:avLst/>
@@ -7332,20 +6908,20 @@
                   <a:latin typeface="DejaVu Sans"/>
                   <a:cs typeface="DejaVu Sans"/>
                 </a:rPr>
-                <a:t>24</a:t>
+                <a:t>25</a:t>
               </a:r>
             </a:p>
           </p:txBody>
         </p:sp>
         <p:sp>
           <p:nvSpPr>
-            <p:cNvPr id="130" name="tx129"/>
-            <p:cNvSpPr/>
-            <p:nvPr/>
-          </p:nvSpPr>
-          <p:spPr>
-            <a:xfrm>
-              <a:off x="3561261" y="4228939"/>
+            <p:cNvPr id="120" name="tx119"/>
+            <p:cNvSpPr/>
+            <p:nvPr/>
+          </p:nvSpPr>
+          <p:spPr>
+            <a:xfrm>
+              <a:off x="3702708" y="4228939"/>
               <a:ext cx="142210" cy="84529"/>
             </a:xfrm>
             <a:prstGeom prst="rect">
@@ -7378,20 +6954,20 @@
                   <a:latin typeface="DejaVu Sans"/>
                   <a:cs typeface="DejaVu Sans"/>
                 </a:rPr>
-                <a:t>28</a:t>
+                <a:t>30</a:t>
               </a:r>
             </a:p>
           </p:txBody>
         </p:sp>
         <p:sp>
           <p:nvSpPr>
-            <p:cNvPr id="131" name="tx130"/>
-            <p:cNvSpPr/>
-            <p:nvPr/>
-          </p:nvSpPr>
-          <p:spPr>
-            <a:xfrm>
-              <a:off x="3844155" y="4228939"/>
+            <p:cNvPr id="121" name="tx120"/>
+            <p:cNvSpPr/>
+            <p:nvPr/>
+          </p:nvSpPr>
+          <p:spPr>
+            <a:xfrm>
+              <a:off x="4056326" y="4228939"/>
               <a:ext cx="142210" cy="84529"/>
             </a:xfrm>
             <a:prstGeom prst="rect">
@@ -7424,60 +7000,14 @@
                   <a:latin typeface="DejaVu Sans"/>
                   <a:cs typeface="DejaVu Sans"/>
                 </a:rPr>
-                <a:t>32</a:t>
+                <a:t>35</a:t>
               </a:r>
             </a:p>
           </p:txBody>
         </p:sp>
         <p:sp>
           <p:nvSpPr>
-            <p:cNvPr id="132" name="tx131"/>
-            <p:cNvSpPr/>
-            <p:nvPr/>
-          </p:nvSpPr>
-          <p:spPr>
-            <a:xfrm>
-              <a:off x="4127049" y="4228939"/>
-              <a:ext cx="142210" cy="84529"/>
-            </a:xfrm>
-            <a:prstGeom prst="rect">
-              <a:avLst/>
-            </a:prstGeom>
-            <a:noFill/>
-          </p:spPr>
-          <p:txBody>
-            <a:bodyPr lIns="0" rIns="0" tIns="0" bIns="0" anchorCtr="1" anchor="ctr" wrap="none"/>
-            <a:lstStyle/>
-            <a:p>
-              <a:pPr algn="l" marL="0" marR="0" indent="0">
-                <a:lnSpc>
-                  <a:spcPts val="880"/>
-                </a:lnSpc>
-                <a:spcBef>
-                  <a:spcPts val="0"/>
-                </a:spcBef>
-                <a:spcAft>
-                  <a:spcPts val="0"/>
-                </a:spcAft>
-              </a:pPr>
-              <a:r>
-                <a:rPr sz="880">
-                  <a:solidFill>
-                    <a:srgbClr val="4D4D4D">
-                      <a:alpha val="100000"/>
-                    </a:srgbClr>
-                  </a:solidFill>
-                  <a:latin typeface="DejaVu Sans"/>
-                  <a:cs typeface="DejaVu Sans"/>
-                </a:rPr>
-                <a:t>36</a:t>
-              </a:r>
-            </a:p>
-          </p:txBody>
-        </p:sp>
-        <p:sp>
-          <p:nvSpPr>
-            <p:cNvPr id="133" name="tx132"/>
+            <p:cNvPr id="122" name="tx121"/>
             <p:cNvSpPr/>
             <p:nvPr/>
           </p:nvSpPr>
@@ -7523,14 +7053,14 @@
         </p:sp>
         <p:sp>
           <p:nvSpPr>
-            <p:cNvPr id="134" name="tx133"/>
-            <p:cNvSpPr/>
-            <p:nvPr/>
-          </p:nvSpPr>
-          <p:spPr>
-            <a:xfrm>
-              <a:off x="4692837" y="4231995"/>
-              <a:ext cx="142210" cy="81473"/>
+            <p:cNvPr id="123" name="tx122"/>
+            <p:cNvSpPr/>
+            <p:nvPr/>
+          </p:nvSpPr>
+          <p:spPr>
+            <a:xfrm>
+              <a:off x="4763561" y="4230412"/>
+              <a:ext cx="142210" cy="83056"/>
             </a:xfrm>
             <a:prstGeom prst="rect">
               <a:avLst/>
@@ -7562,20 +7092,20 @@
                   <a:latin typeface="DejaVu Sans"/>
                   <a:cs typeface="DejaVu Sans"/>
                 </a:rPr>
-                <a:t>44</a:t>
+                <a:t>45</a:t>
               </a:r>
             </a:p>
           </p:txBody>
         </p:sp>
         <p:sp>
           <p:nvSpPr>
-            <p:cNvPr id="135" name="tx134"/>
-            <p:cNvSpPr/>
-            <p:nvPr/>
-          </p:nvSpPr>
-          <p:spPr>
-            <a:xfrm>
-              <a:off x="4975731" y="4228939"/>
+            <p:cNvPr id="124" name="tx123"/>
+            <p:cNvSpPr/>
+            <p:nvPr/>
+          </p:nvSpPr>
+          <p:spPr>
+            <a:xfrm>
+              <a:off x="5117178" y="4228939"/>
               <a:ext cx="142210" cy="84529"/>
             </a:xfrm>
             <a:prstGeom prst="rect">
@@ -7608,21 +7138,21 @@
                   <a:latin typeface="DejaVu Sans"/>
                   <a:cs typeface="DejaVu Sans"/>
                 </a:rPr>
-                <a:t>48</a:t>
+                <a:t>50</a:t>
               </a:r>
             </a:p>
           </p:txBody>
         </p:sp>
         <p:sp>
           <p:nvSpPr>
-            <p:cNvPr id="136" name="tx135"/>
-            <p:cNvSpPr/>
-            <p:nvPr/>
-          </p:nvSpPr>
-          <p:spPr>
-            <a:xfrm>
-              <a:off x="5258625" y="4228939"/>
-              <a:ext cx="142210" cy="84529"/>
+            <p:cNvPr id="125" name="tx124"/>
+            <p:cNvSpPr/>
+            <p:nvPr/>
+          </p:nvSpPr>
+          <p:spPr>
+            <a:xfrm>
+              <a:off x="5470796" y="4230412"/>
+              <a:ext cx="142210" cy="83056"/>
             </a:xfrm>
             <a:prstGeom prst="rect">
               <a:avLst/>
@@ -7654,60 +7184,14 @@
                   <a:latin typeface="DejaVu Sans"/>
                   <a:cs typeface="DejaVu Sans"/>
                 </a:rPr>
-                <a:t>52</a:t>
+                <a:t>55</a:t>
               </a:r>
             </a:p>
           </p:txBody>
         </p:sp>
         <p:sp>
           <p:nvSpPr>
-            <p:cNvPr id="137" name="tx136"/>
-            <p:cNvSpPr/>
-            <p:nvPr/>
-          </p:nvSpPr>
-          <p:spPr>
-            <a:xfrm>
-              <a:off x="5541519" y="4228939"/>
-              <a:ext cx="142210" cy="84529"/>
-            </a:xfrm>
-            <a:prstGeom prst="rect">
-              <a:avLst/>
-            </a:prstGeom>
-            <a:noFill/>
-          </p:spPr>
-          <p:txBody>
-            <a:bodyPr lIns="0" rIns="0" tIns="0" bIns="0" anchorCtr="1" anchor="ctr" wrap="none"/>
-            <a:lstStyle/>
-            <a:p>
-              <a:pPr algn="l" marL="0" marR="0" indent="0">
-                <a:lnSpc>
-                  <a:spcPts val="880"/>
-                </a:lnSpc>
-                <a:spcBef>
-                  <a:spcPts val="0"/>
-                </a:spcBef>
-                <a:spcAft>
-                  <a:spcPts val="0"/>
-                </a:spcAft>
-              </a:pPr>
-              <a:r>
-                <a:rPr sz="880">
-                  <a:solidFill>
-                    <a:srgbClr val="4D4D4D">
-                      <a:alpha val="100000"/>
-                    </a:srgbClr>
-                  </a:solidFill>
-                  <a:latin typeface="DejaVu Sans"/>
-                  <a:cs typeface="DejaVu Sans"/>
-                </a:rPr>
-                <a:t>56</a:t>
-              </a:r>
-            </a:p>
-          </p:txBody>
-        </p:sp>
-        <p:sp>
-          <p:nvSpPr>
-            <p:cNvPr id="138" name="tx137"/>
+            <p:cNvPr id="126" name="tx125"/>
             <p:cNvSpPr/>
             <p:nvPr/>
           </p:nvSpPr>
@@ -7753,7 +7237,7 @@
         </p:sp>
         <p:sp>
           <p:nvSpPr>
-            <p:cNvPr id="139" name="tx138"/>
+            <p:cNvPr id="127" name="tx126"/>
             <p:cNvSpPr/>
             <p:nvPr/>
           </p:nvSpPr>
@@ -7799,7 +7283,7 @@
         </p:sp>
         <p:sp>
           <p:nvSpPr>
-            <p:cNvPr id="140" name="rc139"/>
+            <p:cNvPr id="128" name="rc127"/>
             <p:cNvSpPr/>
             <p:nvPr/>
           </p:nvSpPr>
@@ -7825,7 +7309,7 @@
         </p:sp>
         <p:sp>
           <p:nvSpPr>
-            <p:cNvPr id="141" name="tx140"/>
+            <p:cNvPr id="129" name="tx128"/>
             <p:cNvSpPr/>
             <p:nvPr/>
           </p:nvSpPr>
@@ -7871,7 +7355,7 @@
         </p:sp>
         <p:sp>
           <p:nvSpPr>
-            <p:cNvPr id="142" name="rc141"/>
+            <p:cNvPr id="130" name="rc129"/>
             <p:cNvSpPr/>
             <p:nvPr/>
           </p:nvSpPr>
@@ -7897,7 +7381,7 @@
         </p:sp>
         <p:sp>
           <p:nvSpPr>
-            <p:cNvPr id="143" name="pl142"/>
+            <p:cNvPr id="131" name="pl130"/>
             <p:cNvSpPr/>
             <p:nvPr/>
           </p:nvSpPr>
@@ -7937,7 +7421,7 @@
         </p:sp>
         <p:sp>
           <p:nvSpPr>
-            <p:cNvPr id="144" name="pt143"/>
+            <p:cNvPr id="132" name="pt131"/>
             <p:cNvSpPr/>
             <p:nvPr/>
           </p:nvSpPr>
@@ -7972,7 +7456,7 @@
         </p:sp>
         <p:sp>
           <p:nvSpPr>
-            <p:cNvPr id="145" name="tx144"/>
+            <p:cNvPr id="133" name="tx132"/>
             <p:cNvSpPr/>
             <p:nvPr/>
           </p:nvSpPr>

</xml_diff>

<commit_message>
Deploying to gh-pages from @ sean4andrew/safuncs@9de0376b9a252f3e07d58047ff2b409ba6c18a22 🚀
</commit_message>
<xml_diff>
--- a/reference/ONDA_XX-Hazard-Curve.pptx
+++ b/reference/ONDA_XX-Hazard-Curve.pptx
@@ -2334,7 +2334,7 @@
           <p:spPr>
             <a:xfrm>
               <a:off x="1461154" y="983989"/>
-              <a:ext cx="4200976" cy="3185376"/>
+              <a:ext cx="4142600" cy="3185376"/>
             </a:xfrm>
             <a:prstGeom prst="rect">
               <a:avLst/>
@@ -2360,20 +2360,20 @@
           <p:spPr>
             <a:xfrm>
               <a:off x="1461154" y="3601355"/>
-              <a:ext cx="4200976" cy="0"/>
+              <a:ext cx="4142600" cy="0"/>
             </a:xfrm>
             <a:custGeom>
               <a:avLst/>
               <a:pathLst>
-                <a:path w="4200976" h="0">
+                <a:path w="4142600" h="0">
                   <a:moveTo>
                     <a:pt x="0" y="0"/>
                   </a:moveTo>
                   <a:lnTo>
-                    <a:pt x="4200976" y="0"/>
-                  </a:lnTo>
-                  <a:lnTo>
-                    <a:pt x="4200976" y="0"/>
+                    <a:pt x="4142600" y="0"/>
+                  </a:lnTo>
+                  <a:lnTo>
+                    <a:pt x="4142600" y="0"/>
                   </a:lnTo>
                 </a:path>
               </a:pathLst>
@@ -2403,20 +2403,20 @@
           <p:spPr>
             <a:xfrm>
               <a:off x="1461154" y="2754914"/>
-              <a:ext cx="4200976" cy="0"/>
+              <a:ext cx="4142600" cy="0"/>
             </a:xfrm>
             <a:custGeom>
               <a:avLst/>
               <a:pathLst>
-                <a:path w="4200976" h="0">
+                <a:path w="4142600" h="0">
                   <a:moveTo>
                     <a:pt x="0" y="0"/>
                   </a:moveTo>
                   <a:lnTo>
-                    <a:pt x="4200976" y="0"/>
-                  </a:lnTo>
-                  <a:lnTo>
-                    <a:pt x="4200976" y="0"/>
+                    <a:pt x="4142600" y="0"/>
+                  </a:lnTo>
+                  <a:lnTo>
+                    <a:pt x="4142600" y="0"/>
                   </a:lnTo>
                 </a:path>
               </a:pathLst>
@@ -2446,20 +2446,20 @@
           <p:spPr>
             <a:xfrm>
               <a:off x="1461154" y="1908473"/>
-              <a:ext cx="4200976" cy="0"/>
+              <a:ext cx="4142600" cy="0"/>
             </a:xfrm>
             <a:custGeom>
               <a:avLst/>
               <a:pathLst>
-                <a:path w="4200976" h="0">
+                <a:path w="4142600" h="0">
                   <a:moveTo>
                     <a:pt x="0" y="0"/>
                   </a:moveTo>
                   <a:lnTo>
-                    <a:pt x="4200976" y="0"/>
-                  </a:lnTo>
-                  <a:lnTo>
-                    <a:pt x="4200976" y="0"/>
+                    <a:pt x="4142600" y="0"/>
+                  </a:lnTo>
+                  <a:lnTo>
+                    <a:pt x="4142600" y="0"/>
                   </a:lnTo>
                 </a:path>
               </a:pathLst>
@@ -2489,20 +2489,20 @@
           <p:spPr>
             <a:xfrm>
               <a:off x="1461154" y="1062033"/>
-              <a:ext cx="4200976" cy="0"/>
+              <a:ext cx="4142600" cy="0"/>
             </a:xfrm>
             <a:custGeom>
               <a:avLst/>
               <a:pathLst>
-                <a:path w="4200976" h="0">
+                <a:path w="4142600" h="0">
                   <a:moveTo>
                     <a:pt x="0" y="0"/>
                   </a:moveTo>
                   <a:lnTo>
-                    <a:pt x="4200976" y="0"/>
-                  </a:lnTo>
-                  <a:lnTo>
-                    <a:pt x="4200976" y="0"/>
+                    <a:pt x="4142600" y="0"/>
+                  </a:lnTo>
+                  <a:lnTo>
+                    <a:pt x="4142600" y="0"/>
                   </a:lnTo>
                 </a:path>
               </a:pathLst>
@@ -2531,7 +2531,7 @@
           </p:nvSpPr>
           <p:spPr>
             <a:xfrm>
-              <a:off x="1475299" y="983989"/>
+              <a:off x="1475103" y="983989"/>
               <a:ext cx="0" cy="3185376"/>
             </a:xfrm>
             <a:custGeom>
@@ -2574,7 +2574,7 @@
           </p:nvSpPr>
           <p:spPr>
             <a:xfrm>
-              <a:off x="1828917" y="983989"/>
+              <a:off x="1823806" y="983989"/>
               <a:ext cx="0" cy="3185376"/>
             </a:xfrm>
             <a:custGeom>
@@ -2617,7 +2617,7 @@
           </p:nvSpPr>
           <p:spPr>
             <a:xfrm>
-              <a:off x="2182534" y="983989"/>
+              <a:off x="2172510" y="983989"/>
               <a:ext cx="0" cy="3185376"/>
             </a:xfrm>
             <a:custGeom>
@@ -2660,7 +2660,7 @@
           </p:nvSpPr>
           <p:spPr>
             <a:xfrm>
-              <a:off x="2536152" y="983989"/>
+              <a:off x="2521214" y="983989"/>
               <a:ext cx="0" cy="3185376"/>
             </a:xfrm>
             <a:custGeom>
@@ -2703,7 +2703,7 @@
           </p:nvSpPr>
           <p:spPr>
             <a:xfrm>
-              <a:off x="2889769" y="983989"/>
+              <a:off x="2869917" y="983989"/>
               <a:ext cx="0" cy="3185376"/>
             </a:xfrm>
             <a:custGeom>
@@ -2746,7 +2746,7 @@
           </p:nvSpPr>
           <p:spPr>
             <a:xfrm>
-              <a:off x="3243387" y="983989"/>
+              <a:off x="3218621" y="983989"/>
               <a:ext cx="0" cy="3185376"/>
             </a:xfrm>
             <a:custGeom>
@@ -2789,7 +2789,7 @@
           </p:nvSpPr>
           <p:spPr>
             <a:xfrm>
-              <a:off x="3597004" y="983989"/>
+              <a:off x="3567325" y="983989"/>
               <a:ext cx="0" cy="3185376"/>
             </a:xfrm>
             <a:custGeom>
@@ -2832,7 +2832,7 @@
           </p:nvSpPr>
           <p:spPr>
             <a:xfrm>
-              <a:off x="3950622" y="983989"/>
+              <a:off x="3916029" y="983989"/>
               <a:ext cx="0" cy="3185376"/>
             </a:xfrm>
             <a:custGeom>
@@ -2875,7 +2875,7 @@
           </p:nvSpPr>
           <p:spPr>
             <a:xfrm>
-              <a:off x="4304239" y="983989"/>
+              <a:off x="4264732" y="983989"/>
               <a:ext cx="0" cy="3185376"/>
             </a:xfrm>
             <a:custGeom>
@@ -2918,7 +2918,7 @@
           </p:nvSpPr>
           <p:spPr>
             <a:xfrm>
-              <a:off x="4657857" y="983989"/>
+              <a:off x="4613436" y="983989"/>
               <a:ext cx="0" cy="3185376"/>
             </a:xfrm>
             <a:custGeom>
@@ -2961,7 +2961,7 @@
           </p:nvSpPr>
           <p:spPr>
             <a:xfrm>
-              <a:off x="5011475" y="983989"/>
+              <a:off x="4962140" y="983989"/>
               <a:ext cx="0" cy="3185376"/>
             </a:xfrm>
             <a:custGeom>
@@ -3004,7 +3004,7 @@
           </p:nvSpPr>
           <p:spPr>
             <a:xfrm>
-              <a:off x="5365092" y="983989"/>
+              <a:off x="5310843" y="983989"/>
               <a:ext cx="0" cy="3185376"/>
             </a:xfrm>
             <a:custGeom>
@@ -3048,20 +3048,20 @@
           <p:spPr>
             <a:xfrm>
               <a:off x="1461154" y="4024575"/>
-              <a:ext cx="4200976" cy="0"/>
+              <a:ext cx="4142600" cy="0"/>
             </a:xfrm>
             <a:custGeom>
               <a:avLst/>
               <a:pathLst>
-                <a:path w="4200976" h="0">
+                <a:path w="4142600" h="0">
                   <a:moveTo>
                     <a:pt x="0" y="0"/>
                   </a:moveTo>
                   <a:lnTo>
-                    <a:pt x="4200976" y="0"/>
-                  </a:lnTo>
-                  <a:lnTo>
-                    <a:pt x="4200976" y="0"/>
+                    <a:pt x="4142600" y="0"/>
+                  </a:lnTo>
+                  <a:lnTo>
+                    <a:pt x="4142600" y="0"/>
                   </a:lnTo>
                 </a:path>
               </a:pathLst>
@@ -3091,20 +3091,20 @@
           <p:spPr>
             <a:xfrm>
               <a:off x="1461154" y="3178134"/>
-              <a:ext cx="4200976" cy="0"/>
+              <a:ext cx="4142600" cy="0"/>
             </a:xfrm>
             <a:custGeom>
               <a:avLst/>
               <a:pathLst>
-                <a:path w="4200976" h="0">
+                <a:path w="4142600" h="0">
                   <a:moveTo>
                     <a:pt x="0" y="0"/>
                   </a:moveTo>
                   <a:lnTo>
-                    <a:pt x="4200976" y="0"/>
-                  </a:lnTo>
-                  <a:lnTo>
-                    <a:pt x="4200976" y="0"/>
+                    <a:pt x="4142600" y="0"/>
+                  </a:lnTo>
+                  <a:lnTo>
+                    <a:pt x="4142600" y="0"/>
                   </a:lnTo>
                 </a:path>
               </a:pathLst>
@@ -3134,20 +3134,20 @@
           <p:spPr>
             <a:xfrm>
               <a:off x="1461154" y="2331694"/>
-              <a:ext cx="4200976" cy="0"/>
+              <a:ext cx="4142600" cy="0"/>
             </a:xfrm>
             <a:custGeom>
               <a:avLst/>
               <a:pathLst>
-                <a:path w="4200976" h="0">
+                <a:path w="4142600" h="0">
                   <a:moveTo>
                     <a:pt x="0" y="0"/>
                   </a:moveTo>
                   <a:lnTo>
-                    <a:pt x="4200976" y="0"/>
-                  </a:lnTo>
-                  <a:lnTo>
-                    <a:pt x="4200976" y="0"/>
+                    <a:pt x="4142600" y="0"/>
+                  </a:lnTo>
+                  <a:lnTo>
+                    <a:pt x="4142600" y="0"/>
                   </a:lnTo>
                 </a:path>
               </a:pathLst>
@@ -3177,20 +3177,20 @@
           <p:spPr>
             <a:xfrm>
               <a:off x="1461154" y="1485253"/>
-              <a:ext cx="4200976" cy="0"/>
+              <a:ext cx="4142600" cy="0"/>
             </a:xfrm>
             <a:custGeom>
               <a:avLst/>
               <a:pathLst>
-                <a:path w="4200976" h="0">
+                <a:path w="4142600" h="0">
                   <a:moveTo>
                     <a:pt x="0" y="0"/>
                   </a:moveTo>
                   <a:lnTo>
-                    <a:pt x="4200976" y="0"/>
-                  </a:lnTo>
-                  <a:lnTo>
-                    <a:pt x="4200976" y="0"/>
+                    <a:pt x="4142600" y="0"/>
+                  </a:lnTo>
+                  <a:lnTo>
+                    <a:pt x="4142600" y="0"/>
                   </a:lnTo>
                 </a:path>
               </a:pathLst>
@@ -3219,7 +3219,7 @@
           </p:nvSpPr>
           <p:spPr>
             <a:xfrm>
-              <a:off x="1652108" y="983989"/>
+              <a:off x="1649454" y="983989"/>
               <a:ext cx="0" cy="3185376"/>
             </a:xfrm>
             <a:custGeom>
@@ -3262,7 +3262,7 @@
           </p:nvSpPr>
           <p:spPr>
             <a:xfrm>
-              <a:off x="2005725" y="983989"/>
+              <a:off x="1998158" y="983989"/>
               <a:ext cx="0" cy="3185376"/>
             </a:xfrm>
             <a:custGeom>
@@ -3305,7 +3305,7 @@
           </p:nvSpPr>
           <p:spPr>
             <a:xfrm>
-              <a:off x="2359343" y="983989"/>
+              <a:off x="2346862" y="983989"/>
               <a:ext cx="0" cy="3185376"/>
             </a:xfrm>
             <a:custGeom>
@@ -3348,7 +3348,7 @@
           </p:nvSpPr>
           <p:spPr>
             <a:xfrm>
-              <a:off x="2712960" y="983989"/>
+              <a:off x="2695566" y="983989"/>
               <a:ext cx="0" cy="3185376"/>
             </a:xfrm>
             <a:custGeom>
@@ -3391,7 +3391,7 @@
           </p:nvSpPr>
           <p:spPr>
             <a:xfrm>
-              <a:off x="3066578" y="983989"/>
+              <a:off x="3044269" y="983989"/>
               <a:ext cx="0" cy="3185376"/>
             </a:xfrm>
             <a:custGeom>
@@ -3434,7 +3434,7 @@
           </p:nvSpPr>
           <p:spPr>
             <a:xfrm>
-              <a:off x="3420196" y="983989"/>
+              <a:off x="3392973" y="983989"/>
               <a:ext cx="0" cy="3185376"/>
             </a:xfrm>
             <a:custGeom>
@@ -3477,7 +3477,7 @@
           </p:nvSpPr>
           <p:spPr>
             <a:xfrm>
-              <a:off x="3773813" y="983989"/>
+              <a:off x="3741677" y="983989"/>
               <a:ext cx="0" cy="3185376"/>
             </a:xfrm>
             <a:custGeom>
@@ -3520,7 +3520,7 @@
           </p:nvSpPr>
           <p:spPr>
             <a:xfrm>
-              <a:off x="4127431" y="983989"/>
+              <a:off x="4090380" y="983989"/>
               <a:ext cx="0" cy="3185376"/>
             </a:xfrm>
             <a:custGeom>
@@ -3563,7 +3563,7 @@
           </p:nvSpPr>
           <p:spPr>
             <a:xfrm>
-              <a:off x="4481048" y="983989"/>
+              <a:off x="4439084" y="983989"/>
               <a:ext cx="0" cy="3185376"/>
             </a:xfrm>
             <a:custGeom>
@@ -3606,7 +3606,7 @@
           </p:nvSpPr>
           <p:spPr>
             <a:xfrm>
-              <a:off x="4834666" y="983989"/>
+              <a:off x="4787788" y="983989"/>
               <a:ext cx="0" cy="3185376"/>
             </a:xfrm>
             <a:custGeom>
@@ -3649,7 +3649,7 @@
           </p:nvSpPr>
           <p:spPr>
             <a:xfrm>
-              <a:off x="5188283" y="983989"/>
+              <a:off x="5136492" y="983989"/>
               <a:ext cx="0" cy="3185376"/>
             </a:xfrm>
             <a:custGeom>
@@ -3692,7 +3692,7 @@
           </p:nvSpPr>
           <p:spPr>
             <a:xfrm>
-              <a:off x="5541901" y="983989"/>
+              <a:off x="5485195" y="983989"/>
               <a:ext cx="0" cy="3185376"/>
             </a:xfrm>
             <a:custGeom>
@@ -3735,181 +3735,181 @@
           </p:nvSpPr>
           <p:spPr>
             <a:xfrm>
-              <a:off x="1687470" y="1128778"/>
-              <a:ext cx="3748346" cy="2895796"/>
+              <a:off x="1684325" y="1128778"/>
+              <a:ext cx="3696259" cy="2895796"/>
             </a:xfrm>
             <a:custGeom>
               <a:avLst/>
               <a:pathLst>
-                <a:path w="3748346" h="2895796">
+                <a:path w="3696259" h="2895796">
                   <a:moveTo>
                     <a:pt x="0" y="2895796"/>
                   </a:moveTo>
                   <a:lnTo>
-                    <a:pt x="70723" y="2895796"/>
-                  </a:lnTo>
-                  <a:lnTo>
-                    <a:pt x="141447" y="2895796"/>
-                  </a:lnTo>
-                  <a:lnTo>
-                    <a:pt x="212170" y="2895796"/>
-                  </a:lnTo>
-                  <a:lnTo>
-                    <a:pt x="282894" y="2895796"/>
-                  </a:lnTo>
-                  <a:lnTo>
-                    <a:pt x="353617" y="2895796"/>
-                  </a:lnTo>
-                  <a:lnTo>
-                    <a:pt x="424341" y="2895795"/>
-                  </a:lnTo>
-                  <a:lnTo>
-                    <a:pt x="495064" y="2895794"/>
-                  </a:lnTo>
-                  <a:lnTo>
-                    <a:pt x="565788" y="2895792"/>
-                  </a:lnTo>
-                  <a:lnTo>
-                    <a:pt x="636511" y="2895788"/>
-                  </a:lnTo>
-                  <a:lnTo>
-                    <a:pt x="707235" y="2895780"/>
-                  </a:lnTo>
-                  <a:lnTo>
-                    <a:pt x="777958" y="2895761"/>
-                  </a:lnTo>
-                  <a:lnTo>
-                    <a:pt x="848682" y="2895722"/>
-                  </a:lnTo>
-                  <a:lnTo>
-                    <a:pt x="919405" y="2895641"/>
-                  </a:lnTo>
-                  <a:lnTo>
-                    <a:pt x="990129" y="2895467"/>
-                  </a:lnTo>
-                  <a:lnTo>
-                    <a:pt x="1060852" y="2895102"/>
-                  </a:lnTo>
-                  <a:lnTo>
-                    <a:pt x="1131576" y="2894330"/>
-                  </a:lnTo>
-                  <a:lnTo>
-                    <a:pt x="1202299" y="2892704"/>
-                  </a:lnTo>
-                  <a:lnTo>
-                    <a:pt x="1273023" y="2889289"/>
-                  </a:lnTo>
-                  <a:lnTo>
-                    <a:pt x="1343746" y="2882150"/>
-                  </a:lnTo>
-                  <a:lnTo>
-                    <a:pt x="1414470" y="2867526"/>
-                  </a:lnTo>
-                  <a:lnTo>
-                    <a:pt x="1485193" y="2837768"/>
-                  </a:lnTo>
-                  <a:lnTo>
-                    <a:pt x="1555917" y="2783839"/>
-                  </a:lnTo>
-                  <a:lnTo>
-                    <a:pt x="1626640" y="2683813"/>
-                  </a:lnTo>
-                  <a:lnTo>
-                    <a:pt x="1697364" y="2531212"/>
-                  </a:lnTo>
-                  <a:lnTo>
-                    <a:pt x="1768087" y="2336226"/>
-                  </a:lnTo>
-                  <a:lnTo>
-                    <a:pt x="1838811" y="2267813"/>
-                  </a:lnTo>
-                  <a:lnTo>
-                    <a:pt x="1909534" y="2211885"/>
-                  </a:lnTo>
-                  <a:lnTo>
-                    <a:pt x="1980258" y="2173010"/>
-                  </a:lnTo>
-                  <a:lnTo>
-                    <a:pt x="2050981" y="1975660"/>
-                  </a:lnTo>
-                  <a:lnTo>
-                    <a:pt x="2121705" y="1642403"/>
-                  </a:lnTo>
-                  <a:lnTo>
-                    <a:pt x="2192428" y="1271367"/>
-                  </a:lnTo>
-                  <a:lnTo>
-                    <a:pt x="2263152" y="838577"/>
-                  </a:lnTo>
-                  <a:lnTo>
-                    <a:pt x="2333875" y="504086"/>
-                  </a:lnTo>
-                  <a:lnTo>
-                    <a:pt x="2404599" y="206204"/>
-                  </a:lnTo>
-                  <a:lnTo>
-                    <a:pt x="2475322" y="0"/>
-                  </a:lnTo>
-                  <a:lnTo>
-                    <a:pt x="2546046" y="407290"/>
-                  </a:lnTo>
-                  <a:lnTo>
-                    <a:pt x="2616769" y="985269"/>
-                  </a:lnTo>
-                  <a:lnTo>
-                    <a:pt x="2687493" y="1323640"/>
-                  </a:lnTo>
-                  <a:lnTo>
-                    <a:pt x="2758216" y="1609777"/>
-                  </a:lnTo>
-                  <a:lnTo>
-                    <a:pt x="2828940" y="1933298"/>
-                  </a:lnTo>
-                  <a:lnTo>
-                    <a:pt x="2899663" y="2082105"/>
-                  </a:lnTo>
-                  <a:lnTo>
-                    <a:pt x="2970387" y="2046800"/>
-                  </a:lnTo>
-                  <a:lnTo>
-                    <a:pt x="3041110" y="1893380"/>
-                  </a:lnTo>
-                  <a:lnTo>
-                    <a:pt x="3111834" y="1610544"/>
-                  </a:lnTo>
-                  <a:lnTo>
-                    <a:pt x="3182557" y="1424078"/>
-                  </a:lnTo>
-                  <a:lnTo>
-                    <a:pt x="3253281" y="1271332"/>
-                  </a:lnTo>
-                  <a:lnTo>
-                    <a:pt x="3324004" y="1424267"/>
-                  </a:lnTo>
-                  <a:lnTo>
-                    <a:pt x="3394728" y="1705603"/>
-                  </a:lnTo>
-                  <a:lnTo>
-                    <a:pt x="3465451" y="2156809"/>
-                  </a:lnTo>
-                  <a:lnTo>
-                    <a:pt x="3536175" y="2443154"/>
-                  </a:lnTo>
-                  <a:lnTo>
-                    <a:pt x="3606899" y="2621823"/>
-                  </a:lnTo>
-                  <a:lnTo>
-                    <a:pt x="3677622" y="2709088"/>
-                  </a:lnTo>
-                  <a:lnTo>
-                    <a:pt x="3748346" y="2763881"/>
+                    <a:pt x="69740" y="2895796"/>
+                  </a:lnTo>
+                  <a:lnTo>
+                    <a:pt x="139481" y="2895796"/>
+                  </a:lnTo>
+                  <a:lnTo>
+                    <a:pt x="209222" y="2895796"/>
+                  </a:lnTo>
+                  <a:lnTo>
+                    <a:pt x="278962" y="2895796"/>
+                  </a:lnTo>
+                  <a:lnTo>
+                    <a:pt x="348703" y="2895796"/>
+                  </a:lnTo>
+                  <a:lnTo>
+                    <a:pt x="418444" y="2895795"/>
+                  </a:lnTo>
+                  <a:lnTo>
+                    <a:pt x="488185" y="2895794"/>
+                  </a:lnTo>
+                  <a:lnTo>
+                    <a:pt x="557925" y="2895792"/>
+                  </a:lnTo>
+                  <a:lnTo>
+                    <a:pt x="627666" y="2895788"/>
+                  </a:lnTo>
+                  <a:lnTo>
+                    <a:pt x="697407" y="2895780"/>
+                  </a:lnTo>
+                  <a:lnTo>
+                    <a:pt x="767148" y="2895761"/>
+                  </a:lnTo>
+                  <a:lnTo>
+                    <a:pt x="836888" y="2895722"/>
+                  </a:lnTo>
+                  <a:lnTo>
+                    <a:pt x="906629" y="2895641"/>
+                  </a:lnTo>
+                  <a:lnTo>
+                    <a:pt x="976370" y="2895467"/>
+                  </a:lnTo>
+                  <a:lnTo>
+                    <a:pt x="1046111" y="2895102"/>
+                  </a:lnTo>
+                  <a:lnTo>
+                    <a:pt x="1115851" y="2894330"/>
+                  </a:lnTo>
+                  <a:lnTo>
+                    <a:pt x="1185592" y="2892704"/>
+                  </a:lnTo>
+                  <a:lnTo>
+                    <a:pt x="1255333" y="2889289"/>
+                  </a:lnTo>
+                  <a:lnTo>
+                    <a:pt x="1325074" y="2882150"/>
+                  </a:lnTo>
+                  <a:lnTo>
+                    <a:pt x="1394814" y="2867526"/>
+                  </a:lnTo>
+                  <a:lnTo>
+                    <a:pt x="1464555" y="2837768"/>
+                  </a:lnTo>
+                  <a:lnTo>
+                    <a:pt x="1534296" y="2783839"/>
+                  </a:lnTo>
+                  <a:lnTo>
+                    <a:pt x="1604037" y="2683813"/>
+                  </a:lnTo>
+                  <a:lnTo>
+                    <a:pt x="1673777" y="2531212"/>
+                  </a:lnTo>
+                  <a:lnTo>
+                    <a:pt x="1743518" y="2336226"/>
+                  </a:lnTo>
+                  <a:lnTo>
+                    <a:pt x="1813259" y="2267813"/>
+                  </a:lnTo>
+                  <a:lnTo>
+                    <a:pt x="1883000" y="2211885"/>
+                  </a:lnTo>
+                  <a:lnTo>
+                    <a:pt x="1952740" y="2173010"/>
+                  </a:lnTo>
+                  <a:lnTo>
+                    <a:pt x="2022481" y="1975660"/>
+                  </a:lnTo>
+                  <a:lnTo>
+                    <a:pt x="2092222" y="1642403"/>
+                  </a:lnTo>
+                  <a:lnTo>
+                    <a:pt x="2161963" y="1271367"/>
+                  </a:lnTo>
+                  <a:lnTo>
+                    <a:pt x="2231703" y="838577"/>
+                  </a:lnTo>
+                  <a:lnTo>
+                    <a:pt x="2301444" y="504086"/>
+                  </a:lnTo>
+                  <a:lnTo>
+                    <a:pt x="2371185" y="206204"/>
+                  </a:lnTo>
+                  <a:lnTo>
+                    <a:pt x="2440926" y="0"/>
+                  </a:lnTo>
+                  <a:lnTo>
+                    <a:pt x="2510666" y="407290"/>
+                  </a:lnTo>
+                  <a:lnTo>
+                    <a:pt x="2580407" y="985269"/>
+                  </a:lnTo>
+                  <a:lnTo>
+                    <a:pt x="2650148" y="1323640"/>
+                  </a:lnTo>
+                  <a:lnTo>
+                    <a:pt x="2719888" y="1609777"/>
+                  </a:lnTo>
+                  <a:lnTo>
+                    <a:pt x="2789629" y="1933298"/>
+                  </a:lnTo>
+                  <a:lnTo>
+                    <a:pt x="2859370" y="2082105"/>
+                  </a:lnTo>
+                  <a:lnTo>
+                    <a:pt x="2929111" y="2046800"/>
+                  </a:lnTo>
+                  <a:lnTo>
+                    <a:pt x="2998851" y="1893380"/>
+                  </a:lnTo>
+                  <a:lnTo>
+                    <a:pt x="3068592" y="1610544"/>
+                  </a:lnTo>
+                  <a:lnTo>
+                    <a:pt x="3138333" y="1424078"/>
+                  </a:lnTo>
+                  <a:lnTo>
+                    <a:pt x="3208074" y="1271332"/>
+                  </a:lnTo>
+                  <a:lnTo>
+                    <a:pt x="3277814" y="1424267"/>
+                  </a:lnTo>
+                  <a:lnTo>
+                    <a:pt x="3347555" y="1705603"/>
+                  </a:lnTo>
+                  <a:lnTo>
+                    <a:pt x="3417296" y="2156809"/>
+                  </a:lnTo>
+                  <a:lnTo>
+                    <a:pt x="3487037" y="2443154"/>
+                  </a:lnTo>
+                  <a:lnTo>
+                    <a:pt x="3556777" y="2621823"/>
+                  </a:lnTo>
+                  <a:lnTo>
+                    <a:pt x="3626518" y="2709088"/>
+                  </a:lnTo>
+                  <a:lnTo>
+                    <a:pt x="3696259" y="2763881"/>
                   </a:lnTo>
                 </a:path>
               </a:pathLst>
             </a:custGeom>
             <a:ln w="27101" cap="flat">
               <a:solidFill>
-                <a:srgbClr val="F8766D">
+                <a:srgbClr val="7F7F7F">
                   <a:alpha val="100000"/>
                 </a:srgbClr>
               </a:solidFill>
@@ -3931,20 +3931,20 @@
           </p:nvSpPr>
           <p:spPr>
             <a:xfrm>
-              <a:off x="1662644" y="3999749"/>
+              <a:off x="1659499" y="3999749"/>
               <a:ext cx="49651" cy="49651"/>
             </a:xfrm>
             <a:prstGeom prst="ellipse">
               <a:avLst/>
             </a:prstGeom>
             <a:solidFill>
-              <a:srgbClr val="F8766D">
+              <a:srgbClr val="7F7F7F">
                 <a:alpha val="100000"/>
               </a:srgbClr>
             </a:solidFill>
             <a:ln w="9000" cap="rnd">
               <a:solidFill>
-                <a:srgbClr val="F8766D">
+                <a:srgbClr val="7F7F7F">
                   <a:alpha val="100000"/>
                 </a:srgbClr>
               </a:solidFill>
@@ -3966,20 +3966,20 @@
           </p:nvSpPr>
           <p:spPr>
             <a:xfrm>
-              <a:off x="1733367" y="3999749"/>
+              <a:off x="1729240" y="3999749"/>
               <a:ext cx="49651" cy="49651"/>
             </a:xfrm>
             <a:prstGeom prst="ellipse">
               <a:avLst/>
             </a:prstGeom>
             <a:solidFill>
-              <a:srgbClr val="F8766D">
+              <a:srgbClr val="7F7F7F">
                 <a:alpha val="100000"/>
               </a:srgbClr>
             </a:solidFill>
             <a:ln w="9000" cap="rnd">
               <a:solidFill>
-                <a:srgbClr val="F8766D">
+                <a:srgbClr val="7F7F7F">
                   <a:alpha val="100000"/>
                 </a:srgbClr>
               </a:solidFill>
@@ -4001,20 +4001,20 @@
           </p:nvSpPr>
           <p:spPr>
             <a:xfrm>
-              <a:off x="1804091" y="3999749"/>
+              <a:off x="1798980" y="3999749"/>
               <a:ext cx="49651" cy="49651"/>
             </a:xfrm>
             <a:prstGeom prst="ellipse">
               <a:avLst/>
             </a:prstGeom>
             <a:solidFill>
-              <a:srgbClr val="F8766D">
+              <a:srgbClr val="7F7F7F">
                 <a:alpha val="100000"/>
               </a:srgbClr>
             </a:solidFill>
             <a:ln w="9000" cap="rnd">
               <a:solidFill>
-                <a:srgbClr val="F8766D">
+                <a:srgbClr val="7F7F7F">
                   <a:alpha val="100000"/>
                 </a:srgbClr>
               </a:solidFill>
@@ -4036,20 +4036,20 @@
           </p:nvSpPr>
           <p:spPr>
             <a:xfrm>
-              <a:off x="1874814" y="3999749"/>
+              <a:off x="1868721" y="3999749"/>
               <a:ext cx="49651" cy="49651"/>
             </a:xfrm>
             <a:prstGeom prst="ellipse">
               <a:avLst/>
             </a:prstGeom>
             <a:solidFill>
-              <a:srgbClr val="F8766D">
+              <a:srgbClr val="7F7F7F">
                 <a:alpha val="100000"/>
               </a:srgbClr>
             </a:solidFill>
             <a:ln w="9000" cap="rnd">
               <a:solidFill>
-                <a:srgbClr val="F8766D">
+                <a:srgbClr val="7F7F7F">
                   <a:alpha val="100000"/>
                 </a:srgbClr>
               </a:solidFill>
@@ -4071,20 +4071,20 @@
           </p:nvSpPr>
           <p:spPr>
             <a:xfrm>
-              <a:off x="1945538" y="3999749"/>
+              <a:off x="1938462" y="3999749"/>
               <a:ext cx="49651" cy="49651"/>
             </a:xfrm>
             <a:prstGeom prst="ellipse">
               <a:avLst/>
             </a:prstGeom>
             <a:solidFill>
-              <a:srgbClr val="F8766D">
+              <a:srgbClr val="7F7F7F">
                 <a:alpha val="100000"/>
               </a:srgbClr>
             </a:solidFill>
             <a:ln w="9000" cap="rnd">
               <a:solidFill>
-                <a:srgbClr val="F8766D">
+                <a:srgbClr val="7F7F7F">
                   <a:alpha val="100000"/>
                 </a:srgbClr>
               </a:solidFill>
@@ -4106,20 +4106,20 @@
           </p:nvSpPr>
           <p:spPr>
             <a:xfrm>
-              <a:off x="2016261" y="3999749"/>
+              <a:off x="2008203" y="3999749"/>
               <a:ext cx="49651" cy="49651"/>
             </a:xfrm>
             <a:prstGeom prst="ellipse">
               <a:avLst/>
             </a:prstGeom>
             <a:solidFill>
-              <a:srgbClr val="F8766D">
+              <a:srgbClr val="7F7F7F">
                 <a:alpha val="100000"/>
               </a:srgbClr>
             </a:solidFill>
             <a:ln w="9000" cap="rnd">
               <a:solidFill>
-                <a:srgbClr val="F8766D">
+                <a:srgbClr val="7F7F7F">
                   <a:alpha val="100000"/>
                 </a:srgbClr>
               </a:solidFill>
@@ -4141,20 +4141,20 @@
           </p:nvSpPr>
           <p:spPr>
             <a:xfrm>
-              <a:off x="2086985" y="3999748"/>
+              <a:off x="2077943" y="3999748"/>
               <a:ext cx="49651" cy="49651"/>
             </a:xfrm>
             <a:prstGeom prst="ellipse">
               <a:avLst/>
             </a:prstGeom>
             <a:solidFill>
-              <a:srgbClr val="F8766D">
+              <a:srgbClr val="7F7F7F">
                 <a:alpha val="100000"/>
               </a:srgbClr>
             </a:solidFill>
             <a:ln w="9000" cap="rnd">
               <a:solidFill>
-                <a:srgbClr val="F8766D">
+                <a:srgbClr val="7F7F7F">
                   <a:alpha val="100000"/>
                 </a:srgbClr>
               </a:solidFill>
@@ -4176,20 +4176,20 @@
           </p:nvSpPr>
           <p:spPr>
             <a:xfrm>
-              <a:off x="2157708" y="3999747"/>
+              <a:off x="2147684" y="3999747"/>
               <a:ext cx="49651" cy="49651"/>
             </a:xfrm>
             <a:prstGeom prst="ellipse">
               <a:avLst/>
             </a:prstGeom>
             <a:solidFill>
-              <a:srgbClr val="F8766D">
+              <a:srgbClr val="7F7F7F">
                 <a:alpha val="100000"/>
               </a:srgbClr>
             </a:solidFill>
             <a:ln w="9000" cap="rnd">
               <a:solidFill>
-                <a:srgbClr val="F8766D">
+                <a:srgbClr val="7F7F7F">
                   <a:alpha val="100000"/>
                 </a:srgbClr>
               </a:solidFill>
@@ -4211,20 +4211,20 @@
           </p:nvSpPr>
           <p:spPr>
             <a:xfrm>
-              <a:off x="2228432" y="3999745"/>
+              <a:off x="2217425" y="3999745"/>
               <a:ext cx="49651" cy="49651"/>
             </a:xfrm>
             <a:prstGeom prst="ellipse">
               <a:avLst/>
             </a:prstGeom>
             <a:solidFill>
-              <a:srgbClr val="F8766D">
+              <a:srgbClr val="7F7F7F">
                 <a:alpha val="100000"/>
               </a:srgbClr>
             </a:solidFill>
             <a:ln w="9000" cap="rnd">
               <a:solidFill>
-                <a:srgbClr val="F8766D">
+                <a:srgbClr val="7F7F7F">
                   <a:alpha val="100000"/>
                 </a:srgbClr>
               </a:solidFill>
@@ -4246,20 +4246,20 @@
           </p:nvSpPr>
           <p:spPr>
             <a:xfrm>
-              <a:off x="2299155" y="3999741"/>
+              <a:off x="2287165" y="3999741"/>
               <a:ext cx="49651" cy="49651"/>
             </a:xfrm>
             <a:prstGeom prst="ellipse">
               <a:avLst/>
             </a:prstGeom>
             <a:solidFill>
-              <a:srgbClr val="F8766D">
+              <a:srgbClr val="7F7F7F">
                 <a:alpha val="100000"/>
               </a:srgbClr>
             </a:solidFill>
             <a:ln w="9000" cap="rnd">
               <a:solidFill>
-                <a:srgbClr val="F8766D">
+                <a:srgbClr val="7F7F7F">
                   <a:alpha val="100000"/>
                 </a:srgbClr>
               </a:solidFill>
@@ -4281,20 +4281,20 @@
           </p:nvSpPr>
           <p:spPr>
             <a:xfrm>
-              <a:off x="2369879" y="3999733"/>
+              <a:off x="2356906" y="3999733"/>
               <a:ext cx="49651" cy="49651"/>
             </a:xfrm>
             <a:prstGeom prst="ellipse">
               <a:avLst/>
             </a:prstGeom>
             <a:solidFill>
-              <a:srgbClr val="F8766D">
+              <a:srgbClr val="7F7F7F">
                 <a:alpha val="100000"/>
               </a:srgbClr>
             </a:solidFill>
             <a:ln w="9000" cap="rnd">
               <a:solidFill>
-                <a:srgbClr val="F8766D">
+                <a:srgbClr val="7F7F7F">
                   <a:alpha val="100000"/>
                 </a:srgbClr>
               </a:solidFill>
@@ -4316,20 +4316,20 @@
           </p:nvSpPr>
           <p:spPr>
             <a:xfrm>
-              <a:off x="2440602" y="3999714"/>
+              <a:off x="2426647" y="3999714"/>
               <a:ext cx="49651" cy="49651"/>
             </a:xfrm>
             <a:prstGeom prst="ellipse">
               <a:avLst/>
             </a:prstGeom>
             <a:solidFill>
-              <a:srgbClr val="F8766D">
+              <a:srgbClr val="7F7F7F">
                 <a:alpha val="100000"/>
               </a:srgbClr>
             </a:solidFill>
             <a:ln w="9000" cap="rnd">
               <a:solidFill>
-                <a:srgbClr val="F8766D">
+                <a:srgbClr val="7F7F7F">
                   <a:alpha val="100000"/>
                 </a:srgbClr>
               </a:solidFill>
@@ -4351,20 +4351,20 @@
           </p:nvSpPr>
           <p:spPr>
             <a:xfrm>
-              <a:off x="2511326" y="3999675"/>
+              <a:off x="2496388" y="3999675"/>
               <a:ext cx="49651" cy="49651"/>
             </a:xfrm>
             <a:prstGeom prst="ellipse">
               <a:avLst/>
             </a:prstGeom>
             <a:solidFill>
-              <a:srgbClr val="F8766D">
+              <a:srgbClr val="7F7F7F">
                 <a:alpha val="100000"/>
               </a:srgbClr>
             </a:solidFill>
             <a:ln w="9000" cap="rnd">
               <a:solidFill>
-                <a:srgbClr val="F8766D">
+                <a:srgbClr val="7F7F7F">
                   <a:alpha val="100000"/>
                 </a:srgbClr>
               </a:solidFill>
@@ -4386,20 +4386,20 @@
           </p:nvSpPr>
           <p:spPr>
             <a:xfrm>
-              <a:off x="2582049" y="3999593"/>
+              <a:off x="2566128" y="3999593"/>
               <a:ext cx="49651" cy="49651"/>
             </a:xfrm>
             <a:prstGeom prst="ellipse">
               <a:avLst/>
             </a:prstGeom>
             <a:solidFill>
-              <a:srgbClr val="F8766D">
+              <a:srgbClr val="7F7F7F">
                 <a:alpha val="100000"/>
               </a:srgbClr>
             </a:solidFill>
             <a:ln w="9000" cap="rnd">
               <a:solidFill>
-                <a:srgbClr val="F8766D">
+                <a:srgbClr val="7F7F7F">
                   <a:alpha val="100000"/>
                 </a:srgbClr>
               </a:solidFill>
@@ -4421,20 +4421,20 @@
           </p:nvSpPr>
           <p:spPr>
             <a:xfrm>
-              <a:off x="2652773" y="3999420"/>
+              <a:off x="2635869" y="3999420"/>
               <a:ext cx="49651" cy="49651"/>
             </a:xfrm>
             <a:prstGeom prst="ellipse">
               <a:avLst/>
             </a:prstGeom>
             <a:solidFill>
-              <a:srgbClr val="F8766D">
+              <a:srgbClr val="7F7F7F">
                 <a:alpha val="100000"/>
               </a:srgbClr>
             </a:solidFill>
             <a:ln w="9000" cap="rnd">
               <a:solidFill>
-                <a:srgbClr val="F8766D">
+                <a:srgbClr val="7F7F7F">
                   <a:alpha val="100000"/>
                 </a:srgbClr>
               </a:solidFill>
@@ -4456,20 +4456,20 @@
           </p:nvSpPr>
           <p:spPr>
             <a:xfrm>
-              <a:off x="2723496" y="3999055"/>
+              <a:off x="2705610" y="3999055"/>
               <a:ext cx="49651" cy="49651"/>
             </a:xfrm>
             <a:prstGeom prst="ellipse">
               <a:avLst/>
             </a:prstGeom>
             <a:solidFill>
-              <a:srgbClr val="F8766D">
+              <a:srgbClr val="7F7F7F">
                 <a:alpha val="100000"/>
               </a:srgbClr>
             </a:solidFill>
             <a:ln w="9000" cap="rnd">
               <a:solidFill>
-                <a:srgbClr val="F8766D">
+                <a:srgbClr val="7F7F7F">
                   <a:alpha val="100000"/>
                 </a:srgbClr>
               </a:solidFill>
@@ -4491,20 +4491,20 @@
           </p:nvSpPr>
           <p:spPr>
             <a:xfrm>
-              <a:off x="2794220" y="3998283"/>
+              <a:off x="2775351" y="3998283"/>
               <a:ext cx="49651" cy="49651"/>
             </a:xfrm>
             <a:prstGeom prst="ellipse">
               <a:avLst/>
             </a:prstGeom>
             <a:solidFill>
-              <a:srgbClr val="F8766D">
+              <a:srgbClr val="7F7F7F">
                 <a:alpha val="100000"/>
               </a:srgbClr>
             </a:solidFill>
             <a:ln w="9000" cap="rnd">
               <a:solidFill>
-                <a:srgbClr val="F8766D">
+                <a:srgbClr val="7F7F7F">
                   <a:alpha val="100000"/>
                 </a:srgbClr>
               </a:solidFill>
@@ -4526,20 +4526,20 @@
           </p:nvSpPr>
           <p:spPr>
             <a:xfrm>
-              <a:off x="2864943" y="3996657"/>
+              <a:off x="2845091" y="3996657"/>
               <a:ext cx="49651" cy="49651"/>
             </a:xfrm>
             <a:prstGeom prst="ellipse">
               <a:avLst/>
             </a:prstGeom>
             <a:solidFill>
-              <a:srgbClr val="F8766D">
+              <a:srgbClr val="7F7F7F">
                 <a:alpha val="100000"/>
               </a:srgbClr>
             </a:solidFill>
             <a:ln w="9000" cap="rnd">
               <a:solidFill>
-                <a:srgbClr val="F8766D">
+                <a:srgbClr val="7F7F7F">
                   <a:alpha val="100000"/>
                 </a:srgbClr>
               </a:solidFill>
@@ -4561,20 +4561,20 @@
           </p:nvSpPr>
           <p:spPr>
             <a:xfrm>
-              <a:off x="2935667" y="3993242"/>
+              <a:off x="2914832" y="3993242"/>
               <a:ext cx="49651" cy="49651"/>
             </a:xfrm>
             <a:prstGeom prst="ellipse">
               <a:avLst/>
             </a:prstGeom>
             <a:solidFill>
-              <a:srgbClr val="F8766D">
+              <a:srgbClr val="7F7F7F">
                 <a:alpha val="100000"/>
               </a:srgbClr>
             </a:solidFill>
             <a:ln w="9000" cap="rnd">
               <a:solidFill>
-                <a:srgbClr val="F8766D">
+                <a:srgbClr val="7F7F7F">
                   <a:alpha val="100000"/>
                 </a:srgbClr>
               </a:solidFill>
@@ -4596,20 +4596,20 @@
           </p:nvSpPr>
           <p:spPr>
             <a:xfrm>
-              <a:off x="3006390" y="3986103"/>
+              <a:off x="2984573" y="3986103"/>
               <a:ext cx="49651" cy="49651"/>
             </a:xfrm>
             <a:prstGeom prst="ellipse">
               <a:avLst/>
             </a:prstGeom>
             <a:solidFill>
-              <a:srgbClr val="F8766D">
+              <a:srgbClr val="7F7F7F">
                 <a:alpha val="100000"/>
               </a:srgbClr>
             </a:solidFill>
             <a:ln w="9000" cap="rnd">
               <a:solidFill>
-                <a:srgbClr val="F8766D">
+                <a:srgbClr val="7F7F7F">
                   <a:alpha val="100000"/>
                 </a:srgbClr>
               </a:solidFill>
@@ -4631,20 +4631,20 @@
           </p:nvSpPr>
           <p:spPr>
             <a:xfrm>
-              <a:off x="3077114" y="3971479"/>
+              <a:off x="3054314" y="3971479"/>
               <a:ext cx="49651" cy="49651"/>
             </a:xfrm>
             <a:prstGeom prst="ellipse">
               <a:avLst/>
             </a:prstGeom>
             <a:solidFill>
-              <a:srgbClr val="F8766D">
+              <a:srgbClr val="7F7F7F">
                 <a:alpha val="100000"/>
               </a:srgbClr>
             </a:solidFill>
             <a:ln w="9000" cap="rnd">
               <a:solidFill>
-                <a:srgbClr val="F8766D">
+                <a:srgbClr val="7F7F7F">
                   <a:alpha val="100000"/>
                 </a:srgbClr>
               </a:solidFill>
@@ -4666,20 +4666,20 @@
           </p:nvSpPr>
           <p:spPr>
             <a:xfrm>
-              <a:off x="3147837" y="3941721"/>
+              <a:off x="3124054" y="3941721"/>
               <a:ext cx="49651" cy="49651"/>
             </a:xfrm>
             <a:prstGeom prst="ellipse">
               <a:avLst/>
             </a:prstGeom>
             <a:solidFill>
-              <a:srgbClr val="F8766D">
+              <a:srgbClr val="7F7F7F">
                 <a:alpha val="100000"/>
               </a:srgbClr>
             </a:solidFill>
             <a:ln w="9000" cap="rnd">
               <a:solidFill>
-                <a:srgbClr val="F8766D">
+                <a:srgbClr val="7F7F7F">
                   <a:alpha val="100000"/>
                 </a:srgbClr>
               </a:solidFill>
@@ -4701,20 +4701,20 @@
           </p:nvSpPr>
           <p:spPr>
             <a:xfrm>
-              <a:off x="3218561" y="3887792"/>
+              <a:off x="3193795" y="3887792"/>
               <a:ext cx="49651" cy="49651"/>
             </a:xfrm>
             <a:prstGeom prst="ellipse">
               <a:avLst/>
             </a:prstGeom>
             <a:solidFill>
-              <a:srgbClr val="F8766D">
+              <a:srgbClr val="7F7F7F">
                 <a:alpha val="100000"/>
               </a:srgbClr>
             </a:solidFill>
             <a:ln w="9000" cap="rnd">
               <a:solidFill>
-                <a:srgbClr val="F8766D">
+                <a:srgbClr val="7F7F7F">
                   <a:alpha val="100000"/>
                 </a:srgbClr>
               </a:solidFill>
@@ -4736,20 +4736,20 @@
           </p:nvSpPr>
           <p:spPr>
             <a:xfrm>
-              <a:off x="3289284" y="3787766"/>
+              <a:off x="3263536" y="3787766"/>
               <a:ext cx="49651" cy="49651"/>
             </a:xfrm>
             <a:prstGeom prst="ellipse">
               <a:avLst/>
             </a:prstGeom>
             <a:solidFill>
-              <a:srgbClr val="F8766D">
+              <a:srgbClr val="7F7F7F">
                 <a:alpha val="100000"/>
               </a:srgbClr>
             </a:solidFill>
             <a:ln w="9000" cap="rnd">
               <a:solidFill>
-                <a:srgbClr val="F8766D">
+                <a:srgbClr val="7F7F7F">
                   <a:alpha val="100000"/>
                 </a:srgbClr>
               </a:solidFill>
@@ -4771,20 +4771,20 @@
           </p:nvSpPr>
           <p:spPr>
             <a:xfrm>
-              <a:off x="3360008" y="3635165"/>
+              <a:off x="3333277" y="3635165"/>
               <a:ext cx="49651" cy="49651"/>
             </a:xfrm>
             <a:prstGeom prst="ellipse">
               <a:avLst/>
             </a:prstGeom>
             <a:solidFill>
-              <a:srgbClr val="F8766D">
+              <a:srgbClr val="7F7F7F">
                 <a:alpha val="100000"/>
               </a:srgbClr>
             </a:solidFill>
             <a:ln w="9000" cap="rnd">
               <a:solidFill>
-                <a:srgbClr val="F8766D">
+                <a:srgbClr val="7F7F7F">
                   <a:alpha val="100000"/>
                 </a:srgbClr>
               </a:solidFill>
@@ -4806,20 +4806,20 @@
           </p:nvSpPr>
           <p:spPr>
             <a:xfrm>
-              <a:off x="3430731" y="3440179"/>
+              <a:off x="3403017" y="3440179"/>
               <a:ext cx="49651" cy="49651"/>
             </a:xfrm>
             <a:prstGeom prst="ellipse">
               <a:avLst/>
             </a:prstGeom>
             <a:solidFill>
-              <a:srgbClr val="F8766D">
+              <a:srgbClr val="7F7F7F">
                 <a:alpha val="100000"/>
               </a:srgbClr>
             </a:solidFill>
             <a:ln w="9000" cap="rnd">
               <a:solidFill>
-                <a:srgbClr val="F8766D">
+                <a:srgbClr val="7F7F7F">
                   <a:alpha val="100000"/>
                 </a:srgbClr>
               </a:solidFill>
@@ -4841,20 +4841,20 @@
           </p:nvSpPr>
           <p:spPr>
             <a:xfrm>
-              <a:off x="3501455" y="3371766"/>
+              <a:off x="3472758" y="3371766"/>
               <a:ext cx="49651" cy="49651"/>
             </a:xfrm>
             <a:prstGeom prst="ellipse">
               <a:avLst/>
             </a:prstGeom>
             <a:solidFill>
-              <a:srgbClr val="F8766D">
+              <a:srgbClr val="7F7F7F">
                 <a:alpha val="100000"/>
               </a:srgbClr>
             </a:solidFill>
             <a:ln w="9000" cap="rnd">
               <a:solidFill>
-                <a:srgbClr val="F8766D">
+                <a:srgbClr val="7F7F7F">
                   <a:alpha val="100000"/>
                 </a:srgbClr>
               </a:solidFill>
@@ -4876,20 +4876,20 @@
           </p:nvSpPr>
           <p:spPr>
             <a:xfrm>
-              <a:off x="3572178" y="3315838"/>
+              <a:off x="3542499" y="3315838"/>
               <a:ext cx="49651" cy="49651"/>
             </a:xfrm>
             <a:prstGeom prst="ellipse">
               <a:avLst/>
             </a:prstGeom>
             <a:solidFill>
-              <a:srgbClr val="F8766D">
+              <a:srgbClr val="7F7F7F">
                 <a:alpha val="100000"/>
               </a:srgbClr>
             </a:solidFill>
             <a:ln w="9000" cap="rnd">
               <a:solidFill>
-                <a:srgbClr val="F8766D">
+                <a:srgbClr val="7F7F7F">
                   <a:alpha val="100000"/>
                 </a:srgbClr>
               </a:solidFill>
@@ -4911,20 +4911,20 @@
           </p:nvSpPr>
           <p:spPr>
             <a:xfrm>
-              <a:off x="3642902" y="3276963"/>
+              <a:off x="3612240" y="3276963"/>
               <a:ext cx="49651" cy="49651"/>
             </a:xfrm>
             <a:prstGeom prst="ellipse">
               <a:avLst/>
             </a:prstGeom>
             <a:solidFill>
-              <a:srgbClr val="F8766D">
+              <a:srgbClr val="7F7F7F">
                 <a:alpha val="100000"/>
               </a:srgbClr>
             </a:solidFill>
             <a:ln w="9000" cap="rnd">
               <a:solidFill>
-                <a:srgbClr val="F8766D">
+                <a:srgbClr val="7F7F7F">
                   <a:alpha val="100000"/>
                 </a:srgbClr>
               </a:solidFill>
@@ -4946,20 +4946,20 @@
           </p:nvSpPr>
           <p:spPr>
             <a:xfrm>
-              <a:off x="3713625" y="3079613"/>
+              <a:off x="3681980" y="3079613"/>
               <a:ext cx="49651" cy="49651"/>
             </a:xfrm>
             <a:prstGeom prst="ellipse">
               <a:avLst/>
             </a:prstGeom>
             <a:solidFill>
-              <a:srgbClr val="F8766D">
+              <a:srgbClr val="7F7F7F">
                 <a:alpha val="100000"/>
               </a:srgbClr>
             </a:solidFill>
             <a:ln w="9000" cap="rnd">
               <a:solidFill>
-                <a:srgbClr val="F8766D">
+                <a:srgbClr val="7F7F7F">
                   <a:alpha val="100000"/>
                 </a:srgbClr>
               </a:solidFill>
@@ -4981,20 +4981,20 @@
           </p:nvSpPr>
           <p:spPr>
             <a:xfrm>
-              <a:off x="3784349" y="2746356"/>
+              <a:off x="3751721" y="2746356"/>
               <a:ext cx="49651" cy="49651"/>
             </a:xfrm>
             <a:prstGeom prst="ellipse">
               <a:avLst/>
             </a:prstGeom>
             <a:solidFill>
-              <a:srgbClr val="F8766D">
+              <a:srgbClr val="7F7F7F">
                 <a:alpha val="100000"/>
               </a:srgbClr>
             </a:solidFill>
             <a:ln w="9000" cap="rnd">
               <a:solidFill>
-                <a:srgbClr val="F8766D">
+                <a:srgbClr val="7F7F7F">
                   <a:alpha val="100000"/>
                 </a:srgbClr>
               </a:solidFill>
@@ -5016,20 +5016,20 @@
           </p:nvSpPr>
           <p:spPr>
             <a:xfrm>
-              <a:off x="3855072" y="2375320"/>
+              <a:off x="3821462" y="2375320"/>
               <a:ext cx="49651" cy="49651"/>
             </a:xfrm>
             <a:prstGeom prst="ellipse">
               <a:avLst/>
             </a:prstGeom>
             <a:solidFill>
-              <a:srgbClr val="F8766D">
+              <a:srgbClr val="7F7F7F">
                 <a:alpha val="100000"/>
               </a:srgbClr>
             </a:solidFill>
             <a:ln w="9000" cap="rnd">
               <a:solidFill>
-                <a:srgbClr val="F8766D">
+                <a:srgbClr val="7F7F7F">
                   <a:alpha val="100000"/>
                 </a:srgbClr>
               </a:solidFill>
@@ -5051,20 +5051,20 @@
           </p:nvSpPr>
           <p:spPr>
             <a:xfrm>
-              <a:off x="3925796" y="1942530"/>
+              <a:off x="3891203" y="1942530"/>
               <a:ext cx="49651" cy="49651"/>
             </a:xfrm>
             <a:prstGeom prst="ellipse">
               <a:avLst/>
             </a:prstGeom>
             <a:solidFill>
-              <a:srgbClr val="F8766D">
+              <a:srgbClr val="7F7F7F">
                 <a:alpha val="100000"/>
               </a:srgbClr>
             </a:solidFill>
             <a:ln w="9000" cap="rnd">
               <a:solidFill>
-                <a:srgbClr val="F8766D">
+                <a:srgbClr val="7F7F7F">
                   <a:alpha val="100000"/>
                 </a:srgbClr>
               </a:solidFill>
@@ -5086,20 +5086,20 @@
           </p:nvSpPr>
           <p:spPr>
             <a:xfrm>
-              <a:off x="3996519" y="1608039"/>
+              <a:off x="3960943" y="1608039"/>
               <a:ext cx="49651" cy="49651"/>
             </a:xfrm>
             <a:prstGeom prst="ellipse">
               <a:avLst/>
             </a:prstGeom>
             <a:solidFill>
-              <a:srgbClr val="F8766D">
+              <a:srgbClr val="7F7F7F">
                 <a:alpha val="100000"/>
               </a:srgbClr>
             </a:solidFill>
             <a:ln w="9000" cap="rnd">
               <a:solidFill>
-                <a:srgbClr val="F8766D">
+                <a:srgbClr val="7F7F7F">
                   <a:alpha val="100000"/>
                 </a:srgbClr>
               </a:solidFill>
@@ -5121,20 +5121,20 @@
           </p:nvSpPr>
           <p:spPr>
             <a:xfrm>
-              <a:off x="4067243" y="1310157"/>
+              <a:off x="4030684" y="1310157"/>
               <a:ext cx="49651" cy="49651"/>
             </a:xfrm>
             <a:prstGeom prst="ellipse">
               <a:avLst/>
             </a:prstGeom>
             <a:solidFill>
-              <a:srgbClr val="F8766D">
+              <a:srgbClr val="7F7F7F">
                 <a:alpha val="100000"/>
               </a:srgbClr>
             </a:solidFill>
             <a:ln w="9000" cap="rnd">
               <a:solidFill>
-                <a:srgbClr val="F8766D">
+                <a:srgbClr val="7F7F7F">
                   <a:alpha val="100000"/>
                 </a:srgbClr>
               </a:solidFill>
@@ -5156,20 +5156,20 @@
           </p:nvSpPr>
           <p:spPr>
             <a:xfrm>
-              <a:off x="4137967" y="1103952"/>
+              <a:off x="4100425" y="1103952"/>
               <a:ext cx="49651" cy="49651"/>
             </a:xfrm>
             <a:prstGeom prst="ellipse">
               <a:avLst/>
             </a:prstGeom>
             <a:solidFill>
-              <a:srgbClr val="F8766D">
+              <a:srgbClr val="7F7F7F">
                 <a:alpha val="100000"/>
               </a:srgbClr>
             </a:solidFill>
             <a:ln w="9000" cap="rnd">
               <a:solidFill>
-                <a:srgbClr val="F8766D">
+                <a:srgbClr val="7F7F7F">
                   <a:alpha val="100000"/>
                 </a:srgbClr>
               </a:solidFill>
@@ -5191,20 +5191,20 @@
           </p:nvSpPr>
           <p:spPr>
             <a:xfrm>
-              <a:off x="4208690" y="1511243"/>
+              <a:off x="4170166" y="1511243"/>
               <a:ext cx="49651" cy="49651"/>
             </a:xfrm>
             <a:prstGeom prst="ellipse">
               <a:avLst/>
             </a:prstGeom>
             <a:solidFill>
-              <a:srgbClr val="F8766D">
+              <a:srgbClr val="7F7F7F">
                 <a:alpha val="100000"/>
               </a:srgbClr>
             </a:solidFill>
             <a:ln w="9000" cap="rnd">
               <a:solidFill>
-                <a:srgbClr val="F8766D">
+                <a:srgbClr val="7F7F7F">
                   <a:alpha val="100000"/>
                 </a:srgbClr>
               </a:solidFill>
@@ -5226,20 +5226,20 @@
           </p:nvSpPr>
           <p:spPr>
             <a:xfrm>
-              <a:off x="4279414" y="2089222"/>
+              <a:off x="4239906" y="2089222"/>
               <a:ext cx="49651" cy="49651"/>
             </a:xfrm>
             <a:prstGeom prst="ellipse">
               <a:avLst/>
             </a:prstGeom>
             <a:solidFill>
-              <a:srgbClr val="F8766D">
+              <a:srgbClr val="7F7F7F">
                 <a:alpha val="100000"/>
               </a:srgbClr>
             </a:solidFill>
             <a:ln w="9000" cap="rnd">
               <a:solidFill>
-                <a:srgbClr val="F8766D">
+                <a:srgbClr val="7F7F7F">
                   <a:alpha val="100000"/>
                 </a:srgbClr>
               </a:solidFill>
@@ -5261,20 +5261,20 @@
           </p:nvSpPr>
           <p:spPr>
             <a:xfrm>
-              <a:off x="4350137" y="2427593"/>
+              <a:off x="4309647" y="2427593"/>
               <a:ext cx="49651" cy="49651"/>
             </a:xfrm>
             <a:prstGeom prst="ellipse">
               <a:avLst/>
             </a:prstGeom>
             <a:solidFill>
-              <a:srgbClr val="F8766D">
+              <a:srgbClr val="7F7F7F">
                 <a:alpha val="100000"/>
               </a:srgbClr>
             </a:solidFill>
             <a:ln w="9000" cap="rnd">
               <a:solidFill>
-                <a:srgbClr val="F8766D">
+                <a:srgbClr val="7F7F7F">
                   <a:alpha val="100000"/>
                 </a:srgbClr>
               </a:solidFill>
@@ -5296,20 +5296,20 @@
           </p:nvSpPr>
           <p:spPr>
             <a:xfrm>
-              <a:off x="4420861" y="2713729"/>
+              <a:off x="4379388" y="2713729"/>
               <a:ext cx="49651" cy="49651"/>
             </a:xfrm>
             <a:prstGeom prst="ellipse">
               <a:avLst/>
             </a:prstGeom>
             <a:solidFill>
-              <a:srgbClr val="F8766D">
+              <a:srgbClr val="7F7F7F">
                 <a:alpha val="100000"/>
               </a:srgbClr>
             </a:solidFill>
             <a:ln w="9000" cap="rnd">
               <a:solidFill>
-                <a:srgbClr val="F8766D">
+                <a:srgbClr val="7F7F7F">
                   <a:alpha val="100000"/>
                 </a:srgbClr>
               </a:solidFill>
@@ -5331,20 +5331,20 @@
           </p:nvSpPr>
           <p:spPr>
             <a:xfrm>
-              <a:off x="4491584" y="3037251"/>
+              <a:off x="4449129" y="3037251"/>
               <a:ext cx="49651" cy="49651"/>
             </a:xfrm>
             <a:prstGeom prst="ellipse">
               <a:avLst/>
             </a:prstGeom>
             <a:solidFill>
-              <a:srgbClr val="F8766D">
+              <a:srgbClr val="7F7F7F">
                 <a:alpha val="100000"/>
               </a:srgbClr>
             </a:solidFill>
             <a:ln w="9000" cap="rnd">
               <a:solidFill>
-                <a:srgbClr val="F8766D">
+                <a:srgbClr val="7F7F7F">
                   <a:alpha val="100000"/>
                 </a:srgbClr>
               </a:solidFill>
@@ -5366,20 +5366,20 @@
           </p:nvSpPr>
           <p:spPr>
             <a:xfrm>
-              <a:off x="4562308" y="3186058"/>
+              <a:off x="4518869" y="3186058"/>
               <a:ext cx="49651" cy="49651"/>
             </a:xfrm>
             <a:prstGeom prst="ellipse">
               <a:avLst/>
             </a:prstGeom>
             <a:solidFill>
-              <a:srgbClr val="F8766D">
+              <a:srgbClr val="7F7F7F">
                 <a:alpha val="100000"/>
               </a:srgbClr>
             </a:solidFill>
             <a:ln w="9000" cap="rnd">
               <a:solidFill>
-                <a:srgbClr val="F8766D">
+                <a:srgbClr val="7F7F7F">
                   <a:alpha val="100000"/>
                 </a:srgbClr>
               </a:solidFill>
@@ -5401,20 +5401,20 @@
           </p:nvSpPr>
           <p:spPr>
             <a:xfrm>
-              <a:off x="4633031" y="3150753"/>
+              <a:off x="4588610" y="3150753"/>
               <a:ext cx="49651" cy="49651"/>
             </a:xfrm>
             <a:prstGeom prst="ellipse">
               <a:avLst/>
             </a:prstGeom>
             <a:solidFill>
-              <a:srgbClr val="F8766D">
+              <a:srgbClr val="7F7F7F">
                 <a:alpha val="100000"/>
               </a:srgbClr>
             </a:solidFill>
             <a:ln w="9000" cap="rnd">
               <a:solidFill>
-                <a:srgbClr val="F8766D">
+                <a:srgbClr val="7F7F7F">
                   <a:alpha val="100000"/>
                 </a:srgbClr>
               </a:solidFill>
@@ -5436,20 +5436,20 @@
           </p:nvSpPr>
           <p:spPr>
             <a:xfrm>
-              <a:off x="4703755" y="2997333"/>
+              <a:off x="4658351" y="2997333"/>
               <a:ext cx="49651" cy="49651"/>
             </a:xfrm>
             <a:prstGeom prst="ellipse">
               <a:avLst/>
             </a:prstGeom>
             <a:solidFill>
-              <a:srgbClr val="F8766D">
+              <a:srgbClr val="7F7F7F">
                 <a:alpha val="100000"/>
               </a:srgbClr>
             </a:solidFill>
             <a:ln w="9000" cap="rnd">
               <a:solidFill>
-                <a:srgbClr val="F8766D">
+                <a:srgbClr val="7F7F7F">
                   <a:alpha val="100000"/>
                 </a:srgbClr>
               </a:solidFill>
@@ -5471,20 +5471,20 @@
           </p:nvSpPr>
           <p:spPr>
             <a:xfrm>
-              <a:off x="4774478" y="2714497"/>
+              <a:off x="4728092" y="2714497"/>
               <a:ext cx="49651" cy="49651"/>
             </a:xfrm>
             <a:prstGeom prst="ellipse">
               <a:avLst/>
             </a:prstGeom>
             <a:solidFill>
-              <a:srgbClr val="F8766D">
+              <a:srgbClr val="7F7F7F">
                 <a:alpha val="100000"/>
               </a:srgbClr>
             </a:solidFill>
             <a:ln w="9000" cap="rnd">
               <a:solidFill>
-                <a:srgbClr val="F8766D">
+                <a:srgbClr val="7F7F7F">
                   <a:alpha val="100000"/>
                 </a:srgbClr>
               </a:solidFill>
@@ -5506,20 +5506,20 @@
           </p:nvSpPr>
           <p:spPr>
             <a:xfrm>
-              <a:off x="4845202" y="2528031"/>
+              <a:off x="4797832" y="2528031"/>
               <a:ext cx="49651" cy="49651"/>
             </a:xfrm>
             <a:prstGeom prst="ellipse">
               <a:avLst/>
             </a:prstGeom>
             <a:solidFill>
-              <a:srgbClr val="F8766D">
+              <a:srgbClr val="7F7F7F">
                 <a:alpha val="100000"/>
               </a:srgbClr>
             </a:solidFill>
             <a:ln w="9000" cap="rnd">
               <a:solidFill>
-                <a:srgbClr val="F8766D">
+                <a:srgbClr val="7F7F7F">
                   <a:alpha val="100000"/>
                 </a:srgbClr>
               </a:solidFill>
@@ -5541,20 +5541,20 @@
           </p:nvSpPr>
           <p:spPr>
             <a:xfrm>
-              <a:off x="4915925" y="2375285"/>
+              <a:off x="4867573" y="2375285"/>
               <a:ext cx="49651" cy="49651"/>
             </a:xfrm>
             <a:prstGeom prst="ellipse">
               <a:avLst/>
             </a:prstGeom>
             <a:solidFill>
-              <a:srgbClr val="F8766D">
+              <a:srgbClr val="7F7F7F">
                 <a:alpha val="100000"/>
               </a:srgbClr>
             </a:solidFill>
             <a:ln w="9000" cap="rnd">
               <a:solidFill>
-                <a:srgbClr val="F8766D">
+                <a:srgbClr val="7F7F7F">
                   <a:alpha val="100000"/>
                 </a:srgbClr>
               </a:solidFill>
@@ -5576,20 +5576,20 @@
           </p:nvSpPr>
           <p:spPr>
             <a:xfrm>
-              <a:off x="4986649" y="2528220"/>
+              <a:off x="4937314" y="2528220"/>
               <a:ext cx="49651" cy="49651"/>
             </a:xfrm>
             <a:prstGeom prst="ellipse">
               <a:avLst/>
             </a:prstGeom>
             <a:solidFill>
-              <a:srgbClr val="F8766D">
+              <a:srgbClr val="7F7F7F">
                 <a:alpha val="100000"/>
               </a:srgbClr>
             </a:solidFill>
             <a:ln w="9000" cap="rnd">
               <a:solidFill>
-                <a:srgbClr val="F8766D">
+                <a:srgbClr val="7F7F7F">
                   <a:alpha val="100000"/>
                 </a:srgbClr>
               </a:solidFill>
@@ -5611,20 +5611,20 @@
           </p:nvSpPr>
           <p:spPr>
             <a:xfrm>
-              <a:off x="5057372" y="2809556"/>
+              <a:off x="5007054" y="2809556"/>
               <a:ext cx="49651" cy="49651"/>
             </a:xfrm>
             <a:prstGeom prst="ellipse">
               <a:avLst/>
             </a:prstGeom>
             <a:solidFill>
-              <a:srgbClr val="F8766D">
+              <a:srgbClr val="7F7F7F">
                 <a:alpha val="100000"/>
               </a:srgbClr>
             </a:solidFill>
             <a:ln w="9000" cap="rnd">
               <a:solidFill>
-                <a:srgbClr val="F8766D">
+                <a:srgbClr val="7F7F7F">
                   <a:alpha val="100000"/>
                 </a:srgbClr>
               </a:solidFill>
@@ -5646,20 +5646,20 @@
           </p:nvSpPr>
           <p:spPr>
             <a:xfrm>
-              <a:off x="5128096" y="3260761"/>
+              <a:off x="5076795" y="3260761"/>
               <a:ext cx="49651" cy="49651"/>
             </a:xfrm>
             <a:prstGeom prst="ellipse">
               <a:avLst/>
             </a:prstGeom>
             <a:solidFill>
-              <a:srgbClr val="F8766D">
+              <a:srgbClr val="7F7F7F">
                 <a:alpha val="100000"/>
               </a:srgbClr>
             </a:solidFill>
             <a:ln w="9000" cap="rnd">
               <a:solidFill>
-                <a:srgbClr val="F8766D">
+                <a:srgbClr val="7F7F7F">
                   <a:alpha val="100000"/>
                 </a:srgbClr>
               </a:solidFill>
@@ -5681,20 +5681,20 @@
           </p:nvSpPr>
           <p:spPr>
             <a:xfrm>
-              <a:off x="5198819" y="3547107"/>
+              <a:off x="5146536" y="3547107"/>
               <a:ext cx="49651" cy="49651"/>
             </a:xfrm>
             <a:prstGeom prst="ellipse">
               <a:avLst/>
             </a:prstGeom>
             <a:solidFill>
-              <a:srgbClr val="F8766D">
+              <a:srgbClr val="7F7F7F">
                 <a:alpha val="100000"/>
               </a:srgbClr>
             </a:solidFill>
             <a:ln w="9000" cap="rnd">
               <a:solidFill>
-                <a:srgbClr val="F8766D">
+                <a:srgbClr val="7F7F7F">
                   <a:alpha val="100000"/>
                 </a:srgbClr>
               </a:solidFill>
@@ -5716,20 +5716,20 @@
           </p:nvSpPr>
           <p:spPr>
             <a:xfrm>
-              <a:off x="5269543" y="3725776"/>
+              <a:off x="5216277" y="3725776"/>
               <a:ext cx="49651" cy="49651"/>
             </a:xfrm>
             <a:prstGeom prst="ellipse">
               <a:avLst/>
             </a:prstGeom>
             <a:solidFill>
-              <a:srgbClr val="F8766D">
+              <a:srgbClr val="7F7F7F">
                 <a:alpha val="100000"/>
               </a:srgbClr>
             </a:solidFill>
             <a:ln w="9000" cap="rnd">
               <a:solidFill>
-                <a:srgbClr val="F8766D">
+                <a:srgbClr val="7F7F7F">
                   <a:alpha val="100000"/>
                 </a:srgbClr>
               </a:solidFill>
@@ -5751,20 +5751,20 @@
           </p:nvSpPr>
           <p:spPr>
             <a:xfrm>
-              <a:off x="5340266" y="3813041"/>
+              <a:off x="5286017" y="3813041"/>
               <a:ext cx="49651" cy="49651"/>
             </a:xfrm>
             <a:prstGeom prst="ellipse">
               <a:avLst/>
             </a:prstGeom>
             <a:solidFill>
-              <a:srgbClr val="F8766D">
+              <a:srgbClr val="7F7F7F">
                 <a:alpha val="100000"/>
               </a:srgbClr>
             </a:solidFill>
             <a:ln w="9000" cap="rnd">
               <a:solidFill>
-                <a:srgbClr val="F8766D">
+                <a:srgbClr val="7F7F7F">
                   <a:alpha val="100000"/>
                 </a:srgbClr>
               </a:solidFill>
@@ -5786,20 +5786,20 @@
           </p:nvSpPr>
           <p:spPr>
             <a:xfrm>
-              <a:off x="5410990" y="3867834"/>
+              <a:off x="5355758" y="3867834"/>
               <a:ext cx="49651" cy="49651"/>
             </a:xfrm>
             <a:prstGeom prst="ellipse">
               <a:avLst/>
             </a:prstGeom>
             <a:solidFill>
-              <a:srgbClr val="F8766D">
+              <a:srgbClr val="7F7F7F">
                 <a:alpha val="100000"/>
               </a:srgbClr>
             </a:solidFill>
             <a:ln w="9000" cap="rnd">
               <a:solidFill>
-                <a:srgbClr val="F8766D">
+                <a:srgbClr val="7F7F7F">
                   <a:alpha val="100000"/>
                 </a:srgbClr>
               </a:solidFill>
@@ -6165,7 +6165,7 @@
           </p:nvSpPr>
           <p:spPr>
             <a:xfrm>
-              <a:off x="1652108" y="4169365"/>
+              <a:off x="1649454" y="4169365"/>
               <a:ext cx="0" cy="34794"/>
             </a:xfrm>
             <a:custGeom>
@@ -6205,7 +6205,7 @@
           </p:nvSpPr>
           <p:spPr>
             <a:xfrm>
-              <a:off x="2005725" y="4169365"/>
+              <a:off x="1998158" y="4169365"/>
               <a:ext cx="0" cy="34794"/>
             </a:xfrm>
             <a:custGeom>
@@ -6245,7 +6245,7 @@
           </p:nvSpPr>
           <p:spPr>
             <a:xfrm>
-              <a:off x="2359343" y="4169365"/>
+              <a:off x="2346862" y="4169365"/>
               <a:ext cx="0" cy="34794"/>
             </a:xfrm>
             <a:custGeom>
@@ -6285,7 +6285,7 @@
           </p:nvSpPr>
           <p:spPr>
             <a:xfrm>
-              <a:off x="2712960" y="4169365"/>
+              <a:off x="2695566" y="4169365"/>
               <a:ext cx="0" cy="34794"/>
             </a:xfrm>
             <a:custGeom>
@@ -6325,7 +6325,7 @@
           </p:nvSpPr>
           <p:spPr>
             <a:xfrm>
-              <a:off x="3066578" y="4169365"/>
+              <a:off x="3044269" y="4169365"/>
               <a:ext cx="0" cy="34794"/>
             </a:xfrm>
             <a:custGeom>
@@ -6365,7 +6365,7 @@
           </p:nvSpPr>
           <p:spPr>
             <a:xfrm>
-              <a:off x="3420196" y="4169365"/>
+              <a:off x="3392973" y="4169365"/>
               <a:ext cx="0" cy="34794"/>
             </a:xfrm>
             <a:custGeom>
@@ -6405,7 +6405,7 @@
           </p:nvSpPr>
           <p:spPr>
             <a:xfrm>
-              <a:off x="3773813" y="4169365"/>
+              <a:off x="3741677" y="4169365"/>
               <a:ext cx="0" cy="34794"/>
             </a:xfrm>
             <a:custGeom>
@@ -6445,7 +6445,7 @@
           </p:nvSpPr>
           <p:spPr>
             <a:xfrm>
-              <a:off x="4127431" y="4169365"/>
+              <a:off x="4090380" y="4169365"/>
               <a:ext cx="0" cy="34794"/>
             </a:xfrm>
             <a:custGeom>
@@ -6485,7 +6485,7 @@
           </p:nvSpPr>
           <p:spPr>
             <a:xfrm>
-              <a:off x="4481048" y="4169365"/>
+              <a:off x="4439084" y="4169365"/>
               <a:ext cx="0" cy="34794"/>
             </a:xfrm>
             <a:custGeom>
@@ -6525,7 +6525,7 @@
           </p:nvSpPr>
           <p:spPr>
             <a:xfrm>
-              <a:off x="4834666" y="4169365"/>
+              <a:off x="4787788" y="4169365"/>
               <a:ext cx="0" cy="34794"/>
             </a:xfrm>
             <a:custGeom>
@@ -6565,7 +6565,7 @@
           </p:nvSpPr>
           <p:spPr>
             <a:xfrm>
-              <a:off x="5188283" y="4169365"/>
+              <a:off x="5136492" y="4169365"/>
               <a:ext cx="0" cy="34794"/>
             </a:xfrm>
             <a:custGeom>
@@ -6605,7 +6605,7 @@
           </p:nvSpPr>
           <p:spPr>
             <a:xfrm>
-              <a:off x="5541901" y="4169365"/>
+              <a:off x="5485195" y="4169365"/>
               <a:ext cx="0" cy="34794"/>
             </a:xfrm>
             <a:custGeom>
@@ -6645,7 +6645,7 @@
           </p:nvSpPr>
           <p:spPr>
             <a:xfrm>
-              <a:off x="1616555" y="4228939"/>
+              <a:off x="1613902" y="4228939"/>
               <a:ext cx="71105" cy="84529"/>
             </a:xfrm>
             <a:prstGeom prst="rect">
@@ -6691,7 +6691,7 @@
           </p:nvSpPr>
           <p:spPr>
             <a:xfrm>
-              <a:off x="1970173" y="4230412"/>
+              <a:off x="1962606" y="4230412"/>
               <a:ext cx="71105" cy="83056"/>
             </a:xfrm>
             <a:prstGeom prst="rect">
@@ -6737,7 +6737,7 @@
           </p:nvSpPr>
           <p:spPr>
             <a:xfrm>
-              <a:off x="2288238" y="4228939"/>
+              <a:off x="2275757" y="4228939"/>
               <a:ext cx="142210" cy="84529"/>
             </a:xfrm>
             <a:prstGeom prst="rect">
@@ -6783,7 +6783,7 @@
           </p:nvSpPr>
           <p:spPr>
             <a:xfrm>
-              <a:off x="2641855" y="4230412"/>
+              <a:off x="2624460" y="4230412"/>
               <a:ext cx="142210" cy="83056"/>
             </a:xfrm>
             <a:prstGeom prst="rect">
@@ -6829,7 +6829,7 @@
           </p:nvSpPr>
           <p:spPr>
             <a:xfrm>
-              <a:off x="2995473" y="4228939"/>
+              <a:off x="2973164" y="4228939"/>
               <a:ext cx="142210" cy="84529"/>
             </a:xfrm>
             <a:prstGeom prst="rect">
@@ -6875,7 +6875,7 @@
           </p:nvSpPr>
           <p:spPr>
             <a:xfrm>
-              <a:off x="3349090" y="4228939"/>
+              <a:off x="3321868" y="4228939"/>
               <a:ext cx="142210" cy="84529"/>
             </a:xfrm>
             <a:prstGeom prst="rect">
@@ -6921,7 +6921,7 @@
           </p:nvSpPr>
           <p:spPr>
             <a:xfrm>
-              <a:off x="3702708" y="4228939"/>
+              <a:off x="3670572" y="4228939"/>
               <a:ext cx="142210" cy="84529"/>
             </a:xfrm>
             <a:prstGeom prst="rect">
@@ -6967,7 +6967,7 @@
           </p:nvSpPr>
           <p:spPr>
             <a:xfrm>
-              <a:off x="4056326" y="4228939"/>
+              <a:off x="4019275" y="4228939"/>
               <a:ext cx="142210" cy="84529"/>
             </a:xfrm>
             <a:prstGeom prst="rect">
@@ -7013,7 +7013,7 @@
           </p:nvSpPr>
           <p:spPr>
             <a:xfrm>
-              <a:off x="4409943" y="4228939"/>
+              <a:off x="4367979" y="4228939"/>
               <a:ext cx="142210" cy="84529"/>
             </a:xfrm>
             <a:prstGeom prst="rect">
@@ -7059,7 +7059,7 @@
           </p:nvSpPr>
           <p:spPr>
             <a:xfrm>
-              <a:off x="4763561" y="4230412"/>
+              <a:off x="4716683" y="4230412"/>
               <a:ext cx="142210" cy="83056"/>
             </a:xfrm>
             <a:prstGeom prst="rect">
@@ -7105,7 +7105,7 @@
           </p:nvSpPr>
           <p:spPr>
             <a:xfrm>
-              <a:off x="5117178" y="4228939"/>
+              <a:off x="5065386" y="4228939"/>
               <a:ext cx="142210" cy="84529"/>
             </a:xfrm>
             <a:prstGeom prst="rect">
@@ -7151,7 +7151,7 @@
           </p:nvSpPr>
           <p:spPr>
             <a:xfrm>
-              <a:off x="5470796" y="4230412"/>
+              <a:off x="5414090" y="4230412"/>
               <a:ext cx="142210" cy="83056"/>
             </a:xfrm>
             <a:prstGeom prst="rect">
@@ -7197,7 +7197,7 @@
           </p:nvSpPr>
           <p:spPr>
             <a:xfrm>
-              <a:off x="2845066" y="4338154"/>
+              <a:off x="2815878" y="4338154"/>
               <a:ext cx="1433152" cy="135197"/>
             </a:xfrm>
             <a:prstGeom prst="rect">
@@ -7289,8 +7289,8 @@
           </p:nvSpPr>
           <p:spPr>
             <a:xfrm>
-              <a:off x="5801309" y="2297115"/>
-              <a:ext cx="529901" cy="559123"/>
+              <a:off x="5742933" y="2297115"/>
+              <a:ext cx="588277" cy="559123"/>
             </a:xfrm>
             <a:prstGeom prst="rect">
               <a:avLst/>
@@ -7315,7 +7315,7 @@
           </p:nvSpPr>
           <p:spPr>
             <a:xfrm>
-              <a:off x="5870898" y="2381233"/>
+              <a:off x="5812522" y="2381233"/>
               <a:ext cx="390723" cy="101841"/>
             </a:xfrm>
             <a:prstGeom prst="rect">
@@ -7361,7 +7361,7 @@
           </p:nvSpPr>
           <p:spPr>
             <a:xfrm>
-              <a:off x="5870898" y="2567193"/>
+              <a:off x="5812522" y="2567193"/>
               <a:ext cx="219455" cy="219456"/>
             </a:xfrm>
             <a:prstGeom prst="rect">
@@ -7387,7 +7387,7 @@
           </p:nvSpPr>
           <p:spPr>
             <a:xfrm>
-              <a:off x="5892844" y="2676921"/>
+              <a:off x="5834467" y="2676921"/>
               <a:ext cx="175564" cy="0"/>
             </a:xfrm>
             <a:custGeom>
@@ -7405,7 +7405,7 @@
             </a:custGeom>
             <a:ln w="27101" cap="flat">
               <a:solidFill>
-                <a:srgbClr val="F8766D">
+                <a:srgbClr val="7F7F7F">
                   <a:alpha val="100000"/>
                 </a:srgbClr>
               </a:solidFill>
@@ -7427,20 +7427,20 @@
           </p:nvSpPr>
           <p:spPr>
             <a:xfrm>
-              <a:off x="5955800" y="2652096"/>
+              <a:off x="5897424" y="2652096"/>
               <a:ext cx="49651" cy="49651"/>
             </a:xfrm>
             <a:prstGeom prst="ellipse">
               <a:avLst/>
             </a:prstGeom>
             <a:solidFill>
-              <a:srgbClr val="F8766D">
+              <a:srgbClr val="7F7F7F">
                 <a:alpha val="100000"/>
               </a:srgbClr>
             </a:solidFill>
             <a:ln w="9000" cap="rnd">
               <a:solidFill>
-                <a:srgbClr val="F8766D">
+                <a:srgbClr val="7F7F7F">
                   <a:alpha val="100000"/>
                 </a:srgbClr>
               </a:solidFill>
@@ -7462,8 +7462,8 @@
           </p:nvSpPr>
           <p:spPr>
             <a:xfrm>
-              <a:off x="6159943" y="2636185"/>
-              <a:ext cx="76453" cy="81473"/>
+              <a:off x="6101567" y="2636185"/>
+              <a:ext cx="160054" cy="81473"/>
             </a:xfrm>
             <a:prstGeom prst="rect">
               <a:avLst/>
@@ -7495,7 +7495,7 @@
                   <a:latin typeface="DejaVu Sans"/>
                   <a:cs typeface="DejaVu Sans"/>
                 </a:rPr>
-                <a:t>A</a:t>
+                <a:t>NA</a:t>
               </a:r>
             </a:p>
           </p:txBody>

</xml_diff>

<commit_message>
Deploying to gh-pages from @ sean4andrew/safuncs@2bb19139c7e91250e8e049eff3ecb9f70feca90b 🚀
</commit_message>
<xml_diff>
--- a/reference/ONDA_XX-Hazard-Curve.pptx
+++ b/reference/ONDA_XX-Hazard-Curve.pptx
@@ -2334,7 +2334,7 @@
           <p:spPr>
             <a:xfrm>
               <a:off x="1461154" y="983989"/>
-              <a:ext cx="4142600" cy="3185376"/>
+              <a:ext cx="4200976" cy="3185376"/>
             </a:xfrm>
             <a:prstGeom prst="rect">
               <a:avLst/>
@@ -2360,20 +2360,20 @@
           <p:spPr>
             <a:xfrm>
               <a:off x="1461154" y="3601355"/>
-              <a:ext cx="4142600" cy="0"/>
+              <a:ext cx="4200976" cy="0"/>
             </a:xfrm>
             <a:custGeom>
               <a:avLst/>
               <a:pathLst>
-                <a:path w="4142600" h="0">
+                <a:path w="4200976" h="0">
                   <a:moveTo>
                     <a:pt x="0" y="0"/>
                   </a:moveTo>
                   <a:lnTo>
-                    <a:pt x="4142600" y="0"/>
-                  </a:lnTo>
-                  <a:lnTo>
-                    <a:pt x="4142600" y="0"/>
+                    <a:pt x="4200976" y="0"/>
+                  </a:lnTo>
+                  <a:lnTo>
+                    <a:pt x="4200976" y="0"/>
                   </a:lnTo>
                 </a:path>
               </a:pathLst>
@@ -2403,20 +2403,20 @@
           <p:spPr>
             <a:xfrm>
               <a:off x="1461154" y="2754914"/>
-              <a:ext cx="4142600" cy="0"/>
+              <a:ext cx="4200976" cy="0"/>
             </a:xfrm>
             <a:custGeom>
               <a:avLst/>
               <a:pathLst>
-                <a:path w="4142600" h="0">
+                <a:path w="4200976" h="0">
                   <a:moveTo>
                     <a:pt x="0" y="0"/>
                   </a:moveTo>
                   <a:lnTo>
-                    <a:pt x="4142600" y="0"/>
-                  </a:lnTo>
-                  <a:lnTo>
-                    <a:pt x="4142600" y="0"/>
+                    <a:pt x="4200976" y="0"/>
+                  </a:lnTo>
+                  <a:lnTo>
+                    <a:pt x="4200976" y="0"/>
                   </a:lnTo>
                 </a:path>
               </a:pathLst>
@@ -2446,20 +2446,20 @@
           <p:spPr>
             <a:xfrm>
               <a:off x="1461154" y="1908473"/>
-              <a:ext cx="4142600" cy="0"/>
+              <a:ext cx="4200976" cy="0"/>
             </a:xfrm>
             <a:custGeom>
               <a:avLst/>
               <a:pathLst>
-                <a:path w="4142600" h="0">
+                <a:path w="4200976" h="0">
                   <a:moveTo>
                     <a:pt x="0" y="0"/>
                   </a:moveTo>
                   <a:lnTo>
-                    <a:pt x="4142600" y="0"/>
-                  </a:lnTo>
-                  <a:lnTo>
-                    <a:pt x="4142600" y="0"/>
+                    <a:pt x="4200976" y="0"/>
+                  </a:lnTo>
+                  <a:lnTo>
+                    <a:pt x="4200976" y="0"/>
                   </a:lnTo>
                 </a:path>
               </a:pathLst>
@@ -2489,20 +2489,20 @@
           <p:spPr>
             <a:xfrm>
               <a:off x="1461154" y="1062033"/>
-              <a:ext cx="4142600" cy="0"/>
+              <a:ext cx="4200976" cy="0"/>
             </a:xfrm>
             <a:custGeom>
               <a:avLst/>
               <a:pathLst>
-                <a:path w="4142600" h="0">
+                <a:path w="4200976" h="0">
                   <a:moveTo>
                     <a:pt x="0" y="0"/>
                   </a:moveTo>
                   <a:lnTo>
-                    <a:pt x="4142600" y="0"/>
-                  </a:lnTo>
-                  <a:lnTo>
-                    <a:pt x="4142600" y="0"/>
+                    <a:pt x="4200976" y="0"/>
+                  </a:lnTo>
+                  <a:lnTo>
+                    <a:pt x="4200976" y="0"/>
                   </a:lnTo>
                 </a:path>
               </a:pathLst>
@@ -2531,7 +2531,7 @@
           </p:nvSpPr>
           <p:spPr>
             <a:xfrm>
-              <a:off x="1475103" y="983989"/>
+              <a:off x="1475299" y="983989"/>
               <a:ext cx="0" cy="3185376"/>
             </a:xfrm>
             <a:custGeom>
@@ -2574,7 +2574,7 @@
           </p:nvSpPr>
           <p:spPr>
             <a:xfrm>
-              <a:off x="1823806" y="983989"/>
+              <a:off x="1828917" y="983989"/>
               <a:ext cx="0" cy="3185376"/>
             </a:xfrm>
             <a:custGeom>
@@ -2617,7 +2617,7 @@
           </p:nvSpPr>
           <p:spPr>
             <a:xfrm>
-              <a:off x="2172510" y="983989"/>
+              <a:off x="2182534" y="983989"/>
               <a:ext cx="0" cy="3185376"/>
             </a:xfrm>
             <a:custGeom>
@@ -2660,7 +2660,7 @@
           </p:nvSpPr>
           <p:spPr>
             <a:xfrm>
-              <a:off x="2521214" y="983989"/>
+              <a:off x="2536152" y="983989"/>
               <a:ext cx="0" cy="3185376"/>
             </a:xfrm>
             <a:custGeom>
@@ -2703,7 +2703,7 @@
           </p:nvSpPr>
           <p:spPr>
             <a:xfrm>
-              <a:off x="2869917" y="983989"/>
+              <a:off x="2889769" y="983989"/>
               <a:ext cx="0" cy="3185376"/>
             </a:xfrm>
             <a:custGeom>
@@ -2746,7 +2746,7 @@
           </p:nvSpPr>
           <p:spPr>
             <a:xfrm>
-              <a:off x="3218621" y="983989"/>
+              <a:off x="3243387" y="983989"/>
               <a:ext cx="0" cy="3185376"/>
             </a:xfrm>
             <a:custGeom>
@@ -2789,7 +2789,7 @@
           </p:nvSpPr>
           <p:spPr>
             <a:xfrm>
-              <a:off x="3567325" y="983989"/>
+              <a:off x="3597004" y="983989"/>
               <a:ext cx="0" cy="3185376"/>
             </a:xfrm>
             <a:custGeom>
@@ -2832,7 +2832,7 @@
           </p:nvSpPr>
           <p:spPr>
             <a:xfrm>
-              <a:off x="3916029" y="983989"/>
+              <a:off x="3950622" y="983989"/>
               <a:ext cx="0" cy="3185376"/>
             </a:xfrm>
             <a:custGeom>
@@ -2875,7 +2875,7 @@
           </p:nvSpPr>
           <p:spPr>
             <a:xfrm>
-              <a:off x="4264732" y="983989"/>
+              <a:off x="4304239" y="983989"/>
               <a:ext cx="0" cy="3185376"/>
             </a:xfrm>
             <a:custGeom>
@@ -2918,7 +2918,7 @@
           </p:nvSpPr>
           <p:spPr>
             <a:xfrm>
-              <a:off x="4613436" y="983989"/>
+              <a:off x="4657857" y="983989"/>
               <a:ext cx="0" cy="3185376"/>
             </a:xfrm>
             <a:custGeom>
@@ -2961,7 +2961,7 @@
           </p:nvSpPr>
           <p:spPr>
             <a:xfrm>
-              <a:off x="4962140" y="983989"/>
+              <a:off x="5011475" y="983989"/>
               <a:ext cx="0" cy="3185376"/>
             </a:xfrm>
             <a:custGeom>
@@ -3004,7 +3004,7 @@
           </p:nvSpPr>
           <p:spPr>
             <a:xfrm>
-              <a:off x="5310843" y="983989"/>
+              <a:off x="5365092" y="983989"/>
               <a:ext cx="0" cy="3185376"/>
             </a:xfrm>
             <a:custGeom>
@@ -3048,20 +3048,20 @@
           <p:spPr>
             <a:xfrm>
               <a:off x="1461154" y="4024575"/>
-              <a:ext cx="4142600" cy="0"/>
+              <a:ext cx="4200976" cy="0"/>
             </a:xfrm>
             <a:custGeom>
               <a:avLst/>
               <a:pathLst>
-                <a:path w="4142600" h="0">
+                <a:path w="4200976" h="0">
                   <a:moveTo>
                     <a:pt x="0" y="0"/>
                   </a:moveTo>
                   <a:lnTo>
-                    <a:pt x="4142600" y="0"/>
-                  </a:lnTo>
-                  <a:lnTo>
-                    <a:pt x="4142600" y="0"/>
+                    <a:pt x="4200976" y="0"/>
+                  </a:lnTo>
+                  <a:lnTo>
+                    <a:pt x="4200976" y="0"/>
                   </a:lnTo>
                 </a:path>
               </a:pathLst>
@@ -3091,20 +3091,20 @@
           <p:spPr>
             <a:xfrm>
               <a:off x="1461154" y="3178134"/>
-              <a:ext cx="4142600" cy="0"/>
+              <a:ext cx="4200976" cy="0"/>
             </a:xfrm>
             <a:custGeom>
               <a:avLst/>
               <a:pathLst>
-                <a:path w="4142600" h="0">
+                <a:path w="4200976" h="0">
                   <a:moveTo>
                     <a:pt x="0" y="0"/>
                   </a:moveTo>
                   <a:lnTo>
-                    <a:pt x="4142600" y="0"/>
-                  </a:lnTo>
-                  <a:lnTo>
-                    <a:pt x="4142600" y="0"/>
+                    <a:pt x="4200976" y="0"/>
+                  </a:lnTo>
+                  <a:lnTo>
+                    <a:pt x="4200976" y="0"/>
                   </a:lnTo>
                 </a:path>
               </a:pathLst>
@@ -3134,20 +3134,20 @@
           <p:spPr>
             <a:xfrm>
               <a:off x="1461154" y="2331694"/>
-              <a:ext cx="4142600" cy="0"/>
+              <a:ext cx="4200976" cy="0"/>
             </a:xfrm>
             <a:custGeom>
               <a:avLst/>
               <a:pathLst>
-                <a:path w="4142600" h="0">
+                <a:path w="4200976" h="0">
                   <a:moveTo>
                     <a:pt x="0" y="0"/>
                   </a:moveTo>
                   <a:lnTo>
-                    <a:pt x="4142600" y="0"/>
-                  </a:lnTo>
-                  <a:lnTo>
-                    <a:pt x="4142600" y="0"/>
+                    <a:pt x="4200976" y="0"/>
+                  </a:lnTo>
+                  <a:lnTo>
+                    <a:pt x="4200976" y="0"/>
                   </a:lnTo>
                 </a:path>
               </a:pathLst>
@@ -3177,20 +3177,20 @@
           <p:spPr>
             <a:xfrm>
               <a:off x="1461154" y="1485253"/>
-              <a:ext cx="4142600" cy="0"/>
+              <a:ext cx="4200976" cy="0"/>
             </a:xfrm>
             <a:custGeom>
               <a:avLst/>
               <a:pathLst>
-                <a:path w="4142600" h="0">
+                <a:path w="4200976" h="0">
                   <a:moveTo>
                     <a:pt x="0" y="0"/>
                   </a:moveTo>
                   <a:lnTo>
-                    <a:pt x="4142600" y="0"/>
-                  </a:lnTo>
-                  <a:lnTo>
-                    <a:pt x="4142600" y="0"/>
+                    <a:pt x="4200976" y="0"/>
+                  </a:lnTo>
+                  <a:lnTo>
+                    <a:pt x="4200976" y="0"/>
                   </a:lnTo>
                 </a:path>
               </a:pathLst>
@@ -3219,7 +3219,7 @@
           </p:nvSpPr>
           <p:spPr>
             <a:xfrm>
-              <a:off x="1649454" y="983989"/>
+              <a:off x="1652108" y="983989"/>
               <a:ext cx="0" cy="3185376"/>
             </a:xfrm>
             <a:custGeom>
@@ -3262,7 +3262,7 @@
           </p:nvSpPr>
           <p:spPr>
             <a:xfrm>
-              <a:off x="1998158" y="983989"/>
+              <a:off x="2005725" y="983989"/>
               <a:ext cx="0" cy="3185376"/>
             </a:xfrm>
             <a:custGeom>
@@ -3305,7 +3305,7 @@
           </p:nvSpPr>
           <p:spPr>
             <a:xfrm>
-              <a:off x="2346862" y="983989"/>
+              <a:off x="2359343" y="983989"/>
               <a:ext cx="0" cy="3185376"/>
             </a:xfrm>
             <a:custGeom>
@@ -3348,7 +3348,7 @@
           </p:nvSpPr>
           <p:spPr>
             <a:xfrm>
-              <a:off x="2695566" y="983989"/>
+              <a:off x="2712960" y="983989"/>
               <a:ext cx="0" cy="3185376"/>
             </a:xfrm>
             <a:custGeom>
@@ -3391,7 +3391,7 @@
           </p:nvSpPr>
           <p:spPr>
             <a:xfrm>
-              <a:off x="3044269" y="983989"/>
+              <a:off x="3066578" y="983989"/>
               <a:ext cx="0" cy="3185376"/>
             </a:xfrm>
             <a:custGeom>
@@ -3434,7 +3434,7 @@
           </p:nvSpPr>
           <p:spPr>
             <a:xfrm>
-              <a:off x="3392973" y="983989"/>
+              <a:off x="3420196" y="983989"/>
               <a:ext cx="0" cy="3185376"/>
             </a:xfrm>
             <a:custGeom>
@@ -3477,7 +3477,7 @@
           </p:nvSpPr>
           <p:spPr>
             <a:xfrm>
-              <a:off x="3741677" y="983989"/>
+              <a:off x="3773813" y="983989"/>
               <a:ext cx="0" cy="3185376"/>
             </a:xfrm>
             <a:custGeom>
@@ -3520,7 +3520,7 @@
           </p:nvSpPr>
           <p:spPr>
             <a:xfrm>
-              <a:off x="4090380" y="983989"/>
+              <a:off x="4127431" y="983989"/>
               <a:ext cx="0" cy="3185376"/>
             </a:xfrm>
             <a:custGeom>
@@ -3563,7 +3563,7 @@
           </p:nvSpPr>
           <p:spPr>
             <a:xfrm>
-              <a:off x="4439084" y="983989"/>
+              <a:off x="4481048" y="983989"/>
               <a:ext cx="0" cy="3185376"/>
             </a:xfrm>
             <a:custGeom>
@@ -3606,7 +3606,7 @@
           </p:nvSpPr>
           <p:spPr>
             <a:xfrm>
-              <a:off x="4787788" y="983989"/>
+              <a:off x="4834666" y="983989"/>
               <a:ext cx="0" cy="3185376"/>
             </a:xfrm>
             <a:custGeom>
@@ -3649,7 +3649,7 @@
           </p:nvSpPr>
           <p:spPr>
             <a:xfrm>
-              <a:off x="5136492" y="983989"/>
+              <a:off x="5188283" y="983989"/>
               <a:ext cx="0" cy="3185376"/>
             </a:xfrm>
             <a:custGeom>
@@ -3692,7 +3692,7 @@
           </p:nvSpPr>
           <p:spPr>
             <a:xfrm>
-              <a:off x="5485195" y="983989"/>
+              <a:off x="5541901" y="983989"/>
               <a:ext cx="0" cy="3185376"/>
             </a:xfrm>
             <a:custGeom>
@@ -3735,181 +3735,181 @@
           </p:nvSpPr>
           <p:spPr>
             <a:xfrm>
-              <a:off x="1684325" y="1128778"/>
-              <a:ext cx="3696259" cy="2895796"/>
+              <a:off x="1687470" y="1128778"/>
+              <a:ext cx="3748346" cy="2895796"/>
             </a:xfrm>
             <a:custGeom>
               <a:avLst/>
               <a:pathLst>
-                <a:path w="3696259" h="2895796">
+                <a:path w="3748346" h="2895796">
                   <a:moveTo>
                     <a:pt x="0" y="2895796"/>
                   </a:moveTo>
                   <a:lnTo>
-                    <a:pt x="69740" y="2895796"/>
-                  </a:lnTo>
-                  <a:lnTo>
-                    <a:pt x="139481" y="2895796"/>
-                  </a:lnTo>
-                  <a:lnTo>
-                    <a:pt x="209222" y="2895796"/>
-                  </a:lnTo>
-                  <a:lnTo>
-                    <a:pt x="278962" y="2895796"/>
-                  </a:lnTo>
-                  <a:lnTo>
-                    <a:pt x="348703" y="2895796"/>
-                  </a:lnTo>
-                  <a:lnTo>
-                    <a:pt x="418444" y="2895795"/>
-                  </a:lnTo>
-                  <a:lnTo>
-                    <a:pt x="488185" y="2895794"/>
-                  </a:lnTo>
-                  <a:lnTo>
-                    <a:pt x="557925" y="2895792"/>
-                  </a:lnTo>
-                  <a:lnTo>
-                    <a:pt x="627666" y="2895788"/>
-                  </a:lnTo>
-                  <a:lnTo>
-                    <a:pt x="697407" y="2895780"/>
-                  </a:lnTo>
-                  <a:lnTo>
-                    <a:pt x="767148" y="2895761"/>
-                  </a:lnTo>
-                  <a:lnTo>
-                    <a:pt x="836888" y="2895722"/>
-                  </a:lnTo>
-                  <a:lnTo>
-                    <a:pt x="906629" y="2895641"/>
-                  </a:lnTo>
-                  <a:lnTo>
-                    <a:pt x="976370" y="2895467"/>
-                  </a:lnTo>
-                  <a:lnTo>
-                    <a:pt x="1046111" y="2895102"/>
-                  </a:lnTo>
-                  <a:lnTo>
-                    <a:pt x="1115851" y="2894330"/>
-                  </a:lnTo>
-                  <a:lnTo>
-                    <a:pt x="1185592" y="2892704"/>
-                  </a:lnTo>
-                  <a:lnTo>
-                    <a:pt x="1255333" y="2889289"/>
-                  </a:lnTo>
-                  <a:lnTo>
-                    <a:pt x="1325074" y="2882150"/>
-                  </a:lnTo>
-                  <a:lnTo>
-                    <a:pt x="1394814" y="2867526"/>
-                  </a:lnTo>
-                  <a:lnTo>
-                    <a:pt x="1464555" y="2837768"/>
-                  </a:lnTo>
-                  <a:lnTo>
-                    <a:pt x="1534296" y="2783839"/>
-                  </a:lnTo>
-                  <a:lnTo>
-                    <a:pt x="1604037" y="2683813"/>
-                  </a:lnTo>
-                  <a:lnTo>
-                    <a:pt x="1673777" y="2531212"/>
-                  </a:lnTo>
-                  <a:lnTo>
-                    <a:pt x="1743518" y="2336226"/>
-                  </a:lnTo>
-                  <a:lnTo>
-                    <a:pt x="1813259" y="2267813"/>
-                  </a:lnTo>
-                  <a:lnTo>
-                    <a:pt x="1883000" y="2211885"/>
-                  </a:lnTo>
-                  <a:lnTo>
-                    <a:pt x="1952740" y="2173010"/>
-                  </a:lnTo>
-                  <a:lnTo>
-                    <a:pt x="2022481" y="1975660"/>
-                  </a:lnTo>
-                  <a:lnTo>
-                    <a:pt x="2092222" y="1642403"/>
-                  </a:lnTo>
-                  <a:lnTo>
-                    <a:pt x="2161963" y="1271367"/>
-                  </a:lnTo>
-                  <a:lnTo>
-                    <a:pt x="2231703" y="838577"/>
-                  </a:lnTo>
-                  <a:lnTo>
-                    <a:pt x="2301444" y="504086"/>
-                  </a:lnTo>
-                  <a:lnTo>
-                    <a:pt x="2371185" y="206204"/>
-                  </a:lnTo>
-                  <a:lnTo>
-                    <a:pt x="2440926" y="0"/>
-                  </a:lnTo>
-                  <a:lnTo>
-                    <a:pt x="2510666" y="407290"/>
-                  </a:lnTo>
-                  <a:lnTo>
-                    <a:pt x="2580407" y="985269"/>
-                  </a:lnTo>
-                  <a:lnTo>
-                    <a:pt x="2650148" y="1323640"/>
-                  </a:lnTo>
-                  <a:lnTo>
-                    <a:pt x="2719888" y="1609777"/>
-                  </a:lnTo>
-                  <a:lnTo>
-                    <a:pt x="2789629" y="1933298"/>
-                  </a:lnTo>
-                  <a:lnTo>
-                    <a:pt x="2859370" y="2082105"/>
-                  </a:lnTo>
-                  <a:lnTo>
-                    <a:pt x="2929111" y="2046800"/>
-                  </a:lnTo>
-                  <a:lnTo>
-                    <a:pt x="2998851" y="1893380"/>
-                  </a:lnTo>
-                  <a:lnTo>
-                    <a:pt x="3068592" y="1610544"/>
-                  </a:lnTo>
-                  <a:lnTo>
-                    <a:pt x="3138333" y="1424078"/>
-                  </a:lnTo>
-                  <a:lnTo>
-                    <a:pt x="3208074" y="1271332"/>
-                  </a:lnTo>
-                  <a:lnTo>
-                    <a:pt x="3277814" y="1424267"/>
-                  </a:lnTo>
-                  <a:lnTo>
-                    <a:pt x="3347555" y="1705603"/>
-                  </a:lnTo>
-                  <a:lnTo>
-                    <a:pt x="3417296" y="2156809"/>
-                  </a:lnTo>
-                  <a:lnTo>
-                    <a:pt x="3487037" y="2443154"/>
-                  </a:lnTo>
-                  <a:lnTo>
-                    <a:pt x="3556777" y="2621823"/>
-                  </a:lnTo>
-                  <a:lnTo>
-                    <a:pt x="3626518" y="2709088"/>
-                  </a:lnTo>
-                  <a:lnTo>
-                    <a:pt x="3696259" y="2763881"/>
+                    <a:pt x="70723" y="2895796"/>
+                  </a:lnTo>
+                  <a:lnTo>
+                    <a:pt x="141447" y="2895796"/>
+                  </a:lnTo>
+                  <a:lnTo>
+                    <a:pt x="212170" y="2895796"/>
+                  </a:lnTo>
+                  <a:lnTo>
+                    <a:pt x="282894" y="2895796"/>
+                  </a:lnTo>
+                  <a:lnTo>
+                    <a:pt x="353617" y="2895796"/>
+                  </a:lnTo>
+                  <a:lnTo>
+                    <a:pt x="424341" y="2895795"/>
+                  </a:lnTo>
+                  <a:lnTo>
+                    <a:pt x="495064" y="2895794"/>
+                  </a:lnTo>
+                  <a:lnTo>
+                    <a:pt x="565788" y="2895792"/>
+                  </a:lnTo>
+                  <a:lnTo>
+                    <a:pt x="636511" y="2895788"/>
+                  </a:lnTo>
+                  <a:lnTo>
+                    <a:pt x="707235" y="2895780"/>
+                  </a:lnTo>
+                  <a:lnTo>
+                    <a:pt x="777958" y="2895761"/>
+                  </a:lnTo>
+                  <a:lnTo>
+                    <a:pt x="848682" y="2895722"/>
+                  </a:lnTo>
+                  <a:lnTo>
+                    <a:pt x="919405" y="2895641"/>
+                  </a:lnTo>
+                  <a:lnTo>
+                    <a:pt x="990129" y="2895467"/>
+                  </a:lnTo>
+                  <a:lnTo>
+                    <a:pt x="1060852" y="2895102"/>
+                  </a:lnTo>
+                  <a:lnTo>
+                    <a:pt x="1131576" y="2894330"/>
+                  </a:lnTo>
+                  <a:lnTo>
+                    <a:pt x="1202299" y="2892704"/>
+                  </a:lnTo>
+                  <a:lnTo>
+                    <a:pt x="1273023" y="2889289"/>
+                  </a:lnTo>
+                  <a:lnTo>
+                    <a:pt x="1343746" y="2882150"/>
+                  </a:lnTo>
+                  <a:lnTo>
+                    <a:pt x="1414470" y="2867526"/>
+                  </a:lnTo>
+                  <a:lnTo>
+                    <a:pt x="1485193" y="2837768"/>
+                  </a:lnTo>
+                  <a:lnTo>
+                    <a:pt x="1555917" y="2783839"/>
+                  </a:lnTo>
+                  <a:lnTo>
+                    <a:pt x="1626640" y="2683813"/>
+                  </a:lnTo>
+                  <a:lnTo>
+                    <a:pt x="1697364" y="2531212"/>
+                  </a:lnTo>
+                  <a:lnTo>
+                    <a:pt x="1768087" y="2336226"/>
+                  </a:lnTo>
+                  <a:lnTo>
+                    <a:pt x="1838811" y="2267813"/>
+                  </a:lnTo>
+                  <a:lnTo>
+                    <a:pt x="1909534" y="2211885"/>
+                  </a:lnTo>
+                  <a:lnTo>
+                    <a:pt x="1980258" y="2173010"/>
+                  </a:lnTo>
+                  <a:lnTo>
+                    <a:pt x="2050981" y="1975660"/>
+                  </a:lnTo>
+                  <a:lnTo>
+                    <a:pt x="2121705" y="1642403"/>
+                  </a:lnTo>
+                  <a:lnTo>
+                    <a:pt x="2192428" y="1271367"/>
+                  </a:lnTo>
+                  <a:lnTo>
+                    <a:pt x="2263152" y="838577"/>
+                  </a:lnTo>
+                  <a:lnTo>
+                    <a:pt x="2333875" y="504086"/>
+                  </a:lnTo>
+                  <a:lnTo>
+                    <a:pt x="2404599" y="206204"/>
+                  </a:lnTo>
+                  <a:lnTo>
+                    <a:pt x="2475322" y="0"/>
+                  </a:lnTo>
+                  <a:lnTo>
+                    <a:pt x="2546046" y="407290"/>
+                  </a:lnTo>
+                  <a:lnTo>
+                    <a:pt x="2616769" y="985269"/>
+                  </a:lnTo>
+                  <a:lnTo>
+                    <a:pt x="2687493" y="1323640"/>
+                  </a:lnTo>
+                  <a:lnTo>
+                    <a:pt x="2758216" y="1609777"/>
+                  </a:lnTo>
+                  <a:lnTo>
+                    <a:pt x="2828940" y="1933298"/>
+                  </a:lnTo>
+                  <a:lnTo>
+                    <a:pt x="2899663" y="2082105"/>
+                  </a:lnTo>
+                  <a:lnTo>
+                    <a:pt x="2970387" y="2046800"/>
+                  </a:lnTo>
+                  <a:lnTo>
+                    <a:pt x="3041110" y="1893380"/>
+                  </a:lnTo>
+                  <a:lnTo>
+                    <a:pt x="3111834" y="1610544"/>
+                  </a:lnTo>
+                  <a:lnTo>
+                    <a:pt x="3182557" y="1424078"/>
+                  </a:lnTo>
+                  <a:lnTo>
+                    <a:pt x="3253281" y="1271332"/>
+                  </a:lnTo>
+                  <a:lnTo>
+                    <a:pt x="3324004" y="1424267"/>
+                  </a:lnTo>
+                  <a:lnTo>
+                    <a:pt x="3394728" y="1705603"/>
+                  </a:lnTo>
+                  <a:lnTo>
+                    <a:pt x="3465451" y="2156809"/>
+                  </a:lnTo>
+                  <a:lnTo>
+                    <a:pt x="3536175" y="2443154"/>
+                  </a:lnTo>
+                  <a:lnTo>
+                    <a:pt x="3606899" y="2621823"/>
+                  </a:lnTo>
+                  <a:lnTo>
+                    <a:pt x="3677622" y="2709088"/>
+                  </a:lnTo>
+                  <a:lnTo>
+                    <a:pt x="3748346" y="2763881"/>
                   </a:lnTo>
                 </a:path>
               </a:pathLst>
             </a:custGeom>
             <a:ln w="27101" cap="flat">
               <a:solidFill>
-                <a:srgbClr val="7F7F7F">
+                <a:srgbClr val="F8766D">
                   <a:alpha val="100000"/>
                 </a:srgbClr>
               </a:solidFill>
@@ -3931,20 +3931,20 @@
           </p:nvSpPr>
           <p:spPr>
             <a:xfrm>
-              <a:off x="1659499" y="3999749"/>
+              <a:off x="1662644" y="3999749"/>
               <a:ext cx="49651" cy="49651"/>
             </a:xfrm>
             <a:prstGeom prst="ellipse">
               <a:avLst/>
             </a:prstGeom>
             <a:solidFill>
-              <a:srgbClr val="7F7F7F">
+              <a:srgbClr val="F8766D">
                 <a:alpha val="100000"/>
               </a:srgbClr>
             </a:solidFill>
             <a:ln w="9000" cap="rnd">
               <a:solidFill>
-                <a:srgbClr val="7F7F7F">
+                <a:srgbClr val="F8766D">
                   <a:alpha val="100000"/>
                 </a:srgbClr>
               </a:solidFill>
@@ -3966,20 +3966,20 @@
           </p:nvSpPr>
           <p:spPr>
             <a:xfrm>
-              <a:off x="1729240" y="3999749"/>
+              <a:off x="1733367" y="3999749"/>
               <a:ext cx="49651" cy="49651"/>
             </a:xfrm>
             <a:prstGeom prst="ellipse">
               <a:avLst/>
             </a:prstGeom>
             <a:solidFill>
-              <a:srgbClr val="7F7F7F">
+              <a:srgbClr val="F8766D">
                 <a:alpha val="100000"/>
               </a:srgbClr>
             </a:solidFill>
             <a:ln w="9000" cap="rnd">
               <a:solidFill>
-                <a:srgbClr val="7F7F7F">
+                <a:srgbClr val="F8766D">
                   <a:alpha val="100000"/>
                 </a:srgbClr>
               </a:solidFill>
@@ -4001,20 +4001,20 @@
           </p:nvSpPr>
           <p:spPr>
             <a:xfrm>
-              <a:off x="1798980" y="3999749"/>
+              <a:off x="1804091" y="3999749"/>
               <a:ext cx="49651" cy="49651"/>
             </a:xfrm>
             <a:prstGeom prst="ellipse">
               <a:avLst/>
             </a:prstGeom>
             <a:solidFill>
-              <a:srgbClr val="7F7F7F">
+              <a:srgbClr val="F8766D">
                 <a:alpha val="100000"/>
               </a:srgbClr>
             </a:solidFill>
             <a:ln w="9000" cap="rnd">
               <a:solidFill>
-                <a:srgbClr val="7F7F7F">
+                <a:srgbClr val="F8766D">
                   <a:alpha val="100000"/>
                 </a:srgbClr>
               </a:solidFill>
@@ -4036,20 +4036,20 @@
           </p:nvSpPr>
           <p:spPr>
             <a:xfrm>
-              <a:off x="1868721" y="3999749"/>
+              <a:off x="1874814" y="3999749"/>
               <a:ext cx="49651" cy="49651"/>
             </a:xfrm>
             <a:prstGeom prst="ellipse">
               <a:avLst/>
             </a:prstGeom>
             <a:solidFill>
-              <a:srgbClr val="7F7F7F">
+              <a:srgbClr val="F8766D">
                 <a:alpha val="100000"/>
               </a:srgbClr>
             </a:solidFill>
             <a:ln w="9000" cap="rnd">
               <a:solidFill>
-                <a:srgbClr val="7F7F7F">
+                <a:srgbClr val="F8766D">
                   <a:alpha val="100000"/>
                 </a:srgbClr>
               </a:solidFill>
@@ -4071,20 +4071,20 @@
           </p:nvSpPr>
           <p:spPr>
             <a:xfrm>
-              <a:off x="1938462" y="3999749"/>
+              <a:off x="1945538" y="3999749"/>
               <a:ext cx="49651" cy="49651"/>
             </a:xfrm>
             <a:prstGeom prst="ellipse">
               <a:avLst/>
             </a:prstGeom>
             <a:solidFill>
-              <a:srgbClr val="7F7F7F">
+              <a:srgbClr val="F8766D">
                 <a:alpha val="100000"/>
               </a:srgbClr>
             </a:solidFill>
             <a:ln w="9000" cap="rnd">
               <a:solidFill>
-                <a:srgbClr val="7F7F7F">
+                <a:srgbClr val="F8766D">
                   <a:alpha val="100000"/>
                 </a:srgbClr>
               </a:solidFill>
@@ -4106,20 +4106,20 @@
           </p:nvSpPr>
           <p:spPr>
             <a:xfrm>
-              <a:off x="2008203" y="3999749"/>
+              <a:off x="2016261" y="3999749"/>
               <a:ext cx="49651" cy="49651"/>
             </a:xfrm>
             <a:prstGeom prst="ellipse">
               <a:avLst/>
             </a:prstGeom>
             <a:solidFill>
-              <a:srgbClr val="7F7F7F">
+              <a:srgbClr val="F8766D">
                 <a:alpha val="100000"/>
               </a:srgbClr>
             </a:solidFill>
             <a:ln w="9000" cap="rnd">
               <a:solidFill>
-                <a:srgbClr val="7F7F7F">
+                <a:srgbClr val="F8766D">
                   <a:alpha val="100000"/>
                 </a:srgbClr>
               </a:solidFill>
@@ -4141,20 +4141,20 @@
           </p:nvSpPr>
           <p:spPr>
             <a:xfrm>
-              <a:off x="2077943" y="3999748"/>
+              <a:off x="2086985" y="3999748"/>
               <a:ext cx="49651" cy="49651"/>
             </a:xfrm>
             <a:prstGeom prst="ellipse">
               <a:avLst/>
             </a:prstGeom>
             <a:solidFill>
-              <a:srgbClr val="7F7F7F">
+              <a:srgbClr val="F8766D">
                 <a:alpha val="100000"/>
               </a:srgbClr>
             </a:solidFill>
             <a:ln w="9000" cap="rnd">
               <a:solidFill>
-                <a:srgbClr val="7F7F7F">
+                <a:srgbClr val="F8766D">
                   <a:alpha val="100000"/>
                 </a:srgbClr>
               </a:solidFill>
@@ -4176,20 +4176,20 @@
           </p:nvSpPr>
           <p:spPr>
             <a:xfrm>
-              <a:off x="2147684" y="3999747"/>
+              <a:off x="2157708" y="3999747"/>
               <a:ext cx="49651" cy="49651"/>
             </a:xfrm>
             <a:prstGeom prst="ellipse">
               <a:avLst/>
             </a:prstGeom>
             <a:solidFill>
-              <a:srgbClr val="7F7F7F">
+              <a:srgbClr val="F8766D">
                 <a:alpha val="100000"/>
               </a:srgbClr>
             </a:solidFill>
             <a:ln w="9000" cap="rnd">
               <a:solidFill>
-                <a:srgbClr val="7F7F7F">
+                <a:srgbClr val="F8766D">
                   <a:alpha val="100000"/>
                 </a:srgbClr>
               </a:solidFill>
@@ -4211,20 +4211,20 @@
           </p:nvSpPr>
           <p:spPr>
             <a:xfrm>
-              <a:off x="2217425" y="3999745"/>
+              <a:off x="2228432" y="3999745"/>
               <a:ext cx="49651" cy="49651"/>
             </a:xfrm>
             <a:prstGeom prst="ellipse">
               <a:avLst/>
             </a:prstGeom>
             <a:solidFill>
-              <a:srgbClr val="7F7F7F">
+              <a:srgbClr val="F8766D">
                 <a:alpha val="100000"/>
               </a:srgbClr>
             </a:solidFill>
             <a:ln w="9000" cap="rnd">
               <a:solidFill>
-                <a:srgbClr val="7F7F7F">
+                <a:srgbClr val="F8766D">
                   <a:alpha val="100000"/>
                 </a:srgbClr>
               </a:solidFill>
@@ -4246,20 +4246,20 @@
           </p:nvSpPr>
           <p:spPr>
             <a:xfrm>
-              <a:off x="2287165" y="3999741"/>
+              <a:off x="2299155" y="3999741"/>
               <a:ext cx="49651" cy="49651"/>
             </a:xfrm>
             <a:prstGeom prst="ellipse">
               <a:avLst/>
             </a:prstGeom>
             <a:solidFill>
-              <a:srgbClr val="7F7F7F">
+              <a:srgbClr val="F8766D">
                 <a:alpha val="100000"/>
               </a:srgbClr>
             </a:solidFill>
             <a:ln w="9000" cap="rnd">
               <a:solidFill>
-                <a:srgbClr val="7F7F7F">
+                <a:srgbClr val="F8766D">
                   <a:alpha val="100000"/>
                 </a:srgbClr>
               </a:solidFill>
@@ -4281,20 +4281,20 @@
           </p:nvSpPr>
           <p:spPr>
             <a:xfrm>
-              <a:off x="2356906" y="3999733"/>
+              <a:off x="2369879" y="3999733"/>
               <a:ext cx="49651" cy="49651"/>
             </a:xfrm>
             <a:prstGeom prst="ellipse">
               <a:avLst/>
             </a:prstGeom>
             <a:solidFill>
-              <a:srgbClr val="7F7F7F">
+              <a:srgbClr val="F8766D">
                 <a:alpha val="100000"/>
               </a:srgbClr>
             </a:solidFill>
             <a:ln w="9000" cap="rnd">
               <a:solidFill>
-                <a:srgbClr val="7F7F7F">
+                <a:srgbClr val="F8766D">
                   <a:alpha val="100000"/>
                 </a:srgbClr>
               </a:solidFill>
@@ -4316,20 +4316,20 @@
           </p:nvSpPr>
           <p:spPr>
             <a:xfrm>
-              <a:off x="2426647" y="3999714"/>
+              <a:off x="2440602" y="3999714"/>
               <a:ext cx="49651" cy="49651"/>
             </a:xfrm>
             <a:prstGeom prst="ellipse">
               <a:avLst/>
             </a:prstGeom>
             <a:solidFill>
-              <a:srgbClr val="7F7F7F">
+              <a:srgbClr val="F8766D">
                 <a:alpha val="100000"/>
               </a:srgbClr>
             </a:solidFill>
             <a:ln w="9000" cap="rnd">
               <a:solidFill>
-                <a:srgbClr val="7F7F7F">
+                <a:srgbClr val="F8766D">
                   <a:alpha val="100000"/>
                 </a:srgbClr>
               </a:solidFill>
@@ -4351,20 +4351,20 @@
           </p:nvSpPr>
           <p:spPr>
             <a:xfrm>
-              <a:off x="2496388" y="3999675"/>
+              <a:off x="2511326" y="3999675"/>
               <a:ext cx="49651" cy="49651"/>
             </a:xfrm>
             <a:prstGeom prst="ellipse">
               <a:avLst/>
             </a:prstGeom>
             <a:solidFill>
-              <a:srgbClr val="7F7F7F">
+              <a:srgbClr val="F8766D">
                 <a:alpha val="100000"/>
               </a:srgbClr>
             </a:solidFill>
             <a:ln w="9000" cap="rnd">
               <a:solidFill>
-                <a:srgbClr val="7F7F7F">
+                <a:srgbClr val="F8766D">
                   <a:alpha val="100000"/>
                 </a:srgbClr>
               </a:solidFill>
@@ -4386,20 +4386,20 @@
           </p:nvSpPr>
           <p:spPr>
             <a:xfrm>
-              <a:off x="2566128" y="3999593"/>
+              <a:off x="2582049" y="3999593"/>
               <a:ext cx="49651" cy="49651"/>
             </a:xfrm>
             <a:prstGeom prst="ellipse">
               <a:avLst/>
             </a:prstGeom>
             <a:solidFill>
-              <a:srgbClr val="7F7F7F">
+              <a:srgbClr val="F8766D">
                 <a:alpha val="100000"/>
               </a:srgbClr>
             </a:solidFill>
             <a:ln w="9000" cap="rnd">
               <a:solidFill>
-                <a:srgbClr val="7F7F7F">
+                <a:srgbClr val="F8766D">
                   <a:alpha val="100000"/>
                 </a:srgbClr>
               </a:solidFill>
@@ -4421,20 +4421,20 @@
           </p:nvSpPr>
           <p:spPr>
             <a:xfrm>
-              <a:off x="2635869" y="3999420"/>
+              <a:off x="2652773" y="3999420"/>
               <a:ext cx="49651" cy="49651"/>
             </a:xfrm>
             <a:prstGeom prst="ellipse">
               <a:avLst/>
             </a:prstGeom>
             <a:solidFill>
-              <a:srgbClr val="7F7F7F">
+              <a:srgbClr val="F8766D">
                 <a:alpha val="100000"/>
               </a:srgbClr>
             </a:solidFill>
             <a:ln w="9000" cap="rnd">
               <a:solidFill>
-                <a:srgbClr val="7F7F7F">
+                <a:srgbClr val="F8766D">
                   <a:alpha val="100000"/>
                 </a:srgbClr>
               </a:solidFill>
@@ -4456,20 +4456,20 @@
           </p:nvSpPr>
           <p:spPr>
             <a:xfrm>
-              <a:off x="2705610" y="3999055"/>
+              <a:off x="2723496" y="3999055"/>
               <a:ext cx="49651" cy="49651"/>
             </a:xfrm>
             <a:prstGeom prst="ellipse">
               <a:avLst/>
             </a:prstGeom>
             <a:solidFill>
-              <a:srgbClr val="7F7F7F">
+              <a:srgbClr val="F8766D">
                 <a:alpha val="100000"/>
               </a:srgbClr>
             </a:solidFill>
             <a:ln w="9000" cap="rnd">
               <a:solidFill>
-                <a:srgbClr val="7F7F7F">
+                <a:srgbClr val="F8766D">
                   <a:alpha val="100000"/>
                 </a:srgbClr>
               </a:solidFill>
@@ -4491,20 +4491,20 @@
           </p:nvSpPr>
           <p:spPr>
             <a:xfrm>
-              <a:off x="2775351" y="3998283"/>
+              <a:off x="2794220" y="3998283"/>
               <a:ext cx="49651" cy="49651"/>
             </a:xfrm>
             <a:prstGeom prst="ellipse">
               <a:avLst/>
             </a:prstGeom>
             <a:solidFill>
-              <a:srgbClr val="7F7F7F">
+              <a:srgbClr val="F8766D">
                 <a:alpha val="100000"/>
               </a:srgbClr>
             </a:solidFill>
             <a:ln w="9000" cap="rnd">
               <a:solidFill>
-                <a:srgbClr val="7F7F7F">
+                <a:srgbClr val="F8766D">
                   <a:alpha val="100000"/>
                 </a:srgbClr>
               </a:solidFill>
@@ -4526,20 +4526,20 @@
           </p:nvSpPr>
           <p:spPr>
             <a:xfrm>
-              <a:off x="2845091" y="3996657"/>
+              <a:off x="2864943" y="3996657"/>
               <a:ext cx="49651" cy="49651"/>
             </a:xfrm>
             <a:prstGeom prst="ellipse">
               <a:avLst/>
             </a:prstGeom>
             <a:solidFill>
-              <a:srgbClr val="7F7F7F">
+              <a:srgbClr val="F8766D">
                 <a:alpha val="100000"/>
               </a:srgbClr>
             </a:solidFill>
             <a:ln w="9000" cap="rnd">
               <a:solidFill>
-                <a:srgbClr val="7F7F7F">
+                <a:srgbClr val="F8766D">
                   <a:alpha val="100000"/>
                 </a:srgbClr>
               </a:solidFill>
@@ -4561,20 +4561,20 @@
           </p:nvSpPr>
           <p:spPr>
             <a:xfrm>
-              <a:off x="2914832" y="3993242"/>
+              <a:off x="2935667" y="3993242"/>
               <a:ext cx="49651" cy="49651"/>
             </a:xfrm>
             <a:prstGeom prst="ellipse">
               <a:avLst/>
             </a:prstGeom>
             <a:solidFill>
-              <a:srgbClr val="7F7F7F">
+              <a:srgbClr val="F8766D">
                 <a:alpha val="100000"/>
               </a:srgbClr>
             </a:solidFill>
             <a:ln w="9000" cap="rnd">
               <a:solidFill>
-                <a:srgbClr val="7F7F7F">
+                <a:srgbClr val="F8766D">
                   <a:alpha val="100000"/>
                 </a:srgbClr>
               </a:solidFill>
@@ -4596,20 +4596,20 @@
           </p:nvSpPr>
           <p:spPr>
             <a:xfrm>
-              <a:off x="2984573" y="3986103"/>
+              <a:off x="3006390" y="3986103"/>
               <a:ext cx="49651" cy="49651"/>
             </a:xfrm>
             <a:prstGeom prst="ellipse">
               <a:avLst/>
             </a:prstGeom>
             <a:solidFill>
-              <a:srgbClr val="7F7F7F">
+              <a:srgbClr val="F8766D">
                 <a:alpha val="100000"/>
               </a:srgbClr>
             </a:solidFill>
             <a:ln w="9000" cap="rnd">
               <a:solidFill>
-                <a:srgbClr val="7F7F7F">
+                <a:srgbClr val="F8766D">
                   <a:alpha val="100000"/>
                 </a:srgbClr>
               </a:solidFill>
@@ -4631,20 +4631,20 @@
           </p:nvSpPr>
           <p:spPr>
             <a:xfrm>
-              <a:off x="3054314" y="3971479"/>
+              <a:off x="3077114" y="3971479"/>
               <a:ext cx="49651" cy="49651"/>
             </a:xfrm>
             <a:prstGeom prst="ellipse">
               <a:avLst/>
             </a:prstGeom>
             <a:solidFill>
-              <a:srgbClr val="7F7F7F">
+              <a:srgbClr val="F8766D">
                 <a:alpha val="100000"/>
               </a:srgbClr>
             </a:solidFill>
             <a:ln w="9000" cap="rnd">
               <a:solidFill>
-                <a:srgbClr val="7F7F7F">
+                <a:srgbClr val="F8766D">
                   <a:alpha val="100000"/>
                 </a:srgbClr>
               </a:solidFill>
@@ -4666,20 +4666,20 @@
           </p:nvSpPr>
           <p:spPr>
             <a:xfrm>
-              <a:off x="3124054" y="3941721"/>
+              <a:off x="3147837" y="3941721"/>
               <a:ext cx="49651" cy="49651"/>
             </a:xfrm>
             <a:prstGeom prst="ellipse">
               <a:avLst/>
             </a:prstGeom>
             <a:solidFill>
-              <a:srgbClr val="7F7F7F">
+              <a:srgbClr val="F8766D">
                 <a:alpha val="100000"/>
               </a:srgbClr>
             </a:solidFill>
             <a:ln w="9000" cap="rnd">
               <a:solidFill>
-                <a:srgbClr val="7F7F7F">
+                <a:srgbClr val="F8766D">
                   <a:alpha val="100000"/>
                 </a:srgbClr>
               </a:solidFill>
@@ -4701,20 +4701,20 @@
           </p:nvSpPr>
           <p:spPr>
             <a:xfrm>
-              <a:off x="3193795" y="3887792"/>
+              <a:off x="3218561" y="3887792"/>
               <a:ext cx="49651" cy="49651"/>
             </a:xfrm>
             <a:prstGeom prst="ellipse">
               <a:avLst/>
             </a:prstGeom>
             <a:solidFill>
-              <a:srgbClr val="7F7F7F">
+              <a:srgbClr val="F8766D">
                 <a:alpha val="100000"/>
               </a:srgbClr>
             </a:solidFill>
             <a:ln w="9000" cap="rnd">
               <a:solidFill>
-                <a:srgbClr val="7F7F7F">
+                <a:srgbClr val="F8766D">
                   <a:alpha val="100000"/>
                 </a:srgbClr>
               </a:solidFill>
@@ -4736,20 +4736,20 @@
           </p:nvSpPr>
           <p:spPr>
             <a:xfrm>
-              <a:off x="3263536" y="3787766"/>
+              <a:off x="3289284" y="3787766"/>
               <a:ext cx="49651" cy="49651"/>
             </a:xfrm>
             <a:prstGeom prst="ellipse">
               <a:avLst/>
             </a:prstGeom>
             <a:solidFill>
-              <a:srgbClr val="7F7F7F">
+              <a:srgbClr val="F8766D">
                 <a:alpha val="100000"/>
               </a:srgbClr>
             </a:solidFill>
             <a:ln w="9000" cap="rnd">
               <a:solidFill>
-                <a:srgbClr val="7F7F7F">
+                <a:srgbClr val="F8766D">
                   <a:alpha val="100000"/>
                 </a:srgbClr>
               </a:solidFill>
@@ -4771,20 +4771,20 @@
           </p:nvSpPr>
           <p:spPr>
             <a:xfrm>
-              <a:off x="3333277" y="3635165"/>
+              <a:off x="3360008" y="3635165"/>
               <a:ext cx="49651" cy="49651"/>
             </a:xfrm>
             <a:prstGeom prst="ellipse">
               <a:avLst/>
             </a:prstGeom>
             <a:solidFill>
-              <a:srgbClr val="7F7F7F">
+              <a:srgbClr val="F8766D">
                 <a:alpha val="100000"/>
               </a:srgbClr>
             </a:solidFill>
             <a:ln w="9000" cap="rnd">
               <a:solidFill>
-                <a:srgbClr val="7F7F7F">
+                <a:srgbClr val="F8766D">
                   <a:alpha val="100000"/>
                 </a:srgbClr>
               </a:solidFill>
@@ -4806,20 +4806,20 @@
           </p:nvSpPr>
           <p:spPr>
             <a:xfrm>
-              <a:off x="3403017" y="3440179"/>
+              <a:off x="3430731" y="3440179"/>
               <a:ext cx="49651" cy="49651"/>
             </a:xfrm>
             <a:prstGeom prst="ellipse">
               <a:avLst/>
             </a:prstGeom>
             <a:solidFill>
-              <a:srgbClr val="7F7F7F">
+              <a:srgbClr val="F8766D">
                 <a:alpha val="100000"/>
               </a:srgbClr>
             </a:solidFill>
             <a:ln w="9000" cap="rnd">
               <a:solidFill>
-                <a:srgbClr val="7F7F7F">
+                <a:srgbClr val="F8766D">
                   <a:alpha val="100000"/>
                 </a:srgbClr>
               </a:solidFill>
@@ -4841,20 +4841,20 @@
           </p:nvSpPr>
           <p:spPr>
             <a:xfrm>
-              <a:off x="3472758" y="3371766"/>
+              <a:off x="3501455" y="3371766"/>
               <a:ext cx="49651" cy="49651"/>
             </a:xfrm>
             <a:prstGeom prst="ellipse">
               <a:avLst/>
             </a:prstGeom>
             <a:solidFill>
-              <a:srgbClr val="7F7F7F">
+              <a:srgbClr val="F8766D">
                 <a:alpha val="100000"/>
               </a:srgbClr>
             </a:solidFill>
             <a:ln w="9000" cap="rnd">
               <a:solidFill>
-                <a:srgbClr val="7F7F7F">
+                <a:srgbClr val="F8766D">
                   <a:alpha val="100000"/>
                 </a:srgbClr>
               </a:solidFill>
@@ -4876,20 +4876,20 @@
           </p:nvSpPr>
           <p:spPr>
             <a:xfrm>
-              <a:off x="3542499" y="3315838"/>
+              <a:off x="3572178" y="3315838"/>
               <a:ext cx="49651" cy="49651"/>
             </a:xfrm>
             <a:prstGeom prst="ellipse">
               <a:avLst/>
             </a:prstGeom>
             <a:solidFill>
-              <a:srgbClr val="7F7F7F">
+              <a:srgbClr val="F8766D">
                 <a:alpha val="100000"/>
               </a:srgbClr>
             </a:solidFill>
             <a:ln w="9000" cap="rnd">
               <a:solidFill>
-                <a:srgbClr val="7F7F7F">
+                <a:srgbClr val="F8766D">
                   <a:alpha val="100000"/>
                 </a:srgbClr>
               </a:solidFill>
@@ -4911,20 +4911,20 @@
           </p:nvSpPr>
           <p:spPr>
             <a:xfrm>
-              <a:off x="3612240" y="3276963"/>
+              <a:off x="3642902" y="3276963"/>
               <a:ext cx="49651" cy="49651"/>
             </a:xfrm>
             <a:prstGeom prst="ellipse">
               <a:avLst/>
             </a:prstGeom>
             <a:solidFill>
-              <a:srgbClr val="7F7F7F">
+              <a:srgbClr val="F8766D">
                 <a:alpha val="100000"/>
               </a:srgbClr>
             </a:solidFill>
             <a:ln w="9000" cap="rnd">
               <a:solidFill>
-                <a:srgbClr val="7F7F7F">
+                <a:srgbClr val="F8766D">
                   <a:alpha val="100000"/>
                 </a:srgbClr>
               </a:solidFill>
@@ -4946,20 +4946,20 @@
           </p:nvSpPr>
           <p:spPr>
             <a:xfrm>
-              <a:off x="3681980" y="3079613"/>
+              <a:off x="3713625" y="3079613"/>
               <a:ext cx="49651" cy="49651"/>
             </a:xfrm>
             <a:prstGeom prst="ellipse">
               <a:avLst/>
             </a:prstGeom>
             <a:solidFill>
-              <a:srgbClr val="7F7F7F">
+              <a:srgbClr val="F8766D">
                 <a:alpha val="100000"/>
               </a:srgbClr>
             </a:solidFill>
             <a:ln w="9000" cap="rnd">
               <a:solidFill>
-                <a:srgbClr val="7F7F7F">
+                <a:srgbClr val="F8766D">
                   <a:alpha val="100000"/>
                 </a:srgbClr>
               </a:solidFill>
@@ -4981,20 +4981,20 @@
           </p:nvSpPr>
           <p:spPr>
             <a:xfrm>
-              <a:off x="3751721" y="2746356"/>
+              <a:off x="3784349" y="2746356"/>
               <a:ext cx="49651" cy="49651"/>
             </a:xfrm>
             <a:prstGeom prst="ellipse">
               <a:avLst/>
             </a:prstGeom>
             <a:solidFill>
-              <a:srgbClr val="7F7F7F">
+              <a:srgbClr val="F8766D">
                 <a:alpha val="100000"/>
               </a:srgbClr>
             </a:solidFill>
             <a:ln w="9000" cap="rnd">
               <a:solidFill>
-                <a:srgbClr val="7F7F7F">
+                <a:srgbClr val="F8766D">
                   <a:alpha val="100000"/>
                 </a:srgbClr>
               </a:solidFill>
@@ -5016,20 +5016,20 @@
           </p:nvSpPr>
           <p:spPr>
             <a:xfrm>
-              <a:off x="3821462" y="2375320"/>
+              <a:off x="3855072" y="2375320"/>
               <a:ext cx="49651" cy="49651"/>
             </a:xfrm>
             <a:prstGeom prst="ellipse">
               <a:avLst/>
             </a:prstGeom>
             <a:solidFill>
-              <a:srgbClr val="7F7F7F">
+              <a:srgbClr val="F8766D">
                 <a:alpha val="100000"/>
               </a:srgbClr>
             </a:solidFill>
             <a:ln w="9000" cap="rnd">
               <a:solidFill>
-                <a:srgbClr val="7F7F7F">
+                <a:srgbClr val="F8766D">
                   <a:alpha val="100000"/>
                 </a:srgbClr>
               </a:solidFill>
@@ -5051,20 +5051,20 @@
           </p:nvSpPr>
           <p:spPr>
             <a:xfrm>
-              <a:off x="3891203" y="1942530"/>
+              <a:off x="3925796" y="1942530"/>
               <a:ext cx="49651" cy="49651"/>
             </a:xfrm>
             <a:prstGeom prst="ellipse">
               <a:avLst/>
             </a:prstGeom>
             <a:solidFill>
-              <a:srgbClr val="7F7F7F">
+              <a:srgbClr val="F8766D">
                 <a:alpha val="100000"/>
               </a:srgbClr>
             </a:solidFill>
             <a:ln w="9000" cap="rnd">
               <a:solidFill>
-                <a:srgbClr val="7F7F7F">
+                <a:srgbClr val="F8766D">
                   <a:alpha val="100000"/>
                 </a:srgbClr>
               </a:solidFill>
@@ -5086,20 +5086,20 @@
           </p:nvSpPr>
           <p:spPr>
             <a:xfrm>
-              <a:off x="3960943" y="1608039"/>
+              <a:off x="3996519" y="1608039"/>
               <a:ext cx="49651" cy="49651"/>
             </a:xfrm>
             <a:prstGeom prst="ellipse">
               <a:avLst/>
             </a:prstGeom>
             <a:solidFill>
-              <a:srgbClr val="7F7F7F">
+              <a:srgbClr val="F8766D">
                 <a:alpha val="100000"/>
               </a:srgbClr>
             </a:solidFill>
             <a:ln w="9000" cap="rnd">
               <a:solidFill>
-                <a:srgbClr val="7F7F7F">
+                <a:srgbClr val="F8766D">
                   <a:alpha val="100000"/>
                 </a:srgbClr>
               </a:solidFill>
@@ -5121,20 +5121,20 @@
           </p:nvSpPr>
           <p:spPr>
             <a:xfrm>
-              <a:off x="4030684" y="1310157"/>
+              <a:off x="4067243" y="1310157"/>
               <a:ext cx="49651" cy="49651"/>
             </a:xfrm>
             <a:prstGeom prst="ellipse">
               <a:avLst/>
             </a:prstGeom>
             <a:solidFill>
-              <a:srgbClr val="7F7F7F">
+              <a:srgbClr val="F8766D">
                 <a:alpha val="100000"/>
               </a:srgbClr>
             </a:solidFill>
             <a:ln w="9000" cap="rnd">
               <a:solidFill>
-                <a:srgbClr val="7F7F7F">
+                <a:srgbClr val="F8766D">
                   <a:alpha val="100000"/>
                 </a:srgbClr>
               </a:solidFill>
@@ -5156,20 +5156,20 @@
           </p:nvSpPr>
           <p:spPr>
             <a:xfrm>
-              <a:off x="4100425" y="1103952"/>
+              <a:off x="4137967" y="1103952"/>
               <a:ext cx="49651" cy="49651"/>
             </a:xfrm>
             <a:prstGeom prst="ellipse">
               <a:avLst/>
             </a:prstGeom>
             <a:solidFill>
-              <a:srgbClr val="7F7F7F">
+              <a:srgbClr val="F8766D">
                 <a:alpha val="100000"/>
               </a:srgbClr>
             </a:solidFill>
             <a:ln w="9000" cap="rnd">
               <a:solidFill>
-                <a:srgbClr val="7F7F7F">
+                <a:srgbClr val="F8766D">
                   <a:alpha val="100000"/>
                 </a:srgbClr>
               </a:solidFill>
@@ -5191,20 +5191,20 @@
           </p:nvSpPr>
           <p:spPr>
             <a:xfrm>
-              <a:off x="4170166" y="1511243"/>
+              <a:off x="4208690" y="1511243"/>
               <a:ext cx="49651" cy="49651"/>
             </a:xfrm>
             <a:prstGeom prst="ellipse">
               <a:avLst/>
             </a:prstGeom>
             <a:solidFill>
-              <a:srgbClr val="7F7F7F">
+              <a:srgbClr val="F8766D">
                 <a:alpha val="100000"/>
               </a:srgbClr>
             </a:solidFill>
             <a:ln w="9000" cap="rnd">
               <a:solidFill>
-                <a:srgbClr val="7F7F7F">
+                <a:srgbClr val="F8766D">
                   <a:alpha val="100000"/>
                 </a:srgbClr>
               </a:solidFill>
@@ -5226,20 +5226,20 @@
           </p:nvSpPr>
           <p:spPr>
             <a:xfrm>
-              <a:off x="4239906" y="2089222"/>
+              <a:off x="4279414" y="2089222"/>
               <a:ext cx="49651" cy="49651"/>
             </a:xfrm>
             <a:prstGeom prst="ellipse">
               <a:avLst/>
             </a:prstGeom>
             <a:solidFill>
-              <a:srgbClr val="7F7F7F">
+              <a:srgbClr val="F8766D">
                 <a:alpha val="100000"/>
               </a:srgbClr>
             </a:solidFill>
             <a:ln w="9000" cap="rnd">
               <a:solidFill>
-                <a:srgbClr val="7F7F7F">
+                <a:srgbClr val="F8766D">
                   <a:alpha val="100000"/>
                 </a:srgbClr>
               </a:solidFill>
@@ -5261,20 +5261,20 @@
           </p:nvSpPr>
           <p:spPr>
             <a:xfrm>
-              <a:off x="4309647" y="2427593"/>
+              <a:off x="4350137" y="2427593"/>
               <a:ext cx="49651" cy="49651"/>
             </a:xfrm>
             <a:prstGeom prst="ellipse">
               <a:avLst/>
             </a:prstGeom>
             <a:solidFill>
-              <a:srgbClr val="7F7F7F">
+              <a:srgbClr val="F8766D">
                 <a:alpha val="100000"/>
               </a:srgbClr>
             </a:solidFill>
             <a:ln w="9000" cap="rnd">
               <a:solidFill>
-                <a:srgbClr val="7F7F7F">
+                <a:srgbClr val="F8766D">
                   <a:alpha val="100000"/>
                 </a:srgbClr>
               </a:solidFill>
@@ -5296,20 +5296,20 @@
           </p:nvSpPr>
           <p:spPr>
             <a:xfrm>
-              <a:off x="4379388" y="2713729"/>
+              <a:off x="4420861" y="2713729"/>
               <a:ext cx="49651" cy="49651"/>
             </a:xfrm>
             <a:prstGeom prst="ellipse">
               <a:avLst/>
             </a:prstGeom>
             <a:solidFill>
-              <a:srgbClr val="7F7F7F">
+              <a:srgbClr val="F8766D">
                 <a:alpha val="100000"/>
               </a:srgbClr>
             </a:solidFill>
             <a:ln w="9000" cap="rnd">
               <a:solidFill>
-                <a:srgbClr val="7F7F7F">
+                <a:srgbClr val="F8766D">
                   <a:alpha val="100000"/>
                 </a:srgbClr>
               </a:solidFill>
@@ -5331,20 +5331,20 @@
           </p:nvSpPr>
           <p:spPr>
             <a:xfrm>
-              <a:off x="4449129" y="3037251"/>
+              <a:off x="4491584" y="3037251"/>
               <a:ext cx="49651" cy="49651"/>
             </a:xfrm>
             <a:prstGeom prst="ellipse">
               <a:avLst/>
             </a:prstGeom>
             <a:solidFill>
-              <a:srgbClr val="7F7F7F">
+              <a:srgbClr val="F8766D">
                 <a:alpha val="100000"/>
               </a:srgbClr>
             </a:solidFill>
             <a:ln w="9000" cap="rnd">
               <a:solidFill>
-                <a:srgbClr val="7F7F7F">
+                <a:srgbClr val="F8766D">
                   <a:alpha val="100000"/>
                 </a:srgbClr>
               </a:solidFill>
@@ -5366,20 +5366,20 @@
           </p:nvSpPr>
           <p:spPr>
             <a:xfrm>
-              <a:off x="4518869" y="3186058"/>
+              <a:off x="4562308" y="3186058"/>
               <a:ext cx="49651" cy="49651"/>
             </a:xfrm>
             <a:prstGeom prst="ellipse">
               <a:avLst/>
             </a:prstGeom>
             <a:solidFill>
-              <a:srgbClr val="7F7F7F">
+              <a:srgbClr val="F8766D">
                 <a:alpha val="100000"/>
               </a:srgbClr>
             </a:solidFill>
             <a:ln w="9000" cap="rnd">
               <a:solidFill>
-                <a:srgbClr val="7F7F7F">
+                <a:srgbClr val="F8766D">
                   <a:alpha val="100000"/>
                 </a:srgbClr>
               </a:solidFill>
@@ -5401,20 +5401,20 @@
           </p:nvSpPr>
           <p:spPr>
             <a:xfrm>
-              <a:off x="4588610" y="3150753"/>
+              <a:off x="4633031" y="3150753"/>
               <a:ext cx="49651" cy="49651"/>
             </a:xfrm>
             <a:prstGeom prst="ellipse">
               <a:avLst/>
             </a:prstGeom>
             <a:solidFill>
-              <a:srgbClr val="7F7F7F">
+              <a:srgbClr val="F8766D">
                 <a:alpha val="100000"/>
               </a:srgbClr>
             </a:solidFill>
             <a:ln w="9000" cap="rnd">
               <a:solidFill>
-                <a:srgbClr val="7F7F7F">
+                <a:srgbClr val="F8766D">
                   <a:alpha val="100000"/>
                 </a:srgbClr>
               </a:solidFill>
@@ -5436,20 +5436,20 @@
           </p:nvSpPr>
           <p:spPr>
             <a:xfrm>
-              <a:off x="4658351" y="2997333"/>
+              <a:off x="4703755" y="2997333"/>
               <a:ext cx="49651" cy="49651"/>
             </a:xfrm>
             <a:prstGeom prst="ellipse">
               <a:avLst/>
             </a:prstGeom>
             <a:solidFill>
-              <a:srgbClr val="7F7F7F">
+              <a:srgbClr val="F8766D">
                 <a:alpha val="100000"/>
               </a:srgbClr>
             </a:solidFill>
             <a:ln w="9000" cap="rnd">
               <a:solidFill>
-                <a:srgbClr val="7F7F7F">
+                <a:srgbClr val="F8766D">
                   <a:alpha val="100000"/>
                 </a:srgbClr>
               </a:solidFill>
@@ -5471,20 +5471,20 @@
           </p:nvSpPr>
           <p:spPr>
             <a:xfrm>
-              <a:off x="4728092" y="2714497"/>
+              <a:off x="4774478" y="2714497"/>
               <a:ext cx="49651" cy="49651"/>
             </a:xfrm>
             <a:prstGeom prst="ellipse">
               <a:avLst/>
             </a:prstGeom>
             <a:solidFill>
-              <a:srgbClr val="7F7F7F">
+              <a:srgbClr val="F8766D">
                 <a:alpha val="100000"/>
               </a:srgbClr>
             </a:solidFill>
             <a:ln w="9000" cap="rnd">
               <a:solidFill>
-                <a:srgbClr val="7F7F7F">
+                <a:srgbClr val="F8766D">
                   <a:alpha val="100000"/>
                 </a:srgbClr>
               </a:solidFill>
@@ -5506,20 +5506,20 @@
           </p:nvSpPr>
           <p:spPr>
             <a:xfrm>
-              <a:off x="4797832" y="2528031"/>
+              <a:off x="4845202" y="2528031"/>
               <a:ext cx="49651" cy="49651"/>
             </a:xfrm>
             <a:prstGeom prst="ellipse">
               <a:avLst/>
             </a:prstGeom>
             <a:solidFill>
-              <a:srgbClr val="7F7F7F">
+              <a:srgbClr val="F8766D">
                 <a:alpha val="100000"/>
               </a:srgbClr>
             </a:solidFill>
             <a:ln w="9000" cap="rnd">
               <a:solidFill>
-                <a:srgbClr val="7F7F7F">
+                <a:srgbClr val="F8766D">
                   <a:alpha val="100000"/>
                 </a:srgbClr>
               </a:solidFill>
@@ -5541,20 +5541,20 @@
           </p:nvSpPr>
           <p:spPr>
             <a:xfrm>
-              <a:off x="4867573" y="2375285"/>
+              <a:off x="4915925" y="2375285"/>
               <a:ext cx="49651" cy="49651"/>
             </a:xfrm>
             <a:prstGeom prst="ellipse">
               <a:avLst/>
             </a:prstGeom>
             <a:solidFill>
-              <a:srgbClr val="7F7F7F">
+              <a:srgbClr val="F8766D">
                 <a:alpha val="100000"/>
               </a:srgbClr>
             </a:solidFill>
             <a:ln w="9000" cap="rnd">
               <a:solidFill>
-                <a:srgbClr val="7F7F7F">
+                <a:srgbClr val="F8766D">
                   <a:alpha val="100000"/>
                 </a:srgbClr>
               </a:solidFill>
@@ -5576,20 +5576,20 @@
           </p:nvSpPr>
           <p:spPr>
             <a:xfrm>
-              <a:off x="4937314" y="2528220"/>
+              <a:off x="4986649" y="2528220"/>
               <a:ext cx="49651" cy="49651"/>
             </a:xfrm>
             <a:prstGeom prst="ellipse">
               <a:avLst/>
             </a:prstGeom>
             <a:solidFill>
-              <a:srgbClr val="7F7F7F">
+              <a:srgbClr val="F8766D">
                 <a:alpha val="100000"/>
               </a:srgbClr>
             </a:solidFill>
             <a:ln w="9000" cap="rnd">
               <a:solidFill>
-                <a:srgbClr val="7F7F7F">
+                <a:srgbClr val="F8766D">
                   <a:alpha val="100000"/>
                 </a:srgbClr>
               </a:solidFill>
@@ -5611,20 +5611,20 @@
           </p:nvSpPr>
           <p:spPr>
             <a:xfrm>
-              <a:off x="5007054" y="2809556"/>
+              <a:off x="5057372" y="2809556"/>
               <a:ext cx="49651" cy="49651"/>
             </a:xfrm>
             <a:prstGeom prst="ellipse">
               <a:avLst/>
             </a:prstGeom>
             <a:solidFill>
-              <a:srgbClr val="7F7F7F">
+              <a:srgbClr val="F8766D">
                 <a:alpha val="100000"/>
               </a:srgbClr>
             </a:solidFill>
             <a:ln w="9000" cap="rnd">
               <a:solidFill>
-                <a:srgbClr val="7F7F7F">
+                <a:srgbClr val="F8766D">
                   <a:alpha val="100000"/>
                 </a:srgbClr>
               </a:solidFill>
@@ -5646,20 +5646,20 @@
           </p:nvSpPr>
           <p:spPr>
             <a:xfrm>
-              <a:off x="5076795" y="3260761"/>
+              <a:off x="5128096" y="3260761"/>
               <a:ext cx="49651" cy="49651"/>
             </a:xfrm>
             <a:prstGeom prst="ellipse">
               <a:avLst/>
             </a:prstGeom>
             <a:solidFill>
-              <a:srgbClr val="7F7F7F">
+              <a:srgbClr val="F8766D">
                 <a:alpha val="100000"/>
               </a:srgbClr>
             </a:solidFill>
             <a:ln w="9000" cap="rnd">
               <a:solidFill>
-                <a:srgbClr val="7F7F7F">
+                <a:srgbClr val="F8766D">
                   <a:alpha val="100000"/>
                 </a:srgbClr>
               </a:solidFill>
@@ -5681,20 +5681,20 @@
           </p:nvSpPr>
           <p:spPr>
             <a:xfrm>
-              <a:off x="5146536" y="3547107"/>
+              <a:off x="5198819" y="3547107"/>
               <a:ext cx="49651" cy="49651"/>
             </a:xfrm>
             <a:prstGeom prst="ellipse">
               <a:avLst/>
             </a:prstGeom>
             <a:solidFill>
-              <a:srgbClr val="7F7F7F">
+              <a:srgbClr val="F8766D">
                 <a:alpha val="100000"/>
               </a:srgbClr>
             </a:solidFill>
             <a:ln w="9000" cap="rnd">
               <a:solidFill>
-                <a:srgbClr val="7F7F7F">
+                <a:srgbClr val="F8766D">
                   <a:alpha val="100000"/>
                 </a:srgbClr>
               </a:solidFill>
@@ -5716,20 +5716,20 @@
           </p:nvSpPr>
           <p:spPr>
             <a:xfrm>
-              <a:off x="5216277" y="3725776"/>
+              <a:off x="5269543" y="3725776"/>
               <a:ext cx="49651" cy="49651"/>
             </a:xfrm>
             <a:prstGeom prst="ellipse">
               <a:avLst/>
             </a:prstGeom>
             <a:solidFill>
-              <a:srgbClr val="7F7F7F">
+              <a:srgbClr val="F8766D">
                 <a:alpha val="100000"/>
               </a:srgbClr>
             </a:solidFill>
             <a:ln w="9000" cap="rnd">
               <a:solidFill>
-                <a:srgbClr val="7F7F7F">
+                <a:srgbClr val="F8766D">
                   <a:alpha val="100000"/>
                 </a:srgbClr>
               </a:solidFill>
@@ -5751,20 +5751,20 @@
           </p:nvSpPr>
           <p:spPr>
             <a:xfrm>
-              <a:off x="5286017" y="3813041"/>
+              <a:off x="5340266" y="3813041"/>
               <a:ext cx="49651" cy="49651"/>
             </a:xfrm>
             <a:prstGeom prst="ellipse">
               <a:avLst/>
             </a:prstGeom>
             <a:solidFill>
-              <a:srgbClr val="7F7F7F">
+              <a:srgbClr val="F8766D">
                 <a:alpha val="100000"/>
               </a:srgbClr>
             </a:solidFill>
             <a:ln w="9000" cap="rnd">
               <a:solidFill>
-                <a:srgbClr val="7F7F7F">
+                <a:srgbClr val="F8766D">
                   <a:alpha val="100000"/>
                 </a:srgbClr>
               </a:solidFill>
@@ -5786,20 +5786,20 @@
           </p:nvSpPr>
           <p:spPr>
             <a:xfrm>
-              <a:off x="5355758" y="3867834"/>
+              <a:off x="5410990" y="3867834"/>
               <a:ext cx="49651" cy="49651"/>
             </a:xfrm>
             <a:prstGeom prst="ellipse">
               <a:avLst/>
             </a:prstGeom>
             <a:solidFill>
-              <a:srgbClr val="7F7F7F">
+              <a:srgbClr val="F8766D">
                 <a:alpha val="100000"/>
               </a:srgbClr>
             </a:solidFill>
             <a:ln w="9000" cap="rnd">
               <a:solidFill>
-                <a:srgbClr val="7F7F7F">
+                <a:srgbClr val="F8766D">
                   <a:alpha val="100000"/>
                 </a:srgbClr>
               </a:solidFill>
@@ -6165,7 +6165,7 @@
           </p:nvSpPr>
           <p:spPr>
             <a:xfrm>
-              <a:off x="1649454" y="4169365"/>
+              <a:off x="1652108" y="4169365"/>
               <a:ext cx="0" cy="34794"/>
             </a:xfrm>
             <a:custGeom>
@@ -6205,7 +6205,7 @@
           </p:nvSpPr>
           <p:spPr>
             <a:xfrm>
-              <a:off x="1998158" y="4169365"/>
+              <a:off x="2005725" y="4169365"/>
               <a:ext cx="0" cy="34794"/>
             </a:xfrm>
             <a:custGeom>
@@ -6245,7 +6245,7 @@
           </p:nvSpPr>
           <p:spPr>
             <a:xfrm>
-              <a:off x="2346862" y="4169365"/>
+              <a:off x="2359343" y="4169365"/>
               <a:ext cx="0" cy="34794"/>
             </a:xfrm>
             <a:custGeom>
@@ -6285,7 +6285,7 @@
           </p:nvSpPr>
           <p:spPr>
             <a:xfrm>
-              <a:off x="2695566" y="4169365"/>
+              <a:off x="2712960" y="4169365"/>
               <a:ext cx="0" cy="34794"/>
             </a:xfrm>
             <a:custGeom>
@@ -6325,7 +6325,7 @@
           </p:nvSpPr>
           <p:spPr>
             <a:xfrm>
-              <a:off x="3044269" y="4169365"/>
+              <a:off x="3066578" y="4169365"/>
               <a:ext cx="0" cy="34794"/>
             </a:xfrm>
             <a:custGeom>
@@ -6365,7 +6365,7 @@
           </p:nvSpPr>
           <p:spPr>
             <a:xfrm>
-              <a:off x="3392973" y="4169365"/>
+              <a:off x="3420196" y="4169365"/>
               <a:ext cx="0" cy="34794"/>
             </a:xfrm>
             <a:custGeom>
@@ -6405,7 +6405,7 @@
           </p:nvSpPr>
           <p:spPr>
             <a:xfrm>
-              <a:off x="3741677" y="4169365"/>
+              <a:off x="3773813" y="4169365"/>
               <a:ext cx="0" cy="34794"/>
             </a:xfrm>
             <a:custGeom>
@@ -6445,7 +6445,7 @@
           </p:nvSpPr>
           <p:spPr>
             <a:xfrm>
-              <a:off x="4090380" y="4169365"/>
+              <a:off x="4127431" y="4169365"/>
               <a:ext cx="0" cy="34794"/>
             </a:xfrm>
             <a:custGeom>
@@ -6485,7 +6485,7 @@
           </p:nvSpPr>
           <p:spPr>
             <a:xfrm>
-              <a:off x="4439084" y="4169365"/>
+              <a:off x="4481048" y="4169365"/>
               <a:ext cx="0" cy="34794"/>
             </a:xfrm>
             <a:custGeom>
@@ -6525,7 +6525,7 @@
           </p:nvSpPr>
           <p:spPr>
             <a:xfrm>
-              <a:off x="4787788" y="4169365"/>
+              <a:off x="4834666" y="4169365"/>
               <a:ext cx="0" cy="34794"/>
             </a:xfrm>
             <a:custGeom>
@@ -6565,7 +6565,7 @@
           </p:nvSpPr>
           <p:spPr>
             <a:xfrm>
-              <a:off x="5136492" y="4169365"/>
+              <a:off x="5188283" y="4169365"/>
               <a:ext cx="0" cy="34794"/>
             </a:xfrm>
             <a:custGeom>
@@ -6605,7 +6605,7 @@
           </p:nvSpPr>
           <p:spPr>
             <a:xfrm>
-              <a:off x="5485195" y="4169365"/>
+              <a:off x="5541901" y="4169365"/>
               <a:ext cx="0" cy="34794"/>
             </a:xfrm>
             <a:custGeom>
@@ -6645,7 +6645,7 @@
           </p:nvSpPr>
           <p:spPr>
             <a:xfrm>
-              <a:off x="1613902" y="4228939"/>
+              <a:off x="1616555" y="4228939"/>
               <a:ext cx="71105" cy="84529"/>
             </a:xfrm>
             <a:prstGeom prst="rect">
@@ -6691,7 +6691,7 @@
           </p:nvSpPr>
           <p:spPr>
             <a:xfrm>
-              <a:off x="1962606" y="4230412"/>
+              <a:off x="1970173" y="4230412"/>
               <a:ext cx="71105" cy="83056"/>
             </a:xfrm>
             <a:prstGeom prst="rect">
@@ -6737,7 +6737,7 @@
           </p:nvSpPr>
           <p:spPr>
             <a:xfrm>
-              <a:off x="2275757" y="4228939"/>
+              <a:off x="2288238" y="4228939"/>
               <a:ext cx="142210" cy="84529"/>
             </a:xfrm>
             <a:prstGeom prst="rect">
@@ -6783,7 +6783,7 @@
           </p:nvSpPr>
           <p:spPr>
             <a:xfrm>
-              <a:off x="2624460" y="4230412"/>
+              <a:off x="2641855" y="4230412"/>
               <a:ext cx="142210" cy="83056"/>
             </a:xfrm>
             <a:prstGeom prst="rect">
@@ -6829,7 +6829,7 @@
           </p:nvSpPr>
           <p:spPr>
             <a:xfrm>
-              <a:off x="2973164" y="4228939"/>
+              <a:off x="2995473" y="4228939"/>
               <a:ext cx="142210" cy="84529"/>
             </a:xfrm>
             <a:prstGeom prst="rect">
@@ -6875,7 +6875,7 @@
           </p:nvSpPr>
           <p:spPr>
             <a:xfrm>
-              <a:off x="3321868" y="4228939"/>
+              <a:off x="3349090" y="4228939"/>
               <a:ext cx="142210" cy="84529"/>
             </a:xfrm>
             <a:prstGeom prst="rect">
@@ -6921,7 +6921,7 @@
           </p:nvSpPr>
           <p:spPr>
             <a:xfrm>
-              <a:off x="3670572" y="4228939"/>
+              <a:off x="3702708" y="4228939"/>
               <a:ext cx="142210" cy="84529"/>
             </a:xfrm>
             <a:prstGeom prst="rect">
@@ -6967,7 +6967,7 @@
           </p:nvSpPr>
           <p:spPr>
             <a:xfrm>
-              <a:off x="4019275" y="4228939"/>
+              <a:off x="4056326" y="4228939"/>
               <a:ext cx="142210" cy="84529"/>
             </a:xfrm>
             <a:prstGeom prst="rect">
@@ -7013,7 +7013,7 @@
           </p:nvSpPr>
           <p:spPr>
             <a:xfrm>
-              <a:off x="4367979" y="4228939"/>
+              <a:off x="4409943" y="4228939"/>
               <a:ext cx="142210" cy="84529"/>
             </a:xfrm>
             <a:prstGeom prst="rect">
@@ -7059,7 +7059,7 @@
           </p:nvSpPr>
           <p:spPr>
             <a:xfrm>
-              <a:off x="4716683" y="4230412"/>
+              <a:off x="4763561" y="4230412"/>
               <a:ext cx="142210" cy="83056"/>
             </a:xfrm>
             <a:prstGeom prst="rect">
@@ -7105,7 +7105,7 @@
           </p:nvSpPr>
           <p:spPr>
             <a:xfrm>
-              <a:off x="5065386" y="4228939"/>
+              <a:off x="5117178" y="4228939"/>
               <a:ext cx="142210" cy="84529"/>
             </a:xfrm>
             <a:prstGeom prst="rect">
@@ -7151,7 +7151,7 @@
           </p:nvSpPr>
           <p:spPr>
             <a:xfrm>
-              <a:off x="5414090" y="4230412"/>
+              <a:off x="5470796" y="4230412"/>
               <a:ext cx="142210" cy="83056"/>
             </a:xfrm>
             <a:prstGeom prst="rect">
@@ -7197,7 +7197,7 @@
           </p:nvSpPr>
           <p:spPr>
             <a:xfrm>
-              <a:off x="2815878" y="4338154"/>
+              <a:off x="2845066" y="4338154"/>
               <a:ext cx="1433152" cy="135197"/>
             </a:xfrm>
             <a:prstGeom prst="rect">
@@ -7289,8 +7289,8 @@
           </p:nvSpPr>
           <p:spPr>
             <a:xfrm>
-              <a:off x="5742933" y="2297115"/>
-              <a:ext cx="588277" cy="559123"/>
+              <a:off x="5801309" y="2297115"/>
+              <a:ext cx="529901" cy="559123"/>
             </a:xfrm>
             <a:prstGeom prst="rect">
               <a:avLst/>
@@ -7315,7 +7315,7 @@
           </p:nvSpPr>
           <p:spPr>
             <a:xfrm>
-              <a:off x="5812522" y="2381233"/>
+              <a:off x="5870898" y="2381233"/>
               <a:ext cx="390723" cy="101841"/>
             </a:xfrm>
             <a:prstGeom prst="rect">
@@ -7361,7 +7361,7 @@
           </p:nvSpPr>
           <p:spPr>
             <a:xfrm>
-              <a:off x="5812522" y="2567193"/>
+              <a:off x="5870898" y="2567193"/>
               <a:ext cx="219455" cy="219456"/>
             </a:xfrm>
             <a:prstGeom prst="rect">
@@ -7387,7 +7387,7 @@
           </p:nvSpPr>
           <p:spPr>
             <a:xfrm>
-              <a:off x="5834467" y="2676921"/>
+              <a:off x="5892844" y="2676921"/>
               <a:ext cx="175564" cy="0"/>
             </a:xfrm>
             <a:custGeom>
@@ -7405,7 +7405,7 @@
             </a:custGeom>
             <a:ln w="27101" cap="flat">
               <a:solidFill>
-                <a:srgbClr val="7F7F7F">
+                <a:srgbClr val="F8766D">
                   <a:alpha val="100000"/>
                 </a:srgbClr>
               </a:solidFill>
@@ -7427,20 +7427,20 @@
           </p:nvSpPr>
           <p:spPr>
             <a:xfrm>
-              <a:off x="5897424" y="2652096"/>
+              <a:off x="5955800" y="2652096"/>
               <a:ext cx="49651" cy="49651"/>
             </a:xfrm>
             <a:prstGeom prst="ellipse">
               <a:avLst/>
             </a:prstGeom>
             <a:solidFill>
-              <a:srgbClr val="7F7F7F">
+              <a:srgbClr val="F8766D">
                 <a:alpha val="100000"/>
               </a:srgbClr>
             </a:solidFill>
             <a:ln w="9000" cap="rnd">
               <a:solidFill>
-                <a:srgbClr val="7F7F7F">
+                <a:srgbClr val="F8766D">
                   <a:alpha val="100000"/>
                 </a:srgbClr>
               </a:solidFill>
@@ -7462,8 +7462,8 @@
           </p:nvSpPr>
           <p:spPr>
             <a:xfrm>
-              <a:off x="6101567" y="2636185"/>
-              <a:ext cx="160054" cy="81473"/>
+              <a:off x="6159943" y="2636185"/>
+              <a:ext cx="76453" cy="81473"/>
             </a:xfrm>
             <a:prstGeom prst="rect">
               <a:avLst/>
@@ -7495,7 +7495,7 @@
                   <a:latin typeface="DejaVu Sans"/>
                   <a:cs typeface="DejaVu Sans"/>
                 </a:rPr>
-                <a:t>NA</a:t>
+                <a:t>A</a:t>
               </a:r>
             </a:p>
           </p:txBody>

</xml_diff>

<commit_message>
Deploying to gh-pages from @ sean4andrew/safuncs@c4847d61120a77da6009b24c0d32889d5fda3a17 🚀
</commit_message>
<xml_diff>
--- a/reference/ONDA_XX-Hazard-Curve.pptx
+++ b/reference/ONDA_XX-Hazard-Curve.pptx
@@ -7243,8 +7243,8 @@
           </p:nvSpPr>
           <p:spPr>
             <a:xfrm rot="-5400000">
-              <a:off x="600018" y="2522618"/>
-              <a:ext cx="863506" cy="108117"/>
+              <a:off x="783920" y="2522618"/>
+              <a:ext cx="495703" cy="108117"/>
             </a:xfrm>
             <a:prstGeom prst="rect">
               <a:avLst/>
@@ -7276,7 +7276,7 @@
                   <a:latin typeface="DejaVu Sans"/>
                   <a:cs typeface="DejaVu Sans"/>
                 </a:rPr>
-                <a:t>Hazard Rate</a:t>
+                <a:t>Hazard</a:t>
               </a:r>
             </a:p>
           </p:txBody>

</xml_diff>